<commit_message>
Creation of README.md file
- README.md file
- work in progress for Manuel_Filtering_module.docx
</commit_message>
<xml_diff>
--- a/Manuels/picture_EEGpal_manuals.pptx
+++ b/Manuels/picture_EEGpal_manuals.pptx
@@ -289,7 +289,7 @@
           <a:p>
             <a:fld id="{AE28F081-F961-4F1D-B0FD-EEC618487470}" type="datetimeFigureOut">
               <a:rPr lang="en-US" smtClean="0"/>
-              <a:t>9/29/2024</a:t>
+              <a:t>9/30/2024</a:t>
             </a:fld>
             <a:endParaRPr lang="en-US"/>
           </a:p>
@@ -737,7 +737,7 @@
           <a:p>
             <a:fld id="{BCB0654D-2F9E-40DC-B910-8F58A623289D}" type="datetimeFigureOut">
               <a:rPr lang="fr-CH" smtClean="0"/>
-              <a:t>29.09.2024</a:t>
+              <a:t>30.09.2024</a:t>
             </a:fld>
             <a:endParaRPr lang="fr-CH"/>
           </a:p>
@@ -907,7 +907,7 @@
           <a:p>
             <a:fld id="{BCB0654D-2F9E-40DC-B910-8F58A623289D}" type="datetimeFigureOut">
               <a:rPr lang="fr-CH" smtClean="0"/>
-              <a:t>29.09.2024</a:t>
+              <a:t>30.09.2024</a:t>
             </a:fld>
             <a:endParaRPr lang="fr-CH"/>
           </a:p>
@@ -1087,7 +1087,7 @@
           <a:p>
             <a:fld id="{BCB0654D-2F9E-40DC-B910-8F58A623289D}" type="datetimeFigureOut">
               <a:rPr lang="fr-CH" smtClean="0"/>
-              <a:t>29.09.2024</a:t>
+              <a:t>30.09.2024</a:t>
             </a:fld>
             <a:endParaRPr lang="fr-CH"/>
           </a:p>
@@ -1257,7 +1257,7 @@
           <a:p>
             <a:fld id="{BCB0654D-2F9E-40DC-B910-8F58A623289D}" type="datetimeFigureOut">
               <a:rPr lang="fr-CH" smtClean="0"/>
-              <a:t>29.09.2024</a:t>
+              <a:t>30.09.2024</a:t>
             </a:fld>
             <a:endParaRPr lang="fr-CH"/>
           </a:p>
@@ -1503,7 +1503,7 @@
           <a:p>
             <a:fld id="{BCB0654D-2F9E-40DC-B910-8F58A623289D}" type="datetimeFigureOut">
               <a:rPr lang="fr-CH" smtClean="0"/>
-              <a:t>29.09.2024</a:t>
+              <a:t>30.09.2024</a:t>
             </a:fld>
             <a:endParaRPr lang="fr-CH"/>
           </a:p>
@@ -1791,7 +1791,7 @@
           <a:p>
             <a:fld id="{BCB0654D-2F9E-40DC-B910-8F58A623289D}" type="datetimeFigureOut">
               <a:rPr lang="fr-CH" smtClean="0"/>
-              <a:t>29.09.2024</a:t>
+              <a:t>30.09.2024</a:t>
             </a:fld>
             <a:endParaRPr lang="fr-CH"/>
           </a:p>
@@ -2213,7 +2213,7 @@
           <a:p>
             <a:fld id="{BCB0654D-2F9E-40DC-B910-8F58A623289D}" type="datetimeFigureOut">
               <a:rPr lang="fr-CH" smtClean="0"/>
-              <a:t>29.09.2024</a:t>
+              <a:t>30.09.2024</a:t>
             </a:fld>
             <a:endParaRPr lang="fr-CH"/>
           </a:p>
@@ -2331,7 +2331,7 @@
           <a:p>
             <a:fld id="{BCB0654D-2F9E-40DC-B910-8F58A623289D}" type="datetimeFigureOut">
               <a:rPr lang="fr-CH" smtClean="0"/>
-              <a:t>29.09.2024</a:t>
+              <a:t>30.09.2024</a:t>
             </a:fld>
             <a:endParaRPr lang="fr-CH"/>
           </a:p>
@@ -2426,7 +2426,7 @@
           <a:p>
             <a:fld id="{BCB0654D-2F9E-40DC-B910-8F58A623289D}" type="datetimeFigureOut">
               <a:rPr lang="fr-CH" smtClean="0"/>
-              <a:t>29.09.2024</a:t>
+              <a:t>30.09.2024</a:t>
             </a:fld>
             <a:endParaRPr lang="fr-CH"/>
           </a:p>
@@ -2703,7 +2703,7 @@
           <a:p>
             <a:fld id="{BCB0654D-2F9E-40DC-B910-8F58A623289D}" type="datetimeFigureOut">
               <a:rPr lang="fr-CH" smtClean="0"/>
-              <a:t>29.09.2024</a:t>
+              <a:t>30.09.2024</a:t>
             </a:fld>
             <a:endParaRPr lang="fr-CH"/>
           </a:p>
@@ -2956,7 +2956,7 @@
           <a:p>
             <a:fld id="{BCB0654D-2F9E-40DC-B910-8F58A623289D}" type="datetimeFigureOut">
               <a:rPr lang="fr-CH" smtClean="0"/>
-              <a:t>29.09.2024</a:t>
+              <a:t>30.09.2024</a:t>
             </a:fld>
             <a:endParaRPr lang="fr-CH"/>
           </a:p>
@@ -3169,7 +3169,7 @@
           <a:p>
             <a:fld id="{BCB0654D-2F9E-40DC-B910-8F58A623289D}" type="datetimeFigureOut">
               <a:rPr lang="fr-CH" smtClean="0"/>
-              <a:t>29.09.2024</a:t>
+              <a:t>30.09.2024</a:t>
             </a:fld>
             <a:endParaRPr lang="fr-CH"/>
           </a:p>
@@ -12719,10 +12719,10 @@
       </p:grpSpPr>
       <p:pic>
         <p:nvPicPr>
-          <p:cNvPr id="10" name="Picture 9">
-            <a:extLst>
-              <a:ext uri="{FF2B5EF4-FFF2-40B4-BE49-F238E27FC236}">
-                <a16:creationId xmlns:a16="http://schemas.microsoft.com/office/drawing/2014/main" id="{3D85FB10-471C-2173-880D-E2CD729D642D}"/>
+          <p:cNvPr id="6" name="Picture 5">
+            <a:extLst>
+              <a:ext uri="{FF2B5EF4-FFF2-40B4-BE49-F238E27FC236}">
+                <a16:creationId xmlns:a16="http://schemas.microsoft.com/office/drawing/2014/main" id="{941B5189-4866-C019-258E-462410B17066}"/>
               </a:ext>
             </a:extLst>
           </p:cNvPr>
@@ -12739,54 +12739,129 @@
         </p:blipFill>
         <p:spPr>
           <a:xfrm>
-            <a:off x="1612913" y="2529190"/>
-            <a:ext cx="5734976" cy="4276931"/>
+            <a:off x="692295" y="342106"/>
+            <a:ext cx="7795491" cy="5813586"/>
           </a:xfrm>
           <a:prstGeom prst="rect">
             <a:avLst/>
           </a:prstGeom>
         </p:spPr>
       </p:pic>
-      <p:pic>
-        <p:nvPicPr>
-          <p:cNvPr id="2" name="Picture 1">
-            <a:extLst>
-              <a:ext uri="{FF2B5EF4-FFF2-40B4-BE49-F238E27FC236}">
-                <a16:creationId xmlns:a16="http://schemas.microsoft.com/office/drawing/2014/main" id="{0DEDB5E7-3C72-7B90-9468-4E96F8C102ED}"/>
-              </a:ext>
-            </a:extLst>
-          </p:cNvPr>
-          <p:cNvPicPr>
-            <a:picLocks noChangeAspect="1"/>
-          </p:cNvPicPr>
-          <p:nvPr/>
-        </p:nvPicPr>
-        <p:blipFill>
-          <a:blip r:embed="rId3"/>
-          <a:stretch>
-            <a:fillRect/>
-          </a:stretch>
-        </p:blipFill>
-        <p:spPr>
-          <a:xfrm>
-            <a:off x="2187050" y="51879"/>
-            <a:ext cx="3464995" cy="2482340"/>
-          </a:xfrm>
-          <a:prstGeom prst="rect">
-            <a:avLst/>
-          </a:prstGeom>
-        </p:spPr>
-      </p:pic>
-      <p:sp>
-        <p:nvSpPr>
-          <p:cNvPr id="5" name="Rectangle 4"/>
+      <p:sp>
+        <p:nvSpPr>
+          <p:cNvPr id="12" name="ZoneTexte 11"/>
+          <p:cNvSpPr txBox="1"/>
+          <p:nvPr/>
+        </p:nvSpPr>
+        <p:spPr>
+          <a:xfrm>
+            <a:off x="2267019" y="1255668"/>
+            <a:ext cx="301686" cy="369332"/>
+          </a:xfrm>
+          <a:prstGeom prst="rect">
+            <a:avLst/>
+          </a:prstGeom>
+          <a:noFill/>
+        </p:spPr>
+        <p:txBody>
+          <a:bodyPr wrap="none" rtlCol="0">
+            <a:spAutoFit/>
+          </a:bodyPr>
+          <a:lstStyle/>
+          <a:p>
+            <a:r>
+              <a:rPr lang="fr-CH" dirty="0"/>
+              <a:t>1</a:t>
+            </a:r>
+          </a:p>
+        </p:txBody>
+      </p:sp>
+      <p:sp>
+        <p:nvSpPr>
+          <p:cNvPr id="20" name="ZoneTexte 11">
+            <a:extLst>
+              <a:ext uri="{FF2B5EF4-FFF2-40B4-BE49-F238E27FC236}">
+                <a16:creationId xmlns:a16="http://schemas.microsoft.com/office/drawing/2014/main" id="{FFA8DFB5-2F1C-9B84-C9C0-D6963781B6CC}"/>
+              </a:ext>
+            </a:extLst>
+          </p:cNvPr>
+          <p:cNvSpPr txBox="1"/>
+          <p:nvPr/>
+        </p:nvSpPr>
+        <p:spPr>
+          <a:xfrm>
+            <a:off x="2338276" y="4276151"/>
+            <a:ext cx="301686" cy="369332"/>
+          </a:xfrm>
+          <a:prstGeom prst="rect">
+            <a:avLst/>
+          </a:prstGeom>
+          <a:noFill/>
+        </p:spPr>
+        <p:txBody>
+          <a:bodyPr wrap="none" rtlCol="0">
+            <a:spAutoFit/>
+          </a:bodyPr>
+          <a:lstStyle/>
+          <a:p>
+            <a:r>
+              <a:rPr lang="fr-CH" dirty="0"/>
+              <a:t>2</a:t>
+            </a:r>
+          </a:p>
+        </p:txBody>
+      </p:sp>
+      <p:sp>
+        <p:nvSpPr>
+          <p:cNvPr id="21" name="ZoneTexte 11">
+            <a:extLst>
+              <a:ext uri="{FF2B5EF4-FFF2-40B4-BE49-F238E27FC236}">
+                <a16:creationId xmlns:a16="http://schemas.microsoft.com/office/drawing/2014/main" id="{821BFEA9-8BB4-161F-25B5-65C4CDCF6DF1}"/>
+              </a:ext>
+            </a:extLst>
+          </p:cNvPr>
+          <p:cNvSpPr txBox="1"/>
+          <p:nvPr/>
+        </p:nvSpPr>
+        <p:spPr>
+          <a:xfrm>
+            <a:off x="3534323" y="581951"/>
+            <a:ext cx="301686" cy="369332"/>
+          </a:xfrm>
+          <a:prstGeom prst="rect">
+            <a:avLst/>
+          </a:prstGeom>
+          <a:noFill/>
+        </p:spPr>
+        <p:txBody>
+          <a:bodyPr wrap="none" rtlCol="0">
+            <a:spAutoFit/>
+          </a:bodyPr>
+          <a:lstStyle/>
+          <a:p>
+            <a:r>
+              <a:rPr lang="fr-CH" dirty="0"/>
+              <a:t>3</a:t>
+            </a:r>
+          </a:p>
+        </p:txBody>
+      </p:sp>
+      <p:sp>
+        <p:nvSpPr>
+          <p:cNvPr id="3" name="Rectangle 2">
+            <a:extLst>
+              <a:ext uri="{FF2B5EF4-FFF2-40B4-BE49-F238E27FC236}">
+                <a16:creationId xmlns:a16="http://schemas.microsoft.com/office/drawing/2014/main" id="{01D4AA69-78E4-8292-BF54-B15EFD0EFD7F}"/>
+              </a:ext>
+            </a:extLst>
+          </p:cNvPr>
           <p:cNvSpPr/>
           <p:nvPr/>
         </p:nvSpPr>
         <p:spPr>
           <a:xfrm>
-            <a:off x="4767263" y="1993105"/>
-            <a:ext cx="376237" cy="152401"/>
+            <a:off x="762907" y="588217"/>
+            <a:ext cx="1887929" cy="5626041"/>
           </a:xfrm>
           <a:prstGeom prst="rect">
             <a:avLst/>
@@ -12823,242 +12898,12 @@
           </a:p>
         </p:txBody>
       </p:sp>
-      <p:cxnSp>
-        <p:nvCxnSpPr>
-          <p:cNvPr id="9" name="Connecteur droit avec flèche 8"/>
-          <p:cNvCxnSpPr>
-            <a:cxnSpLocks/>
-          </p:cNvCxnSpPr>
-          <p:nvPr/>
-        </p:nvCxnSpPr>
-        <p:spPr>
-          <a:xfrm>
-            <a:off x="4909444" y="2164556"/>
-            <a:ext cx="0" cy="645562"/>
-          </a:xfrm>
-          <a:prstGeom prst="straightConnector1">
-            <a:avLst/>
-          </a:prstGeom>
-          <a:ln w="38100">
-            <a:solidFill>
-              <a:schemeClr val="tx1"/>
-            </a:solidFill>
-            <a:tailEnd type="arrow"/>
-          </a:ln>
-        </p:spPr>
-        <p:style>
-          <a:lnRef idx="1">
-            <a:schemeClr val="accent1"/>
-          </a:lnRef>
-          <a:fillRef idx="0">
-            <a:schemeClr val="accent1"/>
-          </a:fillRef>
-          <a:effectRef idx="0">
-            <a:schemeClr val="accent1"/>
-          </a:effectRef>
-          <a:fontRef idx="minor">
-            <a:schemeClr val="tx1"/>
-          </a:fontRef>
-        </p:style>
-      </p:cxnSp>
-      <p:sp>
-        <p:nvSpPr>
-          <p:cNvPr id="12" name="ZoneTexte 11"/>
-          <p:cNvSpPr txBox="1"/>
-          <p:nvPr/>
-        </p:nvSpPr>
-        <p:spPr>
-          <a:xfrm>
-            <a:off x="3986669" y="2502577"/>
-            <a:ext cx="301686" cy="369332"/>
-          </a:xfrm>
-          <a:prstGeom prst="rect">
-            <a:avLst/>
-          </a:prstGeom>
-          <a:noFill/>
-        </p:spPr>
-        <p:txBody>
-          <a:bodyPr wrap="none" rtlCol="0">
-            <a:spAutoFit/>
-          </a:bodyPr>
-          <a:lstStyle/>
-          <a:p>
-            <a:r>
-              <a:rPr lang="fr-CH" dirty="0"/>
-              <a:t>1</a:t>
-            </a:r>
-          </a:p>
-        </p:txBody>
-      </p:sp>
-      <p:sp>
-        <p:nvSpPr>
-          <p:cNvPr id="17" name="ZoneTexte 16"/>
-          <p:cNvSpPr txBox="1"/>
-          <p:nvPr/>
-        </p:nvSpPr>
-        <p:spPr>
-          <a:xfrm>
-            <a:off x="7141463" y="5226973"/>
-            <a:ext cx="276038" cy="307777"/>
-          </a:xfrm>
-          <a:prstGeom prst="rect">
-            <a:avLst/>
-          </a:prstGeom>
-          <a:noFill/>
-        </p:spPr>
-        <p:txBody>
-          <a:bodyPr wrap="none" rtlCol="0">
-            <a:spAutoFit/>
-          </a:bodyPr>
-          <a:lstStyle/>
-          <a:p>
-            <a:r>
-              <a:rPr lang="fr-CH" sz="1400" dirty="0"/>
-              <a:t>4</a:t>
-            </a:r>
-          </a:p>
-        </p:txBody>
-      </p:sp>
-      <p:sp>
-        <p:nvSpPr>
-          <p:cNvPr id="19" name="ZoneTexte 18"/>
-          <p:cNvSpPr txBox="1"/>
-          <p:nvPr/>
-        </p:nvSpPr>
-        <p:spPr>
-          <a:xfrm>
-            <a:off x="5984324" y="6599395"/>
-            <a:ext cx="276038" cy="307777"/>
-          </a:xfrm>
-          <a:prstGeom prst="rect">
-            <a:avLst/>
-          </a:prstGeom>
-          <a:noFill/>
-        </p:spPr>
-        <p:txBody>
-          <a:bodyPr wrap="none" rtlCol="0">
-            <a:spAutoFit/>
-          </a:bodyPr>
-          <a:lstStyle/>
-          <a:p>
-            <a:r>
-              <a:rPr lang="fr-CH" sz="1400" dirty="0"/>
-              <a:t>5</a:t>
-            </a:r>
-          </a:p>
-        </p:txBody>
-      </p:sp>
-      <p:sp>
-        <p:nvSpPr>
-          <p:cNvPr id="20" name="ZoneTexte 11">
-            <a:extLst>
-              <a:ext uri="{FF2B5EF4-FFF2-40B4-BE49-F238E27FC236}">
-                <a16:creationId xmlns:a16="http://schemas.microsoft.com/office/drawing/2014/main" id="{FFA8DFB5-2F1C-9B84-C9C0-D6963781B6CC}"/>
-              </a:ext>
-            </a:extLst>
-          </p:cNvPr>
-          <p:cNvSpPr txBox="1"/>
-          <p:nvPr/>
-        </p:nvSpPr>
-        <p:spPr>
-          <a:xfrm>
-            <a:off x="5299608" y="2502768"/>
-            <a:ext cx="301686" cy="369332"/>
-          </a:xfrm>
-          <a:prstGeom prst="rect">
-            <a:avLst/>
-          </a:prstGeom>
-          <a:noFill/>
-        </p:spPr>
-        <p:txBody>
-          <a:bodyPr wrap="none" rtlCol="0">
-            <a:spAutoFit/>
-          </a:bodyPr>
-          <a:lstStyle/>
-          <a:p>
-            <a:r>
-              <a:rPr lang="fr-CH" dirty="0"/>
-              <a:t>2</a:t>
-            </a:r>
-          </a:p>
-        </p:txBody>
-      </p:sp>
-      <p:sp>
-        <p:nvSpPr>
-          <p:cNvPr id="21" name="ZoneTexte 11">
-            <a:extLst>
-              <a:ext uri="{FF2B5EF4-FFF2-40B4-BE49-F238E27FC236}">
-                <a16:creationId xmlns:a16="http://schemas.microsoft.com/office/drawing/2014/main" id="{821BFEA9-8BB4-161F-25B5-65C4CDCF6DF1}"/>
-              </a:ext>
-            </a:extLst>
-          </p:cNvPr>
-          <p:cNvSpPr txBox="1"/>
-          <p:nvPr/>
-        </p:nvSpPr>
-        <p:spPr>
-          <a:xfrm>
-            <a:off x="4288355" y="3064233"/>
-            <a:ext cx="301686" cy="369332"/>
-          </a:xfrm>
-          <a:prstGeom prst="rect">
-            <a:avLst/>
-          </a:prstGeom>
-          <a:noFill/>
-        </p:spPr>
-        <p:txBody>
-          <a:bodyPr wrap="none" rtlCol="0">
-            <a:spAutoFit/>
-          </a:bodyPr>
-          <a:lstStyle/>
-          <a:p>
-            <a:r>
-              <a:rPr lang="fr-CH" dirty="0"/>
-              <a:t>3</a:t>
-            </a:r>
-          </a:p>
-        </p:txBody>
-      </p:sp>
-      <p:sp>
-        <p:nvSpPr>
-          <p:cNvPr id="22" name="ZoneTexte 18">
-            <a:extLst>
-              <a:ext uri="{FF2B5EF4-FFF2-40B4-BE49-F238E27FC236}">
-                <a16:creationId xmlns:a16="http://schemas.microsoft.com/office/drawing/2014/main" id="{EAD35982-CA41-AC77-A4DC-BCC93C68C684}"/>
-              </a:ext>
-            </a:extLst>
-          </p:cNvPr>
-          <p:cNvSpPr txBox="1"/>
-          <p:nvPr/>
-        </p:nvSpPr>
-        <p:spPr>
-          <a:xfrm>
-            <a:off x="6496937" y="6604017"/>
-            <a:ext cx="276038" cy="307777"/>
-          </a:xfrm>
-          <a:prstGeom prst="rect">
-            <a:avLst/>
-          </a:prstGeom>
-          <a:noFill/>
-        </p:spPr>
-        <p:txBody>
-          <a:bodyPr wrap="none" rtlCol="0">
-            <a:spAutoFit/>
-          </a:bodyPr>
-          <a:lstStyle/>
-          <a:p>
-            <a:r>
-              <a:rPr lang="fr-CH" sz="1400" dirty="0"/>
-              <a:t>6</a:t>
-            </a:r>
-          </a:p>
-        </p:txBody>
-      </p:sp>
-      <p:sp>
-        <p:nvSpPr>
-          <p:cNvPr id="3" name="Rectangle 2">
-            <a:extLst>
-              <a:ext uri="{FF2B5EF4-FFF2-40B4-BE49-F238E27FC236}">
-                <a16:creationId xmlns:a16="http://schemas.microsoft.com/office/drawing/2014/main" id="{01D4AA69-78E4-8292-BF54-B15EFD0EFD7F}"/>
+      <p:sp>
+        <p:nvSpPr>
+          <p:cNvPr id="7" name="Rectangle 6">
+            <a:extLst>
+              <a:ext uri="{FF2B5EF4-FFF2-40B4-BE49-F238E27FC236}">
+                <a16:creationId xmlns:a16="http://schemas.microsoft.com/office/drawing/2014/main" id="{0F674ECA-4AB6-1933-2191-A9F5FEF8794C}"/>
               </a:ext>
             </a:extLst>
           </p:cNvPr>
@@ -13067,8 +12912,8 @@
         </p:nvSpPr>
         <p:spPr>
           <a:xfrm>
-            <a:off x="5011634" y="2795708"/>
-            <a:ext cx="874813" cy="369332"/>
+            <a:off x="2702111" y="588218"/>
+            <a:ext cx="3791055" cy="5639832"/>
           </a:xfrm>
           <a:prstGeom prst="rect">
             <a:avLst/>
@@ -13076,7 +12921,9 @@
           <a:noFill/>
           <a:ln>
             <a:solidFill>
-              <a:srgbClr val="FF0000"/>
+              <a:schemeClr val="accent1">
+                <a:lumMod val="75000"/>
+              </a:schemeClr>
             </a:solidFill>
           </a:ln>
         </p:spPr>
@@ -13102,6 +12949,905 @@
           <a:p>
             <a:pPr algn="ctr"/>
             <a:endParaRPr lang="fr-CH"/>
+          </a:p>
+        </p:txBody>
+      </p:sp>
+      <p:sp>
+        <p:nvSpPr>
+          <p:cNvPr id="8" name="Rectangle 7">
+            <a:extLst>
+              <a:ext uri="{FF2B5EF4-FFF2-40B4-BE49-F238E27FC236}">
+                <a16:creationId xmlns:a16="http://schemas.microsoft.com/office/drawing/2014/main" id="{BC7C1F00-9D16-C0B9-A42F-7DF20CF60E58}"/>
+              </a:ext>
+            </a:extLst>
+          </p:cNvPr>
+          <p:cNvSpPr/>
+          <p:nvPr/>
+        </p:nvSpPr>
+        <p:spPr>
+          <a:xfrm>
+            <a:off x="6539957" y="588218"/>
+            <a:ext cx="2121099" cy="2476015"/>
+          </a:xfrm>
+          <a:prstGeom prst="rect">
+            <a:avLst/>
+          </a:prstGeom>
+          <a:noFill/>
+          <a:ln>
+            <a:solidFill>
+              <a:schemeClr val="accent3">
+                <a:lumMod val="75000"/>
+              </a:schemeClr>
+            </a:solidFill>
+          </a:ln>
+        </p:spPr>
+        <p:style>
+          <a:lnRef idx="2">
+            <a:schemeClr val="accent1">
+              <a:shade val="50000"/>
+            </a:schemeClr>
+          </a:lnRef>
+          <a:fillRef idx="1">
+            <a:schemeClr val="accent1"/>
+          </a:fillRef>
+          <a:effectRef idx="0">
+            <a:schemeClr val="accent1"/>
+          </a:effectRef>
+          <a:fontRef idx="minor">
+            <a:schemeClr val="lt1"/>
+          </a:fontRef>
+        </p:style>
+        <p:txBody>
+          <a:bodyPr rtlCol="0" anchor="ctr"/>
+          <a:lstStyle/>
+          <a:p>
+            <a:pPr algn="ctr"/>
+            <a:endParaRPr lang="fr-CH"/>
+          </a:p>
+        </p:txBody>
+      </p:sp>
+      <p:sp>
+        <p:nvSpPr>
+          <p:cNvPr id="11" name="Rectangle 10">
+            <a:extLst>
+              <a:ext uri="{FF2B5EF4-FFF2-40B4-BE49-F238E27FC236}">
+                <a16:creationId xmlns:a16="http://schemas.microsoft.com/office/drawing/2014/main" id="{E0168A7B-1EB9-B234-5527-1BB014EE7344}"/>
+              </a:ext>
+            </a:extLst>
+          </p:cNvPr>
+          <p:cNvSpPr/>
+          <p:nvPr/>
+        </p:nvSpPr>
+        <p:spPr>
+          <a:xfrm>
+            <a:off x="6537707" y="3428999"/>
+            <a:ext cx="2123349" cy="2799051"/>
+          </a:xfrm>
+          <a:prstGeom prst="rect">
+            <a:avLst/>
+          </a:prstGeom>
+          <a:noFill/>
+          <a:ln>
+            <a:solidFill>
+              <a:schemeClr val="accent2">
+                <a:lumMod val="75000"/>
+              </a:schemeClr>
+            </a:solidFill>
+          </a:ln>
+        </p:spPr>
+        <p:style>
+          <a:lnRef idx="2">
+            <a:schemeClr val="accent1">
+              <a:shade val="50000"/>
+            </a:schemeClr>
+          </a:lnRef>
+          <a:fillRef idx="1">
+            <a:schemeClr val="accent1"/>
+          </a:fillRef>
+          <a:effectRef idx="0">
+            <a:schemeClr val="accent1"/>
+          </a:effectRef>
+          <a:fontRef idx="minor">
+            <a:schemeClr val="lt1"/>
+          </a:fontRef>
+        </p:style>
+        <p:txBody>
+          <a:bodyPr rtlCol="0" anchor="ctr"/>
+          <a:lstStyle/>
+          <a:p>
+            <a:pPr algn="ctr"/>
+            <a:endParaRPr lang="fr-CH"/>
+          </a:p>
+        </p:txBody>
+      </p:sp>
+      <p:sp>
+        <p:nvSpPr>
+          <p:cNvPr id="16" name="TextBox 15">
+            <a:extLst>
+              <a:ext uri="{FF2B5EF4-FFF2-40B4-BE49-F238E27FC236}">
+                <a16:creationId xmlns:a16="http://schemas.microsoft.com/office/drawing/2014/main" id="{7D771409-1A40-AD76-01B8-68D0244404F9}"/>
+              </a:ext>
+            </a:extLst>
+          </p:cNvPr>
+          <p:cNvSpPr txBox="1"/>
+          <p:nvPr/>
+        </p:nvSpPr>
+        <p:spPr>
+          <a:xfrm>
+            <a:off x="425482" y="545007"/>
+            <a:ext cx="317716" cy="369332"/>
+          </a:xfrm>
+          <a:prstGeom prst="rect">
+            <a:avLst/>
+          </a:prstGeom>
+          <a:noFill/>
+        </p:spPr>
+        <p:txBody>
+          <a:bodyPr wrap="none" rtlCol="0">
+            <a:spAutoFit/>
+          </a:bodyPr>
+          <a:lstStyle/>
+          <a:p>
+            <a:r>
+              <a:rPr lang="en-US" dirty="0">
+                <a:solidFill>
+                  <a:srgbClr val="FF0000"/>
+                </a:solidFill>
+              </a:rPr>
+              <a:t>A</a:t>
+            </a:r>
+          </a:p>
+        </p:txBody>
+      </p:sp>
+      <p:sp>
+        <p:nvSpPr>
+          <p:cNvPr id="18" name="TextBox 17">
+            <a:extLst>
+              <a:ext uri="{FF2B5EF4-FFF2-40B4-BE49-F238E27FC236}">
+                <a16:creationId xmlns:a16="http://schemas.microsoft.com/office/drawing/2014/main" id="{63AA0B4F-84FC-D576-3499-08F06DB96976}"/>
+              </a:ext>
+            </a:extLst>
+          </p:cNvPr>
+          <p:cNvSpPr txBox="1"/>
+          <p:nvPr/>
+        </p:nvSpPr>
+        <p:spPr>
+          <a:xfrm>
+            <a:off x="2671789" y="283539"/>
+            <a:ext cx="317716" cy="369332"/>
+          </a:xfrm>
+          <a:prstGeom prst="rect">
+            <a:avLst/>
+          </a:prstGeom>
+          <a:noFill/>
+        </p:spPr>
+        <p:txBody>
+          <a:bodyPr wrap="none" rtlCol="0">
+            <a:spAutoFit/>
+          </a:bodyPr>
+          <a:lstStyle/>
+          <a:p>
+            <a:r>
+              <a:rPr lang="en-US" dirty="0">
+                <a:solidFill>
+                  <a:schemeClr val="accent5">
+                    <a:lumMod val="75000"/>
+                  </a:schemeClr>
+                </a:solidFill>
+              </a:rPr>
+              <a:t>B</a:t>
+            </a:r>
+          </a:p>
+        </p:txBody>
+      </p:sp>
+      <p:sp>
+        <p:nvSpPr>
+          <p:cNvPr id="23" name="TextBox 22">
+            <a:extLst>
+              <a:ext uri="{FF2B5EF4-FFF2-40B4-BE49-F238E27FC236}">
+                <a16:creationId xmlns:a16="http://schemas.microsoft.com/office/drawing/2014/main" id="{51FA5747-5A7D-B4DE-7BF2-637A9EEC7191}"/>
+              </a:ext>
+            </a:extLst>
+          </p:cNvPr>
+          <p:cNvSpPr txBox="1"/>
+          <p:nvPr/>
+        </p:nvSpPr>
+        <p:spPr>
+          <a:xfrm>
+            <a:off x="6474292" y="283539"/>
+            <a:ext cx="317716" cy="369332"/>
+          </a:xfrm>
+          <a:prstGeom prst="rect">
+            <a:avLst/>
+          </a:prstGeom>
+          <a:noFill/>
+        </p:spPr>
+        <p:txBody>
+          <a:bodyPr wrap="none" rtlCol="0">
+            <a:spAutoFit/>
+          </a:bodyPr>
+          <a:lstStyle/>
+          <a:p>
+            <a:r>
+              <a:rPr lang="en-US" dirty="0">
+                <a:solidFill>
+                  <a:schemeClr val="accent3">
+                    <a:lumMod val="75000"/>
+                  </a:schemeClr>
+                </a:solidFill>
+              </a:rPr>
+              <a:t>C</a:t>
+            </a:r>
+          </a:p>
+        </p:txBody>
+      </p:sp>
+      <p:sp>
+        <p:nvSpPr>
+          <p:cNvPr id="24" name="TextBox 23">
+            <a:extLst>
+              <a:ext uri="{FF2B5EF4-FFF2-40B4-BE49-F238E27FC236}">
+                <a16:creationId xmlns:a16="http://schemas.microsoft.com/office/drawing/2014/main" id="{463DCCB3-9E02-BB28-F06E-15232B329748}"/>
+              </a:ext>
+            </a:extLst>
+          </p:cNvPr>
+          <p:cNvSpPr txBox="1"/>
+          <p:nvPr/>
+        </p:nvSpPr>
+        <p:spPr>
+          <a:xfrm>
+            <a:off x="6474292" y="3122800"/>
+            <a:ext cx="327334" cy="369332"/>
+          </a:xfrm>
+          <a:prstGeom prst="rect">
+            <a:avLst/>
+          </a:prstGeom>
+          <a:noFill/>
+        </p:spPr>
+        <p:txBody>
+          <a:bodyPr wrap="none" rtlCol="0">
+            <a:spAutoFit/>
+          </a:bodyPr>
+          <a:lstStyle/>
+          <a:p>
+            <a:r>
+              <a:rPr lang="en-US" dirty="0">
+                <a:solidFill>
+                  <a:schemeClr val="accent2">
+                    <a:lumMod val="75000"/>
+                  </a:schemeClr>
+                </a:solidFill>
+              </a:rPr>
+              <a:t>D</a:t>
+            </a:r>
+          </a:p>
+        </p:txBody>
+      </p:sp>
+      <p:sp>
+        <p:nvSpPr>
+          <p:cNvPr id="25" name="Rectangle 24">
+            <a:extLst>
+              <a:ext uri="{FF2B5EF4-FFF2-40B4-BE49-F238E27FC236}">
+                <a16:creationId xmlns:a16="http://schemas.microsoft.com/office/drawing/2014/main" id="{A8A127DE-3FE1-3563-CC8D-BC7E3E05F886}"/>
+              </a:ext>
+            </a:extLst>
+          </p:cNvPr>
+          <p:cNvSpPr/>
+          <p:nvPr/>
+        </p:nvSpPr>
+        <p:spPr>
+          <a:xfrm>
+            <a:off x="762907" y="4553527"/>
+            <a:ext cx="1805798" cy="1477818"/>
+          </a:xfrm>
+          <a:prstGeom prst="rect">
+            <a:avLst/>
+          </a:prstGeom>
+          <a:noFill/>
+          <a:ln w="12700">
+            <a:solidFill>
+              <a:schemeClr val="tx1"/>
+            </a:solidFill>
+          </a:ln>
+        </p:spPr>
+        <p:style>
+          <a:lnRef idx="2">
+            <a:schemeClr val="accent1">
+              <a:shade val="15000"/>
+            </a:schemeClr>
+          </a:lnRef>
+          <a:fillRef idx="1">
+            <a:schemeClr val="accent1"/>
+          </a:fillRef>
+          <a:effectRef idx="0">
+            <a:schemeClr val="accent1"/>
+          </a:effectRef>
+          <a:fontRef idx="minor">
+            <a:schemeClr val="lt1"/>
+          </a:fontRef>
+        </p:style>
+        <p:txBody>
+          <a:bodyPr rtlCol="0" anchor="ctr"/>
+          <a:lstStyle/>
+          <a:p>
+            <a:pPr algn="ctr"/>
+            <a:endParaRPr lang="en-US"/>
+          </a:p>
+        </p:txBody>
+      </p:sp>
+      <p:sp>
+        <p:nvSpPr>
+          <p:cNvPr id="26" name="ZoneTexte 11">
+            <a:extLst>
+              <a:ext uri="{FF2B5EF4-FFF2-40B4-BE49-F238E27FC236}">
+                <a16:creationId xmlns:a16="http://schemas.microsoft.com/office/drawing/2014/main" id="{354C2BEC-AC46-ED4D-18FD-8656383CA664}"/>
+              </a:ext>
+            </a:extLst>
+          </p:cNvPr>
+          <p:cNvSpPr txBox="1"/>
+          <p:nvPr/>
+        </p:nvSpPr>
+        <p:spPr>
+          <a:xfrm>
+            <a:off x="5157150" y="581951"/>
+            <a:ext cx="301686" cy="369332"/>
+          </a:xfrm>
+          <a:prstGeom prst="rect">
+            <a:avLst/>
+          </a:prstGeom>
+          <a:noFill/>
+        </p:spPr>
+        <p:txBody>
+          <a:bodyPr wrap="none" rtlCol="0">
+            <a:spAutoFit/>
+          </a:bodyPr>
+          <a:lstStyle/>
+          <a:p>
+            <a:r>
+              <a:rPr lang="fr-CH" dirty="0"/>
+              <a:t>4</a:t>
+            </a:r>
+          </a:p>
+        </p:txBody>
+      </p:sp>
+      <p:sp>
+        <p:nvSpPr>
+          <p:cNvPr id="27" name="Rectangle 26">
+            <a:extLst>
+              <a:ext uri="{FF2B5EF4-FFF2-40B4-BE49-F238E27FC236}">
+                <a16:creationId xmlns:a16="http://schemas.microsoft.com/office/drawing/2014/main" id="{07A20E00-2223-42E6-5E86-4AA18EADC305}"/>
+              </a:ext>
+            </a:extLst>
+          </p:cNvPr>
+          <p:cNvSpPr/>
+          <p:nvPr/>
+        </p:nvSpPr>
+        <p:spPr>
+          <a:xfrm>
+            <a:off x="2765206" y="905610"/>
+            <a:ext cx="1705194" cy="941663"/>
+          </a:xfrm>
+          <a:prstGeom prst="rect">
+            <a:avLst/>
+          </a:prstGeom>
+          <a:noFill/>
+          <a:ln w="12700">
+            <a:solidFill>
+              <a:schemeClr val="tx1"/>
+            </a:solidFill>
+          </a:ln>
+        </p:spPr>
+        <p:style>
+          <a:lnRef idx="2">
+            <a:schemeClr val="accent1">
+              <a:shade val="15000"/>
+            </a:schemeClr>
+          </a:lnRef>
+          <a:fillRef idx="1">
+            <a:schemeClr val="accent1"/>
+          </a:fillRef>
+          <a:effectRef idx="0">
+            <a:schemeClr val="accent1"/>
+          </a:effectRef>
+          <a:fontRef idx="minor">
+            <a:schemeClr val="lt1"/>
+          </a:fontRef>
+        </p:style>
+        <p:txBody>
+          <a:bodyPr rtlCol="0" anchor="ctr"/>
+          <a:lstStyle/>
+          <a:p>
+            <a:pPr algn="ctr"/>
+            <a:endParaRPr lang="en-US"/>
+          </a:p>
+        </p:txBody>
+      </p:sp>
+      <p:sp>
+        <p:nvSpPr>
+          <p:cNvPr id="28" name="ZoneTexte 11">
+            <a:extLst>
+              <a:ext uri="{FF2B5EF4-FFF2-40B4-BE49-F238E27FC236}">
+                <a16:creationId xmlns:a16="http://schemas.microsoft.com/office/drawing/2014/main" id="{1A479972-CA01-1F67-00F9-DECAB8B6DAEC}"/>
+              </a:ext>
+            </a:extLst>
+          </p:cNvPr>
+          <p:cNvSpPr txBox="1"/>
+          <p:nvPr/>
+        </p:nvSpPr>
+        <p:spPr>
+          <a:xfrm>
+            <a:off x="4421157" y="831272"/>
+            <a:ext cx="301686" cy="369332"/>
+          </a:xfrm>
+          <a:prstGeom prst="rect">
+            <a:avLst/>
+          </a:prstGeom>
+          <a:noFill/>
+        </p:spPr>
+        <p:txBody>
+          <a:bodyPr wrap="none" rtlCol="0">
+            <a:spAutoFit/>
+          </a:bodyPr>
+          <a:lstStyle/>
+          <a:p>
+            <a:r>
+              <a:rPr lang="fr-CH" dirty="0"/>
+              <a:t>5</a:t>
+            </a:r>
+          </a:p>
+        </p:txBody>
+      </p:sp>
+      <p:sp>
+        <p:nvSpPr>
+          <p:cNvPr id="29" name="ZoneTexte 11">
+            <a:extLst>
+              <a:ext uri="{FF2B5EF4-FFF2-40B4-BE49-F238E27FC236}">
+                <a16:creationId xmlns:a16="http://schemas.microsoft.com/office/drawing/2014/main" id="{9CDCE65A-B5D0-EC45-990E-D05305466A91}"/>
+              </a:ext>
+            </a:extLst>
+          </p:cNvPr>
+          <p:cNvSpPr txBox="1"/>
+          <p:nvPr/>
+        </p:nvSpPr>
+        <p:spPr>
+          <a:xfrm>
+            <a:off x="4446795" y="2387599"/>
+            <a:ext cx="301686" cy="369332"/>
+          </a:xfrm>
+          <a:prstGeom prst="rect">
+            <a:avLst/>
+          </a:prstGeom>
+          <a:noFill/>
+        </p:spPr>
+        <p:txBody>
+          <a:bodyPr wrap="none" rtlCol="0">
+            <a:spAutoFit/>
+          </a:bodyPr>
+          <a:lstStyle/>
+          <a:p>
+            <a:r>
+              <a:rPr lang="fr-CH" dirty="0"/>
+              <a:t>6</a:t>
+            </a:r>
+          </a:p>
+        </p:txBody>
+      </p:sp>
+      <p:sp>
+        <p:nvSpPr>
+          <p:cNvPr id="30" name="ZoneTexte 11">
+            <a:extLst>
+              <a:ext uri="{FF2B5EF4-FFF2-40B4-BE49-F238E27FC236}">
+                <a16:creationId xmlns:a16="http://schemas.microsoft.com/office/drawing/2014/main" id="{26D2DE59-18D9-5E48-001A-36FF3D2AEC72}"/>
+              </a:ext>
+            </a:extLst>
+          </p:cNvPr>
+          <p:cNvSpPr txBox="1"/>
+          <p:nvPr/>
+        </p:nvSpPr>
+        <p:spPr>
+          <a:xfrm>
+            <a:off x="4409849" y="3857042"/>
+            <a:ext cx="301686" cy="369332"/>
+          </a:xfrm>
+          <a:prstGeom prst="rect">
+            <a:avLst/>
+          </a:prstGeom>
+          <a:noFill/>
+        </p:spPr>
+        <p:txBody>
+          <a:bodyPr wrap="none" rtlCol="0">
+            <a:spAutoFit/>
+          </a:bodyPr>
+          <a:lstStyle/>
+          <a:p>
+            <a:r>
+              <a:rPr lang="fr-CH" dirty="0"/>
+              <a:t>7</a:t>
+            </a:r>
+          </a:p>
+        </p:txBody>
+      </p:sp>
+      <p:sp>
+        <p:nvSpPr>
+          <p:cNvPr id="31" name="ZoneTexte 11">
+            <a:extLst>
+              <a:ext uri="{FF2B5EF4-FFF2-40B4-BE49-F238E27FC236}">
+                <a16:creationId xmlns:a16="http://schemas.microsoft.com/office/drawing/2014/main" id="{DE99671E-2A0A-DC12-7AA2-5CE764C45735}"/>
+              </a:ext>
+            </a:extLst>
+          </p:cNvPr>
+          <p:cNvSpPr txBox="1"/>
+          <p:nvPr/>
+        </p:nvSpPr>
+        <p:spPr>
+          <a:xfrm>
+            <a:off x="8117776" y="766617"/>
+            <a:ext cx="301686" cy="369332"/>
+          </a:xfrm>
+          <a:prstGeom prst="rect">
+            <a:avLst/>
+          </a:prstGeom>
+          <a:noFill/>
+        </p:spPr>
+        <p:txBody>
+          <a:bodyPr wrap="none" rtlCol="0">
+            <a:spAutoFit/>
+          </a:bodyPr>
+          <a:lstStyle/>
+          <a:p>
+            <a:r>
+              <a:rPr lang="fr-CH" dirty="0"/>
+              <a:t>8</a:t>
+            </a:r>
+          </a:p>
+        </p:txBody>
+      </p:sp>
+      <p:sp>
+        <p:nvSpPr>
+          <p:cNvPr id="32" name="ZoneTexte 11">
+            <a:extLst>
+              <a:ext uri="{FF2B5EF4-FFF2-40B4-BE49-F238E27FC236}">
+                <a16:creationId xmlns:a16="http://schemas.microsoft.com/office/drawing/2014/main" id="{53A8E3EF-2E55-CCC9-F722-E7F9CEA03A34}"/>
+              </a:ext>
+            </a:extLst>
+          </p:cNvPr>
+          <p:cNvSpPr txBox="1"/>
+          <p:nvPr/>
+        </p:nvSpPr>
+        <p:spPr>
+          <a:xfrm>
+            <a:off x="8129254" y="1765421"/>
+            <a:ext cx="301686" cy="369332"/>
+          </a:xfrm>
+          <a:prstGeom prst="rect">
+            <a:avLst/>
+          </a:prstGeom>
+          <a:noFill/>
+        </p:spPr>
+        <p:txBody>
+          <a:bodyPr wrap="none" rtlCol="0">
+            <a:spAutoFit/>
+          </a:bodyPr>
+          <a:lstStyle/>
+          <a:p>
+            <a:r>
+              <a:rPr lang="fr-CH" dirty="0"/>
+              <a:t>9</a:t>
+            </a:r>
+          </a:p>
+        </p:txBody>
+      </p:sp>
+      <p:sp>
+        <p:nvSpPr>
+          <p:cNvPr id="33" name="ZoneTexte 11">
+            <a:extLst>
+              <a:ext uri="{FF2B5EF4-FFF2-40B4-BE49-F238E27FC236}">
+                <a16:creationId xmlns:a16="http://schemas.microsoft.com/office/drawing/2014/main" id="{9DED9E37-1A14-B373-0254-E4A4620231FE}"/>
+              </a:ext>
+            </a:extLst>
+          </p:cNvPr>
+          <p:cNvSpPr txBox="1"/>
+          <p:nvPr/>
+        </p:nvSpPr>
+        <p:spPr>
+          <a:xfrm>
+            <a:off x="8083074" y="2002400"/>
+            <a:ext cx="418704" cy="369332"/>
+          </a:xfrm>
+          <a:prstGeom prst="rect">
+            <a:avLst/>
+          </a:prstGeom>
+          <a:noFill/>
+        </p:spPr>
+        <p:txBody>
+          <a:bodyPr wrap="none" rtlCol="0">
+            <a:spAutoFit/>
+          </a:bodyPr>
+          <a:lstStyle/>
+          <a:p>
+            <a:r>
+              <a:rPr lang="fr-CH" dirty="0"/>
+              <a:t>10</a:t>
+            </a:r>
+          </a:p>
+        </p:txBody>
+      </p:sp>
+      <p:sp>
+        <p:nvSpPr>
+          <p:cNvPr id="34" name="ZoneTexte 11">
+            <a:extLst>
+              <a:ext uri="{FF2B5EF4-FFF2-40B4-BE49-F238E27FC236}">
+                <a16:creationId xmlns:a16="http://schemas.microsoft.com/office/drawing/2014/main" id="{C59E148D-1C35-DF21-93C1-35E9B05D903B}"/>
+              </a:ext>
+            </a:extLst>
+          </p:cNvPr>
+          <p:cNvSpPr txBox="1"/>
+          <p:nvPr/>
+        </p:nvSpPr>
+        <p:spPr>
+          <a:xfrm>
+            <a:off x="8091353" y="2207112"/>
+            <a:ext cx="418704" cy="369332"/>
+          </a:xfrm>
+          <a:prstGeom prst="rect">
+            <a:avLst/>
+          </a:prstGeom>
+          <a:noFill/>
+        </p:spPr>
+        <p:txBody>
+          <a:bodyPr wrap="none" rtlCol="0">
+            <a:spAutoFit/>
+          </a:bodyPr>
+          <a:lstStyle/>
+          <a:p>
+            <a:r>
+              <a:rPr lang="fr-CH" dirty="0"/>
+              <a:t>11</a:t>
+            </a:r>
+          </a:p>
+        </p:txBody>
+      </p:sp>
+      <p:sp>
+        <p:nvSpPr>
+          <p:cNvPr id="35" name="ZoneTexte 11">
+            <a:extLst>
+              <a:ext uri="{FF2B5EF4-FFF2-40B4-BE49-F238E27FC236}">
+                <a16:creationId xmlns:a16="http://schemas.microsoft.com/office/drawing/2014/main" id="{D9BB22CE-E8EE-770E-0C55-B376C0BD9F50}"/>
+              </a:ext>
+            </a:extLst>
+          </p:cNvPr>
+          <p:cNvSpPr txBox="1"/>
+          <p:nvPr/>
+        </p:nvSpPr>
+        <p:spPr>
+          <a:xfrm>
+            <a:off x="8099404" y="2430299"/>
+            <a:ext cx="418704" cy="369332"/>
+          </a:xfrm>
+          <a:prstGeom prst="rect">
+            <a:avLst/>
+          </a:prstGeom>
+          <a:noFill/>
+        </p:spPr>
+        <p:txBody>
+          <a:bodyPr wrap="none" rtlCol="0">
+            <a:spAutoFit/>
+          </a:bodyPr>
+          <a:lstStyle/>
+          <a:p>
+            <a:r>
+              <a:rPr lang="fr-CH" dirty="0"/>
+              <a:t>12</a:t>
+            </a:r>
+          </a:p>
+        </p:txBody>
+      </p:sp>
+      <p:sp>
+        <p:nvSpPr>
+          <p:cNvPr id="36" name="ZoneTexte 11">
+            <a:extLst>
+              <a:ext uri="{FF2B5EF4-FFF2-40B4-BE49-F238E27FC236}">
+                <a16:creationId xmlns:a16="http://schemas.microsoft.com/office/drawing/2014/main" id="{E52BBA46-0F33-4D17-5386-1F90C0EB535B}"/>
+              </a:ext>
+            </a:extLst>
+          </p:cNvPr>
+          <p:cNvSpPr txBox="1"/>
+          <p:nvPr/>
+        </p:nvSpPr>
+        <p:spPr>
+          <a:xfrm>
+            <a:off x="7926323" y="2736499"/>
+            <a:ext cx="418704" cy="369332"/>
+          </a:xfrm>
+          <a:prstGeom prst="rect">
+            <a:avLst/>
+          </a:prstGeom>
+          <a:noFill/>
+        </p:spPr>
+        <p:txBody>
+          <a:bodyPr wrap="none" rtlCol="0">
+            <a:spAutoFit/>
+          </a:bodyPr>
+          <a:lstStyle/>
+          <a:p>
+            <a:r>
+              <a:rPr lang="fr-CH" dirty="0"/>
+              <a:t>13</a:t>
+            </a:r>
+          </a:p>
+        </p:txBody>
+      </p:sp>
+      <p:sp>
+        <p:nvSpPr>
+          <p:cNvPr id="37" name="ZoneTexte 11">
+            <a:extLst>
+              <a:ext uri="{FF2B5EF4-FFF2-40B4-BE49-F238E27FC236}">
+                <a16:creationId xmlns:a16="http://schemas.microsoft.com/office/drawing/2014/main" id="{CDD4C1BB-CAB7-6A14-A887-B6FC620BFD5D}"/>
+              </a:ext>
+            </a:extLst>
+          </p:cNvPr>
+          <p:cNvSpPr txBox="1"/>
+          <p:nvPr/>
+        </p:nvSpPr>
+        <p:spPr>
+          <a:xfrm>
+            <a:off x="8268619" y="3600986"/>
+            <a:ext cx="418704" cy="369332"/>
+          </a:xfrm>
+          <a:prstGeom prst="rect">
+            <a:avLst/>
+          </a:prstGeom>
+          <a:noFill/>
+        </p:spPr>
+        <p:txBody>
+          <a:bodyPr wrap="none" rtlCol="0">
+            <a:spAutoFit/>
+          </a:bodyPr>
+          <a:lstStyle/>
+          <a:p>
+            <a:r>
+              <a:rPr lang="fr-CH" dirty="0"/>
+              <a:t>14</a:t>
+            </a:r>
+          </a:p>
+        </p:txBody>
+      </p:sp>
+      <p:sp>
+        <p:nvSpPr>
+          <p:cNvPr id="38" name="ZoneTexte 11">
+            <a:extLst>
+              <a:ext uri="{FF2B5EF4-FFF2-40B4-BE49-F238E27FC236}">
+                <a16:creationId xmlns:a16="http://schemas.microsoft.com/office/drawing/2014/main" id="{4B899C87-6B5C-D7B1-2B4C-66EE8F35FB83}"/>
+              </a:ext>
+            </a:extLst>
+          </p:cNvPr>
+          <p:cNvSpPr txBox="1"/>
+          <p:nvPr/>
+        </p:nvSpPr>
+        <p:spPr>
+          <a:xfrm>
+            <a:off x="8051043" y="4032026"/>
+            <a:ext cx="418704" cy="369332"/>
+          </a:xfrm>
+          <a:prstGeom prst="rect">
+            <a:avLst/>
+          </a:prstGeom>
+          <a:noFill/>
+        </p:spPr>
+        <p:txBody>
+          <a:bodyPr wrap="none" rtlCol="0">
+            <a:spAutoFit/>
+          </a:bodyPr>
+          <a:lstStyle/>
+          <a:p>
+            <a:r>
+              <a:rPr lang="fr-CH" dirty="0"/>
+              <a:t>15</a:t>
+            </a:r>
+          </a:p>
+        </p:txBody>
+      </p:sp>
+      <p:sp>
+        <p:nvSpPr>
+          <p:cNvPr id="39" name="ZoneTexte 11">
+            <a:extLst>
+              <a:ext uri="{FF2B5EF4-FFF2-40B4-BE49-F238E27FC236}">
+                <a16:creationId xmlns:a16="http://schemas.microsoft.com/office/drawing/2014/main" id="{9192D5D9-F73F-CDB8-7EEF-6307471D588E}"/>
+              </a:ext>
+            </a:extLst>
+          </p:cNvPr>
+          <p:cNvSpPr txBox="1"/>
+          <p:nvPr/>
+        </p:nvSpPr>
+        <p:spPr>
+          <a:xfrm>
+            <a:off x="8242353" y="4553527"/>
+            <a:ext cx="418704" cy="369332"/>
+          </a:xfrm>
+          <a:prstGeom prst="rect">
+            <a:avLst/>
+          </a:prstGeom>
+          <a:noFill/>
+        </p:spPr>
+        <p:txBody>
+          <a:bodyPr wrap="none" rtlCol="0">
+            <a:spAutoFit/>
+          </a:bodyPr>
+          <a:lstStyle/>
+          <a:p>
+            <a:r>
+              <a:rPr lang="fr-CH" dirty="0"/>
+              <a:t>16</a:t>
+            </a:r>
+          </a:p>
+        </p:txBody>
+      </p:sp>
+      <p:sp>
+        <p:nvSpPr>
+          <p:cNvPr id="40" name="ZoneTexte 11">
+            <a:extLst>
+              <a:ext uri="{FF2B5EF4-FFF2-40B4-BE49-F238E27FC236}">
+                <a16:creationId xmlns:a16="http://schemas.microsoft.com/office/drawing/2014/main" id="{B37A7484-A5E6-B2A1-EA65-062DCC3FDF18}"/>
+              </a:ext>
+            </a:extLst>
+          </p:cNvPr>
+          <p:cNvSpPr txBox="1"/>
+          <p:nvPr/>
+        </p:nvSpPr>
+        <p:spPr>
+          <a:xfrm>
+            <a:off x="8268619" y="5004384"/>
+            <a:ext cx="418704" cy="369332"/>
+          </a:xfrm>
+          <a:prstGeom prst="rect">
+            <a:avLst/>
+          </a:prstGeom>
+          <a:noFill/>
+        </p:spPr>
+        <p:txBody>
+          <a:bodyPr wrap="none" rtlCol="0">
+            <a:spAutoFit/>
+          </a:bodyPr>
+          <a:lstStyle/>
+          <a:p>
+            <a:r>
+              <a:rPr lang="fr-CH" dirty="0"/>
+              <a:t>17</a:t>
+            </a:r>
+          </a:p>
+        </p:txBody>
+      </p:sp>
+      <p:sp>
+        <p:nvSpPr>
+          <p:cNvPr id="41" name="ZoneTexte 11">
+            <a:extLst>
+              <a:ext uri="{FF2B5EF4-FFF2-40B4-BE49-F238E27FC236}">
+                <a16:creationId xmlns:a16="http://schemas.microsoft.com/office/drawing/2014/main" id="{53376A6C-743E-0965-64EA-6100C580B58C}"/>
+              </a:ext>
+            </a:extLst>
+          </p:cNvPr>
+          <p:cNvSpPr txBox="1"/>
+          <p:nvPr/>
+        </p:nvSpPr>
+        <p:spPr>
+          <a:xfrm>
+            <a:off x="6641771" y="5923407"/>
+            <a:ext cx="418704" cy="369332"/>
+          </a:xfrm>
+          <a:prstGeom prst="rect">
+            <a:avLst/>
+          </a:prstGeom>
+          <a:noFill/>
+        </p:spPr>
+        <p:txBody>
+          <a:bodyPr wrap="none" rtlCol="0">
+            <a:spAutoFit/>
+          </a:bodyPr>
+          <a:lstStyle/>
+          <a:p>
+            <a:r>
+              <a:rPr lang="fr-CH" dirty="0"/>
+              <a:t>18</a:t>
+            </a:r>
           </a:p>
         </p:txBody>
       </p:sp>

</xml_diff>

<commit_message>
Update manual Filtering and Referefencing
Update manual Filtering and Referefencing
+ Readme.md
</commit_message>
<xml_diff>
--- a/Manuels/picture_EEGpal_manuals.pptx
+++ b/Manuels/picture_EEGpal_manuals.pptx
@@ -5,7 +5,7 @@
     <p:sldMasterId id="2147483648" r:id="rId1"/>
   </p:sldMasterIdLst>
   <p:notesMasterIdLst>
-    <p:notesMasterId r:id="rId23"/>
+    <p:notesMasterId r:id="rId24"/>
   </p:notesMasterIdLst>
   <p:sldIdLst>
     <p:sldId id="292" r:id="rId2"/>
@@ -24,11 +24,12 @@
     <p:sldId id="281" r:id="rId15"/>
     <p:sldId id="282" r:id="rId16"/>
     <p:sldId id="261" r:id="rId17"/>
-    <p:sldId id="283" r:id="rId18"/>
-    <p:sldId id="285" r:id="rId19"/>
-    <p:sldId id="289" r:id="rId20"/>
-    <p:sldId id="291" r:id="rId21"/>
-    <p:sldId id="290" r:id="rId22"/>
+    <p:sldId id="293" r:id="rId18"/>
+    <p:sldId id="283" r:id="rId19"/>
+    <p:sldId id="285" r:id="rId20"/>
+    <p:sldId id="289" r:id="rId21"/>
+    <p:sldId id="291" r:id="rId22"/>
+    <p:sldId id="290" r:id="rId23"/>
   </p:sldIdLst>
   <p:sldSz cx="9144000" cy="6858000" type="screen4x3"/>
   <p:notesSz cx="6858000" cy="9144000"/>
@@ -168,6 +169,7 @@
         <p14:section name="Re-Ref" id="{8B2F3EC4-B640-4D20-8094-02AA9BB7A4DA}">
           <p14:sldIdLst>
             <p14:sldId id="261"/>
+            <p14:sldId id="293"/>
           </p14:sldIdLst>
         </p14:section>
         <p14:section name="Epoching" id="{BE5F1953-1855-4361-86F1-FB62BE342A56}">
@@ -289,7 +291,7 @@
           <a:p>
             <a:fld id="{AE28F081-F961-4F1D-B0FD-EEC618487470}" type="datetimeFigureOut">
               <a:rPr lang="en-US" smtClean="0"/>
-              <a:t>10/10/2024</a:t>
+              <a:t>10/27/2024</a:t>
             </a:fld>
             <a:endParaRPr lang="en-US"/>
           </a:p>
@@ -737,7 +739,7 @@
           <a:p>
             <a:fld id="{BCB0654D-2F9E-40DC-B910-8F58A623289D}" type="datetimeFigureOut">
               <a:rPr lang="fr-CH" smtClean="0"/>
-              <a:t>10.10.2024</a:t>
+              <a:t>27.10.2024</a:t>
             </a:fld>
             <a:endParaRPr lang="fr-CH"/>
           </a:p>
@@ -907,7 +909,7 @@
           <a:p>
             <a:fld id="{BCB0654D-2F9E-40DC-B910-8F58A623289D}" type="datetimeFigureOut">
               <a:rPr lang="fr-CH" smtClean="0"/>
-              <a:t>10.10.2024</a:t>
+              <a:t>27.10.2024</a:t>
             </a:fld>
             <a:endParaRPr lang="fr-CH"/>
           </a:p>
@@ -1087,7 +1089,7 @@
           <a:p>
             <a:fld id="{BCB0654D-2F9E-40DC-B910-8F58A623289D}" type="datetimeFigureOut">
               <a:rPr lang="fr-CH" smtClean="0"/>
-              <a:t>10.10.2024</a:t>
+              <a:t>27.10.2024</a:t>
             </a:fld>
             <a:endParaRPr lang="fr-CH"/>
           </a:p>
@@ -1257,7 +1259,7 @@
           <a:p>
             <a:fld id="{BCB0654D-2F9E-40DC-B910-8F58A623289D}" type="datetimeFigureOut">
               <a:rPr lang="fr-CH" smtClean="0"/>
-              <a:t>10.10.2024</a:t>
+              <a:t>27.10.2024</a:t>
             </a:fld>
             <a:endParaRPr lang="fr-CH"/>
           </a:p>
@@ -1503,7 +1505,7 @@
           <a:p>
             <a:fld id="{BCB0654D-2F9E-40DC-B910-8F58A623289D}" type="datetimeFigureOut">
               <a:rPr lang="fr-CH" smtClean="0"/>
-              <a:t>10.10.2024</a:t>
+              <a:t>27.10.2024</a:t>
             </a:fld>
             <a:endParaRPr lang="fr-CH"/>
           </a:p>
@@ -1791,7 +1793,7 @@
           <a:p>
             <a:fld id="{BCB0654D-2F9E-40DC-B910-8F58A623289D}" type="datetimeFigureOut">
               <a:rPr lang="fr-CH" smtClean="0"/>
-              <a:t>10.10.2024</a:t>
+              <a:t>27.10.2024</a:t>
             </a:fld>
             <a:endParaRPr lang="fr-CH"/>
           </a:p>
@@ -2213,7 +2215,7 @@
           <a:p>
             <a:fld id="{BCB0654D-2F9E-40DC-B910-8F58A623289D}" type="datetimeFigureOut">
               <a:rPr lang="fr-CH" smtClean="0"/>
-              <a:t>10.10.2024</a:t>
+              <a:t>27.10.2024</a:t>
             </a:fld>
             <a:endParaRPr lang="fr-CH"/>
           </a:p>
@@ -2331,7 +2333,7 @@
           <a:p>
             <a:fld id="{BCB0654D-2F9E-40DC-B910-8F58A623289D}" type="datetimeFigureOut">
               <a:rPr lang="fr-CH" smtClean="0"/>
-              <a:t>10.10.2024</a:t>
+              <a:t>27.10.2024</a:t>
             </a:fld>
             <a:endParaRPr lang="fr-CH"/>
           </a:p>
@@ -2426,7 +2428,7 @@
           <a:p>
             <a:fld id="{BCB0654D-2F9E-40DC-B910-8F58A623289D}" type="datetimeFigureOut">
               <a:rPr lang="fr-CH" smtClean="0"/>
-              <a:t>10.10.2024</a:t>
+              <a:t>27.10.2024</a:t>
             </a:fld>
             <a:endParaRPr lang="fr-CH"/>
           </a:p>
@@ -2703,7 +2705,7 @@
           <a:p>
             <a:fld id="{BCB0654D-2F9E-40DC-B910-8F58A623289D}" type="datetimeFigureOut">
               <a:rPr lang="fr-CH" smtClean="0"/>
-              <a:t>10.10.2024</a:t>
+              <a:t>27.10.2024</a:t>
             </a:fld>
             <a:endParaRPr lang="fr-CH"/>
           </a:p>
@@ -2956,7 +2958,7 @@
           <a:p>
             <a:fld id="{BCB0654D-2F9E-40DC-B910-8F58A623289D}" type="datetimeFigureOut">
               <a:rPr lang="fr-CH" smtClean="0"/>
-              <a:t>10.10.2024</a:t>
+              <a:t>27.10.2024</a:t>
             </a:fld>
             <a:endParaRPr lang="fr-CH"/>
           </a:p>
@@ -3169,7 +3171,7 @@
           <a:p>
             <a:fld id="{BCB0654D-2F9E-40DC-B910-8F58A623289D}" type="datetimeFigureOut">
               <a:rPr lang="fr-CH" smtClean="0"/>
-              <a:t>10.10.2024</a:t>
+              <a:t>27.10.2024</a:t>
             </a:fld>
             <a:endParaRPr lang="fr-CH"/>
           </a:p>
@@ -7479,10 +7481,10 @@
       </p:grpSpPr>
       <p:pic>
         <p:nvPicPr>
-          <p:cNvPr id="2" name="Picture 1">
-            <a:extLst>
-              <a:ext uri="{FF2B5EF4-FFF2-40B4-BE49-F238E27FC236}">
-                <a16:creationId xmlns:a16="http://schemas.microsoft.com/office/drawing/2014/main" id="{A90E8023-72DF-1386-2780-10FCD70BB12F}"/>
+          <p:cNvPr id="3" name="Picture 2">
+            <a:extLst>
+              <a:ext uri="{FF2B5EF4-FFF2-40B4-BE49-F238E27FC236}">
+                <a16:creationId xmlns:a16="http://schemas.microsoft.com/office/drawing/2014/main" id="{493B0B75-B7B0-E865-CEEB-12675737CAD5}"/>
               </a:ext>
             </a:extLst>
           </p:cNvPr>
@@ -7499,54 +7501,88 @@
         </p:blipFill>
         <p:spPr>
           <a:xfrm>
-            <a:off x="2134090" y="30361"/>
-            <a:ext cx="3436968" cy="2499337"/>
+            <a:off x="1840499" y="1319134"/>
+            <a:ext cx="5067300" cy="4019550"/>
           </a:xfrm>
           <a:prstGeom prst="rect">
             <a:avLst/>
           </a:prstGeom>
         </p:spPr>
       </p:pic>
-      <p:pic>
-        <p:nvPicPr>
-          <p:cNvPr id="3" name="Picture 2">
-            <a:extLst>
-              <a:ext uri="{FF2B5EF4-FFF2-40B4-BE49-F238E27FC236}">
-                <a16:creationId xmlns:a16="http://schemas.microsoft.com/office/drawing/2014/main" id="{493B0B75-B7B0-E865-CEEB-12675737CAD5}"/>
-              </a:ext>
-            </a:extLst>
-          </p:cNvPr>
-          <p:cNvPicPr>
-            <a:picLocks noChangeAspect="1"/>
-          </p:cNvPicPr>
-          <p:nvPr/>
-        </p:nvPicPr>
-        <p:blipFill>
-          <a:blip r:embed="rId3"/>
-          <a:stretch>
-            <a:fillRect/>
-          </a:stretch>
-        </p:blipFill>
-        <p:spPr>
-          <a:xfrm>
-            <a:off x="1920364" y="2730099"/>
-            <a:ext cx="5067300" cy="4019550"/>
-          </a:xfrm>
-          <a:prstGeom prst="rect">
-            <a:avLst/>
-          </a:prstGeom>
-        </p:spPr>
-      </p:pic>
-      <p:sp>
-        <p:nvSpPr>
-          <p:cNvPr id="5" name="Rectangle 4"/>
+      <p:sp>
+        <p:nvSpPr>
+          <p:cNvPr id="6" name="ZoneTexte 5"/>
+          <p:cNvSpPr txBox="1"/>
+          <p:nvPr/>
+        </p:nvSpPr>
+        <p:spPr>
+          <a:xfrm>
+            <a:off x="3786328" y="2039946"/>
+            <a:ext cx="301686" cy="369332"/>
+          </a:xfrm>
+          <a:prstGeom prst="rect">
+            <a:avLst/>
+          </a:prstGeom>
+          <a:noFill/>
+        </p:spPr>
+        <p:txBody>
+          <a:bodyPr wrap="none" rtlCol="0">
+            <a:spAutoFit/>
+          </a:bodyPr>
+          <a:lstStyle/>
+          <a:p>
+            <a:r>
+              <a:rPr lang="fr-CH" dirty="0"/>
+              <a:t>1</a:t>
+            </a:r>
+          </a:p>
+        </p:txBody>
+      </p:sp>
+      <p:sp>
+        <p:nvSpPr>
+          <p:cNvPr id="18" name="ZoneTexte 17"/>
+          <p:cNvSpPr txBox="1"/>
+          <p:nvPr/>
+        </p:nvSpPr>
+        <p:spPr>
+          <a:xfrm>
+            <a:off x="6701991" y="1965380"/>
+            <a:ext cx="301686" cy="369332"/>
+          </a:xfrm>
+          <a:prstGeom prst="rect">
+            <a:avLst/>
+          </a:prstGeom>
+          <a:noFill/>
+        </p:spPr>
+        <p:txBody>
+          <a:bodyPr wrap="none" rtlCol="0">
+            <a:spAutoFit/>
+          </a:bodyPr>
+          <a:lstStyle/>
+          <a:p>
+            <a:r>
+              <a:rPr lang="fr-CH" dirty="0"/>
+              <a:t>3</a:t>
+            </a:r>
+          </a:p>
+        </p:txBody>
+      </p:sp>
+      <p:sp>
+        <p:nvSpPr>
+          <p:cNvPr id="7" name="Rectangle 6">
+            <a:extLst>
+              <a:ext uri="{FF2B5EF4-FFF2-40B4-BE49-F238E27FC236}">
+                <a16:creationId xmlns:a16="http://schemas.microsoft.com/office/drawing/2014/main" id="{37F70571-9A4B-8ADA-98D5-BEDAC503B76C}"/>
+              </a:ext>
+            </a:extLst>
+          </p:cNvPr>
           <p:cNvSpPr/>
           <p:nvPr/>
         </p:nvSpPr>
         <p:spPr>
           <a:xfrm>
-            <a:off x="4659473" y="2341222"/>
-            <a:ext cx="442716" cy="185130"/>
+            <a:off x="1960775" y="2039946"/>
+            <a:ext cx="2318994" cy="3298738"/>
           </a:xfrm>
           <a:prstGeom prst="rect">
             <a:avLst/>
@@ -7585,78 +7621,153 @@
       </p:sp>
       <p:sp>
         <p:nvSpPr>
-          <p:cNvPr id="6" name="ZoneTexte 5"/>
-          <p:cNvSpPr txBox="1"/>
-          <p:nvPr/>
-        </p:nvSpPr>
-        <p:spPr>
-          <a:xfrm>
-            <a:off x="3900505" y="3430261"/>
-            <a:ext cx="301686" cy="369332"/>
-          </a:xfrm>
-          <a:prstGeom prst="rect">
-            <a:avLst/>
-          </a:prstGeom>
-          <a:noFill/>
-        </p:spPr>
-        <p:txBody>
-          <a:bodyPr wrap="none" rtlCol="0">
-            <a:spAutoFit/>
-          </a:bodyPr>
-          <a:lstStyle/>
-          <a:p>
-            <a:r>
-              <a:rPr lang="fr-CH" dirty="0"/>
-              <a:t>1</a:t>
-            </a:r>
-          </a:p>
-        </p:txBody>
-      </p:sp>
-      <p:cxnSp>
-        <p:nvCxnSpPr>
-          <p:cNvPr id="9" name="Connecteur droit avec flèche 8"/>
-          <p:cNvCxnSpPr/>
-          <p:nvPr/>
-        </p:nvCxnSpPr>
-        <p:spPr>
-          <a:xfrm>
-            <a:off x="4884862" y="2556832"/>
-            <a:ext cx="0" cy="479305"/>
-          </a:xfrm>
-          <a:prstGeom prst="straightConnector1">
-            <a:avLst/>
-          </a:prstGeom>
-          <a:ln w="38100">
+          <p:cNvPr id="8" name="Rectangle 7">
+            <a:extLst>
+              <a:ext uri="{FF2B5EF4-FFF2-40B4-BE49-F238E27FC236}">
+                <a16:creationId xmlns:a16="http://schemas.microsoft.com/office/drawing/2014/main" id="{25C3746F-5DD9-1423-346B-65507579B55A}"/>
+              </a:ext>
+            </a:extLst>
+          </p:cNvPr>
+          <p:cNvSpPr/>
+          <p:nvPr/>
+        </p:nvSpPr>
+        <p:spPr>
+          <a:xfrm>
+            <a:off x="4374149" y="1794764"/>
+            <a:ext cx="2606794" cy="3543920"/>
+          </a:xfrm>
+          <a:prstGeom prst="rect">
+            <a:avLst/>
+          </a:prstGeom>
+          <a:noFill/>
+          <a:ln>
             <a:solidFill>
-              <a:schemeClr val="tx1"/>
+              <a:schemeClr val="accent1">
+                <a:lumMod val="75000"/>
+              </a:schemeClr>
             </a:solidFill>
-            <a:tailEnd type="arrow"/>
           </a:ln>
         </p:spPr>
         <p:style>
-          <a:lnRef idx="1">
-            <a:schemeClr val="accent1"/>
+          <a:lnRef idx="2">
+            <a:schemeClr val="accent1">
+              <a:shade val="50000"/>
+            </a:schemeClr>
           </a:lnRef>
-          <a:fillRef idx="0">
+          <a:fillRef idx="1">
             <a:schemeClr val="accent1"/>
           </a:fillRef>
           <a:effectRef idx="0">
             <a:schemeClr val="accent1"/>
           </a:effectRef>
           <a:fontRef idx="minor">
-            <a:schemeClr val="tx1"/>
+            <a:schemeClr val="lt1"/>
           </a:fontRef>
         </p:style>
-      </p:cxnSp>
-      <p:sp>
-        <p:nvSpPr>
-          <p:cNvPr id="18" name="ZoneTexte 17"/>
-          <p:cNvSpPr txBox="1"/>
-          <p:nvPr/>
-        </p:nvSpPr>
-        <p:spPr>
-          <a:xfrm>
-            <a:off x="6756956" y="3328909"/>
+        <p:txBody>
+          <a:bodyPr rtlCol="0" anchor="ctr"/>
+          <a:lstStyle/>
+          <a:p>
+            <a:pPr algn="ctr"/>
+            <a:endParaRPr lang="fr-CH"/>
+          </a:p>
+        </p:txBody>
+      </p:sp>
+      <p:sp>
+        <p:nvSpPr>
+          <p:cNvPr id="10" name="TextBox 9">
+            <a:extLst>
+              <a:ext uri="{FF2B5EF4-FFF2-40B4-BE49-F238E27FC236}">
+                <a16:creationId xmlns:a16="http://schemas.microsoft.com/office/drawing/2014/main" id="{CAE6D024-DEA5-649B-8B65-4E8D33A1E038}"/>
+              </a:ext>
+            </a:extLst>
+          </p:cNvPr>
+          <p:cNvSpPr txBox="1"/>
+          <p:nvPr/>
+        </p:nvSpPr>
+        <p:spPr>
+          <a:xfrm>
+            <a:off x="1569916" y="1855280"/>
+            <a:ext cx="317716" cy="369332"/>
+          </a:xfrm>
+          <a:prstGeom prst="rect">
+            <a:avLst/>
+          </a:prstGeom>
+          <a:noFill/>
+        </p:spPr>
+        <p:txBody>
+          <a:bodyPr wrap="none" rtlCol="0">
+            <a:spAutoFit/>
+          </a:bodyPr>
+          <a:lstStyle/>
+          <a:p>
+            <a:r>
+              <a:rPr lang="en-US" dirty="0">
+                <a:solidFill>
+                  <a:srgbClr val="FF0000"/>
+                </a:solidFill>
+              </a:rPr>
+              <a:t>A</a:t>
+            </a:r>
+          </a:p>
+        </p:txBody>
+      </p:sp>
+      <p:sp>
+        <p:nvSpPr>
+          <p:cNvPr id="11" name="TextBox 10">
+            <a:extLst>
+              <a:ext uri="{FF2B5EF4-FFF2-40B4-BE49-F238E27FC236}">
+                <a16:creationId xmlns:a16="http://schemas.microsoft.com/office/drawing/2014/main" id="{0E0382A0-FE89-5EC4-0AB3-E01FED323573}"/>
+              </a:ext>
+            </a:extLst>
+          </p:cNvPr>
+          <p:cNvSpPr txBox="1"/>
+          <p:nvPr/>
+        </p:nvSpPr>
+        <p:spPr>
+          <a:xfrm>
+            <a:off x="6980942" y="1688296"/>
+            <a:ext cx="317716" cy="369332"/>
+          </a:xfrm>
+          <a:prstGeom prst="rect">
+            <a:avLst/>
+          </a:prstGeom>
+          <a:noFill/>
+        </p:spPr>
+        <p:txBody>
+          <a:bodyPr wrap="none" rtlCol="0">
+            <a:spAutoFit/>
+          </a:bodyPr>
+          <a:lstStyle/>
+          <a:p>
+            <a:r>
+              <a:rPr lang="en-US" dirty="0">
+                <a:solidFill>
+                  <a:schemeClr val="accent5">
+                    <a:lumMod val="75000"/>
+                  </a:schemeClr>
+                </a:solidFill>
+              </a:rPr>
+              <a:t>B</a:t>
+            </a:r>
+          </a:p>
+        </p:txBody>
+      </p:sp>
+      <p:sp>
+        <p:nvSpPr>
+          <p:cNvPr id="16" name="ZoneTexte 5">
+            <a:extLst>
+              <a:ext uri="{FF2B5EF4-FFF2-40B4-BE49-F238E27FC236}">
+                <a16:creationId xmlns:a16="http://schemas.microsoft.com/office/drawing/2014/main" id="{91F02098-0D73-7C6D-6F91-C709186A1C8E}"/>
+              </a:ext>
+            </a:extLst>
+          </p:cNvPr>
+          <p:cNvSpPr txBox="1"/>
+          <p:nvPr/>
+        </p:nvSpPr>
+        <p:spPr>
+          <a:xfrm>
+            <a:off x="3120272" y="5008616"/>
             <a:ext cx="301686" cy="369332"/>
           </a:xfrm>
           <a:prstGeom prst="rect">
@@ -7679,13 +7790,19 @@
       </p:sp>
       <p:sp>
         <p:nvSpPr>
-          <p:cNvPr id="24" name="ZoneTexte 23"/>
-          <p:cNvSpPr txBox="1"/>
-          <p:nvPr/>
-        </p:nvSpPr>
-        <p:spPr>
-          <a:xfrm>
-            <a:off x="4579145" y="6488189"/>
+          <p:cNvPr id="17" name="ZoneTexte 17">
+            <a:extLst>
+              <a:ext uri="{FF2B5EF4-FFF2-40B4-BE49-F238E27FC236}">
+                <a16:creationId xmlns:a16="http://schemas.microsoft.com/office/drawing/2014/main" id="{E0D3121A-164A-026D-6E1A-3FE7E286549D}"/>
+              </a:ext>
+            </a:extLst>
+          </p:cNvPr>
+          <p:cNvSpPr txBox="1"/>
+          <p:nvPr/>
+        </p:nvSpPr>
+        <p:spPr>
+          <a:xfrm>
+            <a:off x="6700039" y="2242464"/>
             <a:ext cx="301686" cy="369332"/>
           </a:xfrm>
           <a:prstGeom prst="rect">
@@ -7708,19 +7825,19 @@
       </p:sp>
       <p:sp>
         <p:nvSpPr>
-          <p:cNvPr id="4" name="ZoneTexte 17">
-            <a:extLst>
-              <a:ext uri="{FF2B5EF4-FFF2-40B4-BE49-F238E27FC236}">
-                <a16:creationId xmlns:a16="http://schemas.microsoft.com/office/drawing/2014/main" id="{58A8FBA7-C7B2-A030-1C27-68F82D2BA757}"/>
-              </a:ext>
-            </a:extLst>
-          </p:cNvPr>
-          <p:cNvSpPr txBox="1"/>
-          <p:nvPr/>
-        </p:nvSpPr>
-        <p:spPr>
-          <a:xfrm>
-            <a:off x="6756956" y="3698241"/>
+          <p:cNvPr id="19" name="ZoneTexte 17">
+            <a:extLst>
+              <a:ext uri="{FF2B5EF4-FFF2-40B4-BE49-F238E27FC236}">
+                <a16:creationId xmlns:a16="http://schemas.microsoft.com/office/drawing/2014/main" id="{15C05919-CF9C-B23A-5186-78950BE60324}"/>
+              </a:ext>
+            </a:extLst>
+          </p:cNvPr>
+          <p:cNvSpPr txBox="1"/>
+          <p:nvPr/>
+        </p:nvSpPr>
+        <p:spPr>
+          <a:xfrm>
+            <a:off x="6681534" y="3244334"/>
             <a:ext cx="301686" cy="369332"/>
           </a:xfrm>
           <a:prstGeom prst="rect">
@@ -7736,7 +7853,77 @@
           <a:p>
             <a:r>
               <a:rPr lang="fr-CH" dirty="0"/>
-              <a:t>3</a:t>
+              <a:t>5</a:t>
+            </a:r>
+          </a:p>
+        </p:txBody>
+      </p:sp>
+      <p:sp>
+        <p:nvSpPr>
+          <p:cNvPr id="20" name="ZoneTexte 17">
+            <a:extLst>
+              <a:ext uri="{FF2B5EF4-FFF2-40B4-BE49-F238E27FC236}">
+                <a16:creationId xmlns:a16="http://schemas.microsoft.com/office/drawing/2014/main" id="{9D1631DE-CAC3-DCF6-A67E-61ADC0A08565}"/>
+              </a:ext>
+            </a:extLst>
+          </p:cNvPr>
+          <p:cNvSpPr txBox="1"/>
+          <p:nvPr/>
+        </p:nvSpPr>
+        <p:spPr>
+          <a:xfrm>
+            <a:off x="6681534" y="3876700"/>
+            <a:ext cx="301686" cy="369332"/>
+          </a:xfrm>
+          <a:prstGeom prst="rect">
+            <a:avLst/>
+          </a:prstGeom>
+          <a:noFill/>
+        </p:spPr>
+        <p:txBody>
+          <a:bodyPr wrap="none" rtlCol="0">
+            <a:spAutoFit/>
+          </a:bodyPr>
+          <a:lstStyle/>
+          <a:p>
+            <a:r>
+              <a:rPr lang="fr-CH" dirty="0"/>
+              <a:t>6</a:t>
+            </a:r>
+          </a:p>
+        </p:txBody>
+      </p:sp>
+      <p:sp>
+        <p:nvSpPr>
+          <p:cNvPr id="21" name="ZoneTexte 17">
+            <a:extLst>
+              <a:ext uri="{FF2B5EF4-FFF2-40B4-BE49-F238E27FC236}">
+                <a16:creationId xmlns:a16="http://schemas.microsoft.com/office/drawing/2014/main" id="{96493E24-4602-AF6E-AE51-DCFE82D9F5C8}"/>
+              </a:ext>
+            </a:extLst>
+          </p:cNvPr>
+          <p:cNvSpPr txBox="1"/>
+          <p:nvPr/>
+        </p:nvSpPr>
+        <p:spPr>
+          <a:xfrm>
+            <a:off x="4880831" y="5055751"/>
+            <a:ext cx="301686" cy="369332"/>
+          </a:xfrm>
+          <a:prstGeom prst="rect">
+            <a:avLst/>
+          </a:prstGeom>
+          <a:noFill/>
+        </p:spPr>
+        <p:txBody>
+          <a:bodyPr wrap="none" rtlCol="0">
+            <a:spAutoFit/>
+          </a:bodyPr>
+          <a:lstStyle/>
+          <a:p>
+            <a:r>
+              <a:rPr lang="fr-CH" dirty="0"/>
+              <a:t>7</a:t>
             </a:r>
           </a:p>
         </p:txBody>
@@ -7773,10 +7960,10 @@
       </p:grpSpPr>
       <p:pic>
         <p:nvPicPr>
-          <p:cNvPr id="3" name="Picture 2">
-            <a:extLst>
-              <a:ext uri="{FF2B5EF4-FFF2-40B4-BE49-F238E27FC236}">
-                <a16:creationId xmlns:a16="http://schemas.microsoft.com/office/drawing/2014/main" id="{5DBF5D2E-9AF0-308C-8708-B522DFF35718}"/>
+          <p:cNvPr id="10" name="Picture 9">
+            <a:extLst>
+              <a:ext uri="{FF2B5EF4-FFF2-40B4-BE49-F238E27FC236}">
+                <a16:creationId xmlns:a16="http://schemas.microsoft.com/office/drawing/2014/main" id="{48AAB4AE-55CB-C446-AE5C-EEE4753BA741}"/>
               </a:ext>
             </a:extLst>
           </p:cNvPr>
@@ -7793,80 +7980,20 @@
         </p:blipFill>
         <p:spPr>
           <a:xfrm>
-            <a:off x="4380263" y="2709015"/>
-            <a:ext cx="3891656" cy="3749624"/>
+            <a:off x="380902" y="803487"/>
+            <a:ext cx="8401050" cy="5514975"/>
           </a:xfrm>
           <a:prstGeom prst="rect">
             <a:avLst/>
           </a:prstGeom>
         </p:spPr>
       </p:pic>
-      <p:pic>
-        <p:nvPicPr>
-          <p:cNvPr id="21" name="Picture 20">
-            <a:extLst>
-              <a:ext uri="{FF2B5EF4-FFF2-40B4-BE49-F238E27FC236}">
-                <a16:creationId xmlns:a16="http://schemas.microsoft.com/office/drawing/2014/main" id="{C49B2547-835B-00CC-6EE5-D04ACD262C21}"/>
-              </a:ext>
-            </a:extLst>
-          </p:cNvPr>
-          <p:cNvPicPr>
-            <a:picLocks noChangeAspect="1"/>
-          </p:cNvPicPr>
-          <p:nvPr/>
-        </p:nvPicPr>
-        <p:blipFill>
-          <a:blip r:embed="rId3"/>
-          <a:stretch>
-            <a:fillRect/>
-          </a:stretch>
-        </p:blipFill>
-        <p:spPr>
-          <a:xfrm>
-            <a:off x="439479" y="2709015"/>
-            <a:ext cx="3897072" cy="3754843"/>
-          </a:xfrm>
-          <a:prstGeom prst="rect">
-            <a:avLst/>
-          </a:prstGeom>
-        </p:spPr>
-      </p:pic>
-      <p:pic>
-        <p:nvPicPr>
-          <p:cNvPr id="6" name="Picture 5">
-            <a:extLst>
-              <a:ext uri="{FF2B5EF4-FFF2-40B4-BE49-F238E27FC236}">
-                <a16:creationId xmlns:a16="http://schemas.microsoft.com/office/drawing/2014/main" id="{A1FB3430-21D3-FAB0-F22E-75E1A8EA75CC}"/>
-              </a:ext>
-            </a:extLst>
-          </p:cNvPr>
-          <p:cNvPicPr>
-            <a:picLocks noChangeAspect="1"/>
-          </p:cNvPicPr>
-          <p:nvPr/>
-        </p:nvPicPr>
-        <p:blipFill>
-          <a:blip r:embed="rId4"/>
-          <a:stretch>
-            <a:fillRect/>
-          </a:stretch>
-        </p:blipFill>
-        <p:spPr>
-          <a:xfrm>
-            <a:off x="2395653" y="10567"/>
-            <a:ext cx="3436968" cy="2499337"/>
-          </a:xfrm>
-          <a:prstGeom prst="rect">
-            <a:avLst/>
-          </a:prstGeom>
-        </p:spPr>
-      </p:pic>
-      <p:sp>
-        <p:nvSpPr>
-          <p:cNvPr id="9" name="Rectangle 8">
-            <a:extLst>
-              <a:ext uri="{FF2B5EF4-FFF2-40B4-BE49-F238E27FC236}">
-                <a16:creationId xmlns:a16="http://schemas.microsoft.com/office/drawing/2014/main" id="{0456C9EB-09F5-4E73-8838-573A158E4980}"/>
+      <p:sp>
+        <p:nvSpPr>
+          <p:cNvPr id="6" name="Rectangle 5">
+            <a:extLst>
+              <a:ext uri="{FF2B5EF4-FFF2-40B4-BE49-F238E27FC236}">
+                <a16:creationId xmlns:a16="http://schemas.microsoft.com/office/drawing/2014/main" id="{7F1E5C4C-E4C2-B1BA-CCD4-2756D74208DE}"/>
               </a:ext>
             </a:extLst>
           </p:cNvPr>
@@ -7875,8 +8002,8 @@
         </p:nvSpPr>
         <p:spPr>
           <a:xfrm>
-            <a:off x="5340236" y="1968987"/>
-            <a:ext cx="367837" cy="118584"/>
+            <a:off x="3129699" y="6054513"/>
+            <a:ext cx="5548558" cy="241414"/>
           </a:xfrm>
           <a:prstGeom prst="rect">
             <a:avLst/>
@@ -7891,7 +8018,7 @@
         <p:style>
           <a:lnRef idx="2">
             <a:schemeClr val="accent1">
-              <a:shade val="50000"/>
+              <a:shade val="15000"/>
             </a:schemeClr>
           </a:lnRef>
           <a:fillRef idx="1">
@@ -7909,549 +8036,14 @@
           <a:lstStyle/>
           <a:p>
             <a:pPr algn="ctr"/>
-            <a:endParaRPr lang="fr-CH"/>
-          </a:p>
-        </p:txBody>
-      </p:sp>
-      <p:cxnSp>
-        <p:nvCxnSpPr>
-          <p:cNvPr id="10" name="Connecteur droit avec flèche 8">
-            <a:extLst>
-              <a:ext uri="{FF2B5EF4-FFF2-40B4-BE49-F238E27FC236}">
-                <a16:creationId xmlns:a16="http://schemas.microsoft.com/office/drawing/2014/main" id="{865192BE-F994-4ECE-B695-931A540B9870}"/>
-              </a:ext>
-            </a:extLst>
-          </p:cNvPr>
-          <p:cNvCxnSpPr>
-            <a:cxnSpLocks/>
-          </p:cNvCxnSpPr>
-          <p:nvPr/>
-        </p:nvCxnSpPr>
-        <p:spPr>
-          <a:xfrm flipH="1">
-            <a:off x="4354942" y="2087571"/>
-            <a:ext cx="1057567" cy="735528"/>
-          </a:xfrm>
-          <a:prstGeom prst="straightConnector1">
-            <a:avLst/>
-          </a:prstGeom>
-          <a:ln w="38100">
-            <a:solidFill>
-              <a:schemeClr val="tx1"/>
-            </a:solidFill>
-            <a:tailEnd type="arrow"/>
-          </a:ln>
-        </p:spPr>
-        <p:style>
-          <a:lnRef idx="1">
-            <a:schemeClr val="accent1"/>
-          </a:lnRef>
-          <a:fillRef idx="0">
-            <a:schemeClr val="accent1"/>
-          </a:fillRef>
-          <a:effectRef idx="0">
-            <a:schemeClr val="accent1"/>
-          </a:effectRef>
-          <a:fontRef idx="minor">
-            <a:schemeClr val="tx1"/>
-          </a:fontRef>
-        </p:style>
-      </p:cxnSp>
-      <p:sp>
-        <p:nvSpPr>
-          <p:cNvPr id="11" name="ZoneTexte 5">
-            <a:extLst>
-              <a:ext uri="{FF2B5EF4-FFF2-40B4-BE49-F238E27FC236}">
-                <a16:creationId xmlns:a16="http://schemas.microsoft.com/office/drawing/2014/main" id="{36DF3D07-26B1-4DBC-9132-02CB2491F0CE}"/>
-              </a:ext>
-            </a:extLst>
-          </p:cNvPr>
-          <p:cNvSpPr txBox="1"/>
-          <p:nvPr/>
-        </p:nvSpPr>
-        <p:spPr>
-          <a:xfrm>
-            <a:off x="2166233" y="4187312"/>
-            <a:ext cx="301686" cy="369332"/>
-          </a:xfrm>
-          <a:prstGeom prst="rect">
-            <a:avLst/>
-          </a:prstGeom>
-          <a:noFill/>
-        </p:spPr>
-        <p:txBody>
-          <a:bodyPr wrap="none" rtlCol="0">
-            <a:spAutoFit/>
-          </a:bodyPr>
-          <a:lstStyle/>
-          <a:p>
-            <a:r>
-              <a:rPr lang="fr-CH" dirty="0"/>
-              <a:t>3</a:t>
-            </a:r>
-          </a:p>
-        </p:txBody>
-      </p:sp>
-      <p:sp>
-        <p:nvSpPr>
-          <p:cNvPr id="12" name="ZoneTexte 5">
-            <a:extLst>
-              <a:ext uri="{FF2B5EF4-FFF2-40B4-BE49-F238E27FC236}">
-                <a16:creationId xmlns:a16="http://schemas.microsoft.com/office/drawing/2014/main" id="{94223173-1E7A-453C-BE9C-45B4DB8900B6}"/>
-              </a:ext>
-            </a:extLst>
-          </p:cNvPr>
-          <p:cNvSpPr txBox="1"/>
-          <p:nvPr/>
-        </p:nvSpPr>
-        <p:spPr>
-          <a:xfrm>
-            <a:off x="2283145" y="2653673"/>
-            <a:ext cx="301686" cy="369332"/>
-          </a:xfrm>
-          <a:prstGeom prst="rect">
-            <a:avLst/>
-          </a:prstGeom>
-          <a:noFill/>
-        </p:spPr>
-        <p:txBody>
-          <a:bodyPr wrap="none" rtlCol="0">
-            <a:spAutoFit/>
-          </a:bodyPr>
-          <a:lstStyle/>
-          <a:p>
-            <a:r>
-              <a:rPr lang="fr-CH" dirty="0"/>
-              <a:t>4</a:t>
-            </a:r>
-          </a:p>
-        </p:txBody>
-      </p:sp>
-      <p:sp>
-        <p:nvSpPr>
-          <p:cNvPr id="13" name="ZoneTexte 5">
-            <a:extLst>
-              <a:ext uri="{FF2B5EF4-FFF2-40B4-BE49-F238E27FC236}">
-                <a16:creationId xmlns:a16="http://schemas.microsoft.com/office/drawing/2014/main" id="{144EBBCE-40DB-431E-A273-EE7226BE5403}"/>
-              </a:ext>
-            </a:extLst>
-          </p:cNvPr>
-          <p:cNvSpPr txBox="1"/>
-          <p:nvPr/>
-        </p:nvSpPr>
-        <p:spPr>
-          <a:xfrm>
-            <a:off x="6680084" y="3111764"/>
-            <a:ext cx="301686" cy="369332"/>
-          </a:xfrm>
-          <a:prstGeom prst="rect">
-            <a:avLst/>
-          </a:prstGeom>
-          <a:noFill/>
-        </p:spPr>
-        <p:txBody>
-          <a:bodyPr wrap="none" rtlCol="0">
-            <a:spAutoFit/>
-          </a:bodyPr>
-          <a:lstStyle/>
-          <a:p>
-            <a:r>
-              <a:rPr lang="fr-CH" dirty="0"/>
-              <a:t>5</a:t>
-            </a:r>
-          </a:p>
-        </p:txBody>
-      </p:sp>
-      <p:sp>
-        <p:nvSpPr>
-          <p:cNvPr id="4" name="ZoneTexte 5">
-            <a:extLst>
-              <a:ext uri="{FF2B5EF4-FFF2-40B4-BE49-F238E27FC236}">
-                <a16:creationId xmlns:a16="http://schemas.microsoft.com/office/drawing/2014/main" id="{5E8563DD-2630-17AB-11A5-E86F4214EFF6}"/>
-              </a:ext>
-            </a:extLst>
-          </p:cNvPr>
-          <p:cNvSpPr txBox="1"/>
-          <p:nvPr/>
-        </p:nvSpPr>
-        <p:spPr>
-          <a:xfrm>
-            <a:off x="5467089" y="4986101"/>
-            <a:ext cx="301686" cy="369332"/>
-          </a:xfrm>
-          <a:prstGeom prst="rect">
-            <a:avLst/>
-          </a:prstGeom>
-          <a:noFill/>
-        </p:spPr>
-        <p:txBody>
-          <a:bodyPr wrap="none" rtlCol="0">
-            <a:spAutoFit/>
-          </a:bodyPr>
-          <a:lstStyle/>
-          <a:p>
-            <a:r>
-              <a:rPr lang="fr-CH" dirty="0"/>
-              <a:t>6</a:t>
-            </a:r>
-          </a:p>
-        </p:txBody>
-      </p:sp>
-      <p:sp>
-        <p:nvSpPr>
-          <p:cNvPr id="22" name="ZoneTexte 5">
-            <a:extLst>
-              <a:ext uri="{FF2B5EF4-FFF2-40B4-BE49-F238E27FC236}">
-                <a16:creationId xmlns:a16="http://schemas.microsoft.com/office/drawing/2014/main" id="{C5CC45CE-2CDB-2B48-7CC1-3A9FA968C67B}"/>
-              </a:ext>
-            </a:extLst>
-          </p:cNvPr>
-          <p:cNvSpPr txBox="1"/>
-          <p:nvPr/>
-        </p:nvSpPr>
-        <p:spPr>
-          <a:xfrm>
-            <a:off x="2467919" y="3785296"/>
-            <a:ext cx="301686" cy="369332"/>
-          </a:xfrm>
-          <a:prstGeom prst="rect">
-            <a:avLst/>
-          </a:prstGeom>
-          <a:noFill/>
-        </p:spPr>
-        <p:txBody>
-          <a:bodyPr wrap="none" rtlCol="0">
-            <a:spAutoFit/>
-          </a:bodyPr>
-          <a:lstStyle/>
-          <a:p>
-            <a:r>
-              <a:rPr lang="fr-CH" dirty="0"/>
-              <a:t>2</a:t>
-            </a:r>
-          </a:p>
-        </p:txBody>
-      </p:sp>
-      <p:cxnSp>
-        <p:nvCxnSpPr>
-          <p:cNvPr id="24" name="Connecteur droit avec flèche 19">
-            <a:extLst>
-              <a:ext uri="{FF2B5EF4-FFF2-40B4-BE49-F238E27FC236}">
-                <a16:creationId xmlns:a16="http://schemas.microsoft.com/office/drawing/2014/main" id="{113046D9-22B6-7C97-0ACD-B51EBF9F384D}"/>
-              </a:ext>
-            </a:extLst>
-          </p:cNvPr>
-          <p:cNvCxnSpPr>
-            <a:cxnSpLocks/>
-          </p:cNvCxnSpPr>
-          <p:nvPr/>
-        </p:nvCxnSpPr>
-        <p:spPr>
-          <a:xfrm>
-            <a:off x="2916215" y="3014666"/>
-            <a:ext cx="1420336" cy="0"/>
-          </a:xfrm>
-          <a:prstGeom prst="straightConnector1">
-            <a:avLst/>
-          </a:prstGeom>
-          <a:ln>
-            <a:solidFill>
-              <a:schemeClr val="tx1"/>
-            </a:solidFill>
-            <a:tailEnd type="arrow"/>
-          </a:ln>
-        </p:spPr>
-        <p:style>
-          <a:lnRef idx="1">
-            <a:schemeClr val="accent1"/>
-          </a:lnRef>
-          <a:fillRef idx="0">
-            <a:schemeClr val="accent1"/>
-          </a:fillRef>
-          <a:effectRef idx="0">
-            <a:schemeClr val="accent1"/>
-          </a:effectRef>
-          <a:fontRef idx="minor">
-            <a:schemeClr val="tx1"/>
-          </a:fontRef>
-        </p:style>
-      </p:cxnSp>
-      <p:sp>
-        <p:nvSpPr>
-          <p:cNvPr id="30" name="ZoneTexte 5">
-            <a:extLst>
-              <a:ext uri="{FF2B5EF4-FFF2-40B4-BE49-F238E27FC236}">
-                <a16:creationId xmlns:a16="http://schemas.microsoft.com/office/drawing/2014/main" id="{B48FB699-960C-D8C1-F2CD-99F3BD727EC5}"/>
-              </a:ext>
-            </a:extLst>
-          </p:cNvPr>
-          <p:cNvSpPr txBox="1"/>
-          <p:nvPr/>
-        </p:nvSpPr>
-        <p:spPr>
-          <a:xfrm>
-            <a:off x="5530935" y="5379183"/>
-            <a:ext cx="301686" cy="369332"/>
-          </a:xfrm>
-          <a:prstGeom prst="rect">
-            <a:avLst/>
-          </a:prstGeom>
-          <a:noFill/>
-        </p:spPr>
-        <p:txBody>
-          <a:bodyPr wrap="none" rtlCol="0">
-            <a:spAutoFit/>
-          </a:bodyPr>
-          <a:lstStyle/>
-          <a:p>
-            <a:r>
-              <a:rPr lang="fr-CH" dirty="0"/>
-              <a:t>7</a:t>
-            </a:r>
-          </a:p>
-        </p:txBody>
-      </p:sp>
-      <p:sp>
-        <p:nvSpPr>
-          <p:cNvPr id="31" name="ZoneTexte 5">
-            <a:extLst>
-              <a:ext uri="{FF2B5EF4-FFF2-40B4-BE49-F238E27FC236}">
-                <a16:creationId xmlns:a16="http://schemas.microsoft.com/office/drawing/2014/main" id="{CCDADEA0-781E-47A1-09D2-06F378435361}"/>
-              </a:ext>
-            </a:extLst>
-          </p:cNvPr>
-          <p:cNvSpPr txBox="1"/>
-          <p:nvPr/>
-        </p:nvSpPr>
-        <p:spPr>
-          <a:xfrm>
-            <a:off x="4505699" y="6273973"/>
-            <a:ext cx="301686" cy="369332"/>
-          </a:xfrm>
-          <a:prstGeom prst="rect">
-            <a:avLst/>
-          </a:prstGeom>
-          <a:noFill/>
-        </p:spPr>
-        <p:txBody>
-          <a:bodyPr wrap="none" rtlCol="0">
-            <a:spAutoFit/>
-          </a:bodyPr>
-          <a:lstStyle/>
-          <a:p>
-            <a:r>
-              <a:rPr lang="fr-CH" dirty="0"/>
-              <a:t>8</a:t>
-            </a:r>
-          </a:p>
-        </p:txBody>
-      </p:sp>
-      <p:sp>
-        <p:nvSpPr>
-          <p:cNvPr id="32" name="ZoneTexte 5">
-            <a:extLst>
-              <a:ext uri="{FF2B5EF4-FFF2-40B4-BE49-F238E27FC236}">
-                <a16:creationId xmlns:a16="http://schemas.microsoft.com/office/drawing/2014/main" id="{B5E10E91-77A2-024E-6B53-21EABA12317B}"/>
-              </a:ext>
-            </a:extLst>
-          </p:cNvPr>
-          <p:cNvSpPr txBox="1"/>
-          <p:nvPr/>
-        </p:nvSpPr>
-        <p:spPr>
-          <a:xfrm>
-            <a:off x="5686702" y="1823530"/>
-            <a:ext cx="301686" cy="369332"/>
-          </a:xfrm>
-          <a:prstGeom prst="rect">
-            <a:avLst/>
-          </a:prstGeom>
-          <a:noFill/>
-        </p:spPr>
-        <p:txBody>
-          <a:bodyPr wrap="none" rtlCol="0">
-            <a:spAutoFit/>
-          </a:bodyPr>
-          <a:lstStyle/>
-          <a:p>
-            <a:r>
-              <a:rPr lang="fr-CH" dirty="0"/>
-              <a:t>1</a:t>
-            </a:r>
-          </a:p>
-        </p:txBody>
-      </p:sp>
-      <p:sp>
-        <p:nvSpPr>
-          <p:cNvPr id="33" name="ZoneTexte 5">
-            <a:extLst>
-              <a:ext uri="{FF2B5EF4-FFF2-40B4-BE49-F238E27FC236}">
-                <a16:creationId xmlns:a16="http://schemas.microsoft.com/office/drawing/2014/main" id="{05B8C77A-1EBF-84D0-B3F8-7E86D273A6CD}"/>
-              </a:ext>
-            </a:extLst>
-          </p:cNvPr>
-          <p:cNvSpPr txBox="1"/>
-          <p:nvPr/>
-        </p:nvSpPr>
-        <p:spPr>
-          <a:xfrm>
-            <a:off x="5229249" y="6278175"/>
-            <a:ext cx="301686" cy="369332"/>
-          </a:xfrm>
-          <a:prstGeom prst="rect">
-            <a:avLst/>
-          </a:prstGeom>
-          <a:noFill/>
-        </p:spPr>
-        <p:txBody>
-          <a:bodyPr wrap="none" rtlCol="0">
-            <a:spAutoFit/>
-          </a:bodyPr>
-          <a:lstStyle/>
-          <a:p>
-            <a:r>
-              <a:rPr lang="fr-CH" dirty="0"/>
-              <a:t>9</a:t>
-            </a:r>
-          </a:p>
-        </p:txBody>
-      </p:sp>
-      <p:sp>
-        <p:nvSpPr>
-          <p:cNvPr id="34" name="TextBox 33">
-            <a:extLst>
-              <a:ext uri="{FF2B5EF4-FFF2-40B4-BE49-F238E27FC236}">
-                <a16:creationId xmlns:a16="http://schemas.microsoft.com/office/drawing/2014/main" id="{DD6A987D-1BFD-1E25-8C33-F2E82DF24B13}"/>
-              </a:ext>
-            </a:extLst>
-          </p:cNvPr>
-          <p:cNvSpPr txBox="1"/>
-          <p:nvPr/>
-        </p:nvSpPr>
-        <p:spPr>
-          <a:xfrm>
-            <a:off x="1848741" y="4025178"/>
-            <a:ext cx="277640" cy="169277"/>
-          </a:xfrm>
-          <a:prstGeom prst="rect">
-            <a:avLst/>
-          </a:prstGeom>
-          <a:noFill/>
-        </p:spPr>
-        <p:txBody>
-          <a:bodyPr wrap="none" rtlCol="0">
-            <a:spAutoFit/>
-          </a:bodyPr>
-          <a:lstStyle/>
-          <a:p>
-            <a:r>
-              <a:rPr lang="en-US" sz="400" dirty="0"/>
-              <a:t>,</a:t>
-            </a:r>
-            <a:r>
-              <a:rPr lang="en-US" sz="500" dirty="0"/>
-              <a:t>7,8</a:t>
-            </a:r>
-            <a:endParaRPr lang="en-US" sz="400" dirty="0"/>
-          </a:p>
-        </p:txBody>
-      </p:sp>
-      <p:sp>
-        <p:nvSpPr>
-          <p:cNvPr id="35" name="TextBox 34">
-            <a:extLst>
-              <a:ext uri="{FF2B5EF4-FFF2-40B4-BE49-F238E27FC236}">
-                <a16:creationId xmlns:a16="http://schemas.microsoft.com/office/drawing/2014/main" id="{A76D0ADF-5F61-BD72-A7A5-5B3AB8802DA1}"/>
-              </a:ext>
-            </a:extLst>
-          </p:cNvPr>
-          <p:cNvSpPr txBox="1"/>
-          <p:nvPr/>
-        </p:nvSpPr>
-        <p:spPr>
-          <a:xfrm>
-            <a:off x="1846808" y="3323724"/>
-            <a:ext cx="277640" cy="169277"/>
-          </a:xfrm>
-          <a:prstGeom prst="rect">
-            <a:avLst/>
-          </a:prstGeom>
-          <a:noFill/>
-        </p:spPr>
-        <p:txBody>
-          <a:bodyPr wrap="none" rtlCol="0">
-            <a:spAutoFit/>
-          </a:bodyPr>
-          <a:lstStyle/>
-          <a:p>
-            <a:r>
-              <a:rPr lang="en-US" sz="400" dirty="0"/>
-              <a:t>,</a:t>
-            </a:r>
-            <a:r>
-              <a:rPr lang="en-US" sz="500" dirty="0"/>
-              <a:t>7,8</a:t>
-            </a:r>
-            <a:endParaRPr lang="en-US" sz="400" dirty="0"/>
-          </a:p>
-        </p:txBody>
-      </p:sp>
-      <p:sp>
-        <p:nvSpPr>
-          <p:cNvPr id="36" name="Rectangle 35">
-            <a:extLst>
-              <a:ext uri="{FF2B5EF4-FFF2-40B4-BE49-F238E27FC236}">
-                <a16:creationId xmlns:a16="http://schemas.microsoft.com/office/drawing/2014/main" id="{D03159ED-CFDA-5258-8554-8A6291023C19}"/>
-              </a:ext>
-            </a:extLst>
-          </p:cNvPr>
-          <p:cNvSpPr/>
-          <p:nvPr/>
-        </p:nvSpPr>
-        <p:spPr>
-          <a:xfrm>
-            <a:off x="5715216" y="3352800"/>
-            <a:ext cx="124548" cy="107156"/>
-          </a:xfrm>
-          <a:prstGeom prst="rect">
-            <a:avLst/>
-          </a:prstGeom>
-          <a:noFill/>
-          <a:ln>
-            <a:solidFill>
-              <a:srgbClr val="FF0000"/>
-            </a:solidFill>
-          </a:ln>
-        </p:spPr>
-        <p:style>
-          <a:lnRef idx="2">
-            <a:schemeClr val="accent1">
-              <a:shade val="50000"/>
-            </a:schemeClr>
-          </a:lnRef>
-          <a:fillRef idx="1">
-            <a:schemeClr val="accent1"/>
-          </a:fillRef>
-          <a:effectRef idx="0">
-            <a:schemeClr val="accent1"/>
-          </a:effectRef>
-          <a:fontRef idx="minor">
-            <a:schemeClr val="lt1"/>
-          </a:fontRef>
-        </p:style>
-        <p:txBody>
-          <a:bodyPr rtlCol="0" anchor="ctr"/>
-          <a:lstStyle/>
-          <a:p>
-            <a:pPr algn="ctr"/>
-            <a:endParaRPr lang="fr-CH"/>
+            <a:endParaRPr lang="en-US"/>
           </a:p>
         </p:txBody>
       </p:sp>
     </p:spTree>
     <p:extLst>
       <p:ext uri="{BB962C8B-B14F-4D97-AF65-F5344CB8AC3E}">
-        <p14:creationId xmlns:p14="http://schemas.microsoft.com/office/powerpoint/2010/main" val="346468439"/>
+        <p14:creationId xmlns:p14="http://schemas.microsoft.com/office/powerpoint/2010/main" val="2923874409"/>
       </p:ext>
     </p:extLst>
   </p:cSld>
@@ -8480,10 +8072,10 @@
       </p:grpSpPr>
       <p:pic>
         <p:nvPicPr>
-          <p:cNvPr id="4" name="Picture 3">
-            <a:extLst>
-              <a:ext uri="{FF2B5EF4-FFF2-40B4-BE49-F238E27FC236}">
-                <a16:creationId xmlns:a16="http://schemas.microsoft.com/office/drawing/2014/main" id="{575B0742-8CC0-0A7F-8E1D-DAC79D6BF0C2}"/>
+          <p:cNvPr id="3" name="Picture 2">
+            <a:extLst>
+              <a:ext uri="{FF2B5EF4-FFF2-40B4-BE49-F238E27FC236}">
+                <a16:creationId xmlns:a16="http://schemas.microsoft.com/office/drawing/2014/main" id="{5DBF5D2E-9AF0-308C-8708-B522DFF35718}"/>
               </a:ext>
             </a:extLst>
           </p:cNvPr>
@@ -8500,55 +8092,80 @@
         </p:blipFill>
         <p:spPr>
           <a:xfrm>
-            <a:off x="671136" y="332682"/>
-            <a:ext cx="7548562" cy="4525061"/>
+            <a:off x="4380263" y="2709015"/>
+            <a:ext cx="3891656" cy="3749624"/>
           </a:xfrm>
           <a:prstGeom prst="rect">
             <a:avLst/>
           </a:prstGeom>
         </p:spPr>
       </p:pic>
-      <p:sp>
-        <p:nvSpPr>
-          <p:cNvPr id="11" name="ZoneTexte 6">
-            <a:extLst>
-              <a:ext uri="{FF2B5EF4-FFF2-40B4-BE49-F238E27FC236}">
-                <a16:creationId xmlns:a16="http://schemas.microsoft.com/office/drawing/2014/main" id="{1B2B5547-ED2C-33AF-89B1-76E4C1A09100}"/>
-              </a:ext>
-            </a:extLst>
-          </p:cNvPr>
-          <p:cNvSpPr txBox="1"/>
-          <p:nvPr/>
-        </p:nvSpPr>
-        <p:spPr>
-          <a:xfrm>
-            <a:off x="992304" y="1762362"/>
-            <a:ext cx="301686" cy="369332"/>
-          </a:xfrm>
-          <a:prstGeom prst="rect">
-            <a:avLst/>
-          </a:prstGeom>
-          <a:noFill/>
-        </p:spPr>
-        <p:txBody>
-          <a:bodyPr wrap="none" rtlCol="0">
-            <a:spAutoFit/>
-          </a:bodyPr>
-          <a:lstStyle/>
-          <a:p>
-            <a:r>
-              <a:rPr lang="fr-CH" dirty="0"/>
-              <a:t>1</a:t>
-            </a:r>
-          </a:p>
-        </p:txBody>
-      </p:sp>
-      <p:sp>
-        <p:nvSpPr>
-          <p:cNvPr id="12" name="Rectangle 11">
-            <a:extLst>
-              <a:ext uri="{FF2B5EF4-FFF2-40B4-BE49-F238E27FC236}">
-                <a16:creationId xmlns:a16="http://schemas.microsoft.com/office/drawing/2014/main" id="{B4339C67-E72F-8C32-5050-984F38B12716}"/>
+      <p:pic>
+        <p:nvPicPr>
+          <p:cNvPr id="21" name="Picture 20">
+            <a:extLst>
+              <a:ext uri="{FF2B5EF4-FFF2-40B4-BE49-F238E27FC236}">
+                <a16:creationId xmlns:a16="http://schemas.microsoft.com/office/drawing/2014/main" id="{C49B2547-835B-00CC-6EE5-D04ACD262C21}"/>
+              </a:ext>
+            </a:extLst>
+          </p:cNvPr>
+          <p:cNvPicPr>
+            <a:picLocks noChangeAspect="1"/>
+          </p:cNvPicPr>
+          <p:nvPr/>
+        </p:nvPicPr>
+        <p:blipFill>
+          <a:blip r:embed="rId3"/>
+          <a:stretch>
+            <a:fillRect/>
+          </a:stretch>
+        </p:blipFill>
+        <p:spPr>
+          <a:xfrm>
+            <a:off x="439479" y="2709015"/>
+            <a:ext cx="3897072" cy="3754843"/>
+          </a:xfrm>
+          <a:prstGeom prst="rect">
+            <a:avLst/>
+          </a:prstGeom>
+        </p:spPr>
+      </p:pic>
+      <p:pic>
+        <p:nvPicPr>
+          <p:cNvPr id="6" name="Picture 5">
+            <a:extLst>
+              <a:ext uri="{FF2B5EF4-FFF2-40B4-BE49-F238E27FC236}">
+                <a16:creationId xmlns:a16="http://schemas.microsoft.com/office/drawing/2014/main" id="{A1FB3430-21D3-FAB0-F22E-75E1A8EA75CC}"/>
+              </a:ext>
+            </a:extLst>
+          </p:cNvPr>
+          <p:cNvPicPr>
+            <a:picLocks noChangeAspect="1"/>
+          </p:cNvPicPr>
+          <p:nvPr/>
+        </p:nvPicPr>
+        <p:blipFill>
+          <a:blip r:embed="rId4"/>
+          <a:stretch>
+            <a:fillRect/>
+          </a:stretch>
+        </p:blipFill>
+        <p:spPr>
+          <a:xfrm>
+            <a:off x="2395653" y="10567"/>
+            <a:ext cx="3436968" cy="2499337"/>
+          </a:xfrm>
+          <a:prstGeom prst="rect">
+            <a:avLst/>
+          </a:prstGeom>
+        </p:spPr>
+      </p:pic>
+      <p:sp>
+        <p:nvSpPr>
+          <p:cNvPr id="9" name="Rectangle 8">
+            <a:extLst>
+              <a:ext uri="{FF2B5EF4-FFF2-40B4-BE49-F238E27FC236}">
+                <a16:creationId xmlns:a16="http://schemas.microsoft.com/office/drawing/2014/main" id="{0456C9EB-09F5-4E73-8838-573A158E4980}"/>
               </a:ext>
             </a:extLst>
           </p:cNvPr>
@@ -8557,8 +8174,8 @@
         </p:nvSpPr>
         <p:spPr>
           <a:xfrm>
-            <a:off x="1080656" y="1339272"/>
-            <a:ext cx="426668" cy="480230"/>
+            <a:off x="5340236" y="1968987"/>
+            <a:ext cx="367837" cy="118584"/>
           </a:xfrm>
           <a:prstGeom prst="rect">
             <a:avLst/>
@@ -8566,9 +8183,7 @@
           <a:noFill/>
           <a:ln>
             <a:solidFill>
-              <a:schemeClr val="accent6">
-                <a:lumMod val="75000"/>
-              </a:schemeClr>
+              <a:srgbClr val="FF0000"/>
             </a:solidFill>
           </a:ln>
         </p:spPr>
@@ -8597,32 +8212,513 @@
           </a:p>
         </p:txBody>
       </p:sp>
-      <p:sp>
-        <p:nvSpPr>
-          <p:cNvPr id="14" name="Rectangle 13">
-            <a:extLst>
-              <a:ext uri="{FF2B5EF4-FFF2-40B4-BE49-F238E27FC236}">
-                <a16:creationId xmlns:a16="http://schemas.microsoft.com/office/drawing/2014/main" id="{D377BBCA-C190-A019-DD53-FAB4DC7C0ABE}"/>
-              </a:ext>
-            </a:extLst>
-          </p:cNvPr>
-          <p:cNvSpPr/>
-          <p:nvPr/>
-        </p:nvSpPr>
-        <p:spPr>
-          <a:xfrm>
-            <a:off x="1685259" y="1339271"/>
-            <a:ext cx="549942" cy="301410"/>
-          </a:xfrm>
-          <a:prstGeom prst="rect">
-            <a:avLst/>
-          </a:prstGeom>
-          <a:noFill/>
+      <p:cxnSp>
+        <p:nvCxnSpPr>
+          <p:cNvPr id="10" name="Connecteur droit avec flèche 8">
+            <a:extLst>
+              <a:ext uri="{FF2B5EF4-FFF2-40B4-BE49-F238E27FC236}">
+                <a16:creationId xmlns:a16="http://schemas.microsoft.com/office/drawing/2014/main" id="{865192BE-F994-4ECE-B695-931A540B9870}"/>
+              </a:ext>
+            </a:extLst>
+          </p:cNvPr>
+          <p:cNvCxnSpPr>
+            <a:cxnSpLocks/>
+          </p:cNvCxnSpPr>
+          <p:nvPr/>
+        </p:nvCxnSpPr>
+        <p:spPr>
+          <a:xfrm flipH="1">
+            <a:off x="4354942" y="2087571"/>
+            <a:ext cx="1057567" cy="735528"/>
+          </a:xfrm>
+          <a:prstGeom prst="straightConnector1">
+            <a:avLst/>
+          </a:prstGeom>
+          <a:ln w="38100">
+            <a:solidFill>
+              <a:schemeClr val="tx1"/>
+            </a:solidFill>
+            <a:tailEnd type="arrow"/>
+          </a:ln>
+        </p:spPr>
+        <p:style>
+          <a:lnRef idx="1">
+            <a:schemeClr val="accent1"/>
+          </a:lnRef>
+          <a:fillRef idx="0">
+            <a:schemeClr val="accent1"/>
+          </a:fillRef>
+          <a:effectRef idx="0">
+            <a:schemeClr val="accent1"/>
+          </a:effectRef>
+          <a:fontRef idx="minor">
+            <a:schemeClr val="tx1"/>
+          </a:fontRef>
+        </p:style>
+      </p:cxnSp>
+      <p:sp>
+        <p:nvSpPr>
+          <p:cNvPr id="11" name="ZoneTexte 5">
+            <a:extLst>
+              <a:ext uri="{FF2B5EF4-FFF2-40B4-BE49-F238E27FC236}">
+                <a16:creationId xmlns:a16="http://schemas.microsoft.com/office/drawing/2014/main" id="{36DF3D07-26B1-4DBC-9132-02CB2491F0CE}"/>
+              </a:ext>
+            </a:extLst>
+          </p:cNvPr>
+          <p:cNvSpPr txBox="1"/>
+          <p:nvPr/>
+        </p:nvSpPr>
+        <p:spPr>
+          <a:xfrm>
+            <a:off x="2166233" y="4187312"/>
+            <a:ext cx="301686" cy="369332"/>
+          </a:xfrm>
+          <a:prstGeom prst="rect">
+            <a:avLst/>
+          </a:prstGeom>
+          <a:noFill/>
+        </p:spPr>
+        <p:txBody>
+          <a:bodyPr wrap="none" rtlCol="0">
+            <a:spAutoFit/>
+          </a:bodyPr>
+          <a:lstStyle/>
+          <a:p>
+            <a:r>
+              <a:rPr lang="fr-CH" dirty="0"/>
+              <a:t>3</a:t>
+            </a:r>
+          </a:p>
+        </p:txBody>
+      </p:sp>
+      <p:sp>
+        <p:nvSpPr>
+          <p:cNvPr id="12" name="ZoneTexte 5">
+            <a:extLst>
+              <a:ext uri="{FF2B5EF4-FFF2-40B4-BE49-F238E27FC236}">
+                <a16:creationId xmlns:a16="http://schemas.microsoft.com/office/drawing/2014/main" id="{94223173-1E7A-453C-BE9C-45B4DB8900B6}"/>
+              </a:ext>
+            </a:extLst>
+          </p:cNvPr>
+          <p:cNvSpPr txBox="1"/>
+          <p:nvPr/>
+        </p:nvSpPr>
+        <p:spPr>
+          <a:xfrm>
+            <a:off x="2283145" y="2653673"/>
+            <a:ext cx="301686" cy="369332"/>
+          </a:xfrm>
+          <a:prstGeom prst="rect">
+            <a:avLst/>
+          </a:prstGeom>
+          <a:noFill/>
+        </p:spPr>
+        <p:txBody>
+          <a:bodyPr wrap="none" rtlCol="0">
+            <a:spAutoFit/>
+          </a:bodyPr>
+          <a:lstStyle/>
+          <a:p>
+            <a:r>
+              <a:rPr lang="fr-CH" dirty="0"/>
+              <a:t>4</a:t>
+            </a:r>
+          </a:p>
+        </p:txBody>
+      </p:sp>
+      <p:sp>
+        <p:nvSpPr>
+          <p:cNvPr id="13" name="ZoneTexte 5">
+            <a:extLst>
+              <a:ext uri="{FF2B5EF4-FFF2-40B4-BE49-F238E27FC236}">
+                <a16:creationId xmlns:a16="http://schemas.microsoft.com/office/drawing/2014/main" id="{144EBBCE-40DB-431E-A273-EE7226BE5403}"/>
+              </a:ext>
+            </a:extLst>
+          </p:cNvPr>
+          <p:cNvSpPr txBox="1"/>
+          <p:nvPr/>
+        </p:nvSpPr>
+        <p:spPr>
+          <a:xfrm>
+            <a:off x="6680084" y="3111764"/>
+            <a:ext cx="301686" cy="369332"/>
+          </a:xfrm>
+          <a:prstGeom prst="rect">
+            <a:avLst/>
+          </a:prstGeom>
+          <a:noFill/>
+        </p:spPr>
+        <p:txBody>
+          <a:bodyPr wrap="none" rtlCol="0">
+            <a:spAutoFit/>
+          </a:bodyPr>
+          <a:lstStyle/>
+          <a:p>
+            <a:r>
+              <a:rPr lang="fr-CH" dirty="0"/>
+              <a:t>5</a:t>
+            </a:r>
+          </a:p>
+        </p:txBody>
+      </p:sp>
+      <p:sp>
+        <p:nvSpPr>
+          <p:cNvPr id="4" name="ZoneTexte 5">
+            <a:extLst>
+              <a:ext uri="{FF2B5EF4-FFF2-40B4-BE49-F238E27FC236}">
+                <a16:creationId xmlns:a16="http://schemas.microsoft.com/office/drawing/2014/main" id="{5E8563DD-2630-17AB-11A5-E86F4214EFF6}"/>
+              </a:ext>
+            </a:extLst>
+          </p:cNvPr>
+          <p:cNvSpPr txBox="1"/>
+          <p:nvPr/>
+        </p:nvSpPr>
+        <p:spPr>
+          <a:xfrm>
+            <a:off x="5467089" y="4986101"/>
+            <a:ext cx="301686" cy="369332"/>
+          </a:xfrm>
+          <a:prstGeom prst="rect">
+            <a:avLst/>
+          </a:prstGeom>
+          <a:noFill/>
+        </p:spPr>
+        <p:txBody>
+          <a:bodyPr wrap="none" rtlCol="0">
+            <a:spAutoFit/>
+          </a:bodyPr>
+          <a:lstStyle/>
+          <a:p>
+            <a:r>
+              <a:rPr lang="fr-CH" dirty="0"/>
+              <a:t>6</a:t>
+            </a:r>
+          </a:p>
+        </p:txBody>
+      </p:sp>
+      <p:sp>
+        <p:nvSpPr>
+          <p:cNvPr id="22" name="ZoneTexte 5">
+            <a:extLst>
+              <a:ext uri="{FF2B5EF4-FFF2-40B4-BE49-F238E27FC236}">
+                <a16:creationId xmlns:a16="http://schemas.microsoft.com/office/drawing/2014/main" id="{C5CC45CE-2CDB-2B48-7CC1-3A9FA968C67B}"/>
+              </a:ext>
+            </a:extLst>
+          </p:cNvPr>
+          <p:cNvSpPr txBox="1"/>
+          <p:nvPr/>
+        </p:nvSpPr>
+        <p:spPr>
+          <a:xfrm>
+            <a:off x="2467919" y="3785296"/>
+            <a:ext cx="301686" cy="369332"/>
+          </a:xfrm>
+          <a:prstGeom prst="rect">
+            <a:avLst/>
+          </a:prstGeom>
+          <a:noFill/>
+        </p:spPr>
+        <p:txBody>
+          <a:bodyPr wrap="none" rtlCol="0">
+            <a:spAutoFit/>
+          </a:bodyPr>
+          <a:lstStyle/>
+          <a:p>
+            <a:r>
+              <a:rPr lang="fr-CH" dirty="0"/>
+              <a:t>2</a:t>
+            </a:r>
+          </a:p>
+        </p:txBody>
+      </p:sp>
+      <p:cxnSp>
+        <p:nvCxnSpPr>
+          <p:cNvPr id="24" name="Connecteur droit avec flèche 19">
+            <a:extLst>
+              <a:ext uri="{FF2B5EF4-FFF2-40B4-BE49-F238E27FC236}">
+                <a16:creationId xmlns:a16="http://schemas.microsoft.com/office/drawing/2014/main" id="{113046D9-22B6-7C97-0ACD-B51EBF9F384D}"/>
+              </a:ext>
+            </a:extLst>
+          </p:cNvPr>
+          <p:cNvCxnSpPr>
+            <a:cxnSpLocks/>
+          </p:cNvCxnSpPr>
+          <p:nvPr/>
+        </p:nvCxnSpPr>
+        <p:spPr>
+          <a:xfrm>
+            <a:off x="2916215" y="3014666"/>
+            <a:ext cx="1420336" cy="0"/>
+          </a:xfrm>
+          <a:prstGeom prst="straightConnector1">
+            <a:avLst/>
+          </a:prstGeom>
           <a:ln>
             <a:solidFill>
-              <a:schemeClr val="accent5">
-                <a:lumMod val="75000"/>
-              </a:schemeClr>
+              <a:schemeClr val="tx1"/>
+            </a:solidFill>
+            <a:tailEnd type="arrow"/>
+          </a:ln>
+        </p:spPr>
+        <p:style>
+          <a:lnRef idx="1">
+            <a:schemeClr val="accent1"/>
+          </a:lnRef>
+          <a:fillRef idx="0">
+            <a:schemeClr val="accent1"/>
+          </a:fillRef>
+          <a:effectRef idx="0">
+            <a:schemeClr val="accent1"/>
+          </a:effectRef>
+          <a:fontRef idx="minor">
+            <a:schemeClr val="tx1"/>
+          </a:fontRef>
+        </p:style>
+      </p:cxnSp>
+      <p:sp>
+        <p:nvSpPr>
+          <p:cNvPr id="30" name="ZoneTexte 5">
+            <a:extLst>
+              <a:ext uri="{FF2B5EF4-FFF2-40B4-BE49-F238E27FC236}">
+                <a16:creationId xmlns:a16="http://schemas.microsoft.com/office/drawing/2014/main" id="{B48FB699-960C-D8C1-F2CD-99F3BD727EC5}"/>
+              </a:ext>
+            </a:extLst>
+          </p:cNvPr>
+          <p:cNvSpPr txBox="1"/>
+          <p:nvPr/>
+        </p:nvSpPr>
+        <p:spPr>
+          <a:xfrm>
+            <a:off x="5530935" y="5379183"/>
+            <a:ext cx="301686" cy="369332"/>
+          </a:xfrm>
+          <a:prstGeom prst="rect">
+            <a:avLst/>
+          </a:prstGeom>
+          <a:noFill/>
+        </p:spPr>
+        <p:txBody>
+          <a:bodyPr wrap="none" rtlCol="0">
+            <a:spAutoFit/>
+          </a:bodyPr>
+          <a:lstStyle/>
+          <a:p>
+            <a:r>
+              <a:rPr lang="fr-CH" dirty="0"/>
+              <a:t>7</a:t>
+            </a:r>
+          </a:p>
+        </p:txBody>
+      </p:sp>
+      <p:sp>
+        <p:nvSpPr>
+          <p:cNvPr id="31" name="ZoneTexte 5">
+            <a:extLst>
+              <a:ext uri="{FF2B5EF4-FFF2-40B4-BE49-F238E27FC236}">
+                <a16:creationId xmlns:a16="http://schemas.microsoft.com/office/drawing/2014/main" id="{CCDADEA0-781E-47A1-09D2-06F378435361}"/>
+              </a:ext>
+            </a:extLst>
+          </p:cNvPr>
+          <p:cNvSpPr txBox="1"/>
+          <p:nvPr/>
+        </p:nvSpPr>
+        <p:spPr>
+          <a:xfrm>
+            <a:off x="4505699" y="6273973"/>
+            <a:ext cx="301686" cy="369332"/>
+          </a:xfrm>
+          <a:prstGeom prst="rect">
+            <a:avLst/>
+          </a:prstGeom>
+          <a:noFill/>
+        </p:spPr>
+        <p:txBody>
+          <a:bodyPr wrap="none" rtlCol="0">
+            <a:spAutoFit/>
+          </a:bodyPr>
+          <a:lstStyle/>
+          <a:p>
+            <a:r>
+              <a:rPr lang="fr-CH" dirty="0"/>
+              <a:t>8</a:t>
+            </a:r>
+          </a:p>
+        </p:txBody>
+      </p:sp>
+      <p:sp>
+        <p:nvSpPr>
+          <p:cNvPr id="32" name="ZoneTexte 5">
+            <a:extLst>
+              <a:ext uri="{FF2B5EF4-FFF2-40B4-BE49-F238E27FC236}">
+                <a16:creationId xmlns:a16="http://schemas.microsoft.com/office/drawing/2014/main" id="{B5E10E91-77A2-024E-6B53-21EABA12317B}"/>
+              </a:ext>
+            </a:extLst>
+          </p:cNvPr>
+          <p:cNvSpPr txBox="1"/>
+          <p:nvPr/>
+        </p:nvSpPr>
+        <p:spPr>
+          <a:xfrm>
+            <a:off x="5686702" y="1823530"/>
+            <a:ext cx="301686" cy="369332"/>
+          </a:xfrm>
+          <a:prstGeom prst="rect">
+            <a:avLst/>
+          </a:prstGeom>
+          <a:noFill/>
+        </p:spPr>
+        <p:txBody>
+          <a:bodyPr wrap="none" rtlCol="0">
+            <a:spAutoFit/>
+          </a:bodyPr>
+          <a:lstStyle/>
+          <a:p>
+            <a:r>
+              <a:rPr lang="fr-CH" dirty="0"/>
+              <a:t>1</a:t>
+            </a:r>
+          </a:p>
+        </p:txBody>
+      </p:sp>
+      <p:sp>
+        <p:nvSpPr>
+          <p:cNvPr id="33" name="ZoneTexte 5">
+            <a:extLst>
+              <a:ext uri="{FF2B5EF4-FFF2-40B4-BE49-F238E27FC236}">
+                <a16:creationId xmlns:a16="http://schemas.microsoft.com/office/drawing/2014/main" id="{05B8C77A-1EBF-84D0-B3F8-7E86D273A6CD}"/>
+              </a:ext>
+            </a:extLst>
+          </p:cNvPr>
+          <p:cNvSpPr txBox="1"/>
+          <p:nvPr/>
+        </p:nvSpPr>
+        <p:spPr>
+          <a:xfrm>
+            <a:off x="5229249" y="6278175"/>
+            <a:ext cx="301686" cy="369332"/>
+          </a:xfrm>
+          <a:prstGeom prst="rect">
+            <a:avLst/>
+          </a:prstGeom>
+          <a:noFill/>
+        </p:spPr>
+        <p:txBody>
+          <a:bodyPr wrap="none" rtlCol="0">
+            <a:spAutoFit/>
+          </a:bodyPr>
+          <a:lstStyle/>
+          <a:p>
+            <a:r>
+              <a:rPr lang="fr-CH" dirty="0"/>
+              <a:t>9</a:t>
+            </a:r>
+          </a:p>
+        </p:txBody>
+      </p:sp>
+      <p:sp>
+        <p:nvSpPr>
+          <p:cNvPr id="34" name="TextBox 33">
+            <a:extLst>
+              <a:ext uri="{FF2B5EF4-FFF2-40B4-BE49-F238E27FC236}">
+                <a16:creationId xmlns:a16="http://schemas.microsoft.com/office/drawing/2014/main" id="{DD6A987D-1BFD-1E25-8C33-F2E82DF24B13}"/>
+              </a:ext>
+            </a:extLst>
+          </p:cNvPr>
+          <p:cNvSpPr txBox="1"/>
+          <p:nvPr/>
+        </p:nvSpPr>
+        <p:spPr>
+          <a:xfrm>
+            <a:off x="1848741" y="4025178"/>
+            <a:ext cx="277640" cy="169277"/>
+          </a:xfrm>
+          <a:prstGeom prst="rect">
+            <a:avLst/>
+          </a:prstGeom>
+          <a:noFill/>
+        </p:spPr>
+        <p:txBody>
+          <a:bodyPr wrap="none" rtlCol="0">
+            <a:spAutoFit/>
+          </a:bodyPr>
+          <a:lstStyle/>
+          <a:p>
+            <a:r>
+              <a:rPr lang="en-US" sz="400" dirty="0"/>
+              <a:t>,</a:t>
+            </a:r>
+            <a:r>
+              <a:rPr lang="en-US" sz="500" dirty="0"/>
+              <a:t>7,8</a:t>
+            </a:r>
+            <a:endParaRPr lang="en-US" sz="400" dirty="0"/>
+          </a:p>
+        </p:txBody>
+      </p:sp>
+      <p:sp>
+        <p:nvSpPr>
+          <p:cNvPr id="35" name="TextBox 34">
+            <a:extLst>
+              <a:ext uri="{FF2B5EF4-FFF2-40B4-BE49-F238E27FC236}">
+                <a16:creationId xmlns:a16="http://schemas.microsoft.com/office/drawing/2014/main" id="{A76D0ADF-5F61-BD72-A7A5-5B3AB8802DA1}"/>
+              </a:ext>
+            </a:extLst>
+          </p:cNvPr>
+          <p:cNvSpPr txBox="1"/>
+          <p:nvPr/>
+        </p:nvSpPr>
+        <p:spPr>
+          <a:xfrm>
+            <a:off x="1846808" y="3323724"/>
+            <a:ext cx="277640" cy="169277"/>
+          </a:xfrm>
+          <a:prstGeom prst="rect">
+            <a:avLst/>
+          </a:prstGeom>
+          <a:noFill/>
+        </p:spPr>
+        <p:txBody>
+          <a:bodyPr wrap="none" rtlCol="0">
+            <a:spAutoFit/>
+          </a:bodyPr>
+          <a:lstStyle/>
+          <a:p>
+            <a:r>
+              <a:rPr lang="en-US" sz="400" dirty="0"/>
+              <a:t>,</a:t>
+            </a:r>
+            <a:r>
+              <a:rPr lang="en-US" sz="500" dirty="0"/>
+              <a:t>7,8</a:t>
+            </a:r>
+            <a:endParaRPr lang="en-US" sz="400" dirty="0"/>
+          </a:p>
+        </p:txBody>
+      </p:sp>
+      <p:sp>
+        <p:nvSpPr>
+          <p:cNvPr id="36" name="Rectangle 35">
+            <a:extLst>
+              <a:ext uri="{FF2B5EF4-FFF2-40B4-BE49-F238E27FC236}">
+                <a16:creationId xmlns:a16="http://schemas.microsoft.com/office/drawing/2014/main" id="{D03159ED-CFDA-5258-8554-8A6291023C19}"/>
+              </a:ext>
+            </a:extLst>
+          </p:cNvPr>
+          <p:cNvSpPr/>
+          <p:nvPr/>
+        </p:nvSpPr>
+        <p:spPr>
+          <a:xfrm>
+            <a:off x="5715216" y="3352800"/>
+            <a:ext cx="124548" cy="107156"/>
+          </a:xfrm>
+          <a:prstGeom prst="rect">
+            <a:avLst/>
+          </a:prstGeom>
+          <a:noFill/>
+          <a:ln>
+            <a:solidFill>
+              <a:srgbClr val="FF0000"/>
             </a:solidFill>
           </a:ln>
         </p:spPr>
@@ -8651,904 +8747,10 @@
           </a:p>
         </p:txBody>
       </p:sp>
-      <p:sp>
-        <p:nvSpPr>
-          <p:cNvPr id="15" name="ZoneTexte 6">
-            <a:extLst>
-              <a:ext uri="{FF2B5EF4-FFF2-40B4-BE49-F238E27FC236}">
-                <a16:creationId xmlns:a16="http://schemas.microsoft.com/office/drawing/2014/main" id="{0D825E88-5BF2-2F85-E572-48D771C99277}"/>
-              </a:ext>
-            </a:extLst>
-          </p:cNvPr>
-          <p:cNvSpPr txBox="1"/>
-          <p:nvPr/>
-        </p:nvSpPr>
-        <p:spPr>
-          <a:xfrm>
-            <a:off x="2234527" y="1609085"/>
-            <a:ext cx="301686" cy="369332"/>
-          </a:xfrm>
-          <a:prstGeom prst="rect">
-            <a:avLst/>
-          </a:prstGeom>
-          <a:noFill/>
-        </p:spPr>
-        <p:txBody>
-          <a:bodyPr wrap="none" rtlCol="0">
-            <a:spAutoFit/>
-          </a:bodyPr>
-          <a:lstStyle/>
-          <a:p>
-            <a:r>
-              <a:rPr lang="fr-CH" dirty="0"/>
-              <a:t>2</a:t>
-            </a:r>
-          </a:p>
-        </p:txBody>
-      </p:sp>
-      <p:sp>
-        <p:nvSpPr>
-          <p:cNvPr id="16" name="Rectangle 15">
-            <a:extLst>
-              <a:ext uri="{FF2B5EF4-FFF2-40B4-BE49-F238E27FC236}">
-                <a16:creationId xmlns:a16="http://schemas.microsoft.com/office/drawing/2014/main" id="{A0909BD0-9553-985E-4DFC-C040D9A356A1}"/>
-              </a:ext>
-            </a:extLst>
-          </p:cNvPr>
-          <p:cNvSpPr/>
-          <p:nvPr/>
-        </p:nvSpPr>
-        <p:spPr>
-          <a:xfrm>
-            <a:off x="2619512" y="1609085"/>
-            <a:ext cx="549942" cy="210417"/>
-          </a:xfrm>
-          <a:prstGeom prst="rect">
-            <a:avLst/>
-          </a:prstGeom>
-          <a:noFill/>
-          <a:ln>
-            <a:solidFill>
-              <a:schemeClr val="accent3">
-                <a:lumMod val="75000"/>
-              </a:schemeClr>
-            </a:solidFill>
-          </a:ln>
-        </p:spPr>
-        <p:style>
-          <a:lnRef idx="2">
-            <a:schemeClr val="accent1">
-              <a:shade val="50000"/>
-            </a:schemeClr>
-          </a:lnRef>
-          <a:fillRef idx="1">
-            <a:schemeClr val="accent1"/>
-          </a:fillRef>
-          <a:effectRef idx="0">
-            <a:schemeClr val="accent1"/>
-          </a:effectRef>
-          <a:fontRef idx="minor">
-            <a:schemeClr val="lt1"/>
-          </a:fontRef>
-        </p:style>
-        <p:txBody>
-          <a:bodyPr rtlCol="0" anchor="ctr"/>
-          <a:lstStyle/>
-          <a:p>
-            <a:pPr algn="ctr"/>
-            <a:endParaRPr lang="fr-CH"/>
-          </a:p>
-        </p:txBody>
-      </p:sp>
-      <p:sp>
-        <p:nvSpPr>
-          <p:cNvPr id="18" name="Rectangle 17">
-            <a:extLst>
-              <a:ext uri="{FF2B5EF4-FFF2-40B4-BE49-F238E27FC236}">
-                <a16:creationId xmlns:a16="http://schemas.microsoft.com/office/drawing/2014/main" id="{99E81ECF-575E-2F8C-A24A-302BD1C7CEC4}"/>
-              </a:ext>
-            </a:extLst>
-          </p:cNvPr>
-          <p:cNvSpPr/>
-          <p:nvPr/>
-        </p:nvSpPr>
-        <p:spPr>
-          <a:xfrm>
-            <a:off x="4242217" y="1648063"/>
-            <a:ext cx="441117" cy="165535"/>
-          </a:xfrm>
-          <a:prstGeom prst="rect">
-            <a:avLst/>
-          </a:prstGeom>
-          <a:noFill/>
-          <a:ln>
-            <a:solidFill>
-              <a:schemeClr val="accent3">
-                <a:lumMod val="75000"/>
-              </a:schemeClr>
-            </a:solidFill>
-          </a:ln>
-        </p:spPr>
-        <p:style>
-          <a:lnRef idx="2">
-            <a:schemeClr val="accent1">
-              <a:shade val="50000"/>
-            </a:schemeClr>
-          </a:lnRef>
-          <a:fillRef idx="1">
-            <a:schemeClr val="accent1"/>
-          </a:fillRef>
-          <a:effectRef idx="0">
-            <a:schemeClr val="accent1"/>
-          </a:effectRef>
-          <a:fontRef idx="minor">
-            <a:schemeClr val="lt1"/>
-          </a:fontRef>
-        </p:style>
-        <p:txBody>
-          <a:bodyPr rtlCol="0" anchor="ctr"/>
-          <a:lstStyle/>
-          <a:p>
-            <a:pPr algn="ctr"/>
-            <a:endParaRPr lang="fr-CH"/>
-          </a:p>
-        </p:txBody>
-      </p:sp>
-      <p:sp>
-        <p:nvSpPr>
-          <p:cNvPr id="19" name="ZoneTexte 6">
-            <a:extLst>
-              <a:ext uri="{FF2B5EF4-FFF2-40B4-BE49-F238E27FC236}">
-                <a16:creationId xmlns:a16="http://schemas.microsoft.com/office/drawing/2014/main" id="{08239DC9-AA4D-9D27-272B-C70BF3716F25}"/>
-              </a:ext>
-            </a:extLst>
-          </p:cNvPr>
-          <p:cNvSpPr txBox="1"/>
-          <p:nvPr/>
-        </p:nvSpPr>
-        <p:spPr>
-          <a:xfrm>
-            <a:off x="4239251" y="1765319"/>
-            <a:ext cx="301686" cy="369332"/>
-          </a:xfrm>
-          <a:prstGeom prst="rect">
-            <a:avLst/>
-          </a:prstGeom>
-          <a:noFill/>
-        </p:spPr>
-        <p:txBody>
-          <a:bodyPr wrap="none" rtlCol="0">
-            <a:spAutoFit/>
-          </a:bodyPr>
-          <a:lstStyle/>
-          <a:p>
-            <a:r>
-              <a:rPr lang="fr-CH" dirty="0"/>
-              <a:t>3</a:t>
-            </a:r>
-          </a:p>
-        </p:txBody>
-      </p:sp>
-      <p:sp>
-        <p:nvSpPr>
-          <p:cNvPr id="20" name="ZoneTexte 6">
-            <a:extLst>
-              <a:ext uri="{FF2B5EF4-FFF2-40B4-BE49-F238E27FC236}">
-                <a16:creationId xmlns:a16="http://schemas.microsoft.com/office/drawing/2014/main" id="{93B0FC80-3857-01EE-F9C0-A214D3548CC3}"/>
-              </a:ext>
-            </a:extLst>
-          </p:cNvPr>
-          <p:cNvSpPr txBox="1"/>
-          <p:nvPr/>
-        </p:nvSpPr>
-        <p:spPr>
-          <a:xfrm>
-            <a:off x="5068319" y="1748073"/>
-            <a:ext cx="301686" cy="369332"/>
-          </a:xfrm>
-          <a:prstGeom prst="rect">
-            <a:avLst/>
-          </a:prstGeom>
-          <a:noFill/>
-        </p:spPr>
-        <p:txBody>
-          <a:bodyPr wrap="none" rtlCol="0">
-            <a:spAutoFit/>
-          </a:bodyPr>
-          <a:lstStyle/>
-          <a:p>
-            <a:r>
-              <a:rPr lang="fr-CH" dirty="0"/>
-              <a:t>4</a:t>
-            </a:r>
-          </a:p>
-        </p:txBody>
-      </p:sp>
-      <p:sp>
-        <p:nvSpPr>
-          <p:cNvPr id="21" name="ZoneTexte 6">
-            <a:extLst>
-              <a:ext uri="{FF2B5EF4-FFF2-40B4-BE49-F238E27FC236}">
-                <a16:creationId xmlns:a16="http://schemas.microsoft.com/office/drawing/2014/main" id="{AE339E3F-5A83-5EDE-4DB7-58E3EE818EF4}"/>
-              </a:ext>
-            </a:extLst>
-          </p:cNvPr>
-          <p:cNvSpPr txBox="1"/>
-          <p:nvPr/>
-        </p:nvSpPr>
-        <p:spPr>
-          <a:xfrm>
-            <a:off x="5604147" y="1738547"/>
-            <a:ext cx="301686" cy="369332"/>
-          </a:xfrm>
-          <a:prstGeom prst="rect">
-            <a:avLst/>
-          </a:prstGeom>
-          <a:noFill/>
-        </p:spPr>
-        <p:txBody>
-          <a:bodyPr wrap="none" rtlCol="0">
-            <a:spAutoFit/>
-          </a:bodyPr>
-          <a:lstStyle/>
-          <a:p>
-            <a:r>
-              <a:rPr lang="fr-CH" dirty="0"/>
-              <a:t>5</a:t>
-            </a:r>
-          </a:p>
-        </p:txBody>
-      </p:sp>
-      <p:sp>
-        <p:nvSpPr>
-          <p:cNvPr id="22" name="ZoneTexte 6">
-            <a:extLst>
-              <a:ext uri="{FF2B5EF4-FFF2-40B4-BE49-F238E27FC236}">
-                <a16:creationId xmlns:a16="http://schemas.microsoft.com/office/drawing/2014/main" id="{C1EFA149-703C-7495-0C71-3EC892919A05}"/>
-              </a:ext>
-            </a:extLst>
-          </p:cNvPr>
-          <p:cNvSpPr txBox="1"/>
-          <p:nvPr/>
-        </p:nvSpPr>
-        <p:spPr>
-          <a:xfrm>
-            <a:off x="5797530" y="3979001"/>
-            <a:ext cx="301686" cy="369332"/>
-          </a:xfrm>
-          <a:prstGeom prst="rect">
-            <a:avLst/>
-          </a:prstGeom>
-          <a:noFill/>
-        </p:spPr>
-        <p:txBody>
-          <a:bodyPr wrap="none" rtlCol="0">
-            <a:spAutoFit/>
-          </a:bodyPr>
-          <a:lstStyle/>
-          <a:p>
-            <a:r>
-              <a:rPr lang="fr-CH" dirty="0"/>
-              <a:t>6</a:t>
-            </a:r>
-          </a:p>
-        </p:txBody>
-      </p:sp>
-      <p:sp>
-        <p:nvSpPr>
-          <p:cNvPr id="25" name="ZoneTexte 6">
-            <a:extLst>
-              <a:ext uri="{FF2B5EF4-FFF2-40B4-BE49-F238E27FC236}">
-                <a16:creationId xmlns:a16="http://schemas.microsoft.com/office/drawing/2014/main" id="{8ADD92C4-242C-5BA8-434E-45CFE8943167}"/>
-              </a:ext>
-            </a:extLst>
-          </p:cNvPr>
-          <p:cNvSpPr txBox="1"/>
-          <p:nvPr/>
-        </p:nvSpPr>
-        <p:spPr>
-          <a:xfrm>
-            <a:off x="7921726" y="2316604"/>
-            <a:ext cx="301686" cy="369332"/>
-          </a:xfrm>
-          <a:prstGeom prst="rect">
-            <a:avLst/>
-          </a:prstGeom>
-          <a:noFill/>
-        </p:spPr>
-        <p:txBody>
-          <a:bodyPr wrap="none" rtlCol="0">
-            <a:spAutoFit/>
-          </a:bodyPr>
-          <a:lstStyle/>
-          <a:p>
-            <a:r>
-              <a:rPr lang="fr-CH" dirty="0"/>
-              <a:t>8</a:t>
-            </a:r>
-          </a:p>
-        </p:txBody>
-      </p:sp>
-      <p:sp>
-        <p:nvSpPr>
-          <p:cNvPr id="2" name="ZoneTexte 6">
-            <a:extLst>
-              <a:ext uri="{FF2B5EF4-FFF2-40B4-BE49-F238E27FC236}">
-                <a16:creationId xmlns:a16="http://schemas.microsoft.com/office/drawing/2014/main" id="{12C1570A-C560-01F2-6526-B676FE69F6E6}"/>
-              </a:ext>
-            </a:extLst>
-          </p:cNvPr>
-          <p:cNvSpPr txBox="1"/>
-          <p:nvPr/>
-        </p:nvSpPr>
-        <p:spPr>
-          <a:xfrm>
-            <a:off x="5905407" y="681561"/>
-            <a:ext cx="301686" cy="369332"/>
-          </a:xfrm>
-          <a:prstGeom prst="rect">
-            <a:avLst/>
-          </a:prstGeom>
-          <a:noFill/>
-        </p:spPr>
-        <p:txBody>
-          <a:bodyPr wrap="none" rtlCol="0">
-            <a:spAutoFit/>
-          </a:bodyPr>
-          <a:lstStyle/>
-          <a:p>
-            <a:r>
-              <a:rPr lang="fr-CH" dirty="0"/>
-              <a:t>7</a:t>
-            </a:r>
-          </a:p>
-        </p:txBody>
-      </p:sp>
-      <p:sp>
-        <p:nvSpPr>
-          <p:cNvPr id="8" name="Rectangle 7">
-            <a:extLst>
-              <a:ext uri="{FF2B5EF4-FFF2-40B4-BE49-F238E27FC236}">
-                <a16:creationId xmlns:a16="http://schemas.microsoft.com/office/drawing/2014/main" id="{F2E786B7-7D0D-A079-6579-D9C9FA64F496}"/>
-              </a:ext>
-            </a:extLst>
-          </p:cNvPr>
-          <p:cNvSpPr/>
-          <p:nvPr/>
-        </p:nvSpPr>
-        <p:spPr>
-          <a:xfrm>
-            <a:off x="4242217" y="1339272"/>
-            <a:ext cx="441117" cy="301409"/>
-          </a:xfrm>
-          <a:prstGeom prst="rect">
-            <a:avLst/>
-          </a:prstGeom>
-          <a:noFill/>
-          <a:ln>
-            <a:solidFill>
-              <a:schemeClr val="accent5">
-                <a:lumMod val="75000"/>
-              </a:schemeClr>
-            </a:solidFill>
-          </a:ln>
-        </p:spPr>
-        <p:style>
-          <a:lnRef idx="2">
-            <a:schemeClr val="accent1">
-              <a:shade val="50000"/>
-            </a:schemeClr>
-          </a:lnRef>
-          <a:fillRef idx="1">
-            <a:schemeClr val="accent1"/>
-          </a:fillRef>
-          <a:effectRef idx="0">
-            <a:schemeClr val="accent1"/>
-          </a:effectRef>
-          <a:fontRef idx="minor">
-            <a:schemeClr val="lt1"/>
-          </a:fontRef>
-        </p:style>
-        <p:txBody>
-          <a:bodyPr rtlCol="0" anchor="ctr"/>
-          <a:lstStyle/>
-          <a:p>
-            <a:pPr algn="ctr"/>
-            <a:endParaRPr lang="fr-CH"/>
-          </a:p>
-        </p:txBody>
-      </p:sp>
-      <p:sp>
-        <p:nvSpPr>
-          <p:cNvPr id="9" name="Rectangle 8">
-            <a:extLst>
-              <a:ext uri="{FF2B5EF4-FFF2-40B4-BE49-F238E27FC236}">
-                <a16:creationId xmlns:a16="http://schemas.microsoft.com/office/drawing/2014/main" id="{5C6CA6BE-CA18-204E-B513-023312CAE1CF}"/>
-              </a:ext>
-            </a:extLst>
-          </p:cNvPr>
-          <p:cNvSpPr/>
-          <p:nvPr/>
-        </p:nvSpPr>
-        <p:spPr>
-          <a:xfrm>
-            <a:off x="4692022" y="1319386"/>
-            <a:ext cx="549942" cy="480230"/>
-          </a:xfrm>
-          <a:prstGeom prst="rect">
-            <a:avLst/>
-          </a:prstGeom>
-          <a:noFill/>
-          <a:ln>
-            <a:solidFill>
-              <a:schemeClr val="accent2">
-                <a:lumMod val="60000"/>
-                <a:lumOff val="40000"/>
-              </a:schemeClr>
-            </a:solidFill>
-          </a:ln>
-        </p:spPr>
-        <p:style>
-          <a:lnRef idx="2">
-            <a:schemeClr val="accent1">
-              <a:shade val="50000"/>
-            </a:schemeClr>
-          </a:lnRef>
-          <a:fillRef idx="1">
-            <a:schemeClr val="accent1"/>
-          </a:fillRef>
-          <a:effectRef idx="0">
-            <a:schemeClr val="accent1"/>
-          </a:effectRef>
-          <a:fontRef idx="minor">
-            <a:schemeClr val="lt1"/>
-          </a:fontRef>
-        </p:style>
-        <p:txBody>
-          <a:bodyPr rtlCol="0" anchor="ctr"/>
-          <a:lstStyle/>
-          <a:p>
-            <a:pPr algn="ctr"/>
-            <a:endParaRPr lang="fr-CH"/>
-          </a:p>
-        </p:txBody>
-      </p:sp>
-      <p:sp>
-        <p:nvSpPr>
-          <p:cNvPr id="23" name="Rectangle 22">
-            <a:extLst>
-              <a:ext uri="{FF2B5EF4-FFF2-40B4-BE49-F238E27FC236}">
-                <a16:creationId xmlns:a16="http://schemas.microsoft.com/office/drawing/2014/main" id="{91140C2B-9CF8-6E7F-7801-6432F9E9C1AF}"/>
-              </a:ext>
-            </a:extLst>
-          </p:cNvPr>
-          <p:cNvSpPr/>
-          <p:nvPr/>
-        </p:nvSpPr>
-        <p:spPr>
-          <a:xfrm>
-            <a:off x="5710237" y="1339271"/>
-            <a:ext cx="353267" cy="480230"/>
-          </a:xfrm>
-          <a:prstGeom prst="rect">
-            <a:avLst/>
-          </a:prstGeom>
-          <a:noFill/>
-          <a:ln>
-            <a:solidFill>
-              <a:schemeClr val="accent4">
-                <a:lumMod val="60000"/>
-                <a:lumOff val="40000"/>
-              </a:schemeClr>
-            </a:solidFill>
-          </a:ln>
-        </p:spPr>
-        <p:style>
-          <a:lnRef idx="2">
-            <a:schemeClr val="accent1">
-              <a:shade val="50000"/>
-            </a:schemeClr>
-          </a:lnRef>
-          <a:fillRef idx="1">
-            <a:schemeClr val="accent1"/>
-          </a:fillRef>
-          <a:effectRef idx="0">
-            <a:schemeClr val="accent1"/>
-          </a:effectRef>
-          <a:fontRef idx="minor">
-            <a:schemeClr val="lt1"/>
-          </a:fontRef>
-        </p:style>
-        <p:txBody>
-          <a:bodyPr rtlCol="0" anchor="ctr"/>
-          <a:lstStyle/>
-          <a:p>
-            <a:pPr algn="ctr"/>
-            <a:endParaRPr lang="fr-CH"/>
-          </a:p>
-        </p:txBody>
-      </p:sp>
-      <p:sp>
-        <p:nvSpPr>
-          <p:cNvPr id="28" name="Rectangle 27">
-            <a:extLst>
-              <a:ext uri="{FF2B5EF4-FFF2-40B4-BE49-F238E27FC236}">
-                <a16:creationId xmlns:a16="http://schemas.microsoft.com/office/drawing/2014/main" id="{9858621E-DAC3-319F-520C-A896EAE8CE6C}"/>
-              </a:ext>
-            </a:extLst>
-          </p:cNvPr>
-          <p:cNvSpPr/>
-          <p:nvPr/>
-        </p:nvSpPr>
-        <p:spPr>
-          <a:xfrm>
-            <a:off x="6136160" y="845909"/>
-            <a:ext cx="2083538" cy="1527835"/>
-          </a:xfrm>
-          <a:prstGeom prst="rect">
-            <a:avLst/>
-          </a:prstGeom>
-          <a:noFill/>
-          <a:ln>
-            <a:solidFill>
-              <a:schemeClr val="accent4">
-                <a:lumMod val="60000"/>
-                <a:lumOff val="40000"/>
-              </a:schemeClr>
-            </a:solidFill>
-          </a:ln>
-        </p:spPr>
-        <p:style>
-          <a:lnRef idx="2">
-            <a:schemeClr val="accent1">
-              <a:shade val="50000"/>
-            </a:schemeClr>
-          </a:lnRef>
-          <a:fillRef idx="1">
-            <a:schemeClr val="accent1"/>
-          </a:fillRef>
-          <a:effectRef idx="0">
-            <a:schemeClr val="accent1"/>
-          </a:effectRef>
-          <a:fontRef idx="minor">
-            <a:schemeClr val="lt1"/>
-          </a:fontRef>
-        </p:style>
-        <p:txBody>
-          <a:bodyPr rtlCol="0" anchor="ctr"/>
-          <a:lstStyle/>
-          <a:p>
-            <a:pPr algn="ctr"/>
-            <a:endParaRPr lang="fr-CH"/>
-          </a:p>
-        </p:txBody>
-      </p:sp>
-      <p:sp>
-        <p:nvSpPr>
-          <p:cNvPr id="31" name="ZoneTexte 6">
-            <a:extLst>
-              <a:ext uri="{FF2B5EF4-FFF2-40B4-BE49-F238E27FC236}">
-                <a16:creationId xmlns:a16="http://schemas.microsoft.com/office/drawing/2014/main" id="{36EEFACD-2977-EEE2-CF97-26259667AE64}"/>
-              </a:ext>
-            </a:extLst>
-          </p:cNvPr>
-          <p:cNvSpPr txBox="1"/>
-          <p:nvPr/>
-        </p:nvSpPr>
-        <p:spPr>
-          <a:xfrm>
-            <a:off x="7857074" y="2702305"/>
-            <a:ext cx="301686" cy="369332"/>
-          </a:xfrm>
-          <a:prstGeom prst="rect">
-            <a:avLst/>
-          </a:prstGeom>
-          <a:noFill/>
-        </p:spPr>
-        <p:txBody>
-          <a:bodyPr wrap="none" rtlCol="0">
-            <a:spAutoFit/>
-          </a:bodyPr>
-          <a:lstStyle/>
-          <a:p>
-            <a:r>
-              <a:rPr lang="fr-CH" dirty="0"/>
-              <a:t>9</a:t>
-            </a:r>
-          </a:p>
-        </p:txBody>
-      </p:sp>
-      <p:sp>
-        <p:nvSpPr>
-          <p:cNvPr id="32" name="ZoneTexte 6">
-            <a:extLst>
-              <a:ext uri="{FF2B5EF4-FFF2-40B4-BE49-F238E27FC236}">
-                <a16:creationId xmlns:a16="http://schemas.microsoft.com/office/drawing/2014/main" id="{395E7291-B0AD-3BCB-4D5D-8AAEEBA6F96D}"/>
-              </a:ext>
-            </a:extLst>
-          </p:cNvPr>
-          <p:cNvSpPr txBox="1"/>
-          <p:nvPr/>
-        </p:nvSpPr>
-        <p:spPr>
-          <a:xfrm>
-            <a:off x="7802851" y="3434164"/>
-            <a:ext cx="418704" cy="369332"/>
-          </a:xfrm>
-          <a:prstGeom prst="rect">
-            <a:avLst/>
-          </a:prstGeom>
-          <a:noFill/>
-        </p:spPr>
-        <p:txBody>
-          <a:bodyPr wrap="none" rtlCol="0">
-            <a:spAutoFit/>
-          </a:bodyPr>
-          <a:lstStyle/>
-          <a:p>
-            <a:r>
-              <a:rPr lang="fr-CH" dirty="0"/>
-              <a:t>10</a:t>
-            </a:r>
-          </a:p>
-        </p:txBody>
-      </p:sp>
-      <p:sp>
-        <p:nvSpPr>
-          <p:cNvPr id="33" name="ZoneTexte 6">
-            <a:extLst>
-              <a:ext uri="{FF2B5EF4-FFF2-40B4-BE49-F238E27FC236}">
-                <a16:creationId xmlns:a16="http://schemas.microsoft.com/office/drawing/2014/main" id="{90716B7C-FA14-7E81-0DC5-7CE2DAE21AB3}"/>
-              </a:ext>
-            </a:extLst>
-          </p:cNvPr>
-          <p:cNvSpPr txBox="1"/>
-          <p:nvPr/>
-        </p:nvSpPr>
-        <p:spPr>
-          <a:xfrm>
-            <a:off x="6531401" y="4299591"/>
-            <a:ext cx="418704" cy="369332"/>
-          </a:xfrm>
-          <a:prstGeom prst="rect">
-            <a:avLst/>
-          </a:prstGeom>
-          <a:noFill/>
-        </p:spPr>
-        <p:txBody>
-          <a:bodyPr wrap="none" rtlCol="0">
-            <a:spAutoFit/>
-          </a:bodyPr>
-          <a:lstStyle/>
-          <a:p>
-            <a:r>
-              <a:rPr lang="fr-CH" dirty="0"/>
-              <a:t>11</a:t>
-            </a:r>
-          </a:p>
-        </p:txBody>
-      </p:sp>
-      <p:pic>
-        <p:nvPicPr>
-          <p:cNvPr id="38" name="Picture 37">
-            <a:extLst>
-              <a:ext uri="{FF2B5EF4-FFF2-40B4-BE49-F238E27FC236}">
-                <a16:creationId xmlns:a16="http://schemas.microsoft.com/office/drawing/2014/main" id="{03640F89-9FE5-520D-F078-896CC8C5DBE5}"/>
-              </a:ext>
-            </a:extLst>
-          </p:cNvPr>
-          <p:cNvPicPr>
-            <a:picLocks noChangeAspect="1"/>
-          </p:cNvPicPr>
-          <p:nvPr/>
-        </p:nvPicPr>
-        <p:blipFill>
-          <a:blip r:embed="rId3"/>
-          <a:stretch>
-            <a:fillRect/>
-          </a:stretch>
-        </p:blipFill>
-        <p:spPr>
-          <a:xfrm>
-            <a:off x="2512950" y="5146121"/>
-            <a:ext cx="3543300" cy="1447800"/>
-          </a:xfrm>
-          <a:prstGeom prst="rect">
-            <a:avLst/>
-          </a:prstGeom>
-        </p:spPr>
-      </p:pic>
-      <p:cxnSp>
-        <p:nvCxnSpPr>
-          <p:cNvPr id="40" name="Straight Arrow Connector 39">
-            <a:extLst>
-              <a:ext uri="{FF2B5EF4-FFF2-40B4-BE49-F238E27FC236}">
-                <a16:creationId xmlns:a16="http://schemas.microsoft.com/office/drawing/2014/main" id="{49047C2F-3A42-F511-AB61-356E2712E315}"/>
-              </a:ext>
-            </a:extLst>
-          </p:cNvPr>
-          <p:cNvCxnSpPr/>
-          <p:nvPr/>
-        </p:nvCxnSpPr>
-        <p:spPr>
-          <a:xfrm>
-            <a:off x="2396995" y="5146121"/>
-            <a:ext cx="0" cy="488061"/>
-          </a:xfrm>
-          <a:prstGeom prst="straightConnector1">
-            <a:avLst/>
-          </a:prstGeom>
-          <a:ln>
-            <a:headEnd type="triangle" w="med" len="med"/>
-            <a:tailEnd type="triangle" w="med" len="med"/>
-          </a:ln>
-        </p:spPr>
-        <p:style>
-          <a:lnRef idx="1">
-            <a:schemeClr val="accent1"/>
-          </a:lnRef>
-          <a:fillRef idx="0">
-            <a:schemeClr val="accent1"/>
-          </a:fillRef>
-          <a:effectRef idx="0">
-            <a:schemeClr val="accent1"/>
-          </a:effectRef>
-          <a:fontRef idx="minor">
-            <a:schemeClr val="tx1"/>
-          </a:fontRef>
-        </p:style>
-      </p:cxnSp>
-      <p:cxnSp>
-        <p:nvCxnSpPr>
-          <p:cNvPr id="41" name="Straight Arrow Connector 40">
-            <a:extLst>
-              <a:ext uri="{FF2B5EF4-FFF2-40B4-BE49-F238E27FC236}">
-                <a16:creationId xmlns:a16="http://schemas.microsoft.com/office/drawing/2014/main" id="{A25E9E35-120B-1473-AD2F-2C4AEE46E846}"/>
-              </a:ext>
-            </a:extLst>
-          </p:cNvPr>
-          <p:cNvCxnSpPr>
-            <a:cxnSpLocks/>
-          </p:cNvCxnSpPr>
-          <p:nvPr/>
-        </p:nvCxnSpPr>
-        <p:spPr>
-          <a:xfrm>
-            <a:off x="2406390" y="5663669"/>
-            <a:ext cx="0" cy="672476"/>
-          </a:xfrm>
-          <a:prstGeom prst="straightConnector1">
-            <a:avLst/>
-          </a:prstGeom>
-          <a:ln>
-            <a:headEnd type="triangle" w="med" len="med"/>
-            <a:tailEnd type="triangle" w="med" len="med"/>
-          </a:ln>
-        </p:spPr>
-        <p:style>
-          <a:lnRef idx="1">
-            <a:schemeClr val="accent1"/>
-          </a:lnRef>
-          <a:fillRef idx="0">
-            <a:schemeClr val="accent1"/>
-          </a:fillRef>
-          <a:effectRef idx="0">
-            <a:schemeClr val="accent1"/>
-          </a:effectRef>
-          <a:fontRef idx="minor">
-            <a:schemeClr val="tx1"/>
-          </a:fontRef>
-        </p:style>
-      </p:cxnSp>
-      <p:sp>
-        <p:nvSpPr>
-          <p:cNvPr id="43" name="ZoneTexte 6">
-            <a:extLst>
-              <a:ext uri="{FF2B5EF4-FFF2-40B4-BE49-F238E27FC236}">
-                <a16:creationId xmlns:a16="http://schemas.microsoft.com/office/drawing/2014/main" id="{341BC775-940A-743B-CEFE-5D631D751CCC}"/>
-              </a:ext>
-            </a:extLst>
-          </p:cNvPr>
-          <p:cNvSpPr txBox="1"/>
-          <p:nvPr/>
-        </p:nvSpPr>
-        <p:spPr>
-          <a:xfrm>
-            <a:off x="2083684" y="5205485"/>
-            <a:ext cx="301686" cy="369332"/>
-          </a:xfrm>
-          <a:prstGeom prst="rect">
-            <a:avLst/>
-          </a:prstGeom>
-          <a:noFill/>
-        </p:spPr>
-        <p:txBody>
-          <a:bodyPr wrap="none" rtlCol="0">
-            <a:spAutoFit/>
-          </a:bodyPr>
-          <a:lstStyle/>
-          <a:p>
-            <a:r>
-              <a:rPr lang="fr-CH" dirty="0"/>
-              <a:t>1</a:t>
-            </a:r>
-          </a:p>
-        </p:txBody>
-      </p:sp>
-      <p:sp>
-        <p:nvSpPr>
-          <p:cNvPr id="44" name="ZoneTexte 6">
-            <a:extLst>
-              <a:ext uri="{FF2B5EF4-FFF2-40B4-BE49-F238E27FC236}">
-                <a16:creationId xmlns:a16="http://schemas.microsoft.com/office/drawing/2014/main" id="{2EC92148-675C-D11E-2D9F-50305A7BF851}"/>
-              </a:ext>
-            </a:extLst>
-          </p:cNvPr>
-          <p:cNvSpPr txBox="1"/>
-          <p:nvPr/>
-        </p:nvSpPr>
-        <p:spPr>
-          <a:xfrm>
-            <a:off x="2113267" y="5779557"/>
-            <a:ext cx="301686" cy="369332"/>
-          </a:xfrm>
-          <a:prstGeom prst="rect">
-            <a:avLst/>
-          </a:prstGeom>
-          <a:noFill/>
-        </p:spPr>
-        <p:txBody>
-          <a:bodyPr wrap="none" rtlCol="0">
-            <a:spAutoFit/>
-          </a:bodyPr>
-          <a:lstStyle/>
-          <a:p>
-            <a:r>
-              <a:rPr lang="fr-CH" dirty="0"/>
-              <a:t>2</a:t>
-            </a:r>
-          </a:p>
-        </p:txBody>
-      </p:sp>
-      <p:sp>
-        <p:nvSpPr>
-          <p:cNvPr id="45" name="ZoneTexte 6">
-            <a:extLst>
-              <a:ext uri="{FF2B5EF4-FFF2-40B4-BE49-F238E27FC236}">
-                <a16:creationId xmlns:a16="http://schemas.microsoft.com/office/drawing/2014/main" id="{B0E382D2-CBC9-743F-E641-5A13087E8FAA}"/>
-              </a:ext>
-            </a:extLst>
-          </p:cNvPr>
-          <p:cNvSpPr txBox="1"/>
-          <p:nvPr/>
-        </p:nvSpPr>
-        <p:spPr>
-          <a:xfrm>
-            <a:off x="2113267" y="6287915"/>
-            <a:ext cx="301686" cy="369332"/>
-          </a:xfrm>
-          <a:prstGeom prst="rect">
-            <a:avLst/>
-          </a:prstGeom>
-          <a:noFill/>
-        </p:spPr>
-        <p:txBody>
-          <a:bodyPr wrap="none" rtlCol="0">
-            <a:spAutoFit/>
-          </a:bodyPr>
-          <a:lstStyle/>
-          <a:p>
-            <a:r>
-              <a:rPr lang="fr-CH" dirty="0"/>
-              <a:t>3</a:t>
-            </a:r>
-          </a:p>
-        </p:txBody>
-      </p:sp>
     </p:spTree>
     <p:extLst>
       <p:ext uri="{BB962C8B-B14F-4D97-AF65-F5344CB8AC3E}">
-        <p14:creationId xmlns:p14="http://schemas.microsoft.com/office/powerpoint/2010/main" val="1895642754"/>
+        <p14:creationId xmlns:p14="http://schemas.microsoft.com/office/powerpoint/2010/main" val="346468439"/>
       </p:ext>
     </p:extLst>
   </p:cSld>
@@ -9577,10 +8779,10 @@
       </p:grpSpPr>
       <p:pic>
         <p:nvPicPr>
-          <p:cNvPr id="5" name="Picture 4">
-            <a:extLst>
-              <a:ext uri="{FF2B5EF4-FFF2-40B4-BE49-F238E27FC236}">
-                <a16:creationId xmlns:a16="http://schemas.microsoft.com/office/drawing/2014/main" id="{B9DE361F-9ED5-4568-E67B-DD52E5FFA4BD}"/>
+          <p:cNvPr id="4" name="Picture 3">
+            <a:extLst>
+              <a:ext uri="{FF2B5EF4-FFF2-40B4-BE49-F238E27FC236}">
+                <a16:creationId xmlns:a16="http://schemas.microsoft.com/office/drawing/2014/main" id="{575B0742-8CC0-0A7F-8E1D-DAC79D6BF0C2}"/>
               </a:ext>
             </a:extLst>
           </p:cNvPr>
@@ -9597,8 +8799,8 @@
         </p:blipFill>
         <p:spPr>
           <a:xfrm>
-            <a:off x="591127" y="1174736"/>
-            <a:ext cx="7499927" cy="3485785"/>
+            <a:off x="671136" y="332682"/>
+            <a:ext cx="7548562" cy="4525061"/>
           </a:xfrm>
           <a:prstGeom prst="rect">
             <a:avLst/>
@@ -9607,19 +8809,19 @@
       </p:pic>
       <p:sp>
         <p:nvSpPr>
-          <p:cNvPr id="6" name="ZoneTexte 6">
-            <a:extLst>
-              <a:ext uri="{FF2B5EF4-FFF2-40B4-BE49-F238E27FC236}">
-                <a16:creationId xmlns:a16="http://schemas.microsoft.com/office/drawing/2014/main" id="{2ED8FE06-1F26-567C-8688-6B406B1A9A64}"/>
-              </a:ext>
-            </a:extLst>
-          </p:cNvPr>
-          <p:cNvSpPr txBox="1"/>
-          <p:nvPr/>
-        </p:nvSpPr>
-        <p:spPr>
-          <a:xfrm>
-            <a:off x="2073504" y="1907448"/>
+          <p:cNvPr id="11" name="ZoneTexte 6">
+            <a:extLst>
+              <a:ext uri="{FF2B5EF4-FFF2-40B4-BE49-F238E27FC236}">
+                <a16:creationId xmlns:a16="http://schemas.microsoft.com/office/drawing/2014/main" id="{1B2B5547-ED2C-33AF-89B1-76E4C1A09100}"/>
+              </a:ext>
+            </a:extLst>
+          </p:cNvPr>
+          <p:cNvSpPr txBox="1"/>
+          <p:nvPr/>
+        </p:nvSpPr>
+        <p:spPr>
+          <a:xfrm>
+            <a:off x="992304" y="1762362"/>
             <a:ext cx="301686" cy="369332"/>
           </a:xfrm>
           <a:prstGeom prst="rect">
@@ -9642,19 +8844,127 @@
       </p:sp>
       <p:sp>
         <p:nvSpPr>
-          <p:cNvPr id="7" name="ZoneTexte 6">
-            <a:extLst>
-              <a:ext uri="{FF2B5EF4-FFF2-40B4-BE49-F238E27FC236}">
-                <a16:creationId xmlns:a16="http://schemas.microsoft.com/office/drawing/2014/main" id="{64CDFA9F-B37D-C28C-D064-203FC41BAFE1}"/>
-              </a:ext>
-            </a:extLst>
-          </p:cNvPr>
-          <p:cNvSpPr txBox="1"/>
-          <p:nvPr/>
-        </p:nvSpPr>
-        <p:spPr>
-          <a:xfrm>
-            <a:off x="5564849" y="1907448"/>
+          <p:cNvPr id="12" name="Rectangle 11">
+            <a:extLst>
+              <a:ext uri="{FF2B5EF4-FFF2-40B4-BE49-F238E27FC236}">
+                <a16:creationId xmlns:a16="http://schemas.microsoft.com/office/drawing/2014/main" id="{B4339C67-E72F-8C32-5050-984F38B12716}"/>
+              </a:ext>
+            </a:extLst>
+          </p:cNvPr>
+          <p:cNvSpPr/>
+          <p:nvPr/>
+        </p:nvSpPr>
+        <p:spPr>
+          <a:xfrm>
+            <a:off x="1080656" y="1339272"/>
+            <a:ext cx="426668" cy="480230"/>
+          </a:xfrm>
+          <a:prstGeom prst="rect">
+            <a:avLst/>
+          </a:prstGeom>
+          <a:noFill/>
+          <a:ln>
+            <a:solidFill>
+              <a:schemeClr val="accent6">
+                <a:lumMod val="75000"/>
+              </a:schemeClr>
+            </a:solidFill>
+          </a:ln>
+        </p:spPr>
+        <p:style>
+          <a:lnRef idx="2">
+            <a:schemeClr val="accent1">
+              <a:shade val="50000"/>
+            </a:schemeClr>
+          </a:lnRef>
+          <a:fillRef idx="1">
+            <a:schemeClr val="accent1"/>
+          </a:fillRef>
+          <a:effectRef idx="0">
+            <a:schemeClr val="accent1"/>
+          </a:effectRef>
+          <a:fontRef idx="minor">
+            <a:schemeClr val="lt1"/>
+          </a:fontRef>
+        </p:style>
+        <p:txBody>
+          <a:bodyPr rtlCol="0" anchor="ctr"/>
+          <a:lstStyle/>
+          <a:p>
+            <a:pPr algn="ctr"/>
+            <a:endParaRPr lang="fr-CH"/>
+          </a:p>
+        </p:txBody>
+      </p:sp>
+      <p:sp>
+        <p:nvSpPr>
+          <p:cNvPr id="14" name="Rectangle 13">
+            <a:extLst>
+              <a:ext uri="{FF2B5EF4-FFF2-40B4-BE49-F238E27FC236}">
+                <a16:creationId xmlns:a16="http://schemas.microsoft.com/office/drawing/2014/main" id="{D377BBCA-C190-A019-DD53-FAB4DC7C0ABE}"/>
+              </a:ext>
+            </a:extLst>
+          </p:cNvPr>
+          <p:cNvSpPr/>
+          <p:nvPr/>
+        </p:nvSpPr>
+        <p:spPr>
+          <a:xfrm>
+            <a:off x="1685259" y="1339271"/>
+            <a:ext cx="549942" cy="301410"/>
+          </a:xfrm>
+          <a:prstGeom prst="rect">
+            <a:avLst/>
+          </a:prstGeom>
+          <a:noFill/>
+          <a:ln>
+            <a:solidFill>
+              <a:schemeClr val="accent5">
+                <a:lumMod val="75000"/>
+              </a:schemeClr>
+            </a:solidFill>
+          </a:ln>
+        </p:spPr>
+        <p:style>
+          <a:lnRef idx="2">
+            <a:schemeClr val="accent1">
+              <a:shade val="50000"/>
+            </a:schemeClr>
+          </a:lnRef>
+          <a:fillRef idx="1">
+            <a:schemeClr val="accent1"/>
+          </a:fillRef>
+          <a:effectRef idx="0">
+            <a:schemeClr val="accent1"/>
+          </a:effectRef>
+          <a:fontRef idx="minor">
+            <a:schemeClr val="lt1"/>
+          </a:fontRef>
+        </p:style>
+        <p:txBody>
+          <a:bodyPr rtlCol="0" anchor="ctr"/>
+          <a:lstStyle/>
+          <a:p>
+            <a:pPr algn="ctr"/>
+            <a:endParaRPr lang="fr-CH"/>
+          </a:p>
+        </p:txBody>
+      </p:sp>
+      <p:sp>
+        <p:nvSpPr>
+          <p:cNvPr id="15" name="ZoneTexte 6">
+            <a:extLst>
+              <a:ext uri="{FF2B5EF4-FFF2-40B4-BE49-F238E27FC236}">
+                <a16:creationId xmlns:a16="http://schemas.microsoft.com/office/drawing/2014/main" id="{0D825E88-5BF2-2F85-E572-48D771C99277}"/>
+              </a:ext>
+            </a:extLst>
+          </p:cNvPr>
+          <p:cNvSpPr txBox="1"/>
+          <p:nvPr/>
+        </p:nvSpPr>
+        <p:spPr>
+          <a:xfrm>
+            <a:off x="2234527" y="1609085"/>
             <a:ext cx="301686" cy="369332"/>
           </a:xfrm>
           <a:prstGeom prst="rect">
@@ -9677,19 +8987,127 @@
       </p:sp>
       <p:sp>
         <p:nvSpPr>
-          <p:cNvPr id="8" name="ZoneTexte 6">
-            <a:extLst>
-              <a:ext uri="{FF2B5EF4-FFF2-40B4-BE49-F238E27FC236}">
-                <a16:creationId xmlns:a16="http://schemas.microsoft.com/office/drawing/2014/main" id="{83929B2F-BA9B-E645-FCD7-B43F9A3E73EB}"/>
-              </a:ext>
-            </a:extLst>
-          </p:cNvPr>
-          <p:cNvSpPr txBox="1"/>
-          <p:nvPr/>
-        </p:nvSpPr>
-        <p:spPr>
-          <a:xfrm>
-            <a:off x="2113512" y="2760671"/>
+          <p:cNvPr id="16" name="Rectangle 15">
+            <a:extLst>
+              <a:ext uri="{FF2B5EF4-FFF2-40B4-BE49-F238E27FC236}">
+                <a16:creationId xmlns:a16="http://schemas.microsoft.com/office/drawing/2014/main" id="{A0909BD0-9553-985E-4DFC-C040D9A356A1}"/>
+              </a:ext>
+            </a:extLst>
+          </p:cNvPr>
+          <p:cNvSpPr/>
+          <p:nvPr/>
+        </p:nvSpPr>
+        <p:spPr>
+          <a:xfrm>
+            <a:off x="2619512" y="1609085"/>
+            <a:ext cx="549942" cy="210417"/>
+          </a:xfrm>
+          <a:prstGeom prst="rect">
+            <a:avLst/>
+          </a:prstGeom>
+          <a:noFill/>
+          <a:ln>
+            <a:solidFill>
+              <a:schemeClr val="accent3">
+                <a:lumMod val="75000"/>
+              </a:schemeClr>
+            </a:solidFill>
+          </a:ln>
+        </p:spPr>
+        <p:style>
+          <a:lnRef idx="2">
+            <a:schemeClr val="accent1">
+              <a:shade val="50000"/>
+            </a:schemeClr>
+          </a:lnRef>
+          <a:fillRef idx="1">
+            <a:schemeClr val="accent1"/>
+          </a:fillRef>
+          <a:effectRef idx="0">
+            <a:schemeClr val="accent1"/>
+          </a:effectRef>
+          <a:fontRef idx="minor">
+            <a:schemeClr val="lt1"/>
+          </a:fontRef>
+        </p:style>
+        <p:txBody>
+          <a:bodyPr rtlCol="0" anchor="ctr"/>
+          <a:lstStyle/>
+          <a:p>
+            <a:pPr algn="ctr"/>
+            <a:endParaRPr lang="fr-CH"/>
+          </a:p>
+        </p:txBody>
+      </p:sp>
+      <p:sp>
+        <p:nvSpPr>
+          <p:cNvPr id="18" name="Rectangle 17">
+            <a:extLst>
+              <a:ext uri="{FF2B5EF4-FFF2-40B4-BE49-F238E27FC236}">
+                <a16:creationId xmlns:a16="http://schemas.microsoft.com/office/drawing/2014/main" id="{99E81ECF-575E-2F8C-A24A-302BD1C7CEC4}"/>
+              </a:ext>
+            </a:extLst>
+          </p:cNvPr>
+          <p:cNvSpPr/>
+          <p:nvPr/>
+        </p:nvSpPr>
+        <p:spPr>
+          <a:xfrm>
+            <a:off x="4242217" y="1648063"/>
+            <a:ext cx="441117" cy="165535"/>
+          </a:xfrm>
+          <a:prstGeom prst="rect">
+            <a:avLst/>
+          </a:prstGeom>
+          <a:noFill/>
+          <a:ln>
+            <a:solidFill>
+              <a:schemeClr val="accent3">
+                <a:lumMod val="75000"/>
+              </a:schemeClr>
+            </a:solidFill>
+          </a:ln>
+        </p:spPr>
+        <p:style>
+          <a:lnRef idx="2">
+            <a:schemeClr val="accent1">
+              <a:shade val="50000"/>
+            </a:schemeClr>
+          </a:lnRef>
+          <a:fillRef idx="1">
+            <a:schemeClr val="accent1"/>
+          </a:fillRef>
+          <a:effectRef idx="0">
+            <a:schemeClr val="accent1"/>
+          </a:effectRef>
+          <a:fontRef idx="minor">
+            <a:schemeClr val="lt1"/>
+          </a:fontRef>
+        </p:style>
+        <p:txBody>
+          <a:bodyPr rtlCol="0" anchor="ctr"/>
+          <a:lstStyle/>
+          <a:p>
+            <a:pPr algn="ctr"/>
+            <a:endParaRPr lang="fr-CH"/>
+          </a:p>
+        </p:txBody>
+      </p:sp>
+      <p:sp>
+        <p:nvSpPr>
+          <p:cNvPr id="19" name="ZoneTexte 6">
+            <a:extLst>
+              <a:ext uri="{FF2B5EF4-FFF2-40B4-BE49-F238E27FC236}">
+                <a16:creationId xmlns:a16="http://schemas.microsoft.com/office/drawing/2014/main" id="{08239DC9-AA4D-9D27-272B-C70BF3716F25}"/>
+              </a:ext>
+            </a:extLst>
+          </p:cNvPr>
+          <p:cNvSpPr txBox="1"/>
+          <p:nvPr/>
+        </p:nvSpPr>
+        <p:spPr>
+          <a:xfrm>
+            <a:off x="4239251" y="1765319"/>
             <a:ext cx="301686" cy="369332"/>
           </a:xfrm>
           <a:prstGeom prst="rect">
@@ -9712,19 +9130,19 @@
       </p:sp>
       <p:sp>
         <p:nvSpPr>
-          <p:cNvPr id="9" name="ZoneTexte 6">
-            <a:extLst>
-              <a:ext uri="{FF2B5EF4-FFF2-40B4-BE49-F238E27FC236}">
-                <a16:creationId xmlns:a16="http://schemas.microsoft.com/office/drawing/2014/main" id="{E0EB010C-A3D0-8EEB-579D-192B37F0C25F}"/>
-              </a:ext>
-            </a:extLst>
-          </p:cNvPr>
-          <p:cNvSpPr txBox="1"/>
-          <p:nvPr/>
-        </p:nvSpPr>
-        <p:spPr>
-          <a:xfrm>
-            <a:off x="3720640" y="2474344"/>
+          <p:cNvPr id="20" name="ZoneTexte 6">
+            <a:extLst>
+              <a:ext uri="{FF2B5EF4-FFF2-40B4-BE49-F238E27FC236}">
+                <a16:creationId xmlns:a16="http://schemas.microsoft.com/office/drawing/2014/main" id="{93B0FC80-3857-01EE-F9C0-A214D3548CC3}"/>
+              </a:ext>
+            </a:extLst>
+          </p:cNvPr>
+          <p:cNvSpPr txBox="1"/>
+          <p:nvPr/>
+        </p:nvSpPr>
+        <p:spPr>
+          <a:xfrm>
+            <a:off x="5068319" y="1748073"/>
             <a:ext cx="301686" cy="369332"/>
           </a:xfrm>
           <a:prstGeom prst="rect">
@@ -9747,19 +9165,19 @@
       </p:sp>
       <p:sp>
         <p:nvSpPr>
-          <p:cNvPr id="10" name="ZoneTexte 6">
-            <a:extLst>
-              <a:ext uri="{FF2B5EF4-FFF2-40B4-BE49-F238E27FC236}">
-                <a16:creationId xmlns:a16="http://schemas.microsoft.com/office/drawing/2014/main" id="{232C7CC2-6F8D-6F34-DE97-5B1C0D12F6B2}"/>
-              </a:ext>
-            </a:extLst>
-          </p:cNvPr>
-          <p:cNvSpPr txBox="1"/>
-          <p:nvPr/>
-        </p:nvSpPr>
-        <p:spPr>
-          <a:xfrm>
-            <a:off x="2990967" y="3244334"/>
+          <p:cNvPr id="21" name="ZoneTexte 6">
+            <a:extLst>
+              <a:ext uri="{FF2B5EF4-FFF2-40B4-BE49-F238E27FC236}">
+                <a16:creationId xmlns:a16="http://schemas.microsoft.com/office/drawing/2014/main" id="{AE339E3F-5A83-5EDE-4DB7-58E3EE818EF4}"/>
+              </a:ext>
+            </a:extLst>
+          </p:cNvPr>
+          <p:cNvSpPr txBox="1"/>
+          <p:nvPr/>
+        </p:nvSpPr>
+        <p:spPr>
+          <a:xfrm>
+            <a:off x="5604147" y="1738547"/>
             <a:ext cx="301686" cy="369332"/>
           </a:xfrm>
           <a:prstGeom prst="rect">
@@ -9782,19 +9200,19 @@
       </p:sp>
       <p:sp>
         <p:nvSpPr>
-          <p:cNvPr id="11" name="ZoneTexte 6">
-            <a:extLst>
-              <a:ext uri="{FF2B5EF4-FFF2-40B4-BE49-F238E27FC236}">
-                <a16:creationId xmlns:a16="http://schemas.microsoft.com/office/drawing/2014/main" id="{B73E4B25-208D-24BE-2E2E-A57D84C5DE5A}"/>
-              </a:ext>
-            </a:extLst>
-          </p:cNvPr>
-          <p:cNvSpPr txBox="1"/>
-          <p:nvPr/>
-        </p:nvSpPr>
-        <p:spPr>
-          <a:xfrm>
-            <a:off x="5102283" y="2917628"/>
+          <p:cNvPr id="22" name="ZoneTexte 6">
+            <a:extLst>
+              <a:ext uri="{FF2B5EF4-FFF2-40B4-BE49-F238E27FC236}">
+                <a16:creationId xmlns:a16="http://schemas.microsoft.com/office/drawing/2014/main" id="{C1EFA149-703C-7495-0C71-3EC892919A05}"/>
+              </a:ext>
+            </a:extLst>
+          </p:cNvPr>
+          <p:cNvSpPr txBox="1"/>
+          <p:nvPr/>
+        </p:nvSpPr>
+        <p:spPr>
+          <a:xfrm>
+            <a:off x="5797530" y="3979001"/>
             <a:ext cx="301686" cy="369332"/>
           </a:xfrm>
           <a:prstGeom prst="rect">
@@ -9817,19 +9235,54 @@
       </p:sp>
       <p:sp>
         <p:nvSpPr>
-          <p:cNvPr id="12" name="ZoneTexte 6">
-            <a:extLst>
-              <a:ext uri="{FF2B5EF4-FFF2-40B4-BE49-F238E27FC236}">
-                <a16:creationId xmlns:a16="http://schemas.microsoft.com/office/drawing/2014/main" id="{E2A960FC-4B8B-A663-5885-966156BACB20}"/>
-              </a:ext>
-            </a:extLst>
-          </p:cNvPr>
-          <p:cNvSpPr txBox="1"/>
-          <p:nvPr/>
-        </p:nvSpPr>
-        <p:spPr>
-          <a:xfrm>
-            <a:off x="7777767" y="1538116"/>
+          <p:cNvPr id="25" name="ZoneTexte 6">
+            <a:extLst>
+              <a:ext uri="{FF2B5EF4-FFF2-40B4-BE49-F238E27FC236}">
+                <a16:creationId xmlns:a16="http://schemas.microsoft.com/office/drawing/2014/main" id="{8ADD92C4-242C-5BA8-434E-45CFE8943167}"/>
+              </a:ext>
+            </a:extLst>
+          </p:cNvPr>
+          <p:cNvSpPr txBox="1"/>
+          <p:nvPr/>
+        </p:nvSpPr>
+        <p:spPr>
+          <a:xfrm>
+            <a:off x="7921726" y="2316604"/>
+            <a:ext cx="301686" cy="369332"/>
+          </a:xfrm>
+          <a:prstGeom prst="rect">
+            <a:avLst/>
+          </a:prstGeom>
+          <a:noFill/>
+        </p:spPr>
+        <p:txBody>
+          <a:bodyPr wrap="none" rtlCol="0">
+            <a:spAutoFit/>
+          </a:bodyPr>
+          <a:lstStyle/>
+          <a:p>
+            <a:r>
+              <a:rPr lang="fr-CH" dirty="0"/>
+              <a:t>8</a:t>
+            </a:r>
+          </a:p>
+        </p:txBody>
+      </p:sp>
+      <p:sp>
+        <p:nvSpPr>
+          <p:cNvPr id="2" name="ZoneTexte 6">
+            <a:extLst>
+              <a:ext uri="{FF2B5EF4-FFF2-40B4-BE49-F238E27FC236}">
+                <a16:creationId xmlns:a16="http://schemas.microsoft.com/office/drawing/2014/main" id="{12C1570A-C560-01F2-6526-B676FE69F6E6}"/>
+              </a:ext>
+            </a:extLst>
+          </p:cNvPr>
+          <p:cNvSpPr txBox="1"/>
+          <p:nvPr/>
+        </p:nvSpPr>
+        <p:spPr>
+          <a:xfrm>
+            <a:off x="5905407" y="681561"/>
             <a:ext cx="301686" cy="369332"/>
           </a:xfrm>
           <a:prstGeom prst="rect">
@@ -9852,54 +9305,238 @@
       </p:sp>
       <p:sp>
         <p:nvSpPr>
-          <p:cNvPr id="13" name="ZoneTexte 6">
-            <a:extLst>
-              <a:ext uri="{FF2B5EF4-FFF2-40B4-BE49-F238E27FC236}">
-                <a16:creationId xmlns:a16="http://schemas.microsoft.com/office/drawing/2014/main" id="{110C0431-2A5E-A1B6-5EFE-3D5B9A9C0642}"/>
-              </a:ext>
-            </a:extLst>
-          </p:cNvPr>
-          <p:cNvSpPr txBox="1"/>
-          <p:nvPr/>
-        </p:nvSpPr>
-        <p:spPr>
-          <a:xfrm>
-            <a:off x="7795169" y="1907448"/>
-            <a:ext cx="301686" cy="369332"/>
-          </a:xfrm>
-          <a:prstGeom prst="rect">
-            <a:avLst/>
-          </a:prstGeom>
-          <a:noFill/>
-        </p:spPr>
-        <p:txBody>
-          <a:bodyPr wrap="none" rtlCol="0">
-            <a:spAutoFit/>
-          </a:bodyPr>
-          <a:lstStyle/>
-          <a:p>
-            <a:r>
-              <a:rPr lang="fr-CH" dirty="0"/>
-              <a:t>8</a:t>
-            </a:r>
-          </a:p>
-        </p:txBody>
-      </p:sp>
-      <p:sp>
-        <p:nvSpPr>
-          <p:cNvPr id="14" name="ZoneTexte 6">
-            <a:extLst>
-              <a:ext uri="{FF2B5EF4-FFF2-40B4-BE49-F238E27FC236}">
-                <a16:creationId xmlns:a16="http://schemas.microsoft.com/office/drawing/2014/main" id="{B43AAA21-C602-78B9-B797-5EE8DB0AEF15}"/>
-              </a:ext>
-            </a:extLst>
-          </p:cNvPr>
-          <p:cNvSpPr txBox="1"/>
-          <p:nvPr/>
-        </p:nvSpPr>
-        <p:spPr>
-          <a:xfrm>
-            <a:off x="7795169" y="2760671"/>
+          <p:cNvPr id="8" name="Rectangle 7">
+            <a:extLst>
+              <a:ext uri="{FF2B5EF4-FFF2-40B4-BE49-F238E27FC236}">
+                <a16:creationId xmlns:a16="http://schemas.microsoft.com/office/drawing/2014/main" id="{F2E786B7-7D0D-A079-6579-D9C9FA64F496}"/>
+              </a:ext>
+            </a:extLst>
+          </p:cNvPr>
+          <p:cNvSpPr/>
+          <p:nvPr/>
+        </p:nvSpPr>
+        <p:spPr>
+          <a:xfrm>
+            <a:off x="4242217" y="1339272"/>
+            <a:ext cx="441117" cy="301409"/>
+          </a:xfrm>
+          <a:prstGeom prst="rect">
+            <a:avLst/>
+          </a:prstGeom>
+          <a:noFill/>
+          <a:ln>
+            <a:solidFill>
+              <a:schemeClr val="accent5">
+                <a:lumMod val="75000"/>
+              </a:schemeClr>
+            </a:solidFill>
+          </a:ln>
+        </p:spPr>
+        <p:style>
+          <a:lnRef idx="2">
+            <a:schemeClr val="accent1">
+              <a:shade val="50000"/>
+            </a:schemeClr>
+          </a:lnRef>
+          <a:fillRef idx="1">
+            <a:schemeClr val="accent1"/>
+          </a:fillRef>
+          <a:effectRef idx="0">
+            <a:schemeClr val="accent1"/>
+          </a:effectRef>
+          <a:fontRef idx="minor">
+            <a:schemeClr val="lt1"/>
+          </a:fontRef>
+        </p:style>
+        <p:txBody>
+          <a:bodyPr rtlCol="0" anchor="ctr"/>
+          <a:lstStyle/>
+          <a:p>
+            <a:pPr algn="ctr"/>
+            <a:endParaRPr lang="fr-CH"/>
+          </a:p>
+        </p:txBody>
+      </p:sp>
+      <p:sp>
+        <p:nvSpPr>
+          <p:cNvPr id="9" name="Rectangle 8">
+            <a:extLst>
+              <a:ext uri="{FF2B5EF4-FFF2-40B4-BE49-F238E27FC236}">
+                <a16:creationId xmlns:a16="http://schemas.microsoft.com/office/drawing/2014/main" id="{5C6CA6BE-CA18-204E-B513-023312CAE1CF}"/>
+              </a:ext>
+            </a:extLst>
+          </p:cNvPr>
+          <p:cNvSpPr/>
+          <p:nvPr/>
+        </p:nvSpPr>
+        <p:spPr>
+          <a:xfrm>
+            <a:off x="4692022" y="1319386"/>
+            <a:ext cx="549942" cy="480230"/>
+          </a:xfrm>
+          <a:prstGeom prst="rect">
+            <a:avLst/>
+          </a:prstGeom>
+          <a:noFill/>
+          <a:ln>
+            <a:solidFill>
+              <a:schemeClr val="accent2">
+                <a:lumMod val="60000"/>
+                <a:lumOff val="40000"/>
+              </a:schemeClr>
+            </a:solidFill>
+          </a:ln>
+        </p:spPr>
+        <p:style>
+          <a:lnRef idx="2">
+            <a:schemeClr val="accent1">
+              <a:shade val="50000"/>
+            </a:schemeClr>
+          </a:lnRef>
+          <a:fillRef idx="1">
+            <a:schemeClr val="accent1"/>
+          </a:fillRef>
+          <a:effectRef idx="0">
+            <a:schemeClr val="accent1"/>
+          </a:effectRef>
+          <a:fontRef idx="minor">
+            <a:schemeClr val="lt1"/>
+          </a:fontRef>
+        </p:style>
+        <p:txBody>
+          <a:bodyPr rtlCol="0" anchor="ctr"/>
+          <a:lstStyle/>
+          <a:p>
+            <a:pPr algn="ctr"/>
+            <a:endParaRPr lang="fr-CH"/>
+          </a:p>
+        </p:txBody>
+      </p:sp>
+      <p:sp>
+        <p:nvSpPr>
+          <p:cNvPr id="23" name="Rectangle 22">
+            <a:extLst>
+              <a:ext uri="{FF2B5EF4-FFF2-40B4-BE49-F238E27FC236}">
+                <a16:creationId xmlns:a16="http://schemas.microsoft.com/office/drawing/2014/main" id="{91140C2B-9CF8-6E7F-7801-6432F9E9C1AF}"/>
+              </a:ext>
+            </a:extLst>
+          </p:cNvPr>
+          <p:cNvSpPr/>
+          <p:nvPr/>
+        </p:nvSpPr>
+        <p:spPr>
+          <a:xfrm>
+            <a:off x="5710237" y="1339271"/>
+            <a:ext cx="353267" cy="480230"/>
+          </a:xfrm>
+          <a:prstGeom prst="rect">
+            <a:avLst/>
+          </a:prstGeom>
+          <a:noFill/>
+          <a:ln>
+            <a:solidFill>
+              <a:schemeClr val="accent4">
+                <a:lumMod val="60000"/>
+                <a:lumOff val="40000"/>
+              </a:schemeClr>
+            </a:solidFill>
+          </a:ln>
+        </p:spPr>
+        <p:style>
+          <a:lnRef idx="2">
+            <a:schemeClr val="accent1">
+              <a:shade val="50000"/>
+            </a:schemeClr>
+          </a:lnRef>
+          <a:fillRef idx="1">
+            <a:schemeClr val="accent1"/>
+          </a:fillRef>
+          <a:effectRef idx="0">
+            <a:schemeClr val="accent1"/>
+          </a:effectRef>
+          <a:fontRef idx="minor">
+            <a:schemeClr val="lt1"/>
+          </a:fontRef>
+        </p:style>
+        <p:txBody>
+          <a:bodyPr rtlCol="0" anchor="ctr"/>
+          <a:lstStyle/>
+          <a:p>
+            <a:pPr algn="ctr"/>
+            <a:endParaRPr lang="fr-CH"/>
+          </a:p>
+        </p:txBody>
+      </p:sp>
+      <p:sp>
+        <p:nvSpPr>
+          <p:cNvPr id="28" name="Rectangle 27">
+            <a:extLst>
+              <a:ext uri="{FF2B5EF4-FFF2-40B4-BE49-F238E27FC236}">
+                <a16:creationId xmlns:a16="http://schemas.microsoft.com/office/drawing/2014/main" id="{9858621E-DAC3-319F-520C-A896EAE8CE6C}"/>
+              </a:ext>
+            </a:extLst>
+          </p:cNvPr>
+          <p:cNvSpPr/>
+          <p:nvPr/>
+        </p:nvSpPr>
+        <p:spPr>
+          <a:xfrm>
+            <a:off x="6136160" y="845909"/>
+            <a:ext cx="2083538" cy="1527835"/>
+          </a:xfrm>
+          <a:prstGeom prst="rect">
+            <a:avLst/>
+          </a:prstGeom>
+          <a:noFill/>
+          <a:ln>
+            <a:solidFill>
+              <a:schemeClr val="accent4">
+                <a:lumMod val="60000"/>
+                <a:lumOff val="40000"/>
+              </a:schemeClr>
+            </a:solidFill>
+          </a:ln>
+        </p:spPr>
+        <p:style>
+          <a:lnRef idx="2">
+            <a:schemeClr val="accent1">
+              <a:shade val="50000"/>
+            </a:schemeClr>
+          </a:lnRef>
+          <a:fillRef idx="1">
+            <a:schemeClr val="accent1"/>
+          </a:fillRef>
+          <a:effectRef idx="0">
+            <a:schemeClr val="accent1"/>
+          </a:effectRef>
+          <a:fontRef idx="minor">
+            <a:schemeClr val="lt1"/>
+          </a:fontRef>
+        </p:style>
+        <p:txBody>
+          <a:bodyPr rtlCol="0" anchor="ctr"/>
+          <a:lstStyle/>
+          <a:p>
+            <a:pPr algn="ctr"/>
+            <a:endParaRPr lang="fr-CH"/>
+          </a:p>
+        </p:txBody>
+      </p:sp>
+      <p:sp>
+        <p:nvSpPr>
+          <p:cNvPr id="31" name="ZoneTexte 6">
+            <a:extLst>
+              <a:ext uri="{FF2B5EF4-FFF2-40B4-BE49-F238E27FC236}">
+                <a16:creationId xmlns:a16="http://schemas.microsoft.com/office/drawing/2014/main" id="{36EEFACD-2977-EEE2-CF97-26259667AE64}"/>
+              </a:ext>
+            </a:extLst>
+          </p:cNvPr>
+          <p:cNvSpPr txBox="1"/>
+          <p:nvPr/>
+        </p:nvSpPr>
+        <p:spPr>
+          <a:xfrm>
+            <a:off x="7857074" y="2702305"/>
             <a:ext cx="301686" cy="369332"/>
           </a:xfrm>
           <a:prstGeom prst="rect">
@@ -9922,19 +9559,19 @@
       </p:sp>
       <p:sp>
         <p:nvSpPr>
-          <p:cNvPr id="15" name="ZoneTexte 6">
-            <a:extLst>
-              <a:ext uri="{FF2B5EF4-FFF2-40B4-BE49-F238E27FC236}">
-                <a16:creationId xmlns:a16="http://schemas.microsoft.com/office/drawing/2014/main" id="{7BB52ED5-5CC4-747E-4440-59F773CAE69E}"/>
-              </a:ext>
-            </a:extLst>
-          </p:cNvPr>
-          <p:cNvSpPr txBox="1"/>
-          <p:nvPr/>
-        </p:nvSpPr>
-        <p:spPr>
-          <a:xfrm>
-            <a:off x="7803809" y="3244334"/>
+          <p:cNvPr id="32" name="ZoneTexte 6">
+            <a:extLst>
+              <a:ext uri="{FF2B5EF4-FFF2-40B4-BE49-F238E27FC236}">
+                <a16:creationId xmlns:a16="http://schemas.microsoft.com/office/drawing/2014/main" id="{395E7291-B0AD-3BCB-4D5D-8AAEEBA6F96D}"/>
+              </a:ext>
+            </a:extLst>
+          </p:cNvPr>
+          <p:cNvSpPr txBox="1"/>
+          <p:nvPr/>
+        </p:nvSpPr>
+        <p:spPr>
+          <a:xfrm>
+            <a:off x="7802851" y="3434164"/>
             <a:ext cx="418704" cy="369332"/>
           </a:xfrm>
           <a:prstGeom prst="rect">
@@ -9957,19 +9594,19 @@
       </p:sp>
       <p:sp>
         <p:nvSpPr>
-          <p:cNvPr id="16" name="ZoneTexte 6">
-            <a:extLst>
-              <a:ext uri="{FF2B5EF4-FFF2-40B4-BE49-F238E27FC236}">
-                <a16:creationId xmlns:a16="http://schemas.microsoft.com/office/drawing/2014/main" id="{3EAE9829-BBDD-3A4D-B6A7-8508C2C6A5E2}"/>
-              </a:ext>
-            </a:extLst>
-          </p:cNvPr>
-          <p:cNvSpPr txBox="1"/>
-          <p:nvPr/>
-        </p:nvSpPr>
-        <p:spPr>
-          <a:xfrm>
-            <a:off x="6584610" y="4057135"/>
+          <p:cNvPr id="33" name="ZoneTexte 6">
+            <a:extLst>
+              <a:ext uri="{FF2B5EF4-FFF2-40B4-BE49-F238E27FC236}">
+                <a16:creationId xmlns:a16="http://schemas.microsoft.com/office/drawing/2014/main" id="{90716B7C-FA14-7E81-0DC5-7CE2DAE21AB3}"/>
+              </a:ext>
+            </a:extLst>
+          </p:cNvPr>
+          <p:cNvSpPr txBox="1"/>
+          <p:nvPr/>
+        </p:nvSpPr>
+        <p:spPr>
+          <a:xfrm>
+            <a:off x="6531401" y="4299591"/>
             <a:ext cx="418704" cy="369332"/>
           </a:xfrm>
           <a:prstGeom prst="rect">
@@ -9986,6 +9623,223 @@
             <a:r>
               <a:rPr lang="fr-CH" dirty="0"/>
               <a:t>11</a:t>
+            </a:r>
+          </a:p>
+        </p:txBody>
+      </p:sp>
+      <p:pic>
+        <p:nvPicPr>
+          <p:cNvPr id="38" name="Picture 37">
+            <a:extLst>
+              <a:ext uri="{FF2B5EF4-FFF2-40B4-BE49-F238E27FC236}">
+                <a16:creationId xmlns:a16="http://schemas.microsoft.com/office/drawing/2014/main" id="{03640F89-9FE5-520D-F078-896CC8C5DBE5}"/>
+              </a:ext>
+            </a:extLst>
+          </p:cNvPr>
+          <p:cNvPicPr>
+            <a:picLocks noChangeAspect="1"/>
+          </p:cNvPicPr>
+          <p:nvPr/>
+        </p:nvPicPr>
+        <p:blipFill>
+          <a:blip r:embed="rId3"/>
+          <a:stretch>
+            <a:fillRect/>
+          </a:stretch>
+        </p:blipFill>
+        <p:spPr>
+          <a:xfrm>
+            <a:off x="2512950" y="5146121"/>
+            <a:ext cx="3543300" cy="1447800"/>
+          </a:xfrm>
+          <a:prstGeom prst="rect">
+            <a:avLst/>
+          </a:prstGeom>
+        </p:spPr>
+      </p:pic>
+      <p:cxnSp>
+        <p:nvCxnSpPr>
+          <p:cNvPr id="40" name="Straight Arrow Connector 39">
+            <a:extLst>
+              <a:ext uri="{FF2B5EF4-FFF2-40B4-BE49-F238E27FC236}">
+                <a16:creationId xmlns:a16="http://schemas.microsoft.com/office/drawing/2014/main" id="{49047C2F-3A42-F511-AB61-356E2712E315}"/>
+              </a:ext>
+            </a:extLst>
+          </p:cNvPr>
+          <p:cNvCxnSpPr/>
+          <p:nvPr/>
+        </p:nvCxnSpPr>
+        <p:spPr>
+          <a:xfrm>
+            <a:off x="2396995" y="5146121"/>
+            <a:ext cx="0" cy="488061"/>
+          </a:xfrm>
+          <a:prstGeom prst="straightConnector1">
+            <a:avLst/>
+          </a:prstGeom>
+          <a:ln>
+            <a:headEnd type="triangle" w="med" len="med"/>
+            <a:tailEnd type="triangle" w="med" len="med"/>
+          </a:ln>
+        </p:spPr>
+        <p:style>
+          <a:lnRef idx="1">
+            <a:schemeClr val="accent1"/>
+          </a:lnRef>
+          <a:fillRef idx="0">
+            <a:schemeClr val="accent1"/>
+          </a:fillRef>
+          <a:effectRef idx="0">
+            <a:schemeClr val="accent1"/>
+          </a:effectRef>
+          <a:fontRef idx="minor">
+            <a:schemeClr val="tx1"/>
+          </a:fontRef>
+        </p:style>
+      </p:cxnSp>
+      <p:cxnSp>
+        <p:nvCxnSpPr>
+          <p:cNvPr id="41" name="Straight Arrow Connector 40">
+            <a:extLst>
+              <a:ext uri="{FF2B5EF4-FFF2-40B4-BE49-F238E27FC236}">
+                <a16:creationId xmlns:a16="http://schemas.microsoft.com/office/drawing/2014/main" id="{A25E9E35-120B-1473-AD2F-2C4AEE46E846}"/>
+              </a:ext>
+            </a:extLst>
+          </p:cNvPr>
+          <p:cNvCxnSpPr>
+            <a:cxnSpLocks/>
+          </p:cNvCxnSpPr>
+          <p:nvPr/>
+        </p:nvCxnSpPr>
+        <p:spPr>
+          <a:xfrm>
+            <a:off x="2406390" y="5663669"/>
+            <a:ext cx="0" cy="672476"/>
+          </a:xfrm>
+          <a:prstGeom prst="straightConnector1">
+            <a:avLst/>
+          </a:prstGeom>
+          <a:ln>
+            <a:headEnd type="triangle" w="med" len="med"/>
+            <a:tailEnd type="triangle" w="med" len="med"/>
+          </a:ln>
+        </p:spPr>
+        <p:style>
+          <a:lnRef idx="1">
+            <a:schemeClr val="accent1"/>
+          </a:lnRef>
+          <a:fillRef idx="0">
+            <a:schemeClr val="accent1"/>
+          </a:fillRef>
+          <a:effectRef idx="0">
+            <a:schemeClr val="accent1"/>
+          </a:effectRef>
+          <a:fontRef idx="minor">
+            <a:schemeClr val="tx1"/>
+          </a:fontRef>
+        </p:style>
+      </p:cxnSp>
+      <p:sp>
+        <p:nvSpPr>
+          <p:cNvPr id="43" name="ZoneTexte 6">
+            <a:extLst>
+              <a:ext uri="{FF2B5EF4-FFF2-40B4-BE49-F238E27FC236}">
+                <a16:creationId xmlns:a16="http://schemas.microsoft.com/office/drawing/2014/main" id="{341BC775-940A-743B-CEFE-5D631D751CCC}"/>
+              </a:ext>
+            </a:extLst>
+          </p:cNvPr>
+          <p:cNvSpPr txBox="1"/>
+          <p:nvPr/>
+        </p:nvSpPr>
+        <p:spPr>
+          <a:xfrm>
+            <a:off x="2083684" y="5205485"/>
+            <a:ext cx="301686" cy="369332"/>
+          </a:xfrm>
+          <a:prstGeom prst="rect">
+            <a:avLst/>
+          </a:prstGeom>
+          <a:noFill/>
+        </p:spPr>
+        <p:txBody>
+          <a:bodyPr wrap="none" rtlCol="0">
+            <a:spAutoFit/>
+          </a:bodyPr>
+          <a:lstStyle/>
+          <a:p>
+            <a:r>
+              <a:rPr lang="fr-CH" dirty="0"/>
+              <a:t>1</a:t>
+            </a:r>
+          </a:p>
+        </p:txBody>
+      </p:sp>
+      <p:sp>
+        <p:nvSpPr>
+          <p:cNvPr id="44" name="ZoneTexte 6">
+            <a:extLst>
+              <a:ext uri="{FF2B5EF4-FFF2-40B4-BE49-F238E27FC236}">
+                <a16:creationId xmlns:a16="http://schemas.microsoft.com/office/drawing/2014/main" id="{2EC92148-675C-D11E-2D9F-50305A7BF851}"/>
+              </a:ext>
+            </a:extLst>
+          </p:cNvPr>
+          <p:cNvSpPr txBox="1"/>
+          <p:nvPr/>
+        </p:nvSpPr>
+        <p:spPr>
+          <a:xfrm>
+            <a:off x="2113267" y="5779557"/>
+            <a:ext cx="301686" cy="369332"/>
+          </a:xfrm>
+          <a:prstGeom prst="rect">
+            <a:avLst/>
+          </a:prstGeom>
+          <a:noFill/>
+        </p:spPr>
+        <p:txBody>
+          <a:bodyPr wrap="none" rtlCol="0">
+            <a:spAutoFit/>
+          </a:bodyPr>
+          <a:lstStyle/>
+          <a:p>
+            <a:r>
+              <a:rPr lang="fr-CH" dirty="0"/>
+              <a:t>2</a:t>
+            </a:r>
+          </a:p>
+        </p:txBody>
+      </p:sp>
+      <p:sp>
+        <p:nvSpPr>
+          <p:cNvPr id="45" name="ZoneTexte 6">
+            <a:extLst>
+              <a:ext uri="{FF2B5EF4-FFF2-40B4-BE49-F238E27FC236}">
+                <a16:creationId xmlns:a16="http://schemas.microsoft.com/office/drawing/2014/main" id="{B0E382D2-CBC9-743F-E641-5A13087E8FAA}"/>
+              </a:ext>
+            </a:extLst>
+          </p:cNvPr>
+          <p:cNvSpPr txBox="1"/>
+          <p:nvPr/>
+        </p:nvSpPr>
+        <p:spPr>
+          <a:xfrm>
+            <a:off x="2113267" y="6287915"/>
+            <a:ext cx="301686" cy="369332"/>
+          </a:xfrm>
+          <a:prstGeom prst="rect">
+            <a:avLst/>
+          </a:prstGeom>
+          <a:noFill/>
+        </p:spPr>
+        <p:txBody>
+          <a:bodyPr wrap="none" rtlCol="0">
+            <a:spAutoFit/>
+          </a:bodyPr>
+          <a:lstStyle/>
+          <a:p>
+            <a:r>
+              <a:rPr lang="fr-CH" dirty="0"/>
+              <a:t>3</a:t>
             </a:r>
           </a:p>
         </p:txBody>
@@ -9993,7 +9847,7 @@
     </p:spTree>
     <p:extLst>
       <p:ext uri="{BB962C8B-B14F-4D97-AF65-F5344CB8AC3E}">
-        <p14:creationId xmlns:p14="http://schemas.microsoft.com/office/powerpoint/2010/main" val="4288971629"/>
+        <p14:creationId xmlns:p14="http://schemas.microsoft.com/office/powerpoint/2010/main" val="1895642754"/>
       </p:ext>
     </p:extLst>
   </p:cSld>
@@ -10313,6 +10167,451 @@
       </p:grpSpPr>
       <p:pic>
         <p:nvPicPr>
+          <p:cNvPr id="5" name="Picture 4">
+            <a:extLst>
+              <a:ext uri="{FF2B5EF4-FFF2-40B4-BE49-F238E27FC236}">
+                <a16:creationId xmlns:a16="http://schemas.microsoft.com/office/drawing/2014/main" id="{B9DE361F-9ED5-4568-E67B-DD52E5FFA4BD}"/>
+              </a:ext>
+            </a:extLst>
+          </p:cNvPr>
+          <p:cNvPicPr>
+            <a:picLocks noChangeAspect="1"/>
+          </p:cNvPicPr>
+          <p:nvPr/>
+        </p:nvPicPr>
+        <p:blipFill>
+          <a:blip r:embed="rId2"/>
+          <a:stretch>
+            <a:fillRect/>
+          </a:stretch>
+        </p:blipFill>
+        <p:spPr>
+          <a:xfrm>
+            <a:off x="591127" y="1174736"/>
+            <a:ext cx="7499927" cy="3485785"/>
+          </a:xfrm>
+          <a:prstGeom prst="rect">
+            <a:avLst/>
+          </a:prstGeom>
+        </p:spPr>
+      </p:pic>
+      <p:sp>
+        <p:nvSpPr>
+          <p:cNvPr id="6" name="ZoneTexte 6">
+            <a:extLst>
+              <a:ext uri="{FF2B5EF4-FFF2-40B4-BE49-F238E27FC236}">
+                <a16:creationId xmlns:a16="http://schemas.microsoft.com/office/drawing/2014/main" id="{2ED8FE06-1F26-567C-8688-6B406B1A9A64}"/>
+              </a:ext>
+            </a:extLst>
+          </p:cNvPr>
+          <p:cNvSpPr txBox="1"/>
+          <p:nvPr/>
+        </p:nvSpPr>
+        <p:spPr>
+          <a:xfrm>
+            <a:off x="2073504" y="1907448"/>
+            <a:ext cx="301686" cy="369332"/>
+          </a:xfrm>
+          <a:prstGeom prst="rect">
+            <a:avLst/>
+          </a:prstGeom>
+          <a:noFill/>
+        </p:spPr>
+        <p:txBody>
+          <a:bodyPr wrap="none" rtlCol="0">
+            <a:spAutoFit/>
+          </a:bodyPr>
+          <a:lstStyle/>
+          <a:p>
+            <a:r>
+              <a:rPr lang="fr-CH" dirty="0"/>
+              <a:t>1</a:t>
+            </a:r>
+          </a:p>
+        </p:txBody>
+      </p:sp>
+      <p:sp>
+        <p:nvSpPr>
+          <p:cNvPr id="7" name="ZoneTexte 6">
+            <a:extLst>
+              <a:ext uri="{FF2B5EF4-FFF2-40B4-BE49-F238E27FC236}">
+                <a16:creationId xmlns:a16="http://schemas.microsoft.com/office/drawing/2014/main" id="{64CDFA9F-B37D-C28C-D064-203FC41BAFE1}"/>
+              </a:ext>
+            </a:extLst>
+          </p:cNvPr>
+          <p:cNvSpPr txBox="1"/>
+          <p:nvPr/>
+        </p:nvSpPr>
+        <p:spPr>
+          <a:xfrm>
+            <a:off x="5564849" y="1907448"/>
+            <a:ext cx="301686" cy="369332"/>
+          </a:xfrm>
+          <a:prstGeom prst="rect">
+            <a:avLst/>
+          </a:prstGeom>
+          <a:noFill/>
+        </p:spPr>
+        <p:txBody>
+          <a:bodyPr wrap="none" rtlCol="0">
+            <a:spAutoFit/>
+          </a:bodyPr>
+          <a:lstStyle/>
+          <a:p>
+            <a:r>
+              <a:rPr lang="fr-CH" dirty="0"/>
+              <a:t>2</a:t>
+            </a:r>
+          </a:p>
+        </p:txBody>
+      </p:sp>
+      <p:sp>
+        <p:nvSpPr>
+          <p:cNvPr id="8" name="ZoneTexte 6">
+            <a:extLst>
+              <a:ext uri="{FF2B5EF4-FFF2-40B4-BE49-F238E27FC236}">
+                <a16:creationId xmlns:a16="http://schemas.microsoft.com/office/drawing/2014/main" id="{83929B2F-BA9B-E645-FCD7-B43F9A3E73EB}"/>
+              </a:ext>
+            </a:extLst>
+          </p:cNvPr>
+          <p:cNvSpPr txBox="1"/>
+          <p:nvPr/>
+        </p:nvSpPr>
+        <p:spPr>
+          <a:xfrm>
+            <a:off x="2113512" y="2760671"/>
+            <a:ext cx="301686" cy="369332"/>
+          </a:xfrm>
+          <a:prstGeom prst="rect">
+            <a:avLst/>
+          </a:prstGeom>
+          <a:noFill/>
+        </p:spPr>
+        <p:txBody>
+          <a:bodyPr wrap="none" rtlCol="0">
+            <a:spAutoFit/>
+          </a:bodyPr>
+          <a:lstStyle/>
+          <a:p>
+            <a:r>
+              <a:rPr lang="fr-CH" dirty="0"/>
+              <a:t>3</a:t>
+            </a:r>
+          </a:p>
+        </p:txBody>
+      </p:sp>
+      <p:sp>
+        <p:nvSpPr>
+          <p:cNvPr id="9" name="ZoneTexte 6">
+            <a:extLst>
+              <a:ext uri="{FF2B5EF4-FFF2-40B4-BE49-F238E27FC236}">
+                <a16:creationId xmlns:a16="http://schemas.microsoft.com/office/drawing/2014/main" id="{E0EB010C-A3D0-8EEB-579D-192B37F0C25F}"/>
+              </a:ext>
+            </a:extLst>
+          </p:cNvPr>
+          <p:cNvSpPr txBox="1"/>
+          <p:nvPr/>
+        </p:nvSpPr>
+        <p:spPr>
+          <a:xfrm>
+            <a:off x="3720640" y="2474344"/>
+            <a:ext cx="301686" cy="369332"/>
+          </a:xfrm>
+          <a:prstGeom prst="rect">
+            <a:avLst/>
+          </a:prstGeom>
+          <a:noFill/>
+        </p:spPr>
+        <p:txBody>
+          <a:bodyPr wrap="none" rtlCol="0">
+            <a:spAutoFit/>
+          </a:bodyPr>
+          <a:lstStyle/>
+          <a:p>
+            <a:r>
+              <a:rPr lang="fr-CH" dirty="0"/>
+              <a:t>4</a:t>
+            </a:r>
+          </a:p>
+        </p:txBody>
+      </p:sp>
+      <p:sp>
+        <p:nvSpPr>
+          <p:cNvPr id="10" name="ZoneTexte 6">
+            <a:extLst>
+              <a:ext uri="{FF2B5EF4-FFF2-40B4-BE49-F238E27FC236}">
+                <a16:creationId xmlns:a16="http://schemas.microsoft.com/office/drawing/2014/main" id="{232C7CC2-6F8D-6F34-DE97-5B1C0D12F6B2}"/>
+              </a:ext>
+            </a:extLst>
+          </p:cNvPr>
+          <p:cNvSpPr txBox="1"/>
+          <p:nvPr/>
+        </p:nvSpPr>
+        <p:spPr>
+          <a:xfrm>
+            <a:off x="2990967" y="3244334"/>
+            <a:ext cx="301686" cy="369332"/>
+          </a:xfrm>
+          <a:prstGeom prst="rect">
+            <a:avLst/>
+          </a:prstGeom>
+          <a:noFill/>
+        </p:spPr>
+        <p:txBody>
+          <a:bodyPr wrap="none" rtlCol="0">
+            <a:spAutoFit/>
+          </a:bodyPr>
+          <a:lstStyle/>
+          <a:p>
+            <a:r>
+              <a:rPr lang="fr-CH" dirty="0"/>
+              <a:t>5</a:t>
+            </a:r>
+          </a:p>
+        </p:txBody>
+      </p:sp>
+      <p:sp>
+        <p:nvSpPr>
+          <p:cNvPr id="11" name="ZoneTexte 6">
+            <a:extLst>
+              <a:ext uri="{FF2B5EF4-FFF2-40B4-BE49-F238E27FC236}">
+                <a16:creationId xmlns:a16="http://schemas.microsoft.com/office/drawing/2014/main" id="{B73E4B25-208D-24BE-2E2E-A57D84C5DE5A}"/>
+              </a:ext>
+            </a:extLst>
+          </p:cNvPr>
+          <p:cNvSpPr txBox="1"/>
+          <p:nvPr/>
+        </p:nvSpPr>
+        <p:spPr>
+          <a:xfrm>
+            <a:off x="5102283" y="2917628"/>
+            <a:ext cx="301686" cy="369332"/>
+          </a:xfrm>
+          <a:prstGeom prst="rect">
+            <a:avLst/>
+          </a:prstGeom>
+          <a:noFill/>
+        </p:spPr>
+        <p:txBody>
+          <a:bodyPr wrap="none" rtlCol="0">
+            <a:spAutoFit/>
+          </a:bodyPr>
+          <a:lstStyle/>
+          <a:p>
+            <a:r>
+              <a:rPr lang="fr-CH" dirty="0"/>
+              <a:t>6</a:t>
+            </a:r>
+          </a:p>
+        </p:txBody>
+      </p:sp>
+      <p:sp>
+        <p:nvSpPr>
+          <p:cNvPr id="12" name="ZoneTexte 6">
+            <a:extLst>
+              <a:ext uri="{FF2B5EF4-FFF2-40B4-BE49-F238E27FC236}">
+                <a16:creationId xmlns:a16="http://schemas.microsoft.com/office/drawing/2014/main" id="{E2A960FC-4B8B-A663-5885-966156BACB20}"/>
+              </a:ext>
+            </a:extLst>
+          </p:cNvPr>
+          <p:cNvSpPr txBox="1"/>
+          <p:nvPr/>
+        </p:nvSpPr>
+        <p:spPr>
+          <a:xfrm>
+            <a:off x="7777767" y="1538116"/>
+            <a:ext cx="301686" cy="369332"/>
+          </a:xfrm>
+          <a:prstGeom prst="rect">
+            <a:avLst/>
+          </a:prstGeom>
+          <a:noFill/>
+        </p:spPr>
+        <p:txBody>
+          <a:bodyPr wrap="none" rtlCol="0">
+            <a:spAutoFit/>
+          </a:bodyPr>
+          <a:lstStyle/>
+          <a:p>
+            <a:r>
+              <a:rPr lang="fr-CH" dirty="0"/>
+              <a:t>7</a:t>
+            </a:r>
+          </a:p>
+        </p:txBody>
+      </p:sp>
+      <p:sp>
+        <p:nvSpPr>
+          <p:cNvPr id="13" name="ZoneTexte 6">
+            <a:extLst>
+              <a:ext uri="{FF2B5EF4-FFF2-40B4-BE49-F238E27FC236}">
+                <a16:creationId xmlns:a16="http://schemas.microsoft.com/office/drawing/2014/main" id="{110C0431-2A5E-A1B6-5EFE-3D5B9A9C0642}"/>
+              </a:ext>
+            </a:extLst>
+          </p:cNvPr>
+          <p:cNvSpPr txBox="1"/>
+          <p:nvPr/>
+        </p:nvSpPr>
+        <p:spPr>
+          <a:xfrm>
+            <a:off x="7795169" y="1907448"/>
+            <a:ext cx="301686" cy="369332"/>
+          </a:xfrm>
+          <a:prstGeom prst="rect">
+            <a:avLst/>
+          </a:prstGeom>
+          <a:noFill/>
+        </p:spPr>
+        <p:txBody>
+          <a:bodyPr wrap="none" rtlCol="0">
+            <a:spAutoFit/>
+          </a:bodyPr>
+          <a:lstStyle/>
+          <a:p>
+            <a:r>
+              <a:rPr lang="fr-CH" dirty="0"/>
+              <a:t>8</a:t>
+            </a:r>
+          </a:p>
+        </p:txBody>
+      </p:sp>
+      <p:sp>
+        <p:nvSpPr>
+          <p:cNvPr id="14" name="ZoneTexte 6">
+            <a:extLst>
+              <a:ext uri="{FF2B5EF4-FFF2-40B4-BE49-F238E27FC236}">
+                <a16:creationId xmlns:a16="http://schemas.microsoft.com/office/drawing/2014/main" id="{B43AAA21-C602-78B9-B797-5EE8DB0AEF15}"/>
+              </a:ext>
+            </a:extLst>
+          </p:cNvPr>
+          <p:cNvSpPr txBox="1"/>
+          <p:nvPr/>
+        </p:nvSpPr>
+        <p:spPr>
+          <a:xfrm>
+            <a:off x="7795169" y="2760671"/>
+            <a:ext cx="301686" cy="369332"/>
+          </a:xfrm>
+          <a:prstGeom prst="rect">
+            <a:avLst/>
+          </a:prstGeom>
+          <a:noFill/>
+        </p:spPr>
+        <p:txBody>
+          <a:bodyPr wrap="none" rtlCol="0">
+            <a:spAutoFit/>
+          </a:bodyPr>
+          <a:lstStyle/>
+          <a:p>
+            <a:r>
+              <a:rPr lang="fr-CH" dirty="0"/>
+              <a:t>9</a:t>
+            </a:r>
+          </a:p>
+        </p:txBody>
+      </p:sp>
+      <p:sp>
+        <p:nvSpPr>
+          <p:cNvPr id="15" name="ZoneTexte 6">
+            <a:extLst>
+              <a:ext uri="{FF2B5EF4-FFF2-40B4-BE49-F238E27FC236}">
+                <a16:creationId xmlns:a16="http://schemas.microsoft.com/office/drawing/2014/main" id="{7BB52ED5-5CC4-747E-4440-59F773CAE69E}"/>
+              </a:ext>
+            </a:extLst>
+          </p:cNvPr>
+          <p:cNvSpPr txBox="1"/>
+          <p:nvPr/>
+        </p:nvSpPr>
+        <p:spPr>
+          <a:xfrm>
+            <a:off x="7803809" y="3244334"/>
+            <a:ext cx="418704" cy="369332"/>
+          </a:xfrm>
+          <a:prstGeom prst="rect">
+            <a:avLst/>
+          </a:prstGeom>
+          <a:noFill/>
+        </p:spPr>
+        <p:txBody>
+          <a:bodyPr wrap="none" rtlCol="0">
+            <a:spAutoFit/>
+          </a:bodyPr>
+          <a:lstStyle/>
+          <a:p>
+            <a:r>
+              <a:rPr lang="fr-CH" dirty="0"/>
+              <a:t>10</a:t>
+            </a:r>
+          </a:p>
+        </p:txBody>
+      </p:sp>
+      <p:sp>
+        <p:nvSpPr>
+          <p:cNvPr id="16" name="ZoneTexte 6">
+            <a:extLst>
+              <a:ext uri="{FF2B5EF4-FFF2-40B4-BE49-F238E27FC236}">
+                <a16:creationId xmlns:a16="http://schemas.microsoft.com/office/drawing/2014/main" id="{3EAE9829-BBDD-3A4D-B6A7-8508C2C6A5E2}"/>
+              </a:ext>
+            </a:extLst>
+          </p:cNvPr>
+          <p:cNvSpPr txBox="1"/>
+          <p:nvPr/>
+        </p:nvSpPr>
+        <p:spPr>
+          <a:xfrm>
+            <a:off x="6584610" y="4057135"/>
+            <a:ext cx="418704" cy="369332"/>
+          </a:xfrm>
+          <a:prstGeom prst="rect">
+            <a:avLst/>
+          </a:prstGeom>
+          <a:noFill/>
+        </p:spPr>
+        <p:txBody>
+          <a:bodyPr wrap="none" rtlCol="0">
+            <a:spAutoFit/>
+          </a:bodyPr>
+          <a:lstStyle/>
+          <a:p>
+            <a:r>
+              <a:rPr lang="fr-CH" dirty="0"/>
+              <a:t>11</a:t>
+            </a:r>
+          </a:p>
+        </p:txBody>
+      </p:sp>
+    </p:spTree>
+    <p:extLst>
+      <p:ext uri="{BB962C8B-B14F-4D97-AF65-F5344CB8AC3E}">
+        <p14:creationId xmlns:p14="http://schemas.microsoft.com/office/powerpoint/2010/main" val="4288971629"/>
+      </p:ext>
+    </p:extLst>
+  </p:cSld>
+  <p:clrMapOvr>
+    <a:masterClrMapping/>
+  </p:clrMapOvr>
+</p:sld>
+</file>
+
+<file path=ppt/slides/slide21.xml><?xml version="1.0" encoding="utf-8"?>
+<p:sld xmlns:a="http://schemas.openxmlformats.org/drawingml/2006/main" xmlns:r="http://schemas.openxmlformats.org/officeDocument/2006/relationships" xmlns:p="http://schemas.openxmlformats.org/presentationml/2006/main">
+  <p:cSld>
+    <p:spTree>
+      <p:nvGrpSpPr>
+        <p:cNvPr id="1" name=""/>
+        <p:cNvGrpSpPr/>
+        <p:nvPr/>
+      </p:nvGrpSpPr>
+      <p:grpSpPr>
+        <a:xfrm>
+          <a:off x="0" y="0"/>
+          <a:ext cx="0" cy="0"/>
+          <a:chOff x="0" y="0"/>
+          <a:chExt cx="0" cy="0"/>
+        </a:xfrm>
+      </p:grpSpPr>
+      <p:pic>
+        <p:nvPicPr>
           <p:cNvPr id="15" name="Picture 14">
             <a:extLst>
               <a:ext uri="{FF2B5EF4-FFF2-40B4-BE49-F238E27FC236}">
@@ -10634,7 +10933,7 @@
 </p:sld>
 </file>
 
-<file path=ppt/slides/slide21.xml><?xml version="1.0" encoding="utf-8"?>
+<file path=ppt/slides/slide22.xml><?xml version="1.0" encoding="utf-8"?>
 <p:sld xmlns:a="http://schemas.openxmlformats.org/drawingml/2006/main" xmlns:r="http://schemas.openxmlformats.org/officeDocument/2006/relationships" xmlns:p="http://schemas.openxmlformats.org/presentationml/2006/main">
   <p:cSld>
     <p:spTree>

</xml_diff>

<commit_message>
update manual Frequencying module
Writting of the manual for the frequencying module
</commit_message>
<xml_diff>
--- a/Manuels/picture_EEGpal_manuals.pptx
+++ b/Manuels/picture_EEGpal_manuals.pptx
@@ -5,7 +5,7 @@
     <p:sldMasterId id="2147483648" r:id="rId1"/>
   </p:sldMasterIdLst>
   <p:notesMasterIdLst>
-    <p:notesMasterId r:id="rId24"/>
+    <p:notesMasterId r:id="rId25"/>
   </p:notesMasterIdLst>
   <p:sldIdLst>
     <p:sldId id="292" r:id="rId2"/>
@@ -27,9 +27,10 @@
     <p:sldId id="293" r:id="rId18"/>
     <p:sldId id="283" r:id="rId19"/>
     <p:sldId id="285" r:id="rId20"/>
-    <p:sldId id="289" r:id="rId21"/>
-    <p:sldId id="291" r:id="rId22"/>
-    <p:sldId id="290" r:id="rId23"/>
+    <p:sldId id="262" r:id="rId21"/>
+    <p:sldId id="289" r:id="rId22"/>
+    <p:sldId id="291" r:id="rId23"/>
+    <p:sldId id="290" r:id="rId24"/>
   </p:sldIdLst>
   <p:sldSz cx="9144000" cy="6858000" type="screen4x3"/>
   <p:notesSz cx="6858000" cy="9144000"/>
@@ -182,6 +183,11 @@
             <p14:sldId id="285"/>
           </p14:sldIdLst>
         </p14:section>
+        <p14:section name="Frequencying" id="{68112E2D-F207-4214-A1DF-88EAADD61136}">
+          <p14:sldIdLst>
+            <p14:sldId id="262"/>
+          </p14:sldIdLst>
+        </p14:section>
         <p14:section name="Find Peaks" id="{547D6727-7F9F-4066-AB7B-628195AC32DC}">
           <p14:sldIdLst>
             <p14:sldId id="289"/>
@@ -291,7 +297,7 @@
           <a:p>
             <a:fld id="{AE28F081-F961-4F1D-B0FD-EEC618487470}" type="datetimeFigureOut">
               <a:rPr lang="en-US" smtClean="0"/>
-              <a:t>10/27/2024</a:t>
+              <a:t>11/10/2024</a:t>
             </a:fld>
             <a:endParaRPr lang="en-US"/>
           </a:p>
@@ -739,7 +745,7 @@
           <a:p>
             <a:fld id="{BCB0654D-2F9E-40DC-B910-8F58A623289D}" type="datetimeFigureOut">
               <a:rPr lang="fr-CH" smtClean="0"/>
-              <a:t>27.10.2024</a:t>
+              <a:t>10.11.2024</a:t>
             </a:fld>
             <a:endParaRPr lang="fr-CH"/>
           </a:p>
@@ -909,7 +915,7 @@
           <a:p>
             <a:fld id="{BCB0654D-2F9E-40DC-B910-8F58A623289D}" type="datetimeFigureOut">
               <a:rPr lang="fr-CH" smtClean="0"/>
-              <a:t>27.10.2024</a:t>
+              <a:t>10.11.2024</a:t>
             </a:fld>
             <a:endParaRPr lang="fr-CH"/>
           </a:p>
@@ -1089,7 +1095,7 @@
           <a:p>
             <a:fld id="{BCB0654D-2F9E-40DC-B910-8F58A623289D}" type="datetimeFigureOut">
               <a:rPr lang="fr-CH" smtClean="0"/>
-              <a:t>27.10.2024</a:t>
+              <a:t>10.11.2024</a:t>
             </a:fld>
             <a:endParaRPr lang="fr-CH"/>
           </a:p>
@@ -1259,7 +1265,7 @@
           <a:p>
             <a:fld id="{BCB0654D-2F9E-40DC-B910-8F58A623289D}" type="datetimeFigureOut">
               <a:rPr lang="fr-CH" smtClean="0"/>
-              <a:t>27.10.2024</a:t>
+              <a:t>10.11.2024</a:t>
             </a:fld>
             <a:endParaRPr lang="fr-CH"/>
           </a:p>
@@ -1505,7 +1511,7 @@
           <a:p>
             <a:fld id="{BCB0654D-2F9E-40DC-B910-8F58A623289D}" type="datetimeFigureOut">
               <a:rPr lang="fr-CH" smtClean="0"/>
-              <a:t>27.10.2024</a:t>
+              <a:t>10.11.2024</a:t>
             </a:fld>
             <a:endParaRPr lang="fr-CH"/>
           </a:p>
@@ -1793,7 +1799,7 @@
           <a:p>
             <a:fld id="{BCB0654D-2F9E-40DC-B910-8F58A623289D}" type="datetimeFigureOut">
               <a:rPr lang="fr-CH" smtClean="0"/>
-              <a:t>27.10.2024</a:t>
+              <a:t>10.11.2024</a:t>
             </a:fld>
             <a:endParaRPr lang="fr-CH"/>
           </a:p>
@@ -2215,7 +2221,7 @@
           <a:p>
             <a:fld id="{BCB0654D-2F9E-40DC-B910-8F58A623289D}" type="datetimeFigureOut">
               <a:rPr lang="fr-CH" smtClean="0"/>
-              <a:t>27.10.2024</a:t>
+              <a:t>10.11.2024</a:t>
             </a:fld>
             <a:endParaRPr lang="fr-CH"/>
           </a:p>
@@ -2333,7 +2339,7 @@
           <a:p>
             <a:fld id="{BCB0654D-2F9E-40DC-B910-8F58A623289D}" type="datetimeFigureOut">
               <a:rPr lang="fr-CH" smtClean="0"/>
-              <a:t>27.10.2024</a:t>
+              <a:t>10.11.2024</a:t>
             </a:fld>
             <a:endParaRPr lang="fr-CH"/>
           </a:p>
@@ -2428,7 +2434,7 @@
           <a:p>
             <a:fld id="{BCB0654D-2F9E-40DC-B910-8F58A623289D}" type="datetimeFigureOut">
               <a:rPr lang="fr-CH" smtClean="0"/>
-              <a:t>27.10.2024</a:t>
+              <a:t>10.11.2024</a:t>
             </a:fld>
             <a:endParaRPr lang="fr-CH"/>
           </a:p>
@@ -2705,7 +2711,7 @@
           <a:p>
             <a:fld id="{BCB0654D-2F9E-40DC-B910-8F58A623289D}" type="datetimeFigureOut">
               <a:rPr lang="fr-CH" smtClean="0"/>
-              <a:t>27.10.2024</a:t>
+              <a:t>10.11.2024</a:t>
             </a:fld>
             <a:endParaRPr lang="fr-CH"/>
           </a:p>
@@ -2958,7 +2964,7 @@
           <a:p>
             <a:fld id="{BCB0654D-2F9E-40DC-B910-8F58A623289D}" type="datetimeFigureOut">
               <a:rPr lang="fr-CH" smtClean="0"/>
-              <a:t>27.10.2024</a:t>
+              <a:t>10.11.2024</a:t>
             </a:fld>
             <a:endParaRPr lang="fr-CH"/>
           </a:p>
@@ -3171,7 +3177,7 @@
           <a:p>
             <a:fld id="{BCB0654D-2F9E-40DC-B910-8F58A623289D}" type="datetimeFigureOut">
               <a:rPr lang="fr-CH" smtClean="0"/>
-              <a:t>27.10.2024</a:t>
+              <a:t>10.11.2024</a:t>
             </a:fld>
             <a:endParaRPr lang="fr-CH"/>
           </a:p>
@@ -10170,7 +10176,7 @@
           <p:cNvPr id="5" name="Picture 4">
             <a:extLst>
               <a:ext uri="{FF2B5EF4-FFF2-40B4-BE49-F238E27FC236}">
-                <a16:creationId xmlns:a16="http://schemas.microsoft.com/office/drawing/2014/main" id="{B9DE361F-9ED5-4568-E67B-DD52E5FFA4BD}"/>
+                <a16:creationId xmlns:a16="http://schemas.microsoft.com/office/drawing/2014/main" id="{AAF6D85C-CAA8-80AD-88AE-E210B28FCAFC}"/>
               </a:ext>
             </a:extLst>
           </p:cNvPr>
@@ -10187,8 +10193,8 @@
         </p:blipFill>
         <p:spPr>
           <a:xfrm>
-            <a:off x="591127" y="1174736"/>
-            <a:ext cx="7499927" cy="3485785"/>
+            <a:off x="1220468" y="0"/>
+            <a:ext cx="6703063" cy="6858000"/>
           </a:xfrm>
           <a:prstGeom prst="rect">
             <a:avLst/>
@@ -10197,19 +10203,19 @@
       </p:pic>
       <p:sp>
         <p:nvSpPr>
-          <p:cNvPr id="6" name="ZoneTexte 6">
-            <a:extLst>
-              <a:ext uri="{FF2B5EF4-FFF2-40B4-BE49-F238E27FC236}">
-                <a16:creationId xmlns:a16="http://schemas.microsoft.com/office/drawing/2014/main" id="{2ED8FE06-1F26-567C-8688-6B406B1A9A64}"/>
-              </a:ext>
-            </a:extLst>
-          </p:cNvPr>
-          <p:cNvSpPr txBox="1"/>
-          <p:nvPr/>
-        </p:nvSpPr>
-        <p:spPr>
-          <a:xfrm>
-            <a:off x="2073504" y="1907448"/>
+          <p:cNvPr id="11" name="ZoneTexte 11">
+            <a:extLst>
+              <a:ext uri="{FF2B5EF4-FFF2-40B4-BE49-F238E27FC236}">
+                <a16:creationId xmlns:a16="http://schemas.microsoft.com/office/drawing/2014/main" id="{63472AD8-6466-479C-9D84-11D3DAC79459}"/>
+              </a:ext>
+            </a:extLst>
+          </p:cNvPr>
+          <p:cNvSpPr txBox="1"/>
+          <p:nvPr/>
+        </p:nvSpPr>
+        <p:spPr>
+          <a:xfrm>
+            <a:off x="4826927" y="1182070"/>
             <a:ext cx="301686" cy="369332"/>
           </a:xfrm>
           <a:prstGeom prst="rect">
@@ -10232,19 +10238,19 @@
       </p:sp>
       <p:sp>
         <p:nvSpPr>
-          <p:cNvPr id="7" name="ZoneTexte 6">
-            <a:extLst>
-              <a:ext uri="{FF2B5EF4-FFF2-40B4-BE49-F238E27FC236}">
-                <a16:creationId xmlns:a16="http://schemas.microsoft.com/office/drawing/2014/main" id="{64CDFA9F-B37D-C28C-D064-203FC41BAFE1}"/>
-              </a:ext>
-            </a:extLst>
-          </p:cNvPr>
-          <p:cNvSpPr txBox="1"/>
-          <p:nvPr/>
-        </p:nvSpPr>
-        <p:spPr>
-          <a:xfrm>
-            <a:off x="5564849" y="1907448"/>
+          <p:cNvPr id="14" name="ZoneTexte 11">
+            <a:extLst>
+              <a:ext uri="{FF2B5EF4-FFF2-40B4-BE49-F238E27FC236}">
+                <a16:creationId xmlns:a16="http://schemas.microsoft.com/office/drawing/2014/main" id="{738E938D-EB16-4C24-B4BC-B5DF50FC1710}"/>
+              </a:ext>
+            </a:extLst>
+          </p:cNvPr>
+          <p:cNvSpPr txBox="1"/>
+          <p:nvPr/>
+        </p:nvSpPr>
+        <p:spPr>
+          <a:xfrm>
+            <a:off x="3298248" y="2171520"/>
             <a:ext cx="301686" cy="369332"/>
           </a:xfrm>
           <a:prstGeom prst="rect">
@@ -10267,19 +10273,737 @@
       </p:sp>
       <p:sp>
         <p:nvSpPr>
-          <p:cNvPr id="8" name="ZoneTexte 6">
-            <a:extLst>
-              <a:ext uri="{FF2B5EF4-FFF2-40B4-BE49-F238E27FC236}">
-                <a16:creationId xmlns:a16="http://schemas.microsoft.com/office/drawing/2014/main" id="{83929B2F-BA9B-E645-FCD7-B43F9A3E73EB}"/>
-              </a:ext>
-            </a:extLst>
-          </p:cNvPr>
-          <p:cNvSpPr txBox="1"/>
-          <p:nvPr/>
-        </p:nvSpPr>
-        <p:spPr>
-          <a:xfrm>
-            <a:off x="2113512" y="2760671"/>
+          <p:cNvPr id="16" name="ZoneTexte 11">
+            <a:extLst>
+              <a:ext uri="{FF2B5EF4-FFF2-40B4-BE49-F238E27FC236}">
+                <a16:creationId xmlns:a16="http://schemas.microsoft.com/office/drawing/2014/main" id="{77EE01F6-0ADD-40AE-8B2F-47286EB6B77D}"/>
+              </a:ext>
+            </a:extLst>
+          </p:cNvPr>
+          <p:cNvSpPr txBox="1"/>
+          <p:nvPr/>
+        </p:nvSpPr>
+        <p:spPr>
+          <a:xfrm>
+            <a:off x="3280886" y="3373560"/>
+            <a:ext cx="301686" cy="369332"/>
+          </a:xfrm>
+          <a:prstGeom prst="rect">
+            <a:avLst/>
+          </a:prstGeom>
+          <a:noFill/>
+        </p:spPr>
+        <p:txBody>
+          <a:bodyPr wrap="none" rtlCol="0">
+            <a:spAutoFit/>
+          </a:bodyPr>
+          <a:lstStyle/>
+          <a:p>
+            <a:r>
+              <a:rPr lang="fr-CH" dirty="0"/>
+              <a:t>5</a:t>
+            </a:r>
+          </a:p>
+        </p:txBody>
+      </p:sp>
+      <p:sp>
+        <p:nvSpPr>
+          <p:cNvPr id="19" name="ZoneTexte 11">
+            <a:extLst>
+              <a:ext uri="{FF2B5EF4-FFF2-40B4-BE49-F238E27FC236}">
+                <a16:creationId xmlns:a16="http://schemas.microsoft.com/office/drawing/2014/main" id="{408FC801-FF89-40DE-AF26-50224D7B6A87}"/>
+              </a:ext>
+            </a:extLst>
+          </p:cNvPr>
+          <p:cNvSpPr txBox="1"/>
+          <p:nvPr/>
+        </p:nvSpPr>
+        <p:spPr>
+          <a:xfrm>
+            <a:off x="3281453" y="3747699"/>
+            <a:ext cx="301686" cy="369332"/>
+          </a:xfrm>
+          <a:prstGeom prst="rect">
+            <a:avLst/>
+          </a:prstGeom>
+          <a:noFill/>
+        </p:spPr>
+        <p:txBody>
+          <a:bodyPr wrap="none" rtlCol="0">
+            <a:spAutoFit/>
+          </a:bodyPr>
+          <a:lstStyle/>
+          <a:p>
+            <a:r>
+              <a:rPr lang="fr-CH" dirty="0"/>
+              <a:t>6</a:t>
+            </a:r>
+          </a:p>
+        </p:txBody>
+      </p:sp>
+      <p:sp>
+        <p:nvSpPr>
+          <p:cNvPr id="21" name="ZoneTexte 11">
+            <a:extLst>
+              <a:ext uri="{FF2B5EF4-FFF2-40B4-BE49-F238E27FC236}">
+                <a16:creationId xmlns:a16="http://schemas.microsoft.com/office/drawing/2014/main" id="{1586F6FC-9023-4E31-920A-FAA542747504}"/>
+              </a:ext>
+            </a:extLst>
+          </p:cNvPr>
+          <p:cNvSpPr txBox="1"/>
+          <p:nvPr/>
+        </p:nvSpPr>
+        <p:spPr>
+          <a:xfrm>
+            <a:off x="4421156" y="4530729"/>
+            <a:ext cx="301686" cy="369332"/>
+          </a:xfrm>
+          <a:prstGeom prst="rect">
+            <a:avLst/>
+          </a:prstGeom>
+          <a:noFill/>
+        </p:spPr>
+        <p:txBody>
+          <a:bodyPr wrap="none" rtlCol="0">
+            <a:spAutoFit/>
+          </a:bodyPr>
+          <a:lstStyle/>
+          <a:p>
+            <a:r>
+              <a:rPr lang="fr-CH" dirty="0"/>
+              <a:t>7</a:t>
+            </a:r>
+          </a:p>
+        </p:txBody>
+      </p:sp>
+      <p:sp>
+        <p:nvSpPr>
+          <p:cNvPr id="22" name="ZoneTexte 11">
+            <a:extLst>
+              <a:ext uri="{FF2B5EF4-FFF2-40B4-BE49-F238E27FC236}">
+                <a16:creationId xmlns:a16="http://schemas.microsoft.com/office/drawing/2014/main" id="{0CE95B67-113D-47F7-88C7-FB6411BC2ECC}"/>
+              </a:ext>
+            </a:extLst>
+          </p:cNvPr>
+          <p:cNvSpPr txBox="1"/>
+          <p:nvPr/>
+        </p:nvSpPr>
+        <p:spPr>
+          <a:xfrm>
+            <a:off x="4421156" y="5325429"/>
+            <a:ext cx="301686" cy="369332"/>
+          </a:xfrm>
+          <a:prstGeom prst="rect">
+            <a:avLst/>
+          </a:prstGeom>
+          <a:noFill/>
+        </p:spPr>
+        <p:txBody>
+          <a:bodyPr wrap="none" rtlCol="0">
+            <a:spAutoFit/>
+          </a:bodyPr>
+          <a:lstStyle/>
+          <a:p>
+            <a:r>
+              <a:rPr lang="fr-CH" dirty="0"/>
+              <a:t>8</a:t>
+            </a:r>
+          </a:p>
+        </p:txBody>
+      </p:sp>
+      <p:sp>
+        <p:nvSpPr>
+          <p:cNvPr id="25" name="ZoneTexte 11">
+            <a:extLst>
+              <a:ext uri="{FF2B5EF4-FFF2-40B4-BE49-F238E27FC236}">
+                <a16:creationId xmlns:a16="http://schemas.microsoft.com/office/drawing/2014/main" id="{3B115D02-24D3-422A-995B-A95EB8F3F5EE}"/>
+              </a:ext>
+            </a:extLst>
+          </p:cNvPr>
+          <p:cNvSpPr txBox="1"/>
+          <p:nvPr/>
+        </p:nvSpPr>
+        <p:spPr>
+          <a:xfrm>
+            <a:off x="1152274" y="939396"/>
+            <a:ext cx="301686" cy="369332"/>
+          </a:xfrm>
+          <a:prstGeom prst="rect">
+            <a:avLst/>
+          </a:prstGeom>
+          <a:noFill/>
+        </p:spPr>
+        <p:txBody>
+          <a:bodyPr wrap="none" rtlCol="0">
+            <a:spAutoFit/>
+          </a:bodyPr>
+          <a:lstStyle/>
+          <a:p>
+            <a:r>
+              <a:rPr lang="fr-CH" dirty="0"/>
+              <a:t>9</a:t>
+            </a:r>
+          </a:p>
+        </p:txBody>
+      </p:sp>
+      <p:sp>
+        <p:nvSpPr>
+          <p:cNvPr id="26" name="ZoneTexte 11">
+            <a:extLst>
+              <a:ext uri="{FF2B5EF4-FFF2-40B4-BE49-F238E27FC236}">
+                <a16:creationId xmlns:a16="http://schemas.microsoft.com/office/drawing/2014/main" id="{A18C9203-97A2-4545-BB47-96851C316D85}"/>
+              </a:ext>
+            </a:extLst>
+          </p:cNvPr>
+          <p:cNvSpPr txBox="1"/>
+          <p:nvPr/>
+        </p:nvSpPr>
+        <p:spPr>
+          <a:xfrm>
+            <a:off x="1031431" y="1776933"/>
+            <a:ext cx="418704" cy="369332"/>
+          </a:xfrm>
+          <a:prstGeom prst="rect">
+            <a:avLst/>
+          </a:prstGeom>
+          <a:noFill/>
+        </p:spPr>
+        <p:txBody>
+          <a:bodyPr wrap="none" rtlCol="0">
+            <a:spAutoFit/>
+          </a:bodyPr>
+          <a:lstStyle/>
+          <a:p>
+            <a:r>
+              <a:rPr lang="fr-CH" dirty="0"/>
+              <a:t>10</a:t>
+            </a:r>
+          </a:p>
+        </p:txBody>
+      </p:sp>
+      <p:sp>
+        <p:nvSpPr>
+          <p:cNvPr id="2" name="ZoneTexte 11">
+            <a:extLst>
+              <a:ext uri="{FF2B5EF4-FFF2-40B4-BE49-F238E27FC236}">
+                <a16:creationId xmlns:a16="http://schemas.microsoft.com/office/drawing/2014/main" id="{08E34931-3CEA-04D1-95B4-733E7D869CB6}"/>
+              </a:ext>
+            </a:extLst>
+          </p:cNvPr>
+          <p:cNvSpPr txBox="1"/>
+          <p:nvPr/>
+        </p:nvSpPr>
+        <p:spPr>
+          <a:xfrm>
+            <a:off x="1011116" y="6284790"/>
+            <a:ext cx="418704" cy="369332"/>
+          </a:xfrm>
+          <a:prstGeom prst="rect">
+            <a:avLst/>
+          </a:prstGeom>
+          <a:noFill/>
+        </p:spPr>
+        <p:txBody>
+          <a:bodyPr wrap="none" rtlCol="0">
+            <a:spAutoFit/>
+          </a:bodyPr>
+          <a:lstStyle/>
+          <a:p>
+            <a:r>
+              <a:rPr lang="fr-CH" dirty="0"/>
+              <a:t>16</a:t>
+            </a:r>
+          </a:p>
+        </p:txBody>
+      </p:sp>
+      <p:sp>
+        <p:nvSpPr>
+          <p:cNvPr id="3" name="Rectangle 2">
+            <a:extLst>
+              <a:ext uri="{FF2B5EF4-FFF2-40B4-BE49-F238E27FC236}">
+                <a16:creationId xmlns:a16="http://schemas.microsoft.com/office/drawing/2014/main" id="{EA3E545E-26A0-C391-190E-E9250350C6D3}"/>
+              </a:ext>
+            </a:extLst>
+          </p:cNvPr>
+          <p:cNvSpPr/>
+          <p:nvPr/>
+        </p:nvSpPr>
+        <p:spPr>
+          <a:xfrm>
+            <a:off x="3365838" y="535983"/>
+            <a:ext cx="2059619" cy="1318548"/>
+          </a:xfrm>
+          <a:prstGeom prst="rect">
+            <a:avLst/>
+          </a:prstGeom>
+          <a:noFill/>
+          <a:ln w="28575" cap="flat" cmpd="sng" algn="ctr">
+            <a:solidFill>
+              <a:srgbClr val="FF0000"/>
+            </a:solidFill>
+            <a:prstDash val="solid"/>
+            <a:round/>
+            <a:headEnd type="none" w="med" len="med"/>
+            <a:tailEnd type="none" w="med" len="med"/>
+          </a:ln>
+        </p:spPr>
+        <p:style>
+          <a:lnRef idx="0">
+            <a:scrgbClr r="0" g="0" b="0"/>
+          </a:lnRef>
+          <a:fillRef idx="0">
+            <a:scrgbClr r="0" g="0" b="0"/>
+          </a:fillRef>
+          <a:effectRef idx="0">
+            <a:scrgbClr r="0" g="0" b="0"/>
+          </a:effectRef>
+          <a:fontRef idx="minor">
+            <a:schemeClr val="accent6"/>
+          </a:fontRef>
+        </p:style>
+        <p:txBody>
+          <a:bodyPr rtlCol="0" anchor="ctr"/>
+          <a:lstStyle/>
+          <a:p>
+            <a:pPr algn="ctr"/>
+            <a:endParaRPr lang="en-US"/>
+          </a:p>
+        </p:txBody>
+      </p:sp>
+      <p:sp>
+        <p:nvSpPr>
+          <p:cNvPr id="4" name="TextBox 3">
+            <a:extLst>
+              <a:ext uri="{FF2B5EF4-FFF2-40B4-BE49-F238E27FC236}">
+                <a16:creationId xmlns:a16="http://schemas.microsoft.com/office/drawing/2014/main" id="{97CA5A05-7367-0282-F0CF-37186DA41DC2}"/>
+              </a:ext>
+            </a:extLst>
+          </p:cNvPr>
+          <p:cNvSpPr txBox="1"/>
+          <p:nvPr/>
+        </p:nvSpPr>
+        <p:spPr>
+          <a:xfrm>
+            <a:off x="5493047" y="351317"/>
+            <a:ext cx="317716" cy="369332"/>
+          </a:xfrm>
+          <a:prstGeom prst="rect">
+            <a:avLst/>
+          </a:prstGeom>
+          <a:noFill/>
+        </p:spPr>
+        <p:txBody>
+          <a:bodyPr wrap="none" rtlCol="0">
+            <a:spAutoFit/>
+          </a:bodyPr>
+          <a:lstStyle/>
+          <a:p>
+            <a:r>
+              <a:rPr lang="en-US" dirty="0">
+                <a:solidFill>
+                  <a:srgbClr val="FF0000"/>
+                </a:solidFill>
+              </a:rPr>
+              <a:t>A</a:t>
+            </a:r>
+          </a:p>
+        </p:txBody>
+      </p:sp>
+      <p:sp>
+        <p:nvSpPr>
+          <p:cNvPr id="6" name="Rectangle 5">
+            <a:extLst>
+              <a:ext uri="{FF2B5EF4-FFF2-40B4-BE49-F238E27FC236}">
+                <a16:creationId xmlns:a16="http://schemas.microsoft.com/office/drawing/2014/main" id="{ADD79F38-241D-A6C0-240D-F6CFC3D5A0F8}"/>
+              </a:ext>
+            </a:extLst>
+          </p:cNvPr>
+          <p:cNvSpPr/>
+          <p:nvPr/>
+        </p:nvSpPr>
+        <p:spPr>
+          <a:xfrm>
+            <a:off x="3365838" y="1938887"/>
+            <a:ext cx="2059619" cy="2437983"/>
+          </a:xfrm>
+          <a:prstGeom prst="rect">
+            <a:avLst/>
+          </a:prstGeom>
+          <a:noFill/>
+          <a:ln>
+            <a:solidFill>
+              <a:schemeClr val="accent1">
+                <a:lumMod val="75000"/>
+              </a:schemeClr>
+            </a:solidFill>
+          </a:ln>
+        </p:spPr>
+        <p:style>
+          <a:lnRef idx="2">
+            <a:schemeClr val="accent1">
+              <a:shade val="50000"/>
+            </a:schemeClr>
+          </a:lnRef>
+          <a:fillRef idx="1">
+            <a:schemeClr val="accent1"/>
+          </a:fillRef>
+          <a:effectRef idx="0">
+            <a:schemeClr val="accent1"/>
+          </a:effectRef>
+          <a:fontRef idx="minor">
+            <a:schemeClr val="lt1"/>
+          </a:fontRef>
+        </p:style>
+        <p:txBody>
+          <a:bodyPr rtlCol="0" anchor="ctr"/>
+          <a:lstStyle/>
+          <a:p>
+            <a:pPr algn="ctr"/>
+            <a:endParaRPr lang="fr-CH"/>
+          </a:p>
+        </p:txBody>
+      </p:sp>
+      <p:sp>
+        <p:nvSpPr>
+          <p:cNvPr id="8" name="Rectangle 7">
+            <a:extLst>
+              <a:ext uri="{FF2B5EF4-FFF2-40B4-BE49-F238E27FC236}">
+                <a16:creationId xmlns:a16="http://schemas.microsoft.com/office/drawing/2014/main" id="{FF8DE0B4-DD08-62AF-5865-5BFE155484E0}"/>
+              </a:ext>
+            </a:extLst>
+          </p:cNvPr>
+          <p:cNvSpPr/>
+          <p:nvPr/>
+        </p:nvSpPr>
+        <p:spPr>
+          <a:xfrm>
+            <a:off x="3365838" y="4479524"/>
+            <a:ext cx="2059619" cy="1985075"/>
+          </a:xfrm>
+          <a:prstGeom prst="rect">
+            <a:avLst/>
+          </a:prstGeom>
+          <a:noFill/>
+          <a:ln>
+            <a:solidFill>
+              <a:schemeClr val="accent3">
+                <a:lumMod val="75000"/>
+              </a:schemeClr>
+            </a:solidFill>
+          </a:ln>
+        </p:spPr>
+        <p:style>
+          <a:lnRef idx="2">
+            <a:schemeClr val="accent1">
+              <a:shade val="50000"/>
+            </a:schemeClr>
+          </a:lnRef>
+          <a:fillRef idx="1">
+            <a:schemeClr val="accent1"/>
+          </a:fillRef>
+          <a:effectRef idx="0">
+            <a:schemeClr val="accent1"/>
+          </a:effectRef>
+          <a:fontRef idx="minor">
+            <a:schemeClr val="lt1"/>
+          </a:fontRef>
+        </p:style>
+        <p:txBody>
+          <a:bodyPr rtlCol="0" anchor="ctr"/>
+          <a:lstStyle/>
+          <a:p>
+            <a:pPr algn="ctr"/>
+            <a:endParaRPr lang="fr-CH"/>
+          </a:p>
+        </p:txBody>
+      </p:sp>
+      <p:sp>
+        <p:nvSpPr>
+          <p:cNvPr id="12" name="Rectangle 11">
+            <a:extLst>
+              <a:ext uri="{FF2B5EF4-FFF2-40B4-BE49-F238E27FC236}">
+                <a16:creationId xmlns:a16="http://schemas.microsoft.com/office/drawing/2014/main" id="{BAA1652A-FF4C-BE48-59DF-18FAFB49C9C9}"/>
+              </a:ext>
+            </a:extLst>
+          </p:cNvPr>
+          <p:cNvSpPr/>
+          <p:nvPr/>
+        </p:nvSpPr>
+        <p:spPr>
+          <a:xfrm>
+            <a:off x="1031431" y="662443"/>
+            <a:ext cx="2290413" cy="2766557"/>
+          </a:xfrm>
+          <a:prstGeom prst="rect">
+            <a:avLst/>
+          </a:prstGeom>
+          <a:noFill/>
+          <a:ln>
+            <a:solidFill>
+              <a:schemeClr val="accent2">
+                <a:lumMod val="75000"/>
+              </a:schemeClr>
+            </a:solidFill>
+          </a:ln>
+        </p:spPr>
+        <p:style>
+          <a:lnRef idx="2">
+            <a:schemeClr val="accent1">
+              <a:shade val="50000"/>
+            </a:schemeClr>
+          </a:lnRef>
+          <a:fillRef idx="1">
+            <a:schemeClr val="accent1"/>
+          </a:fillRef>
+          <a:effectRef idx="0">
+            <a:schemeClr val="accent1"/>
+          </a:effectRef>
+          <a:fontRef idx="minor">
+            <a:schemeClr val="lt1"/>
+          </a:fontRef>
+        </p:style>
+        <p:txBody>
+          <a:bodyPr rtlCol="0" anchor="ctr"/>
+          <a:lstStyle/>
+          <a:p>
+            <a:pPr algn="ctr"/>
+            <a:endParaRPr lang="fr-CH"/>
+          </a:p>
+        </p:txBody>
+      </p:sp>
+      <p:sp>
+        <p:nvSpPr>
+          <p:cNvPr id="15" name="TextBox 14">
+            <a:extLst>
+              <a:ext uri="{FF2B5EF4-FFF2-40B4-BE49-F238E27FC236}">
+                <a16:creationId xmlns:a16="http://schemas.microsoft.com/office/drawing/2014/main" id="{678E20C1-5181-04C7-ED97-2962DFF71BEF}"/>
+              </a:ext>
+            </a:extLst>
+          </p:cNvPr>
+          <p:cNvSpPr txBox="1"/>
+          <p:nvPr/>
+        </p:nvSpPr>
+        <p:spPr>
+          <a:xfrm>
+            <a:off x="5493047" y="4375827"/>
+            <a:ext cx="317716" cy="369332"/>
+          </a:xfrm>
+          <a:prstGeom prst="rect">
+            <a:avLst/>
+          </a:prstGeom>
+          <a:noFill/>
+        </p:spPr>
+        <p:txBody>
+          <a:bodyPr wrap="none" rtlCol="0">
+            <a:spAutoFit/>
+          </a:bodyPr>
+          <a:lstStyle/>
+          <a:p>
+            <a:r>
+              <a:rPr lang="en-US" dirty="0">
+                <a:solidFill>
+                  <a:schemeClr val="accent3">
+                    <a:lumMod val="75000"/>
+                  </a:schemeClr>
+                </a:solidFill>
+              </a:rPr>
+              <a:t>C</a:t>
+            </a:r>
+          </a:p>
+        </p:txBody>
+      </p:sp>
+      <p:sp>
+        <p:nvSpPr>
+          <p:cNvPr id="18" name="TextBox 17">
+            <a:extLst>
+              <a:ext uri="{FF2B5EF4-FFF2-40B4-BE49-F238E27FC236}">
+                <a16:creationId xmlns:a16="http://schemas.microsoft.com/office/drawing/2014/main" id="{90EE4E07-0ACA-4FD3-A09C-0625B8C6794B}"/>
+              </a:ext>
+            </a:extLst>
+          </p:cNvPr>
+          <p:cNvSpPr txBox="1"/>
+          <p:nvPr/>
+        </p:nvSpPr>
+        <p:spPr>
+          <a:xfrm>
+            <a:off x="685549" y="652871"/>
+            <a:ext cx="327334" cy="369332"/>
+          </a:xfrm>
+          <a:prstGeom prst="rect">
+            <a:avLst/>
+          </a:prstGeom>
+          <a:noFill/>
+        </p:spPr>
+        <p:txBody>
+          <a:bodyPr wrap="none" rtlCol="0">
+            <a:spAutoFit/>
+          </a:bodyPr>
+          <a:lstStyle/>
+          <a:p>
+            <a:r>
+              <a:rPr lang="en-US" dirty="0">
+                <a:solidFill>
+                  <a:schemeClr val="accent2">
+                    <a:lumMod val="75000"/>
+                  </a:schemeClr>
+                </a:solidFill>
+              </a:rPr>
+              <a:t>D</a:t>
+            </a:r>
+          </a:p>
+        </p:txBody>
+      </p:sp>
+      <p:sp>
+        <p:nvSpPr>
+          <p:cNvPr id="23" name="TextBox 22">
+            <a:extLst>
+              <a:ext uri="{FF2B5EF4-FFF2-40B4-BE49-F238E27FC236}">
+                <a16:creationId xmlns:a16="http://schemas.microsoft.com/office/drawing/2014/main" id="{45A846A9-F91A-8261-340D-70086C595CEB}"/>
+              </a:ext>
+            </a:extLst>
+          </p:cNvPr>
+          <p:cNvSpPr txBox="1"/>
+          <p:nvPr/>
+        </p:nvSpPr>
+        <p:spPr>
+          <a:xfrm>
+            <a:off x="5493047" y="1944508"/>
+            <a:ext cx="317716" cy="369332"/>
+          </a:xfrm>
+          <a:prstGeom prst="rect">
+            <a:avLst/>
+          </a:prstGeom>
+          <a:noFill/>
+        </p:spPr>
+        <p:txBody>
+          <a:bodyPr wrap="none" rtlCol="0">
+            <a:spAutoFit/>
+          </a:bodyPr>
+          <a:lstStyle/>
+          <a:p>
+            <a:r>
+              <a:rPr lang="en-US" dirty="0">
+                <a:solidFill>
+                  <a:schemeClr val="accent5">
+                    <a:lumMod val="75000"/>
+                  </a:schemeClr>
+                </a:solidFill>
+              </a:rPr>
+              <a:t>B</a:t>
+            </a:r>
+          </a:p>
+        </p:txBody>
+      </p:sp>
+      <p:sp>
+        <p:nvSpPr>
+          <p:cNvPr id="24" name="Rectangle 23">
+            <a:extLst>
+              <a:ext uri="{FF2B5EF4-FFF2-40B4-BE49-F238E27FC236}">
+                <a16:creationId xmlns:a16="http://schemas.microsoft.com/office/drawing/2014/main" id="{3EAF0AED-7D3E-AFA4-BA0F-E9F854097564}"/>
+              </a:ext>
+            </a:extLst>
+          </p:cNvPr>
+          <p:cNvSpPr/>
+          <p:nvPr/>
+        </p:nvSpPr>
+        <p:spPr>
+          <a:xfrm>
+            <a:off x="1031431" y="3614027"/>
+            <a:ext cx="2280133" cy="3091573"/>
+          </a:xfrm>
+          <a:prstGeom prst="rect">
+            <a:avLst/>
+          </a:prstGeom>
+          <a:noFill/>
+          <a:ln>
+            <a:solidFill>
+              <a:srgbClr val="FFFF00"/>
+            </a:solidFill>
+          </a:ln>
+        </p:spPr>
+        <p:style>
+          <a:lnRef idx="2">
+            <a:schemeClr val="accent1">
+              <a:shade val="50000"/>
+            </a:schemeClr>
+          </a:lnRef>
+          <a:fillRef idx="1">
+            <a:schemeClr val="accent1"/>
+          </a:fillRef>
+          <a:effectRef idx="0">
+            <a:schemeClr val="accent1"/>
+          </a:effectRef>
+          <a:fontRef idx="minor">
+            <a:schemeClr val="lt1"/>
+          </a:fontRef>
+        </p:style>
+        <p:txBody>
+          <a:bodyPr rtlCol="0" anchor="ctr"/>
+          <a:lstStyle/>
+          <a:p>
+            <a:pPr algn="ctr"/>
+            <a:endParaRPr lang="fr-CH"/>
+          </a:p>
+        </p:txBody>
+      </p:sp>
+      <p:sp>
+        <p:nvSpPr>
+          <p:cNvPr id="27" name="ZoneTexte 4">
+            <a:extLst>
+              <a:ext uri="{FF2B5EF4-FFF2-40B4-BE49-F238E27FC236}">
+                <a16:creationId xmlns:a16="http://schemas.microsoft.com/office/drawing/2014/main" id="{0FD42E3B-58F9-09DB-B94A-461C33B00DD5}"/>
+              </a:ext>
+            </a:extLst>
+          </p:cNvPr>
+          <p:cNvSpPr txBox="1"/>
+          <p:nvPr/>
+        </p:nvSpPr>
+        <p:spPr>
+          <a:xfrm>
+            <a:off x="675130" y="3578411"/>
+            <a:ext cx="348172" cy="461665"/>
+          </a:xfrm>
+          <a:prstGeom prst="rect">
+            <a:avLst/>
+          </a:prstGeom>
+          <a:solidFill>
+            <a:schemeClr val="bg1">
+              <a:lumMod val="85000"/>
+            </a:schemeClr>
+          </a:solidFill>
+        </p:spPr>
+        <p:txBody>
+          <a:bodyPr wrap="none" rtlCol="0">
+            <a:spAutoFit/>
+          </a:bodyPr>
+          <a:lstStyle/>
+          <a:p>
+            <a:r>
+              <a:rPr lang="fr-CH" sz="2400" dirty="0">
+                <a:solidFill>
+                  <a:srgbClr val="FFFF00"/>
+                </a:solidFill>
+              </a:rPr>
+              <a:t>E</a:t>
+            </a:r>
+          </a:p>
+        </p:txBody>
+      </p:sp>
+      <p:sp>
+        <p:nvSpPr>
+          <p:cNvPr id="28" name="ZoneTexte 11">
+            <a:extLst>
+              <a:ext uri="{FF2B5EF4-FFF2-40B4-BE49-F238E27FC236}">
+                <a16:creationId xmlns:a16="http://schemas.microsoft.com/office/drawing/2014/main" id="{E12F90B6-85D3-CEAE-8DC9-9A5C8BE7FD8C}"/>
+              </a:ext>
+            </a:extLst>
+          </p:cNvPr>
+          <p:cNvSpPr txBox="1"/>
+          <p:nvPr/>
+        </p:nvSpPr>
+        <p:spPr>
+          <a:xfrm>
+            <a:off x="3288151" y="2681344"/>
             <a:ext cx="301686" cy="369332"/>
           </a:xfrm>
           <a:prstGeom prst="rect">
@@ -10302,19 +11026,19 @@
       </p:sp>
       <p:sp>
         <p:nvSpPr>
-          <p:cNvPr id="9" name="ZoneTexte 6">
-            <a:extLst>
-              <a:ext uri="{FF2B5EF4-FFF2-40B4-BE49-F238E27FC236}">
-                <a16:creationId xmlns:a16="http://schemas.microsoft.com/office/drawing/2014/main" id="{E0EB010C-A3D0-8EEB-579D-192B37F0C25F}"/>
-              </a:ext>
-            </a:extLst>
-          </p:cNvPr>
-          <p:cNvSpPr txBox="1"/>
-          <p:nvPr/>
-        </p:nvSpPr>
-        <p:spPr>
-          <a:xfrm>
-            <a:off x="3720640" y="2474344"/>
+          <p:cNvPr id="29" name="ZoneTexte 11">
+            <a:extLst>
+              <a:ext uri="{FF2B5EF4-FFF2-40B4-BE49-F238E27FC236}">
+                <a16:creationId xmlns:a16="http://schemas.microsoft.com/office/drawing/2014/main" id="{8712B2E3-8538-1806-2E71-B2D510390518}"/>
+              </a:ext>
+            </a:extLst>
+          </p:cNvPr>
+          <p:cNvSpPr txBox="1"/>
+          <p:nvPr/>
+        </p:nvSpPr>
+        <p:spPr>
+          <a:xfrm>
+            <a:off x="3288151" y="2938519"/>
             <a:ext cx="301686" cy="369332"/>
           </a:xfrm>
           <a:prstGeom prst="rect">
@@ -10337,229 +11061,19 @@
       </p:sp>
       <p:sp>
         <p:nvSpPr>
-          <p:cNvPr id="10" name="ZoneTexte 6">
-            <a:extLst>
-              <a:ext uri="{FF2B5EF4-FFF2-40B4-BE49-F238E27FC236}">
-                <a16:creationId xmlns:a16="http://schemas.microsoft.com/office/drawing/2014/main" id="{232C7CC2-6F8D-6F34-DE97-5B1C0D12F6B2}"/>
-              </a:ext>
-            </a:extLst>
-          </p:cNvPr>
-          <p:cNvSpPr txBox="1"/>
-          <p:nvPr/>
-        </p:nvSpPr>
-        <p:spPr>
-          <a:xfrm>
-            <a:off x="2990967" y="3244334"/>
-            <a:ext cx="301686" cy="369332"/>
-          </a:xfrm>
-          <a:prstGeom prst="rect">
-            <a:avLst/>
-          </a:prstGeom>
-          <a:noFill/>
-        </p:spPr>
-        <p:txBody>
-          <a:bodyPr wrap="none" rtlCol="0">
-            <a:spAutoFit/>
-          </a:bodyPr>
-          <a:lstStyle/>
-          <a:p>
-            <a:r>
-              <a:rPr lang="fr-CH" dirty="0"/>
-              <a:t>5</a:t>
-            </a:r>
-          </a:p>
-        </p:txBody>
-      </p:sp>
-      <p:sp>
-        <p:nvSpPr>
-          <p:cNvPr id="11" name="ZoneTexte 6">
-            <a:extLst>
-              <a:ext uri="{FF2B5EF4-FFF2-40B4-BE49-F238E27FC236}">
-                <a16:creationId xmlns:a16="http://schemas.microsoft.com/office/drawing/2014/main" id="{B73E4B25-208D-24BE-2E2E-A57D84C5DE5A}"/>
-              </a:ext>
-            </a:extLst>
-          </p:cNvPr>
-          <p:cNvSpPr txBox="1"/>
-          <p:nvPr/>
-        </p:nvSpPr>
-        <p:spPr>
-          <a:xfrm>
-            <a:off x="5102283" y="2917628"/>
-            <a:ext cx="301686" cy="369332"/>
-          </a:xfrm>
-          <a:prstGeom prst="rect">
-            <a:avLst/>
-          </a:prstGeom>
-          <a:noFill/>
-        </p:spPr>
-        <p:txBody>
-          <a:bodyPr wrap="none" rtlCol="0">
-            <a:spAutoFit/>
-          </a:bodyPr>
-          <a:lstStyle/>
-          <a:p>
-            <a:r>
-              <a:rPr lang="fr-CH" dirty="0"/>
-              <a:t>6</a:t>
-            </a:r>
-          </a:p>
-        </p:txBody>
-      </p:sp>
-      <p:sp>
-        <p:nvSpPr>
-          <p:cNvPr id="12" name="ZoneTexte 6">
-            <a:extLst>
-              <a:ext uri="{FF2B5EF4-FFF2-40B4-BE49-F238E27FC236}">
-                <a16:creationId xmlns:a16="http://schemas.microsoft.com/office/drawing/2014/main" id="{E2A960FC-4B8B-A663-5885-966156BACB20}"/>
-              </a:ext>
-            </a:extLst>
-          </p:cNvPr>
-          <p:cNvSpPr txBox="1"/>
-          <p:nvPr/>
-        </p:nvSpPr>
-        <p:spPr>
-          <a:xfrm>
-            <a:off x="7777767" y="1538116"/>
-            <a:ext cx="301686" cy="369332"/>
-          </a:xfrm>
-          <a:prstGeom prst="rect">
-            <a:avLst/>
-          </a:prstGeom>
-          <a:noFill/>
-        </p:spPr>
-        <p:txBody>
-          <a:bodyPr wrap="none" rtlCol="0">
-            <a:spAutoFit/>
-          </a:bodyPr>
-          <a:lstStyle/>
-          <a:p>
-            <a:r>
-              <a:rPr lang="fr-CH" dirty="0"/>
-              <a:t>7</a:t>
-            </a:r>
-          </a:p>
-        </p:txBody>
-      </p:sp>
-      <p:sp>
-        <p:nvSpPr>
-          <p:cNvPr id="13" name="ZoneTexte 6">
-            <a:extLst>
-              <a:ext uri="{FF2B5EF4-FFF2-40B4-BE49-F238E27FC236}">
-                <a16:creationId xmlns:a16="http://schemas.microsoft.com/office/drawing/2014/main" id="{110C0431-2A5E-A1B6-5EFE-3D5B9A9C0642}"/>
-              </a:ext>
-            </a:extLst>
-          </p:cNvPr>
-          <p:cNvSpPr txBox="1"/>
-          <p:nvPr/>
-        </p:nvSpPr>
-        <p:spPr>
-          <a:xfrm>
-            <a:off x="7795169" y="1907448"/>
-            <a:ext cx="301686" cy="369332"/>
-          </a:xfrm>
-          <a:prstGeom prst="rect">
-            <a:avLst/>
-          </a:prstGeom>
-          <a:noFill/>
-        </p:spPr>
-        <p:txBody>
-          <a:bodyPr wrap="none" rtlCol="0">
-            <a:spAutoFit/>
-          </a:bodyPr>
-          <a:lstStyle/>
-          <a:p>
-            <a:r>
-              <a:rPr lang="fr-CH" dirty="0"/>
-              <a:t>8</a:t>
-            </a:r>
-          </a:p>
-        </p:txBody>
-      </p:sp>
-      <p:sp>
-        <p:nvSpPr>
-          <p:cNvPr id="14" name="ZoneTexte 6">
-            <a:extLst>
-              <a:ext uri="{FF2B5EF4-FFF2-40B4-BE49-F238E27FC236}">
-                <a16:creationId xmlns:a16="http://schemas.microsoft.com/office/drawing/2014/main" id="{B43AAA21-C602-78B9-B797-5EE8DB0AEF15}"/>
-              </a:ext>
-            </a:extLst>
-          </p:cNvPr>
-          <p:cNvSpPr txBox="1"/>
-          <p:nvPr/>
-        </p:nvSpPr>
-        <p:spPr>
-          <a:xfrm>
-            <a:off x="7795169" y="2760671"/>
-            <a:ext cx="301686" cy="369332"/>
-          </a:xfrm>
-          <a:prstGeom prst="rect">
-            <a:avLst/>
-          </a:prstGeom>
-          <a:noFill/>
-        </p:spPr>
-        <p:txBody>
-          <a:bodyPr wrap="none" rtlCol="0">
-            <a:spAutoFit/>
-          </a:bodyPr>
-          <a:lstStyle/>
-          <a:p>
-            <a:r>
-              <a:rPr lang="fr-CH" dirty="0"/>
-              <a:t>9</a:t>
-            </a:r>
-          </a:p>
-        </p:txBody>
-      </p:sp>
-      <p:sp>
-        <p:nvSpPr>
-          <p:cNvPr id="15" name="ZoneTexte 6">
-            <a:extLst>
-              <a:ext uri="{FF2B5EF4-FFF2-40B4-BE49-F238E27FC236}">
-                <a16:creationId xmlns:a16="http://schemas.microsoft.com/office/drawing/2014/main" id="{7BB52ED5-5CC4-747E-4440-59F773CAE69E}"/>
-              </a:ext>
-            </a:extLst>
-          </p:cNvPr>
-          <p:cNvSpPr txBox="1"/>
-          <p:nvPr/>
-        </p:nvSpPr>
-        <p:spPr>
-          <a:xfrm>
-            <a:off x="7803809" y="3244334"/>
-            <a:ext cx="418704" cy="369332"/>
-          </a:xfrm>
-          <a:prstGeom prst="rect">
-            <a:avLst/>
-          </a:prstGeom>
-          <a:noFill/>
-        </p:spPr>
-        <p:txBody>
-          <a:bodyPr wrap="none" rtlCol="0">
-            <a:spAutoFit/>
-          </a:bodyPr>
-          <a:lstStyle/>
-          <a:p>
-            <a:r>
-              <a:rPr lang="fr-CH" dirty="0"/>
-              <a:t>10</a:t>
-            </a:r>
-          </a:p>
-        </p:txBody>
-      </p:sp>
-      <p:sp>
-        <p:nvSpPr>
-          <p:cNvPr id="16" name="ZoneTexte 6">
-            <a:extLst>
-              <a:ext uri="{FF2B5EF4-FFF2-40B4-BE49-F238E27FC236}">
-                <a16:creationId xmlns:a16="http://schemas.microsoft.com/office/drawing/2014/main" id="{3EAE9829-BBDD-3A4D-B6A7-8508C2C6A5E2}"/>
-              </a:ext>
-            </a:extLst>
-          </p:cNvPr>
-          <p:cNvSpPr txBox="1"/>
-          <p:nvPr/>
-        </p:nvSpPr>
-        <p:spPr>
-          <a:xfrm>
-            <a:off x="6584610" y="4057135"/>
+          <p:cNvPr id="30" name="ZoneTexte 11">
+            <a:extLst>
+              <a:ext uri="{FF2B5EF4-FFF2-40B4-BE49-F238E27FC236}">
+                <a16:creationId xmlns:a16="http://schemas.microsoft.com/office/drawing/2014/main" id="{396D4012-125E-0CB1-8F20-D7ECB1A59C23}"/>
+              </a:ext>
+            </a:extLst>
+          </p:cNvPr>
+          <p:cNvSpPr txBox="1"/>
+          <p:nvPr/>
+        </p:nvSpPr>
+        <p:spPr>
+          <a:xfrm>
+            <a:off x="1036507" y="2720447"/>
             <a:ext cx="418704" cy="369332"/>
           </a:xfrm>
           <a:prstGeom prst="rect">
@@ -10576,6 +11090,146 @@
             <a:r>
               <a:rPr lang="fr-CH" dirty="0"/>
               <a:t>11</a:t>
+            </a:r>
+          </a:p>
+        </p:txBody>
+      </p:sp>
+      <p:sp>
+        <p:nvSpPr>
+          <p:cNvPr id="31" name="ZoneTexte 11">
+            <a:extLst>
+              <a:ext uri="{FF2B5EF4-FFF2-40B4-BE49-F238E27FC236}">
+                <a16:creationId xmlns:a16="http://schemas.microsoft.com/office/drawing/2014/main" id="{422834EF-33BE-A884-63D3-7A82168D19AE}"/>
+              </a:ext>
+            </a:extLst>
+          </p:cNvPr>
+          <p:cNvSpPr txBox="1"/>
+          <p:nvPr/>
+        </p:nvSpPr>
+        <p:spPr>
+          <a:xfrm>
+            <a:off x="1019245" y="3950193"/>
+            <a:ext cx="418704" cy="369332"/>
+          </a:xfrm>
+          <a:prstGeom prst="rect">
+            <a:avLst/>
+          </a:prstGeom>
+          <a:noFill/>
+        </p:spPr>
+        <p:txBody>
+          <a:bodyPr wrap="none" rtlCol="0">
+            <a:spAutoFit/>
+          </a:bodyPr>
+          <a:lstStyle/>
+          <a:p>
+            <a:r>
+              <a:rPr lang="fr-CH" dirty="0"/>
+              <a:t>12</a:t>
+            </a:r>
+          </a:p>
+        </p:txBody>
+      </p:sp>
+      <p:sp>
+        <p:nvSpPr>
+          <p:cNvPr id="32" name="ZoneTexte 11">
+            <a:extLst>
+              <a:ext uri="{FF2B5EF4-FFF2-40B4-BE49-F238E27FC236}">
+                <a16:creationId xmlns:a16="http://schemas.microsoft.com/office/drawing/2014/main" id="{15A875FE-3C98-C265-161E-BA63D8D05917}"/>
+              </a:ext>
+            </a:extLst>
+          </p:cNvPr>
+          <p:cNvSpPr txBox="1"/>
+          <p:nvPr/>
+        </p:nvSpPr>
+        <p:spPr>
+          <a:xfrm>
+            <a:off x="1011116" y="4216568"/>
+            <a:ext cx="418704" cy="369332"/>
+          </a:xfrm>
+          <a:prstGeom prst="rect">
+            <a:avLst/>
+          </a:prstGeom>
+          <a:noFill/>
+        </p:spPr>
+        <p:txBody>
+          <a:bodyPr wrap="none" rtlCol="0">
+            <a:spAutoFit/>
+          </a:bodyPr>
+          <a:lstStyle/>
+          <a:p>
+            <a:r>
+              <a:rPr lang="fr-CH" dirty="0"/>
+              <a:t>13</a:t>
+            </a:r>
+          </a:p>
+        </p:txBody>
+      </p:sp>
+      <p:sp>
+        <p:nvSpPr>
+          <p:cNvPr id="33" name="ZoneTexte 11">
+            <a:extLst>
+              <a:ext uri="{FF2B5EF4-FFF2-40B4-BE49-F238E27FC236}">
+                <a16:creationId xmlns:a16="http://schemas.microsoft.com/office/drawing/2014/main" id="{B4738EAA-EC24-5857-FD7E-5E7B8D8D857D}"/>
+              </a:ext>
+            </a:extLst>
+          </p:cNvPr>
+          <p:cNvSpPr txBox="1"/>
+          <p:nvPr/>
+        </p:nvSpPr>
+        <p:spPr>
+          <a:xfrm>
+            <a:off x="1031431" y="5029212"/>
+            <a:ext cx="418704" cy="369332"/>
+          </a:xfrm>
+          <a:prstGeom prst="rect">
+            <a:avLst/>
+          </a:prstGeom>
+          <a:noFill/>
+        </p:spPr>
+        <p:txBody>
+          <a:bodyPr wrap="none" rtlCol="0">
+            <a:spAutoFit/>
+          </a:bodyPr>
+          <a:lstStyle/>
+          <a:p>
+            <a:r>
+              <a:rPr lang="fr-CH" dirty="0"/>
+              <a:t>14</a:t>
+            </a:r>
+          </a:p>
+        </p:txBody>
+      </p:sp>
+      <p:sp>
+        <p:nvSpPr>
+          <p:cNvPr id="34" name="ZoneTexte 11">
+            <a:extLst>
+              <a:ext uri="{FF2B5EF4-FFF2-40B4-BE49-F238E27FC236}">
+                <a16:creationId xmlns:a16="http://schemas.microsoft.com/office/drawing/2014/main" id="{B614AE3A-9D6E-226C-367B-AC80AF125526}"/>
+              </a:ext>
+            </a:extLst>
+          </p:cNvPr>
+          <p:cNvSpPr txBox="1"/>
+          <p:nvPr/>
+        </p:nvSpPr>
+        <p:spPr>
+          <a:xfrm>
+            <a:off x="1031431" y="5472061"/>
+            <a:ext cx="418704" cy="369332"/>
+          </a:xfrm>
+          <a:prstGeom prst="rect">
+            <a:avLst/>
+          </a:prstGeom>
+          <a:noFill/>
+        </p:spPr>
+        <p:txBody>
+          <a:bodyPr wrap="none" rtlCol="0">
+            <a:spAutoFit/>
+          </a:bodyPr>
+          <a:lstStyle/>
+          <a:p>
+            <a:r>
+              <a:rPr lang="fr-CH" dirty="0"/>
+              <a:t>15</a:t>
             </a:r>
           </a:p>
         </p:txBody>
@@ -10583,7 +11237,7 @@
     </p:spTree>
     <p:extLst>
       <p:ext uri="{BB962C8B-B14F-4D97-AF65-F5344CB8AC3E}">
-        <p14:creationId xmlns:p14="http://schemas.microsoft.com/office/powerpoint/2010/main" val="4288971629"/>
+        <p14:creationId xmlns:p14="http://schemas.microsoft.com/office/powerpoint/2010/main" val="3808064929"/>
       </p:ext>
     </p:extLst>
   </p:cSld>
@@ -10612,6 +11266,451 @@
       </p:grpSpPr>
       <p:pic>
         <p:nvPicPr>
+          <p:cNvPr id="5" name="Picture 4">
+            <a:extLst>
+              <a:ext uri="{FF2B5EF4-FFF2-40B4-BE49-F238E27FC236}">
+                <a16:creationId xmlns:a16="http://schemas.microsoft.com/office/drawing/2014/main" id="{B9DE361F-9ED5-4568-E67B-DD52E5FFA4BD}"/>
+              </a:ext>
+            </a:extLst>
+          </p:cNvPr>
+          <p:cNvPicPr>
+            <a:picLocks noChangeAspect="1"/>
+          </p:cNvPicPr>
+          <p:nvPr/>
+        </p:nvPicPr>
+        <p:blipFill>
+          <a:blip r:embed="rId2"/>
+          <a:stretch>
+            <a:fillRect/>
+          </a:stretch>
+        </p:blipFill>
+        <p:spPr>
+          <a:xfrm>
+            <a:off x="591127" y="1174736"/>
+            <a:ext cx="7499927" cy="3485785"/>
+          </a:xfrm>
+          <a:prstGeom prst="rect">
+            <a:avLst/>
+          </a:prstGeom>
+        </p:spPr>
+      </p:pic>
+      <p:sp>
+        <p:nvSpPr>
+          <p:cNvPr id="6" name="ZoneTexte 6">
+            <a:extLst>
+              <a:ext uri="{FF2B5EF4-FFF2-40B4-BE49-F238E27FC236}">
+                <a16:creationId xmlns:a16="http://schemas.microsoft.com/office/drawing/2014/main" id="{2ED8FE06-1F26-567C-8688-6B406B1A9A64}"/>
+              </a:ext>
+            </a:extLst>
+          </p:cNvPr>
+          <p:cNvSpPr txBox="1"/>
+          <p:nvPr/>
+        </p:nvSpPr>
+        <p:spPr>
+          <a:xfrm>
+            <a:off x="2073504" y="1907448"/>
+            <a:ext cx="301686" cy="369332"/>
+          </a:xfrm>
+          <a:prstGeom prst="rect">
+            <a:avLst/>
+          </a:prstGeom>
+          <a:noFill/>
+        </p:spPr>
+        <p:txBody>
+          <a:bodyPr wrap="none" rtlCol="0">
+            <a:spAutoFit/>
+          </a:bodyPr>
+          <a:lstStyle/>
+          <a:p>
+            <a:r>
+              <a:rPr lang="fr-CH" dirty="0"/>
+              <a:t>1</a:t>
+            </a:r>
+          </a:p>
+        </p:txBody>
+      </p:sp>
+      <p:sp>
+        <p:nvSpPr>
+          <p:cNvPr id="7" name="ZoneTexte 6">
+            <a:extLst>
+              <a:ext uri="{FF2B5EF4-FFF2-40B4-BE49-F238E27FC236}">
+                <a16:creationId xmlns:a16="http://schemas.microsoft.com/office/drawing/2014/main" id="{64CDFA9F-B37D-C28C-D064-203FC41BAFE1}"/>
+              </a:ext>
+            </a:extLst>
+          </p:cNvPr>
+          <p:cNvSpPr txBox="1"/>
+          <p:nvPr/>
+        </p:nvSpPr>
+        <p:spPr>
+          <a:xfrm>
+            <a:off x="5564849" y="1907448"/>
+            <a:ext cx="301686" cy="369332"/>
+          </a:xfrm>
+          <a:prstGeom prst="rect">
+            <a:avLst/>
+          </a:prstGeom>
+          <a:noFill/>
+        </p:spPr>
+        <p:txBody>
+          <a:bodyPr wrap="none" rtlCol="0">
+            <a:spAutoFit/>
+          </a:bodyPr>
+          <a:lstStyle/>
+          <a:p>
+            <a:r>
+              <a:rPr lang="fr-CH" dirty="0"/>
+              <a:t>2</a:t>
+            </a:r>
+          </a:p>
+        </p:txBody>
+      </p:sp>
+      <p:sp>
+        <p:nvSpPr>
+          <p:cNvPr id="8" name="ZoneTexte 6">
+            <a:extLst>
+              <a:ext uri="{FF2B5EF4-FFF2-40B4-BE49-F238E27FC236}">
+                <a16:creationId xmlns:a16="http://schemas.microsoft.com/office/drawing/2014/main" id="{83929B2F-BA9B-E645-FCD7-B43F9A3E73EB}"/>
+              </a:ext>
+            </a:extLst>
+          </p:cNvPr>
+          <p:cNvSpPr txBox="1"/>
+          <p:nvPr/>
+        </p:nvSpPr>
+        <p:spPr>
+          <a:xfrm>
+            <a:off x="2113512" y="2760671"/>
+            <a:ext cx="301686" cy="369332"/>
+          </a:xfrm>
+          <a:prstGeom prst="rect">
+            <a:avLst/>
+          </a:prstGeom>
+          <a:noFill/>
+        </p:spPr>
+        <p:txBody>
+          <a:bodyPr wrap="none" rtlCol="0">
+            <a:spAutoFit/>
+          </a:bodyPr>
+          <a:lstStyle/>
+          <a:p>
+            <a:r>
+              <a:rPr lang="fr-CH" dirty="0"/>
+              <a:t>3</a:t>
+            </a:r>
+          </a:p>
+        </p:txBody>
+      </p:sp>
+      <p:sp>
+        <p:nvSpPr>
+          <p:cNvPr id="9" name="ZoneTexte 6">
+            <a:extLst>
+              <a:ext uri="{FF2B5EF4-FFF2-40B4-BE49-F238E27FC236}">
+                <a16:creationId xmlns:a16="http://schemas.microsoft.com/office/drawing/2014/main" id="{E0EB010C-A3D0-8EEB-579D-192B37F0C25F}"/>
+              </a:ext>
+            </a:extLst>
+          </p:cNvPr>
+          <p:cNvSpPr txBox="1"/>
+          <p:nvPr/>
+        </p:nvSpPr>
+        <p:spPr>
+          <a:xfrm>
+            <a:off x="3720640" y="2474344"/>
+            <a:ext cx="301686" cy="369332"/>
+          </a:xfrm>
+          <a:prstGeom prst="rect">
+            <a:avLst/>
+          </a:prstGeom>
+          <a:noFill/>
+        </p:spPr>
+        <p:txBody>
+          <a:bodyPr wrap="none" rtlCol="0">
+            <a:spAutoFit/>
+          </a:bodyPr>
+          <a:lstStyle/>
+          <a:p>
+            <a:r>
+              <a:rPr lang="fr-CH" dirty="0"/>
+              <a:t>4</a:t>
+            </a:r>
+          </a:p>
+        </p:txBody>
+      </p:sp>
+      <p:sp>
+        <p:nvSpPr>
+          <p:cNvPr id="10" name="ZoneTexte 6">
+            <a:extLst>
+              <a:ext uri="{FF2B5EF4-FFF2-40B4-BE49-F238E27FC236}">
+                <a16:creationId xmlns:a16="http://schemas.microsoft.com/office/drawing/2014/main" id="{232C7CC2-6F8D-6F34-DE97-5B1C0D12F6B2}"/>
+              </a:ext>
+            </a:extLst>
+          </p:cNvPr>
+          <p:cNvSpPr txBox="1"/>
+          <p:nvPr/>
+        </p:nvSpPr>
+        <p:spPr>
+          <a:xfrm>
+            <a:off x="2990967" y="3244334"/>
+            <a:ext cx="301686" cy="369332"/>
+          </a:xfrm>
+          <a:prstGeom prst="rect">
+            <a:avLst/>
+          </a:prstGeom>
+          <a:noFill/>
+        </p:spPr>
+        <p:txBody>
+          <a:bodyPr wrap="none" rtlCol="0">
+            <a:spAutoFit/>
+          </a:bodyPr>
+          <a:lstStyle/>
+          <a:p>
+            <a:r>
+              <a:rPr lang="fr-CH" dirty="0"/>
+              <a:t>5</a:t>
+            </a:r>
+          </a:p>
+        </p:txBody>
+      </p:sp>
+      <p:sp>
+        <p:nvSpPr>
+          <p:cNvPr id="11" name="ZoneTexte 6">
+            <a:extLst>
+              <a:ext uri="{FF2B5EF4-FFF2-40B4-BE49-F238E27FC236}">
+                <a16:creationId xmlns:a16="http://schemas.microsoft.com/office/drawing/2014/main" id="{B73E4B25-208D-24BE-2E2E-A57D84C5DE5A}"/>
+              </a:ext>
+            </a:extLst>
+          </p:cNvPr>
+          <p:cNvSpPr txBox="1"/>
+          <p:nvPr/>
+        </p:nvSpPr>
+        <p:spPr>
+          <a:xfrm>
+            <a:off x="5102283" y="2917628"/>
+            <a:ext cx="301686" cy="369332"/>
+          </a:xfrm>
+          <a:prstGeom prst="rect">
+            <a:avLst/>
+          </a:prstGeom>
+          <a:noFill/>
+        </p:spPr>
+        <p:txBody>
+          <a:bodyPr wrap="none" rtlCol="0">
+            <a:spAutoFit/>
+          </a:bodyPr>
+          <a:lstStyle/>
+          <a:p>
+            <a:r>
+              <a:rPr lang="fr-CH" dirty="0"/>
+              <a:t>6</a:t>
+            </a:r>
+          </a:p>
+        </p:txBody>
+      </p:sp>
+      <p:sp>
+        <p:nvSpPr>
+          <p:cNvPr id="12" name="ZoneTexte 6">
+            <a:extLst>
+              <a:ext uri="{FF2B5EF4-FFF2-40B4-BE49-F238E27FC236}">
+                <a16:creationId xmlns:a16="http://schemas.microsoft.com/office/drawing/2014/main" id="{E2A960FC-4B8B-A663-5885-966156BACB20}"/>
+              </a:ext>
+            </a:extLst>
+          </p:cNvPr>
+          <p:cNvSpPr txBox="1"/>
+          <p:nvPr/>
+        </p:nvSpPr>
+        <p:spPr>
+          <a:xfrm>
+            <a:off x="7777767" y="1538116"/>
+            <a:ext cx="301686" cy="369332"/>
+          </a:xfrm>
+          <a:prstGeom prst="rect">
+            <a:avLst/>
+          </a:prstGeom>
+          <a:noFill/>
+        </p:spPr>
+        <p:txBody>
+          <a:bodyPr wrap="none" rtlCol="0">
+            <a:spAutoFit/>
+          </a:bodyPr>
+          <a:lstStyle/>
+          <a:p>
+            <a:r>
+              <a:rPr lang="fr-CH" dirty="0"/>
+              <a:t>7</a:t>
+            </a:r>
+          </a:p>
+        </p:txBody>
+      </p:sp>
+      <p:sp>
+        <p:nvSpPr>
+          <p:cNvPr id="13" name="ZoneTexte 6">
+            <a:extLst>
+              <a:ext uri="{FF2B5EF4-FFF2-40B4-BE49-F238E27FC236}">
+                <a16:creationId xmlns:a16="http://schemas.microsoft.com/office/drawing/2014/main" id="{110C0431-2A5E-A1B6-5EFE-3D5B9A9C0642}"/>
+              </a:ext>
+            </a:extLst>
+          </p:cNvPr>
+          <p:cNvSpPr txBox="1"/>
+          <p:nvPr/>
+        </p:nvSpPr>
+        <p:spPr>
+          <a:xfrm>
+            <a:off x="7795169" y="1907448"/>
+            <a:ext cx="301686" cy="369332"/>
+          </a:xfrm>
+          <a:prstGeom prst="rect">
+            <a:avLst/>
+          </a:prstGeom>
+          <a:noFill/>
+        </p:spPr>
+        <p:txBody>
+          <a:bodyPr wrap="none" rtlCol="0">
+            <a:spAutoFit/>
+          </a:bodyPr>
+          <a:lstStyle/>
+          <a:p>
+            <a:r>
+              <a:rPr lang="fr-CH" dirty="0"/>
+              <a:t>8</a:t>
+            </a:r>
+          </a:p>
+        </p:txBody>
+      </p:sp>
+      <p:sp>
+        <p:nvSpPr>
+          <p:cNvPr id="14" name="ZoneTexte 6">
+            <a:extLst>
+              <a:ext uri="{FF2B5EF4-FFF2-40B4-BE49-F238E27FC236}">
+                <a16:creationId xmlns:a16="http://schemas.microsoft.com/office/drawing/2014/main" id="{B43AAA21-C602-78B9-B797-5EE8DB0AEF15}"/>
+              </a:ext>
+            </a:extLst>
+          </p:cNvPr>
+          <p:cNvSpPr txBox="1"/>
+          <p:nvPr/>
+        </p:nvSpPr>
+        <p:spPr>
+          <a:xfrm>
+            <a:off x="7795169" y="2760671"/>
+            <a:ext cx="301686" cy="369332"/>
+          </a:xfrm>
+          <a:prstGeom prst="rect">
+            <a:avLst/>
+          </a:prstGeom>
+          <a:noFill/>
+        </p:spPr>
+        <p:txBody>
+          <a:bodyPr wrap="none" rtlCol="0">
+            <a:spAutoFit/>
+          </a:bodyPr>
+          <a:lstStyle/>
+          <a:p>
+            <a:r>
+              <a:rPr lang="fr-CH" dirty="0"/>
+              <a:t>9</a:t>
+            </a:r>
+          </a:p>
+        </p:txBody>
+      </p:sp>
+      <p:sp>
+        <p:nvSpPr>
+          <p:cNvPr id="15" name="ZoneTexte 6">
+            <a:extLst>
+              <a:ext uri="{FF2B5EF4-FFF2-40B4-BE49-F238E27FC236}">
+                <a16:creationId xmlns:a16="http://schemas.microsoft.com/office/drawing/2014/main" id="{7BB52ED5-5CC4-747E-4440-59F773CAE69E}"/>
+              </a:ext>
+            </a:extLst>
+          </p:cNvPr>
+          <p:cNvSpPr txBox="1"/>
+          <p:nvPr/>
+        </p:nvSpPr>
+        <p:spPr>
+          <a:xfrm>
+            <a:off x="7803809" y="3244334"/>
+            <a:ext cx="418704" cy="369332"/>
+          </a:xfrm>
+          <a:prstGeom prst="rect">
+            <a:avLst/>
+          </a:prstGeom>
+          <a:noFill/>
+        </p:spPr>
+        <p:txBody>
+          <a:bodyPr wrap="none" rtlCol="0">
+            <a:spAutoFit/>
+          </a:bodyPr>
+          <a:lstStyle/>
+          <a:p>
+            <a:r>
+              <a:rPr lang="fr-CH" dirty="0"/>
+              <a:t>10</a:t>
+            </a:r>
+          </a:p>
+        </p:txBody>
+      </p:sp>
+      <p:sp>
+        <p:nvSpPr>
+          <p:cNvPr id="16" name="ZoneTexte 6">
+            <a:extLst>
+              <a:ext uri="{FF2B5EF4-FFF2-40B4-BE49-F238E27FC236}">
+                <a16:creationId xmlns:a16="http://schemas.microsoft.com/office/drawing/2014/main" id="{3EAE9829-BBDD-3A4D-B6A7-8508C2C6A5E2}"/>
+              </a:ext>
+            </a:extLst>
+          </p:cNvPr>
+          <p:cNvSpPr txBox="1"/>
+          <p:nvPr/>
+        </p:nvSpPr>
+        <p:spPr>
+          <a:xfrm>
+            <a:off x="6584610" y="4057135"/>
+            <a:ext cx="418704" cy="369332"/>
+          </a:xfrm>
+          <a:prstGeom prst="rect">
+            <a:avLst/>
+          </a:prstGeom>
+          <a:noFill/>
+        </p:spPr>
+        <p:txBody>
+          <a:bodyPr wrap="none" rtlCol="0">
+            <a:spAutoFit/>
+          </a:bodyPr>
+          <a:lstStyle/>
+          <a:p>
+            <a:r>
+              <a:rPr lang="fr-CH" dirty="0"/>
+              <a:t>11</a:t>
+            </a:r>
+          </a:p>
+        </p:txBody>
+      </p:sp>
+    </p:spTree>
+    <p:extLst>
+      <p:ext uri="{BB962C8B-B14F-4D97-AF65-F5344CB8AC3E}">
+        <p14:creationId xmlns:p14="http://schemas.microsoft.com/office/powerpoint/2010/main" val="4288971629"/>
+      </p:ext>
+    </p:extLst>
+  </p:cSld>
+  <p:clrMapOvr>
+    <a:masterClrMapping/>
+  </p:clrMapOvr>
+</p:sld>
+</file>
+
+<file path=ppt/slides/slide22.xml><?xml version="1.0" encoding="utf-8"?>
+<p:sld xmlns:a="http://schemas.openxmlformats.org/drawingml/2006/main" xmlns:r="http://schemas.openxmlformats.org/officeDocument/2006/relationships" xmlns:p="http://schemas.openxmlformats.org/presentationml/2006/main">
+  <p:cSld>
+    <p:spTree>
+      <p:nvGrpSpPr>
+        <p:cNvPr id="1" name=""/>
+        <p:cNvGrpSpPr/>
+        <p:nvPr/>
+      </p:nvGrpSpPr>
+      <p:grpSpPr>
+        <a:xfrm>
+          <a:off x="0" y="0"/>
+          <a:ext cx="0" cy="0"/>
+          <a:chOff x="0" y="0"/>
+          <a:chExt cx="0" cy="0"/>
+        </a:xfrm>
+      </p:grpSpPr>
+      <p:pic>
+        <p:nvPicPr>
           <p:cNvPr id="15" name="Picture 14">
             <a:extLst>
               <a:ext uri="{FF2B5EF4-FFF2-40B4-BE49-F238E27FC236}">
@@ -10933,7 +12032,7 @@
 </p:sld>
 </file>
 
-<file path=ppt/slides/slide22.xml><?xml version="1.0" encoding="utf-8"?>
+<file path=ppt/slides/slide23.xml><?xml version="1.0" encoding="utf-8"?>
 <p:sld xmlns:a="http://schemas.openxmlformats.org/drawingml/2006/main" xmlns:r="http://schemas.openxmlformats.org/officeDocument/2006/relationships" xmlns:p="http://schemas.openxmlformats.org/presentationml/2006/main">
   <p:cSld>
     <p:spTree>

</xml_diff>

<commit_message>
New module PeaksTrace export
Replacement of the module PeaksDetection by the module PeaksTrace export. It bring several changes:
- add the possibility to export the timecourse
- now the electrode name in the file are recorded
- possibility to save in .txt and .xlsx format
</commit_message>
<xml_diff>
--- a/Manuels/picture_EEGpal_manuals.pptx
+++ b/Manuels/picture_EEGpal_manuals.pptx
@@ -5,7 +5,7 @@
     <p:sldMasterId id="2147483648" r:id="rId1"/>
   </p:sldMasterIdLst>
   <p:notesMasterIdLst>
-    <p:notesMasterId r:id="rId25"/>
+    <p:notesMasterId r:id="rId26"/>
   </p:notesMasterIdLst>
   <p:sldIdLst>
     <p:sldId id="292" r:id="rId2"/>
@@ -29,8 +29,9 @@
     <p:sldId id="285" r:id="rId20"/>
     <p:sldId id="262" r:id="rId21"/>
     <p:sldId id="289" r:id="rId22"/>
-    <p:sldId id="291" r:id="rId23"/>
-    <p:sldId id="290" r:id="rId24"/>
+    <p:sldId id="294" r:id="rId23"/>
+    <p:sldId id="291" r:id="rId24"/>
+    <p:sldId id="290" r:id="rId25"/>
   </p:sldIdLst>
   <p:sldSz cx="9144000" cy="6858000" type="screen4x3"/>
   <p:notesSz cx="6858000" cy="9144000"/>
@@ -188,9 +189,10 @@
             <p14:sldId id="262"/>
           </p14:sldIdLst>
         </p14:section>
-        <p14:section name="Find Peaks" id="{547D6727-7F9F-4066-AB7B-628195AC32DC}">
+        <p14:section name="Peak and Trace export" id="{547D6727-7F9F-4066-AB7B-628195AC32DC}">
           <p14:sldIdLst>
             <p14:sldId id="289"/>
+            <p14:sldId id="294"/>
             <p14:sldId id="291"/>
             <p14:sldId id="290"/>
           </p14:sldIdLst>
@@ -297,7 +299,7 @@
           <a:p>
             <a:fld id="{AE28F081-F961-4F1D-B0FD-EEC618487470}" type="datetimeFigureOut">
               <a:rPr lang="en-US" smtClean="0"/>
-              <a:t>11/10/2024</a:t>
+              <a:t>12/29/2024</a:t>
             </a:fld>
             <a:endParaRPr lang="en-US"/>
           </a:p>
@@ -745,7 +747,7 @@
           <a:p>
             <a:fld id="{BCB0654D-2F9E-40DC-B910-8F58A623289D}" type="datetimeFigureOut">
               <a:rPr lang="fr-CH" smtClean="0"/>
-              <a:t>10.11.2024</a:t>
+              <a:t>29.12.2024</a:t>
             </a:fld>
             <a:endParaRPr lang="fr-CH"/>
           </a:p>
@@ -915,7 +917,7 @@
           <a:p>
             <a:fld id="{BCB0654D-2F9E-40DC-B910-8F58A623289D}" type="datetimeFigureOut">
               <a:rPr lang="fr-CH" smtClean="0"/>
-              <a:t>10.11.2024</a:t>
+              <a:t>29.12.2024</a:t>
             </a:fld>
             <a:endParaRPr lang="fr-CH"/>
           </a:p>
@@ -1095,7 +1097,7 @@
           <a:p>
             <a:fld id="{BCB0654D-2F9E-40DC-B910-8F58A623289D}" type="datetimeFigureOut">
               <a:rPr lang="fr-CH" smtClean="0"/>
-              <a:t>10.11.2024</a:t>
+              <a:t>29.12.2024</a:t>
             </a:fld>
             <a:endParaRPr lang="fr-CH"/>
           </a:p>
@@ -1265,7 +1267,7 @@
           <a:p>
             <a:fld id="{BCB0654D-2F9E-40DC-B910-8F58A623289D}" type="datetimeFigureOut">
               <a:rPr lang="fr-CH" smtClean="0"/>
-              <a:t>10.11.2024</a:t>
+              <a:t>29.12.2024</a:t>
             </a:fld>
             <a:endParaRPr lang="fr-CH"/>
           </a:p>
@@ -1511,7 +1513,7 @@
           <a:p>
             <a:fld id="{BCB0654D-2F9E-40DC-B910-8F58A623289D}" type="datetimeFigureOut">
               <a:rPr lang="fr-CH" smtClean="0"/>
-              <a:t>10.11.2024</a:t>
+              <a:t>29.12.2024</a:t>
             </a:fld>
             <a:endParaRPr lang="fr-CH"/>
           </a:p>
@@ -1799,7 +1801,7 @@
           <a:p>
             <a:fld id="{BCB0654D-2F9E-40DC-B910-8F58A623289D}" type="datetimeFigureOut">
               <a:rPr lang="fr-CH" smtClean="0"/>
-              <a:t>10.11.2024</a:t>
+              <a:t>29.12.2024</a:t>
             </a:fld>
             <a:endParaRPr lang="fr-CH"/>
           </a:p>
@@ -2221,7 +2223,7 @@
           <a:p>
             <a:fld id="{BCB0654D-2F9E-40DC-B910-8F58A623289D}" type="datetimeFigureOut">
               <a:rPr lang="fr-CH" smtClean="0"/>
-              <a:t>10.11.2024</a:t>
+              <a:t>29.12.2024</a:t>
             </a:fld>
             <a:endParaRPr lang="fr-CH"/>
           </a:p>
@@ -2339,7 +2341,7 @@
           <a:p>
             <a:fld id="{BCB0654D-2F9E-40DC-B910-8F58A623289D}" type="datetimeFigureOut">
               <a:rPr lang="fr-CH" smtClean="0"/>
-              <a:t>10.11.2024</a:t>
+              <a:t>29.12.2024</a:t>
             </a:fld>
             <a:endParaRPr lang="fr-CH"/>
           </a:p>
@@ -2434,7 +2436,7 @@
           <a:p>
             <a:fld id="{BCB0654D-2F9E-40DC-B910-8F58A623289D}" type="datetimeFigureOut">
               <a:rPr lang="fr-CH" smtClean="0"/>
-              <a:t>10.11.2024</a:t>
+              <a:t>29.12.2024</a:t>
             </a:fld>
             <a:endParaRPr lang="fr-CH"/>
           </a:p>
@@ -2711,7 +2713,7 @@
           <a:p>
             <a:fld id="{BCB0654D-2F9E-40DC-B910-8F58A623289D}" type="datetimeFigureOut">
               <a:rPr lang="fr-CH" smtClean="0"/>
-              <a:t>10.11.2024</a:t>
+              <a:t>29.12.2024</a:t>
             </a:fld>
             <a:endParaRPr lang="fr-CH"/>
           </a:p>
@@ -2964,7 +2966,7 @@
           <a:p>
             <a:fld id="{BCB0654D-2F9E-40DC-B910-8F58A623289D}" type="datetimeFigureOut">
               <a:rPr lang="fr-CH" smtClean="0"/>
-              <a:t>10.11.2024</a:t>
+              <a:t>29.12.2024</a:t>
             </a:fld>
             <a:endParaRPr lang="fr-CH"/>
           </a:p>
@@ -3177,7 +3179,7 @@
           <a:p>
             <a:fld id="{BCB0654D-2F9E-40DC-B910-8F58A623289D}" type="datetimeFigureOut">
               <a:rPr lang="fr-CH" smtClean="0"/>
-              <a:t>10.11.2024</a:t>
+              <a:t>29.12.2024</a:t>
             </a:fld>
             <a:endParaRPr lang="fr-CH"/>
           </a:p>
@@ -11266,10 +11268,10 @@
       </p:grpSpPr>
       <p:pic>
         <p:nvPicPr>
-          <p:cNvPr id="5" name="Picture 4">
-            <a:extLst>
-              <a:ext uri="{FF2B5EF4-FFF2-40B4-BE49-F238E27FC236}">
-                <a16:creationId xmlns:a16="http://schemas.microsoft.com/office/drawing/2014/main" id="{B9DE361F-9ED5-4568-E67B-DD52E5FFA4BD}"/>
+          <p:cNvPr id="3" name="Picture 2">
+            <a:extLst>
+              <a:ext uri="{FF2B5EF4-FFF2-40B4-BE49-F238E27FC236}">
+                <a16:creationId xmlns:a16="http://schemas.microsoft.com/office/drawing/2014/main" id="{8DAB9FF9-5B6C-5274-03A0-1CD781B1DF0F}"/>
               </a:ext>
             </a:extLst>
           </p:cNvPr>
@@ -11286,8 +11288,8 @@
         </p:blipFill>
         <p:spPr>
           <a:xfrm>
-            <a:off x="591127" y="1174736"/>
-            <a:ext cx="7499927" cy="3485785"/>
+            <a:off x="963379" y="1178038"/>
+            <a:ext cx="7055181" cy="3479179"/>
           </a:xfrm>
           <a:prstGeom prst="rect">
             <a:avLst/>
@@ -11308,7 +11310,7 @@
         </p:nvSpPr>
         <p:spPr>
           <a:xfrm>
-            <a:off x="2073504" y="1907448"/>
+            <a:off x="2415198" y="1917526"/>
             <a:ext cx="301686" cy="369332"/>
           </a:xfrm>
           <a:prstGeom prst="rect">
@@ -11343,7 +11345,7 @@
         </p:nvSpPr>
         <p:spPr>
           <a:xfrm>
-            <a:off x="5564849" y="1907448"/>
+            <a:off x="5635930" y="1917526"/>
             <a:ext cx="301686" cy="369332"/>
           </a:xfrm>
           <a:prstGeom prst="rect">
@@ -11378,7 +11380,7 @@
         </p:nvSpPr>
         <p:spPr>
           <a:xfrm>
-            <a:off x="2113512" y="2760671"/>
+            <a:off x="2415198" y="2671637"/>
             <a:ext cx="301686" cy="369332"/>
           </a:xfrm>
           <a:prstGeom prst="rect">
@@ -11413,7 +11415,7 @@
         </p:nvSpPr>
         <p:spPr>
           <a:xfrm>
-            <a:off x="3720640" y="2474344"/>
+            <a:off x="3758740" y="2391339"/>
             <a:ext cx="301686" cy="369332"/>
           </a:xfrm>
           <a:prstGeom prst="rect">
@@ -11448,7 +11450,7 @@
         </p:nvSpPr>
         <p:spPr>
           <a:xfrm>
-            <a:off x="2990967" y="3244334"/>
+            <a:off x="3160650" y="3119838"/>
             <a:ext cx="301686" cy="369332"/>
           </a:xfrm>
           <a:prstGeom prst="rect">
@@ -11483,7 +11485,7 @@
         </p:nvSpPr>
         <p:spPr>
           <a:xfrm>
-            <a:off x="5102283" y="2917628"/>
+            <a:off x="5210559" y="2760671"/>
             <a:ext cx="301686" cy="369332"/>
           </a:xfrm>
           <a:prstGeom prst="rect">
@@ -11518,7 +11520,7 @@
         </p:nvSpPr>
         <p:spPr>
           <a:xfrm>
-            <a:off x="7777767" y="1538116"/>
+            <a:off x="7818851" y="1562541"/>
             <a:ext cx="301686" cy="369332"/>
           </a:xfrm>
           <a:prstGeom prst="rect">
@@ -11553,7 +11555,7 @@
         </p:nvSpPr>
         <p:spPr>
           <a:xfrm>
-            <a:off x="7795169" y="1907448"/>
+            <a:off x="7818851" y="1873857"/>
             <a:ext cx="301686" cy="369332"/>
           </a:xfrm>
           <a:prstGeom prst="rect">
@@ -11588,7 +11590,7 @@
         </p:nvSpPr>
         <p:spPr>
           <a:xfrm>
-            <a:off x="7795169" y="2760671"/>
+            <a:off x="7818851" y="2301377"/>
             <a:ext cx="301686" cy="369332"/>
           </a:xfrm>
           <a:prstGeom prst="rect">
@@ -11611,19 +11613,19 @@
       </p:sp>
       <p:sp>
         <p:nvSpPr>
-          <p:cNvPr id="15" name="ZoneTexte 6">
-            <a:extLst>
-              <a:ext uri="{FF2B5EF4-FFF2-40B4-BE49-F238E27FC236}">
-                <a16:creationId xmlns:a16="http://schemas.microsoft.com/office/drawing/2014/main" id="{7BB52ED5-5CC4-747E-4440-59F773CAE69E}"/>
-              </a:ext>
-            </a:extLst>
-          </p:cNvPr>
-          <p:cNvSpPr txBox="1"/>
-          <p:nvPr/>
-        </p:nvSpPr>
-        <p:spPr>
-          <a:xfrm>
-            <a:off x="7803809" y="3244334"/>
+          <p:cNvPr id="16" name="ZoneTexte 6">
+            <a:extLst>
+              <a:ext uri="{FF2B5EF4-FFF2-40B4-BE49-F238E27FC236}">
+                <a16:creationId xmlns:a16="http://schemas.microsoft.com/office/drawing/2014/main" id="{3EAE9829-BBDD-3A4D-B6A7-8508C2C6A5E2}"/>
+              </a:ext>
+            </a:extLst>
+          </p:cNvPr>
+          <p:cNvSpPr txBox="1"/>
+          <p:nvPr/>
+        </p:nvSpPr>
+        <p:spPr>
+          <a:xfrm>
+            <a:off x="7911185" y="3001505"/>
             <a:ext cx="418704" cy="369332"/>
           </a:xfrm>
           <a:prstGeom prst="rect">
@@ -11646,19 +11648,19 @@
       </p:sp>
       <p:sp>
         <p:nvSpPr>
-          <p:cNvPr id="16" name="ZoneTexte 6">
-            <a:extLst>
-              <a:ext uri="{FF2B5EF4-FFF2-40B4-BE49-F238E27FC236}">
-                <a16:creationId xmlns:a16="http://schemas.microsoft.com/office/drawing/2014/main" id="{3EAE9829-BBDD-3A4D-B6A7-8508C2C6A5E2}"/>
-              </a:ext>
-            </a:extLst>
-          </p:cNvPr>
-          <p:cNvSpPr txBox="1"/>
-          <p:nvPr/>
-        </p:nvSpPr>
-        <p:spPr>
-          <a:xfrm>
-            <a:off x="6584610" y="4057135"/>
+          <p:cNvPr id="4" name="ZoneTexte 6">
+            <a:extLst>
+              <a:ext uri="{FF2B5EF4-FFF2-40B4-BE49-F238E27FC236}">
+                <a16:creationId xmlns:a16="http://schemas.microsoft.com/office/drawing/2014/main" id="{635C1F4E-4A0C-430E-8CD5-1F767F4AF143}"/>
+              </a:ext>
+            </a:extLst>
+          </p:cNvPr>
+          <p:cNvSpPr txBox="1"/>
+          <p:nvPr/>
+        </p:nvSpPr>
+        <p:spPr>
+          <a:xfrm>
+            <a:off x="7911185" y="3294631"/>
             <a:ext cx="418704" cy="369332"/>
           </a:xfrm>
           <a:prstGeom prst="rect">
@@ -11675,6 +11677,41 @@
             <a:r>
               <a:rPr lang="fr-CH" dirty="0"/>
               <a:t>11</a:t>
+            </a:r>
+          </a:p>
+        </p:txBody>
+      </p:sp>
+      <p:sp>
+        <p:nvSpPr>
+          <p:cNvPr id="17" name="ZoneTexte 6">
+            <a:extLst>
+              <a:ext uri="{FF2B5EF4-FFF2-40B4-BE49-F238E27FC236}">
+                <a16:creationId xmlns:a16="http://schemas.microsoft.com/office/drawing/2014/main" id="{F24AAFB1-A703-66C2-EA56-DB44F8D9DEF4}"/>
+              </a:ext>
+            </a:extLst>
+          </p:cNvPr>
+          <p:cNvSpPr txBox="1"/>
+          <p:nvPr/>
+        </p:nvSpPr>
+        <p:spPr>
+          <a:xfrm>
+            <a:off x="6647993" y="4048345"/>
+            <a:ext cx="418704" cy="369332"/>
+          </a:xfrm>
+          <a:prstGeom prst="rect">
+            <a:avLst/>
+          </a:prstGeom>
+          <a:noFill/>
+        </p:spPr>
+        <p:txBody>
+          <a:bodyPr wrap="none" rtlCol="0">
+            <a:spAutoFit/>
+          </a:bodyPr>
+          <a:lstStyle/>
+          <a:p>
+            <a:r>
+              <a:rPr lang="fr-CH" dirty="0"/>
+              <a:t>12</a:t>
             </a:r>
           </a:p>
         </p:txBody>
@@ -11697,6 +11734,422 @@
   <p:cSld>
     <p:spTree>
       <p:nvGrpSpPr>
+        <p:cNvPr id="1" name="">
+          <a:extLst>
+            <a:ext uri="{FF2B5EF4-FFF2-40B4-BE49-F238E27FC236}">
+              <a16:creationId xmlns:a16="http://schemas.microsoft.com/office/drawing/2014/main" id="{D9C4011D-91AF-C05F-EF1F-275C5D4E9231}"/>
+            </a:ext>
+          </a:extLst>
+        </p:cNvPr>
+        <p:cNvGrpSpPr/>
+        <p:nvPr/>
+      </p:nvGrpSpPr>
+      <p:grpSpPr>
+        <a:xfrm>
+          <a:off x="0" y="0"/>
+          <a:ext cx="0" cy="0"/>
+          <a:chOff x="0" y="0"/>
+          <a:chExt cx="0" cy="0"/>
+        </a:xfrm>
+      </p:grpSpPr>
+      <p:pic>
+        <p:nvPicPr>
+          <p:cNvPr id="15" name="Picture 14">
+            <a:extLst>
+              <a:ext uri="{FF2B5EF4-FFF2-40B4-BE49-F238E27FC236}">
+                <a16:creationId xmlns:a16="http://schemas.microsoft.com/office/drawing/2014/main" id="{DE786DC7-DAD1-9964-EF1B-1876787442D5}"/>
+              </a:ext>
+            </a:extLst>
+          </p:cNvPr>
+          <p:cNvPicPr>
+            <a:picLocks noChangeAspect="1"/>
+          </p:cNvPicPr>
+          <p:nvPr/>
+        </p:nvPicPr>
+        <p:blipFill>
+          <a:blip r:embed="rId2"/>
+          <a:stretch>
+            <a:fillRect/>
+          </a:stretch>
+        </p:blipFill>
+        <p:spPr>
+          <a:xfrm>
+            <a:off x="826548" y="1174373"/>
+            <a:ext cx="7051748" cy="3477486"/>
+          </a:xfrm>
+          <a:prstGeom prst="rect">
+            <a:avLst/>
+          </a:prstGeom>
+        </p:spPr>
+      </p:pic>
+      <p:sp>
+        <p:nvSpPr>
+          <p:cNvPr id="6" name="ZoneTexte 6">
+            <a:extLst>
+              <a:ext uri="{FF2B5EF4-FFF2-40B4-BE49-F238E27FC236}">
+                <a16:creationId xmlns:a16="http://schemas.microsoft.com/office/drawing/2014/main" id="{83B824AA-7DBE-4A52-2EE8-E39B72271B81}"/>
+              </a:ext>
+            </a:extLst>
+          </p:cNvPr>
+          <p:cNvSpPr txBox="1"/>
+          <p:nvPr/>
+        </p:nvSpPr>
+        <p:spPr>
+          <a:xfrm>
+            <a:off x="2242726" y="1907448"/>
+            <a:ext cx="301686" cy="369332"/>
+          </a:xfrm>
+          <a:prstGeom prst="rect">
+            <a:avLst/>
+          </a:prstGeom>
+          <a:noFill/>
+        </p:spPr>
+        <p:txBody>
+          <a:bodyPr wrap="none" rtlCol="0">
+            <a:spAutoFit/>
+          </a:bodyPr>
+          <a:lstStyle/>
+          <a:p>
+            <a:r>
+              <a:rPr lang="fr-CH" dirty="0"/>
+              <a:t>1</a:t>
+            </a:r>
+          </a:p>
+        </p:txBody>
+      </p:sp>
+      <p:sp>
+        <p:nvSpPr>
+          <p:cNvPr id="7" name="ZoneTexte 6">
+            <a:extLst>
+              <a:ext uri="{FF2B5EF4-FFF2-40B4-BE49-F238E27FC236}">
+                <a16:creationId xmlns:a16="http://schemas.microsoft.com/office/drawing/2014/main" id="{52128BBE-C489-A820-3B20-4F351534F4D3}"/>
+              </a:ext>
+            </a:extLst>
+          </p:cNvPr>
+          <p:cNvSpPr txBox="1"/>
+          <p:nvPr/>
+        </p:nvSpPr>
+        <p:spPr>
+          <a:xfrm>
+            <a:off x="5508288" y="1907448"/>
+            <a:ext cx="301686" cy="369332"/>
+          </a:xfrm>
+          <a:prstGeom prst="rect">
+            <a:avLst/>
+          </a:prstGeom>
+          <a:noFill/>
+        </p:spPr>
+        <p:txBody>
+          <a:bodyPr wrap="none" rtlCol="0">
+            <a:spAutoFit/>
+          </a:bodyPr>
+          <a:lstStyle/>
+          <a:p>
+            <a:r>
+              <a:rPr lang="fr-CH" dirty="0"/>
+              <a:t>2</a:t>
+            </a:r>
+          </a:p>
+        </p:txBody>
+      </p:sp>
+      <p:sp>
+        <p:nvSpPr>
+          <p:cNvPr id="8" name="ZoneTexte 6">
+            <a:extLst>
+              <a:ext uri="{FF2B5EF4-FFF2-40B4-BE49-F238E27FC236}">
+                <a16:creationId xmlns:a16="http://schemas.microsoft.com/office/drawing/2014/main" id="{853A1612-4AB2-8CBB-6EEE-46C61580AA37}"/>
+              </a:ext>
+            </a:extLst>
+          </p:cNvPr>
+          <p:cNvSpPr txBox="1"/>
+          <p:nvPr/>
+        </p:nvSpPr>
+        <p:spPr>
+          <a:xfrm>
+            <a:off x="2298448" y="2650498"/>
+            <a:ext cx="301686" cy="369332"/>
+          </a:xfrm>
+          <a:prstGeom prst="rect">
+            <a:avLst/>
+          </a:prstGeom>
+          <a:noFill/>
+        </p:spPr>
+        <p:txBody>
+          <a:bodyPr wrap="none" rtlCol="0">
+            <a:spAutoFit/>
+          </a:bodyPr>
+          <a:lstStyle/>
+          <a:p>
+            <a:r>
+              <a:rPr lang="fr-CH" dirty="0"/>
+              <a:t>3</a:t>
+            </a:r>
+          </a:p>
+        </p:txBody>
+      </p:sp>
+      <p:sp>
+        <p:nvSpPr>
+          <p:cNvPr id="9" name="ZoneTexte 6">
+            <a:extLst>
+              <a:ext uri="{FF2B5EF4-FFF2-40B4-BE49-F238E27FC236}">
+                <a16:creationId xmlns:a16="http://schemas.microsoft.com/office/drawing/2014/main" id="{2C42801F-2DDC-97A2-0BB9-51D3637CEC0A}"/>
+              </a:ext>
+            </a:extLst>
+          </p:cNvPr>
+          <p:cNvSpPr txBox="1"/>
+          <p:nvPr/>
+        </p:nvSpPr>
+        <p:spPr>
+          <a:xfrm>
+            <a:off x="5102283" y="2917628"/>
+            <a:ext cx="301686" cy="369332"/>
+          </a:xfrm>
+          <a:prstGeom prst="rect">
+            <a:avLst/>
+          </a:prstGeom>
+          <a:noFill/>
+        </p:spPr>
+        <p:txBody>
+          <a:bodyPr wrap="none" rtlCol="0">
+            <a:spAutoFit/>
+          </a:bodyPr>
+          <a:lstStyle/>
+          <a:p>
+            <a:r>
+              <a:rPr lang="fr-CH" dirty="0"/>
+              <a:t>5</a:t>
+            </a:r>
+          </a:p>
+        </p:txBody>
+      </p:sp>
+      <p:sp>
+        <p:nvSpPr>
+          <p:cNvPr id="10" name="ZoneTexte 6">
+            <a:extLst>
+              <a:ext uri="{FF2B5EF4-FFF2-40B4-BE49-F238E27FC236}">
+                <a16:creationId xmlns:a16="http://schemas.microsoft.com/office/drawing/2014/main" id="{45D8BE27-285D-CB26-E6A0-E9C7BBCD7970}"/>
+              </a:ext>
+            </a:extLst>
+          </p:cNvPr>
+          <p:cNvSpPr txBox="1"/>
+          <p:nvPr/>
+        </p:nvSpPr>
+        <p:spPr>
+          <a:xfrm>
+            <a:off x="7672337" y="1580914"/>
+            <a:ext cx="301686" cy="369332"/>
+          </a:xfrm>
+          <a:prstGeom prst="rect">
+            <a:avLst/>
+          </a:prstGeom>
+          <a:noFill/>
+        </p:spPr>
+        <p:txBody>
+          <a:bodyPr wrap="none" rtlCol="0">
+            <a:spAutoFit/>
+          </a:bodyPr>
+          <a:lstStyle/>
+          <a:p>
+            <a:r>
+              <a:rPr lang="fr-CH" dirty="0"/>
+              <a:t>6</a:t>
+            </a:r>
+          </a:p>
+        </p:txBody>
+      </p:sp>
+      <p:sp>
+        <p:nvSpPr>
+          <p:cNvPr id="11" name="ZoneTexte 6">
+            <a:extLst>
+              <a:ext uri="{FF2B5EF4-FFF2-40B4-BE49-F238E27FC236}">
+                <a16:creationId xmlns:a16="http://schemas.microsoft.com/office/drawing/2014/main" id="{11D4AAAC-3DB8-D213-FA9F-605D3A1047CE}"/>
+              </a:ext>
+            </a:extLst>
+          </p:cNvPr>
+          <p:cNvSpPr txBox="1"/>
+          <p:nvPr/>
+        </p:nvSpPr>
+        <p:spPr>
+          <a:xfrm>
+            <a:off x="7672337" y="1859127"/>
+            <a:ext cx="301686" cy="369332"/>
+          </a:xfrm>
+          <a:prstGeom prst="rect">
+            <a:avLst/>
+          </a:prstGeom>
+          <a:noFill/>
+        </p:spPr>
+        <p:txBody>
+          <a:bodyPr wrap="none" rtlCol="0">
+            <a:spAutoFit/>
+          </a:bodyPr>
+          <a:lstStyle/>
+          <a:p>
+            <a:r>
+              <a:rPr lang="fr-CH" dirty="0"/>
+              <a:t>7</a:t>
+            </a:r>
+          </a:p>
+        </p:txBody>
+      </p:sp>
+      <p:sp>
+        <p:nvSpPr>
+          <p:cNvPr id="12" name="ZoneTexte 6">
+            <a:extLst>
+              <a:ext uri="{FF2B5EF4-FFF2-40B4-BE49-F238E27FC236}">
+                <a16:creationId xmlns:a16="http://schemas.microsoft.com/office/drawing/2014/main" id="{20623E13-8E32-802B-9891-E2F89275FD1C}"/>
+              </a:ext>
+            </a:extLst>
+          </p:cNvPr>
+          <p:cNvSpPr txBox="1"/>
+          <p:nvPr/>
+        </p:nvSpPr>
+        <p:spPr>
+          <a:xfrm>
+            <a:off x="7624474" y="2322006"/>
+            <a:ext cx="301686" cy="369332"/>
+          </a:xfrm>
+          <a:prstGeom prst="rect">
+            <a:avLst/>
+          </a:prstGeom>
+          <a:noFill/>
+        </p:spPr>
+        <p:txBody>
+          <a:bodyPr wrap="none" rtlCol="0">
+            <a:spAutoFit/>
+          </a:bodyPr>
+          <a:lstStyle/>
+          <a:p>
+            <a:r>
+              <a:rPr lang="fr-CH" dirty="0"/>
+              <a:t>8</a:t>
+            </a:r>
+          </a:p>
+        </p:txBody>
+      </p:sp>
+      <p:sp>
+        <p:nvSpPr>
+          <p:cNvPr id="13" name="ZoneTexte 6">
+            <a:extLst>
+              <a:ext uri="{FF2B5EF4-FFF2-40B4-BE49-F238E27FC236}">
+                <a16:creationId xmlns:a16="http://schemas.microsoft.com/office/drawing/2014/main" id="{4F175A14-DBC2-6558-DC93-BD80F749B190}"/>
+              </a:ext>
+            </a:extLst>
+          </p:cNvPr>
+          <p:cNvSpPr txBox="1"/>
+          <p:nvPr/>
+        </p:nvSpPr>
+        <p:spPr>
+          <a:xfrm>
+            <a:off x="3483954" y="2363630"/>
+            <a:ext cx="301686" cy="369332"/>
+          </a:xfrm>
+          <a:prstGeom prst="rect">
+            <a:avLst/>
+          </a:prstGeom>
+          <a:noFill/>
+        </p:spPr>
+        <p:txBody>
+          <a:bodyPr wrap="none" rtlCol="0">
+            <a:spAutoFit/>
+          </a:bodyPr>
+          <a:lstStyle/>
+          <a:p>
+            <a:r>
+              <a:rPr lang="fr-CH" dirty="0"/>
+              <a:t>4</a:t>
+            </a:r>
+          </a:p>
+        </p:txBody>
+      </p:sp>
+      <p:sp>
+        <p:nvSpPr>
+          <p:cNvPr id="4" name="ZoneTexte 6">
+            <a:extLst>
+              <a:ext uri="{FF2B5EF4-FFF2-40B4-BE49-F238E27FC236}">
+                <a16:creationId xmlns:a16="http://schemas.microsoft.com/office/drawing/2014/main" id="{BB89A589-96B6-B6E6-E6FC-164D8DE69E11}"/>
+              </a:ext>
+            </a:extLst>
+          </p:cNvPr>
+          <p:cNvSpPr txBox="1"/>
+          <p:nvPr/>
+        </p:nvSpPr>
+        <p:spPr>
+          <a:xfrm>
+            <a:off x="6616534" y="4007220"/>
+            <a:ext cx="418704" cy="369332"/>
+          </a:xfrm>
+          <a:prstGeom prst="rect">
+            <a:avLst/>
+          </a:prstGeom>
+          <a:noFill/>
+        </p:spPr>
+        <p:txBody>
+          <a:bodyPr wrap="none" rtlCol="0">
+            <a:spAutoFit/>
+          </a:bodyPr>
+          <a:lstStyle/>
+          <a:p>
+            <a:r>
+              <a:rPr lang="fr-CH" dirty="0"/>
+              <a:t>10</a:t>
+            </a:r>
+          </a:p>
+        </p:txBody>
+      </p:sp>
+      <p:sp>
+        <p:nvSpPr>
+          <p:cNvPr id="16" name="ZoneTexte 6">
+            <a:extLst>
+              <a:ext uri="{FF2B5EF4-FFF2-40B4-BE49-F238E27FC236}">
+                <a16:creationId xmlns:a16="http://schemas.microsoft.com/office/drawing/2014/main" id="{9B6B32A0-2C6E-2836-0014-2F638639965F}"/>
+              </a:ext>
+            </a:extLst>
+          </p:cNvPr>
+          <p:cNvSpPr txBox="1"/>
+          <p:nvPr/>
+        </p:nvSpPr>
+        <p:spPr>
+          <a:xfrm>
+            <a:off x="7624474" y="2784885"/>
+            <a:ext cx="301686" cy="369332"/>
+          </a:xfrm>
+          <a:prstGeom prst="rect">
+            <a:avLst/>
+          </a:prstGeom>
+          <a:noFill/>
+        </p:spPr>
+        <p:txBody>
+          <a:bodyPr wrap="none" rtlCol="0">
+            <a:spAutoFit/>
+          </a:bodyPr>
+          <a:lstStyle/>
+          <a:p>
+            <a:r>
+              <a:rPr lang="fr-CH" dirty="0"/>
+              <a:t>9</a:t>
+            </a:r>
+          </a:p>
+        </p:txBody>
+      </p:sp>
+    </p:spTree>
+    <p:extLst>
+      <p:ext uri="{BB962C8B-B14F-4D97-AF65-F5344CB8AC3E}">
+        <p14:creationId xmlns:p14="http://schemas.microsoft.com/office/powerpoint/2010/main" val="3555244142"/>
+      </p:ext>
+    </p:extLst>
+  </p:cSld>
+  <p:clrMapOvr>
+    <a:masterClrMapping/>
+  </p:clrMapOvr>
+</p:sld>
+</file>
+
+<file path=ppt/slides/slide23.xml><?xml version="1.0" encoding="utf-8"?>
+<p:sld xmlns:a="http://schemas.openxmlformats.org/drawingml/2006/main" xmlns:r="http://schemas.openxmlformats.org/officeDocument/2006/relationships" xmlns:p="http://schemas.openxmlformats.org/presentationml/2006/main">
+  <p:cSld>
+    <p:spTree>
+      <p:nvGrpSpPr>
         <p:cNvPr id="1" name=""/>
         <p:cNvGrpSpPr/>
         <p:nvPr/>
@@ -11711,10 +12164,10 @@
       </p:grpSpPr>
       <p:pic>
         <p:nvPicPr>
-          <p:cNvPr id="15" name="Picture 14">
-            <a:extLst>
-              <a:ext uri="{FF2B5EF4-FFF2-40B4-BE49-F238E27FC236}">
-                <a16:creationId xmlns:a16="http://schemas.microsoft.com/office/drawing/2014/main" id="{8498B020-F21B-1703-2097-B2A8C382A3B2}"/>
+          <p:cNvPr id="3" name="Picture 2">
+            <a:extLst>
+              <a:ext uri="{FF2B5EF4-FFF2-40B4-BE49-F238E27FC236}">
+                <a16:creationId xmlns:a16="http://schemas.microsoft.com/office/drawing/2014/main" id="{5CD78B1E-FAC1-6FA1-B78B-81C2ABB8112E}"/>
               </a:ext>
             </a:extLst>
           </p:cNvPr>
@@ -11731,8 +12184,8 @@
         </p:blipFill>
         <p:spPr>
           <a:xfrm>
-            <a:off x="614784" y="1096421"/>
-            <a:ext cx="7482071" cy="3477486"/>
+            <a:off x="826548" y="1164398"/>
+            <a:ext cx="7051748" cy="3477486"/>
           </a:xfrm>
           <a:prstGeom prst="rect">
             <a:avLst/>
@@ -11753,7 +12206,7 @@
         </p:nvSpPr>
         <p:spPr>
           <a:xfrm>
-            <a:off x="2167312" y="1907448"/>
+            <a:off x="2242726" y="1907448"/>
             <a:ext cx="301686" cy="369332"/>
           </a:xfrm>
           <a:prstGeom prst="rect">
@@ -11788,7 +12241,7 @@
         </p:nvSpPr>
         <p:spPr>
           <a:xfrm>
-            <a:off x="5564849" y="1907448"/>
+            <a:off x="5508288" y="1907448"/>
             <a:ext cx="301686" cy="369332"/>
           </a:xfrm>
           <a:prstGeom prst="rect">
@@ -11823,7 +12276,7 @@
         </p:nvSpPr>
         <p:spPr>
           <a:xfrm>
-            <a:off x="2167312" y="2718475"/>
+            <a:off x="2298448" y="2650498"/>
             <a:ext cx="301686" cy="369332"/>
           </a:xfrm>
           <a:prstGeom prst="rect">
@@ -11893,7 +12346,7 @@
         </p:nvSpPr>
         <p:spPr>
           <a:xfrm>
-            <a:off x="7878296" y="1907448"/>
+            <a:off x="7576610" y="1765580"/>
             <a:ext cx="301686" cy="369332"/>
           </a:xfrm>
           <a:prstGeom prst="rect">
@@ -11928,7 +12381,7 @@
         </p:nvSpPr>
         <p:spPr>
           <a:xfrm>
-            <a:off x="7878296" y="2732962"/>
+            <a:off x="7606348" y="2316495"/>
             <a:ext cx="301686" cy="369332"/>
           </a:xfrm>
           <a:prstGeom prst="rect">
@@ -11963,7 +12416,7 @@
         </p:nvSpPr>
         <p:spPr>
           <a:xfrm>
-            <a:off x="6630790" y="3983247"/>
+            <a:off x="7606348" y="2781735"/>
             <a:ext cx="301686" cy="369332"/>
           </a:xfrm>
           <a:prstGeom prst="rect">
@@ -12015,6 +12468,41 @@
             <a:r>
               <a:rPr lang="fr-CH" dirty="0"/>
               <a:t>4</a:t>
+            </a:r>
+          </a:p>
+        </p:txBody>
+      </p:sp>
+      <p:sp>
+        <p:nvSpPr>
+          <p:cNvPr id="4" name="ZoneTexte 6">
+            <a:extLst>
+              <a:ext uri="{FF2B5EF4-FFF2-40B4-BE49-F238E27FC236}">
+                <a16:creationId xmlns:a16="http://schemas.microsoft.com/office/drawing/2014/main" id="{BC7787DB-4217-35B2-8DE5-67F0215CF706}"/>
+              </a:ext>
+            </a:extLst>
+          </p:cNvPr>
+          <p:cNvSpPr txBox="1"/>
+          <p:nvPr/>
+        </p:nvSpPr>
+        <p:spPr>
+          <a:xfrm>
+            <a:off x="6616534" y="4007220"/>
+            <a:ext cx="301686" cy="369332"/>
+          </a:xfrm>
+          <a:prstGeom prst="rect">
+            <a:avLst/>
+          </a:prstGeom>
+          <a:noFill/>
+        </p:spPr>
+        <p:txBody>
+          <a:bodyPr wrap="none" rtlCol="0">
+            <a:spAutoFit/>
+          </a:bodyPr>
+          <a:lstStyle/>
+          <a:p>
+            <a:r>
+              <a:rPr lang="fr-CH" dirty="0"/>
+              <a:t>9</a:t>
             </a:r>
           </a:p>
         </p:txBody>
@@ -12032,7 +12520,7 @@
 </p:sld>
 </file>
 
-<file path=ppt/slides/slide23.xml><?xml version="1.0" encoding="utf-8"?>
+<file path=ppt/slides/slide24.xml><?xml version="1.0" encoding="utf-8"?>
 <p:sld xmlns:a="http://schemas.openxmlformats.org/drawingml/2006/main" xmlns:r="http://schemas.openxmlformats.org/officeDocument/2006/relationships" xmlns:p="http://schemas.openxmlformats.org/presentationml/2006/main">
   <p:cSld>
     <p:spTree>

</xml_diff>

<commit_message>
New version of the Frequencying module
Add possibility to use the eeglab command newtimef.
Student will be able to use eeglab frequency analysis.
</commit_message>
<xml_diff>
--- a/Manuels/picture_EEGpal_manuals.pptx
+++ b/Manuels/picture_EEGpal_manuals.pptx
@@ -299,7 +299,7 @@
           <a:p>
             <a:fld id="{AE28F081-F961-4F1D-B0FD-EEC618487470}" type="datetimeFigureOut">
               <a:rPr lang="en-US" smtClean="0"/>
-              <a:t>12/29/2024</a:t>
+              <a:t>1/2/2025</a:t>
             </a:fld>
             <a:endParaRPr lang="en-US"/>
           </a:p>
@@ -747,7 +747,7 @@
           <a:p>
             <a:fld id="{BCB0654D-2F9E-40DC-B910-8F58A623289D}" type="datetimeFigureOut">
               <a:rPr lang="fr-CH" smtClean="0"/>
-              <a:t>29.12.2024</a:t>
+              <a:t>02.01.2025</a:t>
             </a:fld>
             <a:endParaRPr lang="fr-CH"/>
           </a:p>
@@ -917,7 +917,7 @@
           <a:p>
             <a:fld id="{BCB0654D-2F9E-40DC-B910-8F58A623289D}" type="datetimeFigureOut">
               <a:rPr lang="fr-CH" smtClean="0"/>
-              <a:t>29.12.2024</a:t>
+              <a:t>02.01.2025</a:t>
             </a:fld>
             <a:endParaRPr lang="fr-CH"/>
           </a:p>
@@ -1097,7 +1097,7 @@
           <a:p>
             <a:fld id="{BCB0654D-2F9E-40DC-B910-8F58A623289D}" type="datetimeFigureOut">
               <a:rPr lang="fr-CH" smtClean="0"/>
-              <a:t>29.12.2024</a:t>
+              <a:t>02.01.2025</a:t>
             </a:fld>
             <a:endParaRPr lang="fr-CH"/>
           </a:p>
@@ -1267,7 +1267,7 @@
           <a:p>
             <a:fld id="{BCB0654D-2F9E-40DC-B910-8F58A623289D}" type="datetimeFigureOut">
               <a:rPr lang="fr-CH" smtClean="0"/>
-              <a:t>29.12.2024</a:t>
+              <a:t>02.01.2025</a:t>
             </a:fld>
             <a:endParaRPr lang="fr-CH"/>
           </a:p>
@@ -1513,7 +1513,7 @@
           <a:p>
             <a:fld id="{BCB0654D-2F9E-40DC-B910-8F58A623289D}" type="datetimeFigureOut">
               <a:rPr lang="fr-CH" smtClean="0"/>
-              <a:t>29.12.2024</a:t>
+              <a:t>02.01.2025</a:t>
             </a:fld>
             <a:endParaRPr lang="fr-CH"/>
           </a:p>
@@ -1801,7 +1801,7 @@
           <a:p>
             <a:fld id="{BCB0654D-2F9E-40DC-B910-8F58A623289D}" type="datetimeFigureOut">
               <a:rPr lang="fr-CH" smtClean="0"/>
-              <a:t>29.12.2024</a:t>
+              <a:t>02.01.2025</a:t>
             </a:fld>
             <a:endParaRPr lang="fr-CH"/>
           </a:p>
@@ -2223,7 +2223,7 @@
           <a:p>
             <a:fld id="{BCB0654D-2F9E-40DC-B910-8F58A623289D}" type="datetimeFigureOut">
               <a:rPr lang="fr-CH" smtClean="0"/>
-              <a:t>29.12.2024</a:t>
+              <a:t>02.01.2025</a:t>
             </a:fld>
             <a:endParaRPr lang="fr-CH"/>
           </a:p>
@@ -2341,7 +2341,7 @@
           <a:p>
             <a:fld id="{BCB0654D-2F9E-40DC-B910-8F58A623289D}" type="datetimeFigureOut">
               <a:rPr lang="fr-CH" smtClean="0"/>
-              <a:t>29.12.2024</a:t>
+              <a:t>02.01.2025</a:t>
             </a:fld>
             <a:endParaRPr lang="fr-CH"/>
           </a:p>
@@ -2436,7 +2436,7 @@
           <a:p>
             <a:fld id="{BCB0654D-2F9E-40DC-B910-8F58A623289D}" type="datetimeFigureOut">
               <a:rPr lang="fr-CH" smtClean="0"/>
-              <a:t>29.12.2024</a:t>
+              <a:t>02.01.2025</a:t>
             </a:fld>
             <a:endParaRPr lang="fr-CH"/>
           </a:p>
@@ -2713,7 +2713,7 @@
           <a:p>
             <a:fld id="{BCB0654D-2F9E-40DC-B910-8F58A623289D}" type="datetimeFigureOut">
               <a:rPr lang="fr-CH" smtClean="0"/>
-              <a:t>29.12.2024</a:t>
+              <a:t>02.01.2025</a:t>
             </a:fld>
             <a:endParaRPr lang="fr-CH"/>
           </a:p>
@@ -2966,7 +2966,7 @@
           <a:p>
             <a:fld id="{BCB0654D-2F9E-40DC-B910-8F58A623289D}" type="datetimeFigureOut">
               <a:rPr lang="fr-CH" smtClean="0"/>
-              <a:t>29.12.2024</a:t>
+              <a:t>02.01.2025</a:t>
             </a:fld>
             <a:endParaRPr lang="fr-CH"/>
           </a:p>
@@ -3179,7 +3179,7 @@
           <a:p>
             <a:fld id="{BCB0654D-2F9E-40DC-B910-8F58A623289D}" type="datetimeFigureOut">
               <a:rPr lang="fr-CH" smtClean="0"/>
-              <a:t>29.12.2024</a:t>
+              <a:t>02.01.2025</a:t>
             </a:fld>
             <a:endParaRPr lang="fr-CH"/>
           </a:p>
@@ -10175,10 +10175,10 @@
       </p:grpSpPr>
       <p:pic>
         <p:nvPicPr>
-          <p:cNvPr id="5" name="Picture 4">
-            <a:extLst>
-              <a:ext uri="{FF2B5EF4-FFF2-40B4-BE49-F238E27FC236}">
-                <a16:creationId xmlns:a16="http://schemas.microsoft.com/office/drawing/2014/main" id="{AAF6D85C-CAA8-80AD-88AE-E210B28FCAFC}"/>
+          <p:cNvPr id="9" name="Picture 8">
+            <a:extLst>
+              <a:ext uri="{FF2B5EF4-FFF2-40B4-BE49-F238E27FC236}">
+                <a16:creationId xmlns:a16="http://schemas.microsoft.com/office/drawing/2014/main" id="{166D1EB5-6C25-398C-62F9-35A2EEB6FC0B}"/>
               </a:ext>
             </a:extLst>
           </p:cNvPr>
@@ -10513,7 +10513,7 @@
           <a:p>
             <a:r>
               <a:rPr lang="fr-CH" dirty="0"/>
-              <a:t>16</a:t>
+              <a:t>17</a:t>
             </a:r>
           </a:p>
         </p:txBody>
@@ -11126,7 +11126,7 @@
           <a:p>
             <a:r>
               <a:rPr lang="fr-CH" dirty="0"/>
-              <a:t>12</a:t>
+              <a:t>13</a:t>
             </a:r>
           </a:p>
         </p:txBody>
@@ -11161,7 +11161,7 @@
           <a:p>
             <a:r>
               <a:rPr lang="fr-CH" dirty="0"/>
-              <a:t>13</a:t>
+              <a:t>14</a:t>
             </a:r>
           </a:p>
         </p:txBody>
@@ -11196,7 +11196,7 @@
           <a:p>
             <a:r>
               <a:rPr lang="fr-CH" dirty="0"/>
-              <a:t>14</a:t>
+              <a:t>15</a:t>
             </a:r>
           </a:p>
         </p:txBody>
@@ -11231,7 +11231,42 @@
           <a:p>
             <a:r>
               <a:rPr lang="fr-CH" dirty="0"/>
-              <a:t>15</a:t>
+              <a:t>16</a:t>
+            </a:r>
+          </a:p>
+        </p:txBody>
+      </p:sp>
+      <p:sp>
+        <p:nvSpPr>
+          <p:cNvPr id="10" name="ZoneTexte 11">
+            <a:extLst>
+              <a:ext uri="{FF2B5EF4-FFF2-40B4-BE49-F238E27FC236}">
+                <a16:creationId xmlns:a16="http://schemas.microsoft.com/office/drawing/2014/main" id="{DB4C6D7A-2E1D-6813-B6A9-63E6448DA718}"/>
+              </a:ext>
+            </a:extLst>
+          </p:cNvPr>
+          <p:cNvSpPr txBox="1"/>
+          <p:nvPr/>
+        </p:nvSpPr>
+        <p:spPr>
+          <a:xfrm>
+            <a:off x="1019245" y="3744261"/>
+            <a:ext cx="418704" cy="369332"/>
+          </a:xfrm>
+          <a:prstGeom prst="rect">
+            <a:avLst/>
+          </a:prstGeom>
+          <a:noFill/>
+        </p:spPr>
+        <p:txBody>
+          <a:bodyPr wrap="none" rtlCol="0">
+            <a:spAutoFit/>
+          </a:bodyPr>
+          <a:lstStyle/>
+          <a:p>
+            <a:r>
+              <a:rPr lang="fr-CH" dirty="0"/>
+              <a:t>12</a:t>
             </a:r>
           </a:p>
         </p:txBody>

</xml_diff>

<commit_message>
start of redaction of Epoching manual
</commit_message>
<xml_diff>
--- a/Manuels/picture_EEGpal_manuals.pptx
+++ b/Manuels/picture_EEGpal_manuals.pptx
@@ -299,7 +299,7 @@
           <a:p>
             <a:fld id="{AE28F081-F961-4F1D-B0FD-EEC618487470}" type="datetimeFigureOut">
               <a:rPr lang="en-US" smtClean="0"/>
-              <a:t>1/2/2025</a:t>
+              <a:t>1/16/2025</a:t>
             </a:fld>
             <a:endParaRPr lang="en-US"/>
           </a:p>
@@ -457,7 +457,7 @@
           <a:p>
             <a:fld id="{4F883EE1-A198-44E6-8EE0-87093AF46706}" type="slidenum">
               <a:rPr lang="en-US" smtClean="0"/>
-              <a:t>‹#›</a:t>
+              <a:t>‹N°›</a:t>
             </a:fld>
             <a:endParaRPr lang="en-US"/>
           </a:p>
@@ -747,7 +747,7 @@
           <a:p>
             <a:fld id="{BCB0654D-2F9E-40DC-B910-8F58A623289D}" type="datetimeFigureOut">
               <a:rPr lang="fr-CH" smtClean="0"/>
-              <a:t>02.01.2025</a:t>
+              <a:t>16.01.2025</a:t>
             </a:fld>
             <a:endParaRPr lang="fr-CH"/>
           </a:p>
@@ -789,7 +789,7 @@
           <a:p>
             <a:fld id="{E113E0DD-F661-4EF4-80E8-EFF83EB1839D}" type="slidenum">
               <a:rPr lang="fr-CH" smtClean="0"/>
-              <a:t>‹#›</a:t>
+              <a:t>‹N°›</a:t>
             </a:fld>
             <a:endParaRPr lang="fr-CH"/>
           </a:p>
@@ -917,7 +917,7 @@
           <a:p>
             <a:fld id="{BCB0654D-2F9E-40DC-B910-8F58A623289D}" type="datetimeFigureOut">
               <a:rPr lang="fr-CH" smtClean="0"/>
-              <a:t>02.01.2025</a:t>
+              <a:t>16.01.2025</a:t>
             </a:fld>
             <a:endParaRPr lang="fr-CH"/>
           </a:p>
@@ -959,7 +959,7 @@
           <a:p>
             <a:fld id="{E113E0DD-F661-4EF4-80E8-EFF83EB1839D}" type="slidenum">
               <a:rPr lang="fr-CH" smtClean="0"/>
-              <a:t>‹#›</a:t>
+              <a:t>‹N°›</a:t>
             </a:fld>
             <a:endParaRPr lang="fr-CH"/>
           </a:p>
@@ -1097,7 +1097,7 @@
           <a:p>
             <a:fld id="{BCB0654D-2F9E-40DC-B910-8F58A623289D}" type="datetimeFigureOut">
               <a:rPr lang="fr-CH" smtClean="0"/>
-              <a:t>02.01.2025</a:t>
+              <a:t>16.01.2025</a:t>
             </a:fld>
             <a:endParaRPr lang="fr-CH"/>
           </a:p>
@@ -1139,7 +1139,7 @@
           <a:p>
             <a:fld id="{E113E0DD-F661-4EF4-80E8-EFF83EB1839D}" type="slidenum">
               <a:rPr lang="fr-CH" smtClean="0"/>
-              <a:t>‹#›</a:t>
+              <a:t>‹N°›</a:t>
             </a:fld>
             <a:endParaRPr lang="fr-CH"/>
           </a:p>
@@ -1267,7 +1267,7 @@
           <a:p>
             <a:fld id="{BCB0654D-2F9E-40DC-B910-8F58A623289D}" type="datetimeFigureOut">
               <a:rPr lang="fr-CH" smtClean="0"/>
-              <a:t>02.01.2025</a:t>
+              <a:t>16.01.2025</a:t>
             </a:fld>
             <a:endParaRPr lang="fr-CH"/>
           </a:p>
@@ -1309,7 +1309,7 @@
           <a:p>
             <a:fld id="{E113E0DD-F661-4EF4-80E8-EFF83EB1839D}" type="slidenum">
               <a:rPr lang="fr-CH" smtClean="0"/>
-              <a:t>‹#›</a:t>
+              <a:t>‹N°›</a:t>
             </a:fld>
             <a:endParaRPr lang="fr-CH"/>
           </a:p>
@@ -1513,7 +1513,7 @@
           <a:p>
             <a:fld id="{BCB0654D-2F9E-40DC-B910-8F58A623289D}" type="datetimeFigureOut">
               <a:rPr lang="fr-CH" smtClean="0"/>
-              <a:t>02.01.2025</a:t>
+              <a:t>16.01.2025</a:t>
             </a:fld>
             <a:endParaRPr lang="fr-CH"/>
           </a:p>
@@ -1555,7 +1555,7 @@
           <a:p>
             <a:fld id="{E113E0DD-F661-4EF4-80E8-EFF83EB1839D}" type="slidenum">
               <a:rPr lang="fr-CH" smtClean="0"/>
-              <a:t>‹#›</a:t>
+              <a:t>‹N°›</a:t>
             </a:fld>
             <a:endParaRPr lang="fr-CH"/>
           </a:p>
@@ -1801,7 +1801,7 @@
           <a:p>
             <a:fld id="{BCB0654D-2F9E-40DC-B910-8F58A623289D}" type="datetimeFigureOut">
               <a:rPr lang="fr-CH" smtClean="0"/>
-              <a:t>02.01.2025</a:t>
+              <a:t>16.01.2025</a:t>
             </a:fld>
             <a:endParaRPr lang="fr-CH"/>
           </a:p>
@@ -1843,7 +1843,7 @@
           <a:p>
             <a:fld id="{E113E0DD-F661-4EF4-80E8-EFF83EB1839D}" type="slidenum">
               <a:rPr lang="fr-CH" smtClean="0"/>
-              <a:t>‹#›</a:t>
+              <a:t>‹N°›</a:t>
             </a:fld>
             <a:endParaRPr lang="fr-CH"/>
           </a:p>
@@ -2223,7 +2223,7 @@
           <a:p>
             <a:fld id="{BCB0654D-2F9E-40DC-B910-8F58A623289D}" type="datetimeFigureOut">
               <a:rPr lang="fr-CH" smtClean="0"/>
-              <a:t>02.01.2025</a:t>
+              <a:t>16.01.2025</a:t>
             </a:fld>
             <a:endParaRPr lang="fr-CH"/>
           </a:p>
@@ -2265,7 +2265,7 @@
           <a:p>
             <a:fld id="{E113E0DD-F661-4EF4-80E8-EFF83EB1839D}" type="slidenum">
               <a:rPr lang="fr-CH" smtClean="0"/>
-              <a:t>‹#›</a:t>
+              <a:t>‹N°›</a:t>
             </a:fld>
             <a:endParaRPr lang="fr-CH"/>
           </a:p>
@@ -2341,7 +2341,7 @@
           <a:p>
             <a:fld id="{BCB0654D-2F9E-40DC-B910-8F58A623289D}" type="datetimeFigureOut">
               <a:rPr lang="fr-CH" smtClean="0"/>
-              <a:t>02.01.2025</a:t>
+              <a:t>16.01.2025</a:t>
             </a:fld>
             <a:endParaRPr lang="fr-CH"/>
           </a:p>
@@ -2383,7 +2383,7 @@
           <a:p>
             <a:fld id="{E113E0DD-F661-4EF4-80E8-EFF83EB1839D}" type="slidenum">
               <a:rPr lang="fr-CH" smtClean="0"/>
-              <a:t>‹#›</a:t>
+              <a:t>‹N°›</a:t>
             </a:fld>
             <a:endParaRPr lang="fr-CH"/>
           </a:p>
@@ -2436,7 +2436,7 @@
           <a:p>
             <a:fld id="{BCB0654D-2F9E-40DC-B910-8F58A623289D}" type="datetimeFigureOut">
               <a:rPr lang="fr-CH" smtClean="0"/>
-              <a:t>02.01.2025</a:t>
+              <a:t>16.01.2025</a:t>
             </a:fld>
             <a:endParaRPr lang="fr-CH"/>
           </a:p>
@@ -2478,7 +2478,7 @@
           <a:p>
             <a:fld id="{E113E0DD-F661-4EF4-80E8-EFF83EB1839D}" type="slidenum">
               <a:rPr lang="fr-CH" smtClean="0"/>
-              <a:t>‹#›</a:t>
+              <a:t>‹N°›</a:t>
             </a:fld>
             <a:endParaRPr lang="fr-CH"/>
           </a:p>
@@ -2713,7 +2713,7 @@
           <a:p>
             <a:fld id="{BCB0654D-2F9E-40DC-B910-8F58A623289D}" type="datetimeFigureOut">
               <a:rPr lang="fr-CH" smtClean="0"/>
-              <a:t>02.01.2025</a:t>
+              <a:t>16.01.2025</a:t>
             </a:fld>
             <a:endParaRPr lang="fr-CH"/>
           </a:p>
@@ -2755,7 +2755,7 @@
           <a:p>
             <a:fld id="{E113E0DD-F661-4EF4-80E8-EFF83EB1839D}" type="slidenum">
               <a:rPr lang="fr-CH" smtClean="0"/>
-              <a:t>‹#›</a:t>
+              <a:t>‹N°›</a:t>
             </a:fld>
             <a:endParaRPr lang="fr-CH"/>
           </a:p>
@@ -2966,7 +2966,7 @@
           <a:p>
             <a:fld id="{BCB0654D-2F9E-40DC-B910-8F58A623289D}" type="datetimeFigureOut">
               <a:rPr lang="fr-CH" smtClean="0"/>
-              <a:t>02.01.2025</a:t>
+              <a:t>16.01.2025</a:t>
             </a:fld>
             <a:endParaRPr lang="fr-CH"/>
           </a:p>
@@ -3008,7 +3008,7 @@
           <a:p>
             <a:fld id="{E113E0DD-F661-4EF4-80E8-EFF83EB1839D}" type="slidenum">
               <a:rPr lang="fr-CH" smtClean="0"/>
-              <a:t>‹#›</a:t>
+              <a:t>‹N°›</a:t>
             </a:fld>
             <a:endParaRPr lang="fr-CH"/>
           </a:p>
@@ -3179,7 +3179,7 @@
           <a:p>
             <a:fld id="{BCB0654D-2F9E-40DC-B910-8F58A623289D}" type="datetimeFigureOut">
               <a:rPr lang="fr-CH" smtClean="0"/>
-              <a:t>02.01.2025</a:t>
+              <a:t>16.01.2025</a:t>
             </a:fld>
             <a:endParaRPr lang="fr-CH"/>
           </a:p>
@@ -3257,7 +3257,7 @@
           <a:p>
             <a:fld id="{E113E0DD-F661-4EF4-80E8-EFF83EB1839D}" type="slidenum">
               <a:rPr lang="fr-CH" smtClean="0"/>
-              <a:t>‹#›</a:t>
+              <a:t>‹N°›</a:t>
             </a:fld>
             <a:endParaRPr lang="fr-CH"/>
           </a:p>
@@ -8313,7 +8313,7 @@
         </p:nvSpPr>
         <p:spPr>
           <a:xfrm>
-            <a:off x="2283145" y="2653673"/>
+            <a:off x="1695965" y="1843613"/>
             <a:ext cx="301686" cy="369332"/>
           </a:xfrm>
           <a:prstGeom prst="rect">
@@ -8348,7 +8348,7 @@
         </p:nvSpPr>
         <p:spPr>
           <a:xfrm>
-            <a:off x="6680084" y="3111764"/>
+            <a:off x="6800160" y="1778061"/>
             <a:ext cx="301686" cy="369332"/>
           </a:xfrm>
           <a:prstGeom prst="rect">
@@ -8418,7 +8418,7 @@
         </p:nvSpPr>
         <p:spPr>
           <a:xfrm>
-            <a:off x="2467919" y="3785296"/>
+            <a:off x="2653229" y="3077130"/>
             <a:ext cx="301686" cy="369332"/>
           </a:xfrm>
           <a:prstGeom prst="rect">
@@ -8434,7 +8434,7 @@
           <a:p>
             <a:r>
               <a:rPr lang="fr-CH" dirty="0"/>
-              <a:t>2</a:t>
+              <a:t>1</a:t>
             </a:r>
           </a:p>
         </p:txBody>
@@ -8532,7 +8532,7 @@
         </p:nvSpPr>
         <p:spPr>
           <a:xfrm>
-            <a:off x="4505699" y="6273973"/>
+            <a:off x="7146349" y="1920517"/>
             <a:ext cx="301686" cy="369332"/>
           </a:xfrm>
           <a:prstGeom prst="rect">
@@ -8602,7 +8602,7 @@
         </p:nvSpPr>
         <p:spPr>
           <a:xfrm>
-            <a:off x="5229249" y="6278175"/>
+            <a:off x="7641067" y="1902905"/>
             <a:ext cx="301686" cy="369332"/>
           </a:xfrm>
           <a:prstGeom prst="rect">
@@ -8625,90 +8625,10 @@
       </p:sp>
       <p:sp>
         <p:nvSpPr>
-          <p:cNvPr id="34" name="TextBox 33">
-            <a:extLst>
-              <a:ext uri="{FF2B5EF4-FFF2-40B4-BE49-F238E27FC236}">
-                <a16:creationId xmlns:a16="http://schemas.microsoft.com/office/drawing/2014/main" id="{DD6A987D-1BFD-1E25-8C33-F2E82DF24B13}"/>
-              </a:ext>
-            </a:extLst>
-          </p:cNvPr>
-          <p:cNvSpPr txBox="1"/>
-          <p:nvPr/>
-        </p:nvSpPr>
-        <p:spPr>
-          <a:xfrm>
-            <a:off x="1848741" y="4025178"/>
-            <a:ext cx="277640" cy="169277"/>
-          </a:xfrm>
-          <a:prstGeom prst="rect">
-            <a:avLst/>
-          </a:prstGeom>
-          <a:noFill/>
-        </p:spPr>
-        <p:txBody>
-          <a:bodyPr wrap="none" rtlCol="0">
-            <a:spAutoFit/>
-          </a:bodyPr>
-          <a:lstStyle/>
-          <a:p>
-            <a:r>
-              <a:rPr lang="en-US" sz="400" dirty="0"/>
-              <a:t>,</a:t>
-            </a:r>
-            <a:r>
-              <a:rPr lang="en-US" sz="500" dirty="0"/>
-              <a:t>7,8</a:t>
-            </a:r>
-            <a:endParaRPr lang="en-US" sz="400" dirty="0"/>
-          </a:p>
-        </p:txBody>
-      </p:sp>
-      <p:sp>
-        <p:nvSpPr>
-          <p:cNvPr id="35" name="TextBox 34">
-            <a:extLst>
-              <a:ext uri="{FF2B5EF4-FFF2-40B4-BE49-F238E27FC236}">
-                <a16:creationId xmlns:a16="http://schemas.microsoft.com/office/drawing/2014/main" id="{A76D0ADF-5F61-BD72-A7A5-5B3AB8802DA1}"/>
-              </a:ext>
-            </a:extLst>
-          </p:cNvPr>
-          <p:cNvSpPr txBox="1"/>
-          <p:nvPr/>
-        </p:nvSpPr>
-        <p:spPr>
-          <a:xfrm>
-            <a:off x="1846808" y="3323724"/>
-            <a:ext cx="277640" cy="169277"/>
-          </a:xfrm>
-          <a:prstGeom prst="rect">
-            <a:avLst/>
-          </a:prstGeom>
-          <a:noFill/>
-        </p:spPr>
-        <p:txBody>
-          <a:bodyPr wrap="none" rtlCol="0">
-            <a:spAutoFit/>
-          </a:bodyPr>
-          <a:lstStyle/>
-          <a:p>
-            <a:r>
-              <a:rPr lang="en-US" sz="400" dirty="0"/>
-              <a:t>,</a:t>
-            </a:r>
-            <a:r>
-              <a:rPr lang="en-US" sz="500" dirty="0"/>
-              <a:t>7,8</a:t>
-            </a:r>
-            <a:endParaRPr lang="en-US" sz="400" dirty="0"/>
-          </a:p>
-        </p:txBody>
-      </p:sp>
-      <p:sp>
-        <p:nvSpPr>
-          <p:cNvPr id="36" name="Rectangle 35">
-            <a:extLst>
-              <a:ext uri="{FF2B5EF4-FFF2-40B4-BE49-F238E27FC236}">
-                <a16:creationId xmlns:a16="http://schemas.microsoft.com/office/drawing/2014/main" id="{D03159ED-CFDA-5258-8554-8A6291023C19}"/>
+          <p:cNvPr id="2" name="Rectangle 1">
+            <a:extLst>
+              <a:ext uri="{FF2B5EF4-FFF2-40B4-BE49-F238E27FC236}">
+                <a16:creationId xmlns:a16="http://schemas.microsoft.com/office/drawing/2014/main" id="{5A87A854-4774-50BF-A881-BDCF17829898}"/>
               </a:ext>
             </a:extLst>
           </p:cNvPr>
@@ -8717,8 +8637,8 @@
         </p:nvSpPr>
         <p:spPr>
           <a:xfrm>
-            <a:off x="5715216" y="3352800"/>
-            <a:ext cx="124548" cy="107156"/>
+            <a:off x="1689615" y="2929246"/>
+            <a:ext cx="428483" cy="149797"/>
           </a:xfrm>
           <a:prstGeom prst="rect">
             <a:avLst/>
@@ -8752,6 +8672,270 @@
           <a:p>
             <a:pPr algn="ctr"/>
             <a:endParaRPr lang="fr-CH"/>
+          </a:p>
+        </p:txBody>
+      </p:sp>
+      <p:sp>
+        <p:nvSpPr>
+          <p:cNvPr id="5" name="Rectangle 4">
+            <a:extLst>
+              <a:ext uri="{FF2B5EF4-FFF2-40B4-BE49-F238E27FC236}">
+                <a16:creationId xmlns:a16="http://schemas.microsoft.com/office/drawing/2014/main" id="{C7402B3D-2577-AC45-49F8-A7BD62DD2EE1}"/>
+              </a:ext>
+            </a:extLst>
+          </p:cNvPr>
+          <p:cNvSpPr/>
+          <p:nvPr/>
+        </p:nvSpPr>
+        <p:spPr>
+          <a:xfrm>
+            <a:off x="6053145" y="2929245"/>
+            <a:ext cx="747015" cy="149101"/>
+          </a:xfrm>
+          <a:prstGeom prst="rect">
+            <a:avLst/>
+          </a:prstGeom>
+          <a:noFill/>
+          <a:ln>
+            <a:solidFill>
+              <a:schemeClr val="accent1">
+                <a:lumMod val="75000"/>
+              </a:schemeClr>
+            </a:solidFill>
+          </a:ln>
+        </p:spPr>
+        <p:style>
+          <a:lnRef idx="2">
+            <a:schemeClr val="accent1">
+              <a:shade val="50000"/>
+            </a:schemeClr>
+          </a:lnRef>
+          <a:fillRef idx="1">
+            <a:schemeClr val="accent1"/>
+          </a:fillRef>
+          <a:effectRef idx="0">
+            <a:schemeClr val="accent1"/>
+          </a:effectRef>
+          <a:fontRef idx="minor">
+            <a:schemeClr val="lt1"/>
+          </a:fontRef>
+        </p:style>
+        <p:txBody>
+          <a:bodyPr rtlCol="0" anchor="ctr"/>
+          <a:lstStyle/>
+          <a:p>
+            <a:pPr algn="ctr"/>
+            <a:endParaRPr lang="fr-CH"/>
+          </a:p>
+        </p:txBody>
+      </p:sp>
+      <p:sp>
+        <p:nvSpPr>
+          <p:cNvPr id="7" name="TextBox 9">
+            <a:extLst>
+              <a:ext uri="{FF2B5EF4-FFF2-40B4-BE49-F238E27FC236}">
+                <a16:creationId xmlns:a16="http://schemas.microsoft.com/office/drawing/2014/main" id="{DC0C6D2D-29F5-73D8-F6BB-7FD04E888668}"/>
+              </a:ext>
+            </a:extLst>
+          </p:cNvPr>
+          <p:cNvSpPr txBox="1"/>
+          <p:nvPr/>
+        </p:nvSpPr>
+        <p:spPr>
+          <a:xfrm>
+            <a:off x="1685997" y="2606881"/>
+            <a:ext cx="317716" cy="369332"/>
+          </a:xfrm>
+          <a:prstGeom prst="rect">
+            <a:avLst/>
+          </a:prstGeom>
+          <a:noFill/>
+        </p:spPr>
+        <p:txBody>
+          <a:bodyPr wrap="none" rtlCol="0">
+            <a:spAutoFit/>
+          </a:bodyPr>
+          <a:lstStyle/>
+          <a:p>
+            <a:r>
+              <a:rPr lang="en-US" dirty="0">
+                <a:solidFill>
+                  <a:srgbClr val="FF0000"/>
+                </a:solidFill>
+              </a:rPr>
+              <a:t>A</a:t>
+            </a:r>
+          </a:p>
+        </p:txBody>
+      </p:sp>
+      <p:sp>
+        <p:nvSpPr>
+          <p:cNvPr id="8" name="TextBox 10">
+            <a:extLst>
+              <a:ext uri="{FF2B5EF4-FFF2-40B4-BE49-F238E27FC236}">
+                <a16:creationId xmlns:a16="http://schemas.microsoft.com/office/drawing/2014/main" id="{FE8F8DEB-C6AC-7270-08A3-7543781FE013}"/>
+              </a:ext>
+            </a:extLst>
+          </p:cNvPr>
+          <p:cNvSpPr txBox="1"/>
+          <p:nvPr/>
+        </p:nvSpPr>
+        <p:spPr>
+          <a:xfrm>
+            <a:off x="6687780" y="2613231"/>
+            <a:ext cx="317716" cy="369332"/>
+          </a:xfrm>
+          <a:prstGeom prst="rect">
+            <a:avLst/>
+          </a:prstGeom>
+          <a:noFill/>
+        </p:spPr>
+        <p:txBody>
+          <a:bodyPr wrap="none" rtlCol="0">
+            <a:spAutoFit/>
+          </a:bodyPr>
+          <a:lstStyle/>
+          <a:p>
+            <a:r>
+              <a:rPr lang="en-US" dirty="0">
+                <a:solidFill>
+                  <a:schemeClr val="accent5">
+                    <a:lumMod val="75000"/>
+                  </a:schemeClr>
+                </a:solidFill>
+              </a:rPr>
+              <a:t>B</a:t>
+            </a:r>
+          </a:p>
+        </p:txBody>
+      </p:sp>
+      <p:sp>
+        <p:nvSpPr>
+          <p:cNvPr id="14" name="Rectangle 13">
+            <a:extLst>
+              <a:ext uri="{FF2B5EF4-FFF2-40B4-BE49-F238E27FC236}">
+                <a16:creationId xmlns:a16="http://schemas.microsoft.com/office/drawing/2014/main" id="{B619EF29-DEB0-EE2E-DA00-C8E030980E5F}"/>
+              </a:ext>
+            </a:extLst>
+          </p:cNvPr>
+          <p:cNvSpPr/>
+          <p:nvPr/>
+        </p:nvSpPr>
+        <p:spPr>
+          <a:xfrm>
+            <a:off x="4400549" y="3078347"/>
+            <a:ext cx="1286153" cy="3351934"/>
+          </a:xfrm>
+          <a:prstGeom prst="rect">
+            <a:avLst/>
+          </a:prstGeom>
+          <a:noFill/>
+          <a:ln>
+            <a:solidFill>
+              <a:schemeClr val="accent3">
+                <a:lumMod val="75000"/>
+              </a:schemeClr>
+            </a:solidFill>
+          </a:ln>
+        </p:spPr>
+        <p:style>
+          <a:lnRef idx="2">
+            <a:schemeClr val="accent1">
+              <a:shade val="50000"/>
+            </a:schemeClr>
+          </a:lnRef>
+          <a:fillRef idx="1">
+            <a:schemeClr val="accent1"/>
+          </a:fillRef>
+          <a:effectRef idx="0">
+            <a:schemeClr val="accent1"/>
+          </a:effectRef>
+          <a:fontRef idx="minor">
+            <a:schemeClr val="lt1"/>
+          </a:fontRef>
+        </p:style>
+        <p:txBody>
+          <a:bodyPr rtlCol="0" anchor="ctr"/>
+          <a:lstStyle/>
+          <a:p>
+            <a:pPr algn="ctr"/>
+            <a:endParaRPr lang="fr-CH"/>
+          </a:p>
+        </p:txBody>
+      </p:sp>
+      <p:sp>
+        <p:nvSpPr>
+          <p:cNvPr id="15" name="TextBox 14">
+            <a:extLst>
+              <a:ext uri="{FF2B5EF4-FFF2-40B4-BE49-F238E27FC236}">
+                <a16:creationId xmlns:a16="http://schemas.microsoft.com/office/drawing/2014/main" id="{74103C12-FF15-66F9-49F5-D049EA40EB46}"/>
+              </a:ext>
+            </a:extLst>
+          </p:cNvPr>
+          <p:cNvSpPr txBox="1"/>
+          <p:nvPr/>
+        </p:nvSpPr>
+        <p:spPr>
+          <a:xfrm>
+            <a:off x="5454559" y="2744404"/>
+            <a:ext cx="317716" cy="369332"/>
+          </a:xfrm>
+          <a:prstGeom prst="rect">
+            <a:avLst/>
+          </a:prstGeom>
+          <a:noFill/>
+        </p:spPr>
+        <p:txBody>
+          <a:bodyPr wrap="none" rtlCol="0">
+            <a:spAutoFit/>
+          </a:bodyPr>
+          <a:lstStyle/>
+          <a:p>
+            <a:r>
+              <a:rPr lang="en-US" dirty="0">
+                <a:solidFill>
+                  <a:schemeClr val="accent3">
+                    <a:lumMod val="75000"/>
+                  </a:schemeClr>
+                </a:solidFill>
+              </a:rPr>
+              <a:t>C</a:t>
+            </a:r>
+          </a:p>
+        </p:txBody>
+      </p:sp>
+      <p:sp>
+        <p:nvSpPr>
+          <p:cNvPr id="16" name="ZoneTexte 5">
+            <a:extLst>
+              <a:ext uri="{FF2B5EF4-FFF2-40B4-BE49-F238E27FC236}">
+                <a16:creationId xmlns:a16="http://schemas.microsoft.com/office/drawing/2014/main" id="{71FD7D5A-988E-2F07-0E69-CCB241F1A133}"/>
+              </a:ext>
+            </a:extLst>
+          </p:cNvPr>
+          <p:cNvSpPr txBox="1"/>
+          <p:nvPr/>
+        </p:nvSpPr>
+        <p:spPr>
+          <a:xfrm>
+            <a:off x="2862779" y="3508925"/>
+            <a:ext cx="301686" cy="369332"/>
+          </a:xfrm>
+          <a:prstGeom prst="rect">
+            <a:avLst/>
+          </a:prstGeom>
+          <a:noFill/>
+        </p:spPr>
+        <p:txBody>
+          <a:bodyPr wrap="none" rtlCol="0">
+            <a:spAutoFit/>
+          </a:bodyPr>
+          <a:lstStyle/>
+          <a:p>
+            <a:r>
+              <a:rPr lang="fr-CH" dirty="0"/>
+              <a:t>2</a:t>
+            </a:r>
           </a:p>
         </p:txBody>
       </p:sp>

</xml_diff>

<commit_message>
work on statistical module
current work on statistical module + work on the Epoching manual
</commit_message>
<xml_diff>
--- a/Manuels/picture_EEGpal_manuals.pptx
+++ b/Manuels/picture_EEGpal_manuals.pptx
@@ -299,7 +299,7 @@
           <a:p>
             <a:fld id="{AE28F081-F961-4F1D-B0FD-EEC618487470}" type="datetimeFigureOut">
               <a:rPr lang="en-US" smtClean="0"/>
-              <a:t>1/16/2025</a:t>
+              <a:t>1/18/2025</a:t>
             </a:fld>
             <a:endParaRPr lang="en-US"/>
           </a:p>
@@ -747,7 +747,7 @@
           <a:p>
             <a:fld id="{BCB0654D-2F9E-40DC-B910-8F58A623289D}" type="datetimeFigureOut">
               <a:rPr lang="fr-CH" smtClean="0"/>
-              <a:t>16.01.2025</a:t>
+              <a:t>18.01.2025</a:t>
             </a:fld>
             <a:endParaRPr lang="fr-CH"/>
           </a:p>
@@ -917,7 +917,7 @@
           <a:p>
             <a:fld id="{BCB0654D-2F9E-40DC-B910-8F58A623289D}" type="datetimeFigureOut">
               <a:rPr lang="fr-CH" smtClean="0"/>
-              <a:t>16.01.2025</a:t>
+              <a:t>18.01.2025</a:t>
             </a:fld>
             <a:endParaRPr lang="fr-CH"/>
           </a:p>
@@ -1097,7 +1097,7 @@
           <a:p>
             <a:fld id="{BCB0654D-2F9E-40DC-B910-8F58A623289D}" type="datetimeFigureOut">
               <a:rPr lang="fr-CH" smtClean="0"/>
-              <a:t>16.01.2025</a:t>
+              <a:t>18.01.2025</a:t>
             </a:fld>
             <a:endParaRPr lang="fr-CH"/>
           </a:p>
@@ -1267,7 +1267,7 @@
           <a:p>
             <a:fld id="{BCB0654D-2F9E-40DC-B910-8F58A623289D}" type="datetimeFigureOut">
               <a:rPr lang="fr-CH" smtClean="0"/>
-              <a:t>16.01.2025</a:t>
+              <a:t>18.01.2025</a:t>
             </a:fld>
             <a:endParaRPr lang="fr-CH"/>
           </a:p>
@@ -1513,7 +1513,7 @@
           <a:p>
             <a:fld id="{BCB0654D-2F9E-40DC-B910-8F58A623289D}" type="datetimeFigureOut">
               <a:rPr lang="fr-CH" smtClean="0"/>
-              <a:t>16.01.2025</a:t>
+              <a:t>18.01.2025</a:t>
             </a:fld>
             <a:endParaRPr lang="fr-CH"/>
           </a:p>
@@ -1801,7 +1801,7 @@
           <a:p>
             <a:fld id="{BCB0654D-2F9E-40DC-B910-8F58A623289D}" type="datetimeFigureOut">
               <a:rPr lang="fr-CH" smtClean="0"/>
-              <a:t>16.01.2025</a:t>
+              <a:t>18.01.2025</a:t>
             </a:fld>
             <a:endParaRPr lang="fr-CH"/>
           </a:p>
@@ -2223,7 +2223,7 @@
           <a:p>
             <a:fld id="{BCB0654D-2F9E-40DC-B910-8F58A623289D}" type="datetimeFigureOut">
               <a:rPr lang="fr-CH" smtClean="0"/>
-              <a:t>16.01.2025</a:t>
+              <a:t>18.01.2025</a:t>
             </a:fld>
             <a:endParaRPr lang="fr-CH"/>
           </a:p>
@@ -2341,7 +2341,7 @@
           <a:p>
             <a:fld id="{BCB0654D-2F9E-40DC-B910-8F58A623289D}" type="datetimeFigureOut">
               <a:rPr lang="fr-CH" smtClean="0"/>
-              <a:t>16.01.2025</a:t>
+              <a:t>18.01.2025</a:t>
             </a:fld>
             <a:endParaRPr lang="fr-CH"/>
           </a:p>
@@ -2436,7 +2436,7 @@
           <a:p>
             <a:fld id="{BCB0654D-2F9E-40DC-B910-8F58A623289D}" type="datetimeFigureOut">
               <a:rPr lang="fr-CH" smtClean="0"/>
-              <a:t>16.01.2025</a:t>
+              <a:t>18.01.2025</a:t>
             </a:fld>
             <a:endParaRPr lang="fr-CH"/>
           </a:p>
@@ -2713,7 +2713,7 @@
           <a:p>
             <a:fld id="{BCB0654D-2F9E-40DC-B910-8F58A623289D}" type="datetimeFigureOut">
               <a:rPr lang="fr-CH" smtClean="0"/>
-              <a:t>16.01.2025</a:t>
+              <a:t>18.01.2025</a:t>
             </a:fld>
             <a:endParaRPr lang="fr-CH"/>
           </a:p>
@@ -2966,7 +2966,7 @@
           <a:p>
             <a:fld id="{BCB0654D-2F9E-40DC-B910-8F58A623289D}" type="datetimeFigureOut">
               <a:rPr lang="fr-CH" smtClean="0"/>
-              <a:t>16.01.2025</a:t>
+              <a:t>18.01.2025</a:t>
             </a:fld>
             <a:endParaRPr lang="fr-CH"/>
           </a:p>
@@ -3179,7 +3179,7 @@
           <a:p>
             <a:fld id="{BCB0654D-2F9E-40DC-B910-8F58A623289D}" type="datetimeFigureOut">
               <a:rPr lang="fr-CH" smtClean="0"/>
-              <a:t>16.01.2025</a:t>
+              <a:t>18.01.2025</a:t>
             </a:fld>
             <a:endParaRPr lang="fr-CH"/>
           </a:p>
@@ -8278,7 +8278,7 @@
         </p:nvSpPr>
         <p:spPr>
           <a:xfrm>
-            <a:off x="2166233" y="4187312"/>
+            <a:off x="2475520" y="3787262"/>
             <a:ext cx="301686" cy="369332"/>
           </a:xfrm>
           <a:prstGeom prst="rect">
@@ -8336,19 +8336,19 @@
       </p:sp>
       <p:sp>
         <p:nvSpPr>
-          <p:cNvPr id="13" name="ZoneTexte 5">
-            <a:extLst>
-              <a:ext uri="{FF2B5EF4-FFF2-40B4-BE49-F238E27FC236}">
-                <a16:creationId xmlns:a16="http://schemas.microsoft.com/office/drawing/2014/main" id="{144EBBCE-40DB-431E-A273-EE7226BE5403}"/>
-              </a:ext>
-            </a:extLst>
-          </p:cNvPr>
-          <p:cNvSpPr txBox="1"/>
-          <p:nvPr/>
-        </p:nvSpPr>
-        <p:spPr>
-          <a:xfrm>
-            <a:off x="6800160" y="1778061"/>
+          <p:cNvPr id="4" name="ZoneTexte 5">
+            <a:extLst>
+              <a:ext uri="{FF2B5EF4-FFF2-40B4-BE49-F238E27FC236}">
+                <a16:creationId xmlns:a16="http://schemas.microsoft.com/office/drawing/2014/main" id="{5E8563DD-2630-17AB-11A5-E86F4214EFF6}"/>
+              </a:ext>
+            </a:extLst>
+          </p:cNvPr>
+          <p:cNvSpPr txBox="1"/>
+          <p:nvPr/>
+        </p:nvSpPr>
+        <p:spPr>
+          <a:xfrm>
+            <a:off x="6759851" y="3331433"/>
             <a:ext cx="301686" cy="369332"/>
           </a:xfrm>
           <a:prstGeom prst="rect">
@@ -8363,44 +8363,10 @@
           <a:lstStyle/>
           <a:p>
             <a:r>
-              <a:rPr lang="fr-CH" dirty="0"/>
-              <a:t>5</a:t>
-            </a:r>
-          </a:p>
-        </p:txBody>
-      </p:sp>
-      <p:sp>
-        <p:nvSpPr>
-          <p:cNvPr id="4" name="ZoneTexte 5">
-            <a:extLst>
-              <a:ext uri="{FF2B5EF4-FFF2-40B4-BE49-F238E27FC236}">
-                <a16:creationId xmlns:a16="http://schemas.microsoft.com/office/drawing/2014/main" id="{5E8563DD-2630-17AB-11A5-E86F4214EFF6}"/>
-              </a:ext>
-            </a:extLst>
-          </p:cNvPr>
-          <p:cNvSpPr txBox="1"/>
-          <p:nvPr/>
-        </p:nvSpPr>
-        <p:spPr>
-          <a:xfrm>
-            <a:off x="5467089" y="4986101"/>
-            <a:ext cx="301686" cy="369332"/>
-          </a:xfrm>
-          <a:prstGeom prst="rect">
-            <a:avLst/>
-          </a:prstGeom>
-          <a:noFill/>
-        </p:spPr>
-        <p:txBody>
-          <a:bodyPr wrap="none" rtlCol="0">
-            <a:spAutoFit/>
-          </a:bodyPr>
-          <a:lstStyle/>
-          <a:p>
-            <a:r>
-              <a:rPr lang="fr-CH" dirty="0"/>
-              <a:t>6</a:t>
-            </a:r>
+              <a:rPr lang="fr-FR" dirty="0"/>
+              <a:t>9</a:t>
+            </a:r>
+            <a:endParaRPr lang="fr-CH" dirty="0"/>
           </a:p>
         </p:txBody>
       </p:sp>
@@ -8485,76 +8451,6 @@
       </p:cxnSp>
       <p:sp>
         <p:nvSpPr>
-          <p:cNvPr id="30" name="ZoneTexte 5">
-            <a:extLst>
-              <a:ext uri="{FF2B5EF4-FFF2-40B4-BE49-F238E27FC236}">
-                <a16:creationId xmlns:a16="http://schemas.microsoft.com/office/drawing/2014/main" id="{B48FB699-960C-D8C1-F2CD-99F3BD727EC5}"/>
-              </a:ext>
-            </a:extLst>
-          </p:cNvPr>
-          <p:cNvSpPr txBox="1"/>
-          <p:nvPr/>
-        </p:nvSpPr>
-        <p:spPr>
-          <a:xfrm>
-            <a:off x="5530935" y="5379183"/>
-            <a:ext cx="301686" cy="369332"/>
-          </a:xfrm>
-          <a:prstGeom prst="rect">
-            <a:avLst/>
-          </a:prstGeom>
-          <a:noFill/>
-        </p:spPr>
-        <p:txBody>
-          <a:bodyPr wrap="none" rtlCol="0">
-            <a:spAutoFit/>
-          </a:bodyPr>
-          <a:lstStyle/>
-          <a:p>
-            <a:r>
-              <a:rPr lang="fr-CH" dirty="0"/>
-              <a:t>7</a:t>
-            </a:r>
-          </a:p>
-        </p:txBody>
-      </p:sp>
-      <p:sp>
-        <p:nvSpPr>
-          <p:cNvPr id="31" name="ZoneTexte 5">
-            <a:extLst>
-              <a:ext uri="{FF2B5EF4-FFF2-40B4-BE49-F238E27FC236}">
-                <a16:creationId xmlns:a16="http://schemas.microsoft.com/office/drawing/2014/main" id="{CCDADEA0-781E-47A1-09D2-06F378435361}"/>
-              </a:ext>
-            </a:extLst>
-          </p:cNvPr>
-          <p:cNvSpPr txBox="1"/>
-          <p:nvPr/>
-        </p:nvSpPr>
-        <p:spPr>
-          <a:xfrm>
-            <a:off x="7146349" y="1920517"/>
-            <a:ext cx="301686" cy="369332"/>
-          </a:xfrm>
-          <a:prstGeom prst="rect">
-            <a:avLst/>
-          </a:prstGeom>
-          <a:noFill/>
-        </p:spPr>
-        <p:txBody>
-          <a:bodyPr wrap="none" rtlCol="0">
-            <a:spAutoFit/>
-          </a:bodyPr>
-          <a:lstStyle/>
-          <a:p>
-            <a:r>
-              <a:rPr lang="fr-CH" dirty="0"/>
-              <a:t>8</a:t>
-            </a:r>
-          </a:p>
-        </p:txBody>
-      </p:sp>
-      <p:sp>
-        <p:nvSpPr>
           <p:cNvPr id="32" name="ZoneTexte 5">
             <a:extLst>
               <a:ext uri="{FF2B5EF4-FFF2-40B4-BE49-F238E27FC236}">
@@ -8584,41 +8480,6 @@
             <a:r>
               <a:rPr lang="fr-CH" dirty="0"/>
               <a:t>1</a:t>
-            </a:r>
-          </a:p>
-        </p:txBody>
-      </p:sp>
-      <p:sp>
-        <p:nvSpPr>
-          <p:cNvPr id="33" name="ZoneTexte 5">
-            <a:extLst>
-              <a:ext uri="{FF2B5EF4-FFF2-40B4-BE49-F238E27FC236}">
-                <a16:creationId xmlns:a16="http://schemas.microsoft.com/office/drawing/2014/main" id="{05B8C77A-1EBF-84D0-B3F8-7E86D273A6CD}"/>
-              </a:ext>
-            </a:extLst>
-          </p:cNvPr>
-          <p:cNvSpPr txBox="1"/>
-          <p:nvPr/>
-        </p:nvSpPr>
-        <p:spPr>
-          <a:xfrm>
-            <a:off x="7641067" y="1902905"/>
-            <a:ext cx="301686" cy="369332"/>
-          </a:xfrm>
-          <a:prstGeom prst="rect">
-            <a:avLst/>
-          </a:prstGeom>
-          <a:noFill/>
-        </p:spPr>
-        <p:txBody>
-          <a:bodyPr wrap="none" rtlCol="0">
-            <a:spAutoFit/>
-          </a:bodyPr>
-          <a:lstStyle/>
-          <a:p>
-            <a:r>
-              <a:rPr lang="fr-CH" dirty="0"/>
-              <a:t>9</a:t>
             </a:r>
           </a:p>
         </p:txBody>
@@ -8936,6 +8797,363 @@
               <a:rPr lang="fr-CH" dirty="0"/>
               <a:t>2</a:t>
             </a:r>
+          </a:p>
+        </p:txBody>
+      </p:sp>
+      <p:sp>
+        <p:nvSpPr>
+          <p:cNvPr id="17" name="ZoneTexte 5">
+            <a:extLst>
+              <a:ext uri="{FF2B5EF4-FFF2-40B4-BE49-F238E27FC236}">
+                <a16:creationId xmlns:a16="http://schemas.microsoft.com/office/drawing/2014/main" id="{513649BA-754C-0026-7063-C98C714AC8AD}"/>
+              </a:ext>
+            </a:extLst>
+          </p:cNvPr>
+          <p:cNvSpPr txBox="1"/>
+          <p:nvPr/>
+        </p:nvSpPr>
+        <p:spPr>
+          <a:xfrm>
+            <a:off x="2823069" y="4273037"/>
+            <a:ext cx="301686" cy="369332"/>
+          </a:xfrm>
+          <a:prstGeom prst="rect">
+            <a:avLst/>
+          </a:prstGeom>
+          <a:noFill/>
+        </p:spPr>
+        <p:txBody>
+          <a:bodyPr wrap="none" rtlCol="0">
+            <a:spAutoFit/>
+          </a:bodyPr>
+          <a:lstStyle/>
+          <a:p>
+            <a:r>
+              <a:rPr lang="fr-CH" dirty="0"/>
+              <a:t>4</a:t>
+            </a:r>
+          </a:p>
+        </p:txBody>
+      </p:sp>
+      <p:sp>
+        <p:nvSpPr>
+          <p:cNvPr id="18" name="ZoneTexte 5">
+            <a:extLst>
+              <a:ext uri="{FF2B5EF4-FFF2-40B4-BE49-F238E27FC236}">
+                <a16:creationId xmlns:a16="http://schemas.microsoft.com/office/drawing/2014/main" id="{5CB37243-C700-062E-51E8-3C4DA235F3B5}"/>
+              </a:ext>
+            </a:extLst>
+          </p:cNvPr>
+          <p:cNvSpPr txBox="1"/>
+          <p:nvPr/>
+        </p:nvSpPr>
+        <p:spPr>
+          <a:xfrm>
+            <a:off x="2839052" y="4616769"/>
+            <a:ext cx="301686" cy="369332"/>
+          </a:xfrm>
+          <a:prstGeom prst="rect">
+            <a:avLst/>
+          </a:prstGeom>
+          <a:noFill/>
+        </p:spPr>
+        <p:txBody>
+          <a:bodyPr wrap="none" rtlCol="0">
+            <a:spAutoFit/>
+          </a:bodyPr>
+          <a:lstStyle/>
+          <a:p>
+            <a:r>
+              <a:rPr lang="fr-CH" dirty="0"/>
+              <a:t>5</a:t>
+            </a:r>
+          </a:p>
+        </p:txBody>
+      </p:sp>
+      <p:sp>
+        <p:nvSpPr>
+          <p:cNvPr id="19" name="ZoneTexte 5">
+            <a:extLst>
+              <a:ext uri="{FF2B5EF4-FFF2-40B4-BE49-F238E27FC236}">
+                <a16:creationId xmlns:a16="http://schemas.microsoft.com/office/drawing/2014/main" id="{F78485D4-6431-1E2D-418E-F6B0FA07D7EF}"/>
+              </a:ext>
+            </a:extLst>
+          </p:cNvPr>
+          <p:cNvSpPr txBox="1"/>
+          <p:nvPr/>
+        </p:nvSpPr>
+        <p:spPr>
+          <a:xfrm>
+            <a:off x="2823069" y="5607369"/>
+            <a:ext cx="301686" cy="369332"/>
+          </a:xfrm>
+          <a:prstGeom prst="rect">
+            <a:avLst/>
+          </a:prstGeom>
+          <a:noFill/>
+        </p:spPr>
+        <p:txBody>
+          <a:bodyPr wrap="none" rtlCol="0">
+            <a:spAutoFit/>
+          </a:bodyPr>
+          <a:lstStyle/>
+          <a:p>
+            <a:r>
+              <a:rPr lang="fr-CH" dirty="0"/>
+              <a:t>6</a:t>
+            </a:r>
+          </a:p>
+        </p:txBody>
+      </p:sp>
+      <p:sp>
+        <p:nvSpPr>
+          <p:cNvPr id="20" name="ZoneTexte 5">
+            <a:extLst>
+              <a:ext uri="{FF2B5EF4-FFF2-40B4-BE49-F238E27FC236}">
+                <a16:creationId xmlns:a16="http://schemas.microsoft.com/office/drawing/2014/main" id="{B59BFBEF-C5DD-13B8-3C9A-99F0D84BE292}"/>
+              </a:ext>
+            </a:extLst>
+          </p:cNvPr>
+          <p:cNvSpPr txBox="1"/>
+          <p:nvPr/>
+        </p:nvSpPr>
+        <p:spPr>
+          <a:xfrm>
+            <a:off x="4056721" y="5650232"/>
+            <a:ext cx="301686" cy="369332"/>
+          </a:xfrm>
+          <a:prstGeom prst="rect">
+            <a:avLst/>
+          </a:prstGeom>
+          <a:noFill/>
+        </p:spPr>
+        <p:txBody>
+          <a:bodyPr wrap="none" rtlCol="0">
+            <a:spAutoFit/>
+          </a:bodyPr>
+          <a:lstStyle/>
+          <a:p>
+            <a:r>
+              <a:rPr lang="fr-FR" dirty="0"/>
+              <a:t>7</a:t>
+            </a:r>
+            <a:endParaRPr lang="fr-CH" dirty="0"/>
+          </a:p>
+        </p:txBody>
+      </p:sp>
+      <p:sp>
+        <p:nvSpPr>
+          <p:cNvPr id="23" name="ZoneTexte 5">
+            <a:extLst>
+              <a:ext uri="{FF2B5EF4-FFF2-40B4-BE49-F238E27FC236}">
+                <a16:creationId xmlns:a16="http://schemas.microsoft.com/office/drawing/2014/main" id="{921A4834-3493-F06E-D856-2CB9A489EE9A}"/>
+              </a:ext>
+            </a:extLst>
+          </p:cNvPr>
+          <p:cNvSpPr txBox="1"/>
+          <p:nvPr/>
+        </p:nvSpPr>
+        <p:spPr>
+          <a:xfrm>
+            <a:off x="4098863" y="3369472"/>
+            <a:ext cx="301686" cy="369332"/>
+          </a:xfrm>
+          <a:prstGeom prst="rect">
+            <a:avLst/>
+          </a:prstGeom>
+          <a:noFill/>
+        </p:spPr>
+        <p:txBody>
+          <a:bodyPr wrap="none" rtlCol="0">
+            <a:spAutoFit/>
+          </a:bodyPr>
+          <a:lstStyle/>
+          <a:p>
+            <a:r>
+              <a:rPr lang="fr-FR" dirty="0"/>
+              <a:t>8</a:t>
+            </a:r>
+            <a:endParaRPr lang="fr-CH" dirty="0"/>
+          </a:p>
+        </p:txBody>
+      </p:sp>
+      <p:sp>
+        <p:nvSpPr>
+          <p:cNvPr id="25" name="ZoneTexte 5">
+            <a:extLst>
+              <a:ext uri="{FF2B5EF4-FFF2-40B4-BE49-F238E27FC236}">
+                <a16:creationId xmlns:a16="http://schemas.microsoft.com/office/drawing/2014/main" id="{DA685ED8-B685-5419-5D7A-BD06FF218919}"/>
+              </a:ext>
+            </a:extLst>
+          </p:cNvPr>
+          <p:cNvSpPr txBox="1"/>
+          <p:nvPr/>
+        </p:nvSpPr>
+        <p:spPr>
+          <a:xfrm>
+            <a:off x="7969302" y="3334086"/>
+            <a:ext cx="418704" cy="369332"/>
+          </a:xfrm>
+          <a:prstGeom prst="rect">
+            <a:avLst/>
+          </a:prstGeom>
+          <a:noFill/>
+        </p:spPr>
+        <p:txBody>
+          <a:bodyPr wrap="none" rtlCol="0">
+            <a:spAutoFit/>
+          </a:bodyPr>
+          <a:lstStyle/>
+          <a:p>
+            <a:r>
+              <a:rPr lang="fr-FR" dirty="0"/>
+              <a:t>10</a:t>
+            </a:r>
+            <a:endParaRPr lang="fr-CH" dirty="0"/>
+          </a:p>
+        </p:txBody>
+      </p:sp>
+      <p:sp>
+        <p:nvSpPr>
+          <p:cNvPr id="26" name="ZoneTexte 5">
+            <a:extLst>
+              <a:ext uri="{FF2B5EF4-FFF2-40B4-BE49-F238E27FC236}">
+                <a16:creationId xmlns:a16="http://schemas.microsoft.com/office/drawing/2014/main" id="{5313E699-B71A-E788-9374-6B71FF7B2EB1}"/>
+              </a:ext>
+            </a:extLst>
+          </p:cNvPr>
+          <p:cNvSpPr txBox="1"/>
+          <p:nvPr/>
+        </p:nvSpPr>
+        <p:spPr>
+          <a:xfrm>
+            <a:off x="6673491" y="3742399"/>
+            <a:ext cx="418704" cy="369332"/>
+          </a:xfrm>
+          <a:prstGeom prst="rect">
+            <a:avLst/>
+          </a:prstGeom>
+          <a:noFill/>
+        </p:spPr>
+        <p:txBody>
+          <a:bodyPr wrap="none" rtlCol="0">
+            <a:spAutoFit/>
+          </a:bodyPr>
+          <a:lstStyle/>
+          <a:p>
+            <a:r>
+              <a:rPr lang="fr-FR" dirty="0"/>
+              <a:t>11</a:t>
+            </a:r>
+            <a:endParaRPr lang="fr-CH" dirty="0"/>
+          </a:p>
+        </p:txBody>
+      </p:sp>
+      <p:sp>
+        <p:nvSpPr>
+          <p:cNvPr id="27" name="ZoneTexte 5">
+            <a:extLst>
+              <a:ext uri="{FF2B5EF4-FFF2-40B4-BE49-F238E27FC236}">
+                <a16:creationId xmlns:a16="http://schemas.microsoft.com/office/drawing/2014/main" id="{3C83E1FA-E3BC-DB7F-000C-7B366B18FF69}"/>
+              </a:ext>
+            </a:extLst>
+          </p:cNvPr>
+          <p:cNvSpPr txBox="1"/>
+          <p:nvPr/>
+        </p:nvSpPr>
+        <p:spPr>
+          <a:xfrm>
+            <a:off x="6673491" y="4273037"/>
+            <a:ext cx="418704" cy="369332"/>
+          </a:xfrm>
+          <a:prstGeom prst="rect">
+            <a:avLst/>
+          </a:prstGeom>
+          <a:noFill/>
+        </p:spPr>
+        <p:txBody>
+          <a:bodyPr wrap="none" rtlCol="0">
+            <a:spAutoFit/>
+          </a:bodyPr>
+          <a:lstStyle/>
+          <a:p>
+            <a:r>
+              <a:rPr lang="fr-FR" dirty="0"/>
+              <a:t>12</a:t>
+            </a:r>
+            <a:endParaRPr lang="fr-CH" dirty="0"/>
+          </a:p>
+        </p:txBody>
+      </p:sp>
+      <p:sp>
+        <p:nvSpPr>
+          <p:cNvPr id="28" name="ZoneTexte 5">
+            <a:extLst>
+              <a:ext uri="{FF2B5EF4-FFF2-40B4-BE49-F238E27FC236}">
+                <a16:creationId xmlns:a16="http://schemas.microsoft.com/office/drawing/2014/main" id="{28A7AF95-C910-BB48-757F-65558C7E3963}"/>
+              </a:ext>
+            </a:extLst>
+          </p:cNvPr>
+          <p:cNvSpPr txBox="1"/>
+          <p:nvPr/>
+        </p:nvSpPr>
+        <p:spPr>
+          <a:xfrm>
+            <a:off x="7625991" y="5786204"/>
+            <a:ext cx="418704" cy="369332"/>
+          </a:xfrm>
+          <a:prstGeom prst="rect">
+            <a:avLst/>
+          </a:prstGeom>
+          <a:noFill/>
+        </p:spPr>
+        <p:txBody>
+          <a:bodyPr wrap="none" rtlCol="0">
+            <a:spAutoFit/>
+          </a:bodyPr>
+          <a:lstStyle/>
+          <a:p>
+            <a:r>
+              <a:rPr lang="fr-FR" dirty="0"/>
+              <a:t>14</a:t>
+            </a:r>
+            <a:endParaRPr lang="fr-CH" dirty="0"/>
+          </a:p>
+        </p:txBody>
+      </p:sp>
+      <p:sp>
+        <p:nvSpPr>
+          <p:cNvPr id="29" name="ZoneTexte 5">
+            <a:extLst>
+              <a:ext uri="{FF2B5EF4-FFF2-40B4-BE49-F238E27FC236}">
+                <a16:creationId xmlns:a16="http://schemas.microsoft.com/office/drawing/2014/main" id="{2ACF42F7-7F87-0190-7DFB-31FD73B86E8C}"/>
+              </a:ext>
+            </a:extLst>
+          </p:cNvPr>
+          <p:cNvSpPr txBox="1"/>
+          <p:nvPr/>
+        </p:nvSpPr>
+        <p:spPr>
+          <a:xfrm>
+            <a:off x="6768252" y="5650232"/>
+            <a:ext cx="418704" cy="369332"/>
+          </a:xfrm>
+          <a:prstGeom prst="rect">
+            <a:avLst/>
+          </a:prstGeom>
+          <a:noFill/>
+        </p:spPr>
+        <p:txBody>
+          <a:bodyPr wrap="none" rtlCol="0">
+            <a:spAutoFit/>
+          </a:bodyPr>
+          <a:lstStyle/>
+          <a:p>
+            <a:r>
+              <a:rPr lang="fr-FR" dirty="0"/>
+              <a:t>13</a:t>
+            </a:r>
+            <a:endParaRPr lang="fr-CH" dirty="0"/>
           </a:p>
         </p:txBody>
       </p:sp>

</xml_diff>

<commit_message>
manual ICA + interpolation
</commit_message>
<xml_diff>
--- a/Manuels/picture_EEGpal_manuals.pptx
+++ b/Manuels/picture_EEGpal_manuals.pptx
@@ -311,7 +311,7 @@
           <a:p>
             <a:fld id="{AE28F081-F961-4F1D-B0FD-EEC618487470}" type="datetimeFigureOut">
               <a:rPr lang="en-US" smtClean="0"/>
-              <a:t>8/25/2025</a:t>
+              <a:t>8/30/2025</a:t>
             </a:fld>
             <a:endParaRPr lang="en-US"/>
           </a:p>
@@ -843,7 +843,7 @@
           <a:p>
             <a:fld id="{BCB0654D-2F9E-40DC-B910-8F58A623289D}" type="datetimeFigureOut">
               <a:rPr lang="fr-CH" smtClean="0"/>
-              <a:t>25.08.2025</a:t>
+              <a:t>30.08.2025</a:t>
             </a:fld>
             <a:endParaRPr lang="fr-CH"/>
           </a:p>
@@ -1013,7 +1013,7 @@
           <a:p>
             <a:fld id="{BCB0654D-2F9E-40DC-B910-8F58A623289D}" type="datetimeFigureOut">
               <a:rPr lang="fr-CH" smtClean="0"/>
-              <a:t>25.08.2025</a:t>
+              <a:t>30.08.2025</a:t>
             </a:fld>
             <a:endParaRPr lang="fr-CH"/>
           </a:p>
@@ -1193,7 +1193,7 @@
           <a:p>
             <a:fld id="{BCB0654D-2F9E-40DC-B910-8F58A623289D}" type="datetimeFigureOut">
               <a:rPr lang="fr-CH" smtClean="0"/>
-              <a:t>25.08.2025</a:t>
+              <a:t>30.08.2025</a:t>
             </a:fld>
             <a:endParaRPr lang="fr-CH"/>
           </a:p>
@@ -1363,7 +1363,7 @@
           <a:p>
             <a:fld id="{BCB0654D-2F9E-40DC-B910-8F58A623289D}" type="datetimeFigureOut">
               <a:rPr lang="fr-CH" smtClean="0"/>
-              <a:t>25.08.2025</a:t>
+              <a:t>30.08.2025</a:t>
             </a:fld>
             <a:endParaRPr lang="fr-CH"/>
           </a:p>
@@ -1609,7 +1609,7 @@
           <a:p>
             <a:fld id="{BCB0654D-2F9E-40DC-B910-8F58A623289D}" type="datetimeFigureOut">
               <a:rPr lang="fr-CH" smtClean="0"/>
-              <a:t>25.08.2025</a:t>
+              <a:t>30.08.2025</a:t>
             </a:fld>
             <a:endParaRPr lang="fr-CH"/>
           </a:p>
@@ -1897,7 +1897,7 @@
           <a:p>
             <a:fld id="{BCB0654D-2F9E-40DC-B910-8F58A623289D}" type="datetimeFigureOut">
               <a:rPr lang="fr-CH" smtClean="0"/>
-              <a:t>25.08.2025</a:t>
+              <a:t>30.08.2025</a:t>
             </a:fld>
             <a:endParaRPr lang="fr-CH"/>
           </a:p>
@@ -2319,7 +2319,7 @@
           <a:p>
             <a:fld id="{BCB0654D-2F9E-40DC-B910-8F58A623289D}" type="datetimeFigureOut">
               <a:rPr lang="fr-CH" smtClean="0"/>
-              <a:t>25.08.2025</a:t>
+              <a:t>30.08.2025</a:t>
             </a:fld>
             <a:endParaRPr lang="fr-CH"/>
           </a:p>
@@ -2437,7 +2437,7 @@
           <a:p>
             <a:fld id="{BCB0654D-2F9E-40DC-B910-8F58A623289D}" type="datetimeFigureOut">
               <a:rPr lang="fr-CH" smtClean="0"/>
-              <a:t>25.08.2025</a:t>
+              <a:t>30.08.2025</a:t>
             </a:fld>
             <a:endParaRPr lang="fr-CH"/>
           </a:p>
@@ -2532,7 +2532,7 @@
           <a:p>
             <a:fld id="{BCB0654D-2F9E-40DC-B910-8F58A623289D}" type="datetimeFigureOut">
               <a:rPr lang="fr-CH" smtClean="0"/>
-              <a:t>25.08.2025</a:t>
+              <a:t>30.08.2025</a:t>
             </a:fld>
             <a:endParaRPr lang="fr-CH"/>
           </a:p>
@@ -2809,7 +2809,7 @@
           <a:p>
             <a:fld id="{BCB0654D-2F9E-40DC-B910-8F58A623289D}" type="datetimeFigureOut">
               <a:rPr lang="fr-CH" smtClean="0"/>
-              <a:t>25.08.2025</a:t>
+              <a:t>30.08.2025</a:t>
             </a:fld>
             <a:endParaRPr lang="fr-CH"/>
           </a:p>
@@ -3062,7 +3062,7 @@
           <a:p>
             <a:fld id="{BCB0654D-2F9E-40DC-B910-8F58A623289D}" type="datetimeFigureOut">
               <a:rPr lang="fr-CH" smtClean="0"/>
-              <a:t>25.08.2025</a:t>
+              <a:t>30.08.2025</a:t>
             </a:fld>
             <a:endParaRPr lang="fr-CH"/>
           </a:p>
@@ -3275,7 +3275,7 @@
           <a:p>
             <a:fld id="{BCB0654D-2F9E-40DC-B910-8F58A623289D}" type="datetimeFigureOut">
               <a:rPr lang="fr-CH" smtClean="0"/>
-              <a:t>25.08.2025</a:t>
+              <a:t>30.08.2025</a:t>
             </a:fld>
             <a:endParaRPr lang="fr-CH"/>
           </a:p>
@@ -4379,10 +4379,10 @@
       </p:grpSpPr>
       <p:pic>
         <p:nvPicPr>
-          <p:cNvPr id="7" name="Picture 6">
-            <a:extLst>
-              <a:ext uri="{FF2B5EF4-FFF2-40B4-BE49-F238E27FC236}">
-                <a16:creationId xmlns:a16="http://schemas.microsoft.com/office/drawing/2014/main" id="{D95D7F05-4917-846D-ED69-122957F8F575}"/>
+          <p:cNvPr id="9" name="Picture 8">
+            <a:extLst>
+              <a:ext uri="{FF2B5EF4-FFF2-40B4-BE49-F238E27FC236}">
+                <a16:creationId xmlns:a16="http://schemas.microsoft.com/office/drawing/2014/main" id="{0F30993C-E7CC-3235-8897-63554883E276}"/>
               </a:ext>
             </a:extLst>
           </p:cNvPr>
@@ -4399,8 +4399,8 @@
         </p:blipFill>
         <p:spPr>
           <a:xfrm>
-            <a:off x="1701307" y="0"/>
-            <a:ext cx="4723943" cy="4406900"/>
+            <a:off x="1702794" y="809625"/>
+            <a:ext cx="4752447" cy="4433491"/>
           </a:xfrm>
           <a:prstGeom prst="rect">
             <a:avLst/>
@@ -4415,8 +4415,8 @@
         </p:nvSpPr>
         <p:spPr>
           <a:xfrm>
-            <a:off x="3196927" y="276253"/>
-            <a:ext cx="3228323" cy="4130647"/>
+            <a:off x="3196927" y="1085878"/>
+            <a:ext cx="3256827" cy="4130647"/>
           </a:xfrm>
           <a:prstGeom prst="rect">
             <a:avLst/>
@@ -4461,7 +4461,7 @@
         </p:nvSpPr>
         <p:spPr>
           <a:xfrm>
-            <a:off x="2955524" y="631570"/>
+            <a:off x="2955524" y="1441195"/>
             <a:ext cx="322852" cy="369332"/>
           </a:xfrm>
           <a:prstGeom prst="rect">
@@ -4490,7 +4490,7 @@
         </p:nvSpPr>
         <p:spPr>
           <a:xfrm>
-            <a:off x="5337189" y="3875918"/>
+            <a:off x="5361985" y="4726952"/>
             <a:ext cx="322852" cy="369332"/>
           </a:xfrm>
           <a:prstGeom prst="rect">
@@ -4525,7 +4525,7 @@
         </p:nvSpPr>
         <p:spPr>
           <a:xfrm>
-            <a:off x="4572000" y="1717496"/>
+            <a:off x="4444257" y="1614884"/>
             <a:ext cx="322852" cy="369332"/>
           </a:xfrm>
           <a:prstGeom prst="rect">
@@ -4560,7 +4560,7 @@
         </p:nvSpPr>
         <p:spPr>
           <a:xfrm>
-            <a:off x="6425250" y="203718"/>
+            <a:off x="6425250" y="1013343"/>
             <a:ext cx="340006" cy="369332"/>
           </a:xfrm>
           <a:prstGeom prst="rect">
@@ -4599,7 +4599,7 @@
         </p:nvSpPr>
         <p:spPr>
           <a:xfrm>
-            <a:off x="1701307" y="388384"/>
+            <a:off x="1701307" y="1198009"/>
             <a:ext cx="1490220" cy="2126216"/>
           </a:xfrm>
           <a:prstGeom prst="rect">
@@ -4653,7 +4653,7 @@
         </p:nvSpPr>
         <p:spPr>
           <a:xfrm>
-            <a:off x="5953139" y="3875918"/>
+            <a:off x="5977935" y="4726952"/>
             <a:ext cx="322852" cy="369332"/>
           </a:xfrm>
           <a:prstGeom prst="rect">
@@ -4688,7 +4688,7 @@
         </p:nvSpPr>
         <p:spPr>
           <a:xfrm>
-            <a:off x="1443572" y="262238"/>
+            <a:off x="1443572" y="1071863"/>
             <a:ext cx="317716" cy="369332"/>
           </a:xfrm>
           <a:prstGeom prst="rect">
@@ -4729,7 +4729,7 @@
         </p:nvSpPr>
         <p:spPr>
           <a:xfrm>
-            <a:off x="1702794" y="2514601"/>
+            <a:off x="1702794" y="3324226"/>
             <a:ext cx="1488733" cy="1892300"/>
           </a:xfrm>
           <a:prstGeom prst="rect">
@@ -4783,7 +4783,7 @@
         </p:nvSpPr>
         <p:spPr>
           <a:xfrm>
-            <a:off x="1413582" y="2442065"/>
+            <a:off x="1413582" y="3251690"/>
             <a:ext cx="317716" cy="369332"/>
           </a:xfrm>
           <a:prstGeom prst="rect">
@@ -4824,7 +4824,7 @@
         </p:nvSpPr>
         <p:spPr>
           <a:xfrm>
-            <a:off x="2284991" y="1000902"/>
+            <a:off x="2317682" y="1848627"/>
             <a:ext cx="322852" cy="369332"/>
           </a:xfrm>
           <a:prstGeom prst="rect">
@@ -4859,7 +4859,7 @@
         </p:nvSpPr>
         <p:spPr>
           <a:xfrm>
-            <a:off x="2955524" y="1451492"/>
+            <a:off x="2963817" y="2328361"/>
             <a:ext cx="322852" cy="369332"/>
           </a:xfrm>
           <a:prstGeom prst="rect">
@@ -4882,19 +4882,19 @@
       </p:sp>
       <p:sp>
         <p:nvSpPr>
-          <p:cNvPr id="20" name="ZoneTexte 19">
-            <a:extLst>
-              <a:ext uri="{FF2B5EF4-FFF2-40B4-BE49-F238E27FC236}">
-                <a16:creationId xmlns:a16="http://schemas.microsoft.com/office/drawing/2014/main" id="{C453DF28-DED4-5D3A-E60F-62A4CB0DA797}"/>
-              </a:ext>
-            </a:extLst>
-          </p:cNvPr>
-          <p:cNvSpPr txBox="1"/>
-          <p:nvPr/>
-        </p:nvSpPr>
-        <p:spPr>
-          <a:xfrm>
-            <a:off x="2948878" y="1665667"/>
+          <p:cNvPr id="21" name="ZoneTexte 20">
+            <a:extLst>
+              <a:ext uri="{FF2B5EF4-FFF2-40B4-BE49-F238E27FC236}">
+                <a16:creationId xmlns:a16="http://schemas.microsoft.com/office/drawing/2014/main" id="{3DBB22DD-EADD-1CC2-C986-E0B1802AF5AE}"/>
+              </a:ext>
+            </a:extLst>
+          </p:cNvPr>
+          <p:cNvSpPr txBox="1"/>
+          <p:nvPr/>
+        </p:nvSpPr>
+        <p:spPr>
+          <a:xfrm>
+            <a:off x="2834295" y="2918626"/>
             <a:ext cx="322852" cy="369332"/>
           </a:xfrm>
           <a:prstGeom prst="rect">
@@ -4917,19 +4917,19 @@
       </p:sp>
       <p:sp>
         <p:nvSpPr>
-          <p:cNvPr id="21" name="ZoneTexte 20">
-            <a:extLst>
-              <a:ext uri="{FF2B5EF4-FFF2-40B4-BE49-F238E27FC236}">
-                <a16:creationId xmlns:a16="http://schemas.microsoft.com/office/drawing/2014/main" id="{3DBB22DD-EADD-1CC2-C986-E0B1802AF5AE}"/>
-              </a:ext>
-            </a:extLst>
-          </p:cNvPr>
-          <p:cNvSpPr txBox="1"/>
-          <p:nvPr/>
-        </p:nvSpPr>
-        <p:spPr>
-          <a:xfrm>
-            <a:off x="2834295" y="2109001"/>
+          <p:cNvPr id="22" name="ZoneTexte 21">
+            <a:extLst>
+              <a:ext uri="{FF2B5EF4-FFF2-40B4-BE49-F238E27FC236}">
+                <a16:creationId xmlns:a16="http://schemas.microsoft.com/office/drawing/2014/main" id="{38862B79-94CD-8E00-BAFB-4DC73E03A326}"/>
+              </a:ext>
+            </a:extLst>
+          </p:cNvPr>
+          <p:cNvSpPr txBox="1"/>
+          <p:nvPr/>
+        </p:nvSpPr>
+        <p:spPr>
+          <a:xfrm>
+            <a:off x="2948878" y="3358324"/>
             <a:ext cx="322852" cy="369332"/>
           </a:xfrm>
           <a:prstGeom prst="rect">
@@ -4952,20 +4952,20 @@
       </p:sp>
       <p:sp>
         <p:nvSpPr>
-          <p:cNvPr id="22" name="ZoneTexte 21">
-            <a:extLst>
-              <a:ext uri="{FF2B5EF4-FFF2-40B4-BE49-F238E27FC236}">
-                <a16:creationId xmlns:a16="http://schemas.microsoft.com/office/drawing/2014/main" id="{38862B79-94CD-8E00-BAFB-4DC73E03A326}"/>
-              </a:ext>
-            </a:extLst>
-          </p:cNvPr>
-          <p:cNvSpPr txBox="1"/>
-          <p:nvPr/>
-        </p:nvSpPr>
-        <p:spPr>
-          <a:xfrm>
-            <a:off x="2948878" y="2548699"/>
-            <a:ext cx="322852" cy="369332"/>
+          <p:cNvPr id="23" name="ZoneTexte 22">
+            <a:extLst>
+              <a:ext uri="{FF2B5EF4-FFF2-40B4-BE49-F238E27FC236}">
+                <a16:creationId xmlns:a16="http://schemas.microsoft.com/office/drawing/2014/main" id="{563BAAB5-684F-E805-10A2-527146005BC9}"/>
+              </a:ext>
+            </a:extLst>
+          </p:cNvPr>
+          <p:cNvSpPr txBox="1"/>
+          <p:nvPr/>
+        </p:nvSpPr>
+        <p:spPr>
+          <a:xfrm>
+            <a:off x="2976223" y="3678304"/>
+            <a:ext cx="414809" cy="369332"/>
           </a:xfrm>
           <a:prstGeom prst="rect">
             <a:avLst/>
@@ -4987,19 +4987,19 @@
       </p:sp>
       <p:sp>
         <p:nvSpPr>
-          <p:cNvPr id="23" name="ZoneTexte 22">
-            <a:extLst>
-              <a:ext uri="{FF2B5EF4-FFF2-40B4-BE49-F238E27FC236}">
-                <a16:creationId xmlns:a16="http://schemas.microsoft.com/office/drawing/2014/main" id="{563BAAB5-684F-E805-10A2-527146005BC9}"/>
-              </a:ext>
-            </a:extLst>
-          </p:cNvPr>
-          <p:cNvSpPr txBox="1"/>
-          <p:nvPr/>
-        </p:nvSpPr>
-        <p:spPr>
-          <a:xfrm>
-            <a:off x="2909545" y="2868679"/>
+          <p:cNvPr id="24" name="ZoneTexte 23">
+            <a:extLst>
+              <a:ext uri="{FF2B5EF4-FFF2-40B4-BE49-F238E27FC236}">
+                <a16:creationId xmlns:a16="http://schemas.microsoft.com/office/drawing/2014/main" id="{9C166E31-0A97-2A1D-4888-9C351E6F6C81}"/>
+              </a:ext>
+            </a:extLst>
+          </p:cNvPr>
+          <p:cNvSpPr txBox="1"/>
+          <p:nvPr/>
+        </p:nvSpPr>
+        <p:spPr>
+          <a:xfrm>
+            <a:off x="2909545" y="4066015"/>
             <a:ext cx="414809" cy="369332"/>
           </a:xfrm>
           <a:prstGeom prst="rect">
@@ -5022,19 +5022,19 @@
       </p:sp>
       <p:sp>
         <p:nvSpPr>
-          <p:cNvPr id="24" name="ZoneTexte 23">
-            <a:extLst>
-              <a:ext uri="{FF2B5EF4-FFF2-40B4-BE49-F238E27FC236}">
-                <a16:creationId xmlns:a16="http://schemas.microsoft.com/office/drawing/2014/main" id="{9C166E31-0A97-2A1D-4888-9C351E6F6C81}"/>
-              </a:ext>
-            </a:extLst>
-          </p:cNvPr>
-          <p:cNvSpPr txBox="1"/>
-          <p:nvPr/>
-        </p:nvSpPr>
-        <p:spPr>
-          <a:xfrm>
-            <a:off x="2909545" y="3256390"/>
+          <p:cNvPr id="26" name="ZoneTexte 25">
+            <a:extLst>
+              <a:ext uri="{FF2B5EF4-FFF2-40B4-BE49-F238E27FC236}">
+                <a16:creationId xmlns:a16="http://schemas.microsoft.com/office/drawing/2014/main" id="{B24BE26C-2B61-7C07-2DAA-3C3BF6A834ED}"/>
+              </a:ext>
+            </a:extLst>
+          </p:cNvPr>
+          <p:cNvSpPr txBox="1"/>
+          <p:nvPr/>
+        </p:nvSpPr>
+        <p:spPr>
+          <a:xfrm>
+            <a:off x="1983048" y="4675823"/>
             <a:ext cx="414809" cy="369332"/>
           </a:xfrm>
           <a:prstGeom prst="rect">
@@ -5051,76 +5051,6 @@
             <a:r>
               <a:rPr lang="fr-CH" dirty="0"/>
               <a:t>11</a:t>
-            </a:r>
-          </a:p>
-        </p:txBody>
-      </p:sp>
-      <p:sp>
-        <p:nvSpPr>
-          <p:cNvPr id="25" name="ZoneTexte 24">
-            <a:extLst>
-              <a:ext uri="{FF2B5EF4-FFF2-40B4-BE49-F238E27FC236}">
-                <a16:creationId xmlns:a16="http://schemas.microsoft.com/office/drawing/2014/main" id="{F32B6ACD-B68B-7F31-FD4D-C615E5B6A41D}"/>
-              </a:ext>
-            </a:extLst>
-          </p:cNvPr>
-          <p:cNvSpPr txBox="1"/>
-          <p:nvPr/>
-        </p:nvSpPr>
-        <p:spPr>
-          <a:xfrm>
-            <a:off x="2923267" y="3547995"/>
-            <a:ext cx="414809" cy="369332"/>
-          </a:xfrm>
-          <a:prstGeom prst="rect">
-            <a:avLst/>
-          </a:prstGeom>
-          <a:noFill/>
-        </p:spPr>
-        <p:txBody>
-          <a:bodyPr wrap="square" rtlCol="0">
-            <a:spAutoFit/>
-          </a:bodyPr>
-          <a:lstStyle/>
-          <a:p>
-            <a:r>
-              <a:rPr lang="fr-CH" dirty="0"/>
-              <a:t>12</a:t>
-            </a:r>
-          </a:p>
-        </p:txBody>
-      </p:sp>
-      <p:sp>
-        <p:nvSpPr>
-          <p:cNvPr id="26" name="ZoneTexte 25">
-            <a:extLst>
-              <a:ext uri="{FF2B5EF4-FFF2-40B4-BE49-F238E27FC236}">
-                <a16:creationId xmlns:a16="http://schemas.microsoft.com/office/drawing/2014/main" id="{B24BE26C-2B61-7C07-2DAA-3C3BF6A834ED}"/>
-              </a:ext>
-            </a:extLst>
-          </p:cNvPr>
-          <p:cNvSpPr txBox="1"/>
-          <p:nvPr/>
-        </p:nvSpPr>
-        <p:spPr>
-          <a:xfrm>
-            <a:off x="2923267" y="4074569"/>
-            <a:ext cx="414809" cy="369332"/>
-          </a:xfrm>
-          <a:prstGeom prst="rect">
-            <a:avLst/>
-          </a:prstGeom>
-          <a:noFill/>
-        </p:spPr>
-        <p:txBody>
-          <a:bodyPr wrap="square" rtlCol="0">
-            <a:spAutoFit/>
-          </a:bodyPr>
-          <a:lstStyle/>
-          <a:p>
-            <a:r>
-              <a:rPr lang="fr-CH" dirty="0"/>
-              <a:t>13</a:t>
             </a:r>
           </a:p>
         </p:txBody>
@@ -17362,10 +17292,10 @@
       </p:grpSpPr>
       <p:pic>
         <p:nvPicPr>
-          <p:cNvPr id="40" name="Picture 39">
-            <a:extLst>
-              <a:ext uri="{FF2B5EF4-FFF2-40B4-BE49-F238E27FC236}">
-                <a16:creationId xmlns:a16="http://schemas.microsoft.com/office/drawing/2014/main" id="{9C8A33CE-D68E-DA75-79C7-2C46112B52B4}"/>
+          <p:cNvPr id="31" name="Picture 30">
+            <a:extLst>
+              <a:ext uri="{FF2B5EF4-FFF2-40B4-BE49-F238E27FC236}">
+                <a16:creationId xmlns:a16="http://schemas.microsoft.com/office/drawing/2014/main" id="{2256F150-0493-F241-4773-39A8CCF9F620}"/>
               </a:ext>
             </a:extLst>
           </p:cNvPr>
@@ -17382,8 +17312,8 @@
         </p:blipFill>
         <p:spPr>
           <a:xfrm>
-            <a:off x="5824613" y="674472"/>
-            <a:ext cx="3202736" cy="2816920"/>
+            <a:off x="1719575" y="16730"/>
+            <a:ext cx="2819432" cy="2483848"/>
           </a:xfrm>
           <a:prstGeom prst="rect">
             <a:avLst/>
@@ -17392,10 +17322,10 @@
       </p:pic>
       <p:pic>
         <p:nvPicPr>
-          <p:cNvPr id="47" name="Picture 46">
-            <a:extLst>
-              <a:ext uri="{FF2B5EF4-FFF2-40B4-BE49-F238E27FC236}">
-                <a16:creationId xmlns:a16="http://schemas.microsoft.com/office/drawing/2014/main" id="{880EF3C6-6CC4-AE88-AFE2-99F30AC37EA8}"/>
+          <p:cNvPr id="4" name="Picture 3">
+            <a:extLst>
+              <a:ext uri="{FF2B5EF4-FFF2-40B4-BE49-F238E27FC236}">
+                <a16:creationId xmlns:a16="http://schemas.microsoft.com/office/drawing/2014/main" id="{730272B9-22EC-DC84-F1CD-177FCD19FF36}"/>
               </a:ext>
             </a:extLst>
           </p:cNvPr>
@@ -17412,8 +17342,8 @@
         </p:blipFill>
         <p:spPr>
           <a:xfrm>
-            <a:off x="5805566" y="3514356"/>
-            <a:ext cx="3249484" cy="2267742"/>
+            <a:off x="25400" y="2816319"/>
+            <a:ext cx="5623761" cy="3428806"/>
           </a:xfrm>
           <a:prstGeom prst="rect">
             <a:avLst/>
@@ -17422,10 +17352,10 @@
       </p:pic>
       <p:pic>
         <p:nvPicPr>
-          <p:cNvPr id="30" name="Picture 29">
-            <a:extLst>
-              <a:ext uri="{FF2B5EF4-FFF2-40B4-BE49-F238E27FC236}">
-                <a16:creationId xmlns:a16="http://schemas.microsoft.com/office/drawing/2014/main" id="{B643A20B-BB0E-CB6E-E2A4-998341D3C968}"/>
+          <p:cNvPr id="40" name="Picture 39">
+            <a:extLst>
+              <a:ext uri="{FF2B5EF4-FFF2-40B4-BE49-F238E27FC236}">
+                <a16:creationId xmlns:a16="http://schemas.microsoft.com/office/drawing/2014/main" id="{9C8A33CE-D68E-DA75-79C7-2C46112B52B4}"/>
               </a:ext>
             </a:extLst>
           </p:cNvPr>
@@ -17442,8 +17372,8 @@
         </p:blipFill>
         <p:spPr>
           <a:xfrm>
-            <a:off x="6123199" y="5842139"/>
-            <a:ext cx="1651481" cy="955907"/>
+            <a:off x="5824613" y="674472"/>
+            <a:ext cx="3202736" cy="2816920"/>
           </a:xfrm>
           <a:prstGeom prst="rect">
             <a:avLst/>
@@ -17452,10 +17382,10 @@
       </p:pic>
       <p:pic>
         <p:nvPicPr>
-          <p:cNvPr id="36" name="Picture 35">
-            <a:extLst>
-              <a:ext uri="{FF2B5EF4-FFF2-40B4-BE49-F238E27FC236}">
-                <a16:creationId xmlns:a16="http://schemas.microsoft.com/office/drawing/2014/main" id="{615ED846-5015-288A-9549-051668217CEC}"/>
+          <p:cNvPr id="47" name="Picture 46">
+            <a:extLst>
+              <a:ext uri="{FF2B5EF4-FFF2-40B4-BE49-F238E27FC236}">
+                <a16:creationId xmlns:a16="http://schemas.microsoft.com/office/drawing/2014/main" id="{880EF3C6-6CC4-AE88-AFE2-99F30AC37EA8}"/>
               </a:ext>
             </a:extLst>
           </p:cNvPr>
@@ -17472,8 +17402,8 @@
         </p:blipFill>
         <p:spPr>
           <a:xfrm>
-            <a:off x="17338" y="2824065"/>
-            <a:ext cx="5329131" cy="3249170"/>
+            <a:off x="5805566" y="3514356"/>
+            <a:ext cx="3249484" cy="2267742"/>
           </a:xfrm>
           <a:prstGeom prst="rect">
             <a:avLst/>
@@ -17482,10 +17412,10 @@
       </p:pic>
       <p:pic>
         <p:nvPicPr>
-          <p:cNvPr id="2" name="Picture 1">
-            <a:extLst>
-              <a:ext uri="{FF2B5EF4-FFF2-40B4-BE49-F238E27FC236}">
-                <a16:creationId xmlns:a16="http://schemas.microsoft.com/office/drawing/2014/main" id="{30D237E8-4F48-BB9B-6816-CC9DAA72692F}"/>
+          <p:cNvPr id="30" name="Picture 29">
+            <a:extLst>
+              <a:ext uri="{FF2B5EF4-FFF2-40B4-BE49-F238E27FC236}">
+                <a16:creationId xmlns:a16="http://schemas.microsoft.com/office/drawing/2014/main" id="{B643A20B-BB0E-CB6E-E2A4-998341D3C968}"/>
               </a:ext>
             </a:extLst>
           </p:cNvPr>
@@ -17502,8 +17432,8 @@
         </p:blipFill>
         <p:spPr>
           <a:xfrm>
-            <a:off x="1314024" y="-12249"/>
-            <a:ext cx="3464995" cy="2482340"/>
+            <a:off x="6123199" y="5842139"/>
+            <a:ext cx="1651481" cy="955907"/>
           </a:xfrm>
           <a:prstGeom prst="rect">
             <a:avLst/>
@@ -17524,8 +17454,8 @@
         </p:nvSpPr>
         <p:spPr>
           <a:xfrm>
-            <a:off x="3889406" y="2045152"/>
-            <a:ext cx="399390" cy="145232"/>
+            <a:off x="3874294" y="1723494"/>
+            <a:ext cx="289856" cy="98162"/>
           </a:xfrm>
           <a:prstGeom prst="rect">
             <a:avLst/>
@@ -17573,13 +17503,14 @@
           </p:cNvPr>
           <p:cNvCxnSpPr>
             <a:cxnSpLocks/>
+            <a:stCxn id="7" idx="2"/>
           </p:cNvCxnSpPr>
           <p:nvPr/>
         </p:nvCxnSpPr>
         <p:spPr>
           <a:xfrm flipH="1">
-            <a:off x="3803934" y="2189244"/>
-            <a:ext cx="218635" cy="530027"/>
+            <a:off x="3803934" y="1821656"/>
+            <a:ext cx="215288" cy="897615"/>
           </a:xfrm>
           <a:prstGeom prst="straightConnector1">
             <a:avLst/>
@@ -17620,7 +17551,7 @@
         </p:nvSpPr>
         <p:spPr>
           <a:xfrm>
-            <a:off x="967669" y="3059668"/>
+            <a:off x="1242733" y="3012048"/>
             <a:ext cx="301686" cy="369332"/>
           </a:xfrm>
           <a:prstGeom prst="rect">
@@ -17655,7 +17586,7 @@
         </p:nvSpPr>
         <p:spPr>
           <a:xfrm>
-            <a:off x="-35734" y="2494929"/>
+            <a:off x="-10334" y="2494929"/>
             <a:ext cx="317716" cy="369332"/>
           </a:xfrm>
           <a:prstGeom prst="rect">
@@ -17694,8 +17625,8 @@
         </p:nvSpPr>
         <p:spPr>
           <a:xfrm>
-            <a:off x="0" y="2810906"/>
-            <a:ext cx="1435850" cy="3262329"/>
+            <a:off x="25400" y="2810906"/>
+            <a:ext cx="1519020" cy="3434219"/>
           </a:xfrm>
           <a:prstGeom prst="rect">
             <a:avLst/>
@@ -17746,7 +17677,7 @@
         </p:nvSpPr>
         <p:spPr>
           <a:xfrm>
-            <a:off x="1368176" y="2509732"/>
+            <a:off x="1530316" y="2501934"/>
             <a:ext cx="317716" cy="369332"/>
           </a:xfrm>
           <a:prstGeom prst="rect">
@@ -17785,7 +17716,7 @@
         </p:nvSpPr>
         <p:spPr>
           <a:xfrm>
-            <a:off x="4186167" y="2509732"/>
+            <a:off x="4438542" y="2496907"/>
             <a:ext cx="317716" cy="369332"/>
           </a:xfrm>
           <a:prstGeom prst="rect">
@@ -17824,7 +17755,7 @@
         </p:nvSpPr>
         <p:spPr>
           <a:xfrm>
-            <a:off x="976096" y="3898476"/>
+            <a:off x="1304267" y="4017879"/>
             <a:ext cx="301686" cy="369332"/>
           </a:xfrm>
           <a:prstGeom prst="rect">
@@ -17859,7 +17790,7 @@
         </p:nvSpPr>
         <p:spPr>
           <a:xfrm>
-            <a:off x="3834626" y="3499976"/>
+            <a:off x="4054282" y="2776323"/>
             <a:ext cx="301686" cy="369332"/>
           </a:xfrm>
           <a:prstGeom prst="rect">
@@ -17875,7 +17806,7 @@
           <a:p>
             <a:r>
               <a:rPr lang="fr-CH" dirty="0"/>
-              <a:t>4</a:t>
+              <a:t>7</a:t>
             </a:r>
           </a:p>
         </p:txBody>
@@ -17896,7 +17827,7 @@
         </p:nvCxnSpPr>
         <p:spPr>
           <a:xfrm>
-            <a:off x="4005899" y="3822988"/>
+            <a:off x="4217037" y="3066827"/>
             <a:ext cx="0" cy="230832"/>
           </a:xfrm>
           <a:prstGeom prst="straightConnector1">
@@ -17940,8 +17871,8 @@
         </p:nvCxnSpPr>
         <p:spPr>
           <a:xfrm flipV="1">
-            <a:off x="4074877" y="1249866"/>
-            <a:ext cx="1671890" cy="2833185"/>
+            <a:off x="4258463" y="1249866"/>
+            <a:ext cx="1488304" cy="2098172"/>
           </a:xfrm>
           <a:prstGeom prst="straightConnector1">
             <a:avLst/>
@@ -18126,8 +18057,8 @@
         </p:nvCxnSpPr>
         <p:spPr>
           <a:xfrm flipV="1">
-            <a:off x="3435658" y="4202545"/>
-            <a:ext cx="0" cy="2188340"/>
+            <a:off x="3435658" y="3429000"/>
+            <a:ext cx="0" cy="2961885"/>
           </a:xfrm>
           <a:prstGeom prst="straightConnector1">
             <a:avLst/>
@@ -18165,7 +18096,7 @@
         </p:nvSpPr>
         <p:spPr>
           <a:xfrm>
-            <a:off x="5103582" y="4538268"/>
+            <a:off x="5416698" y="4684795"/>
             <a:ext cx="301686" cy="369332"/>
           </a:xfrm>
           <a:prstGeom prst="rect">
@@ -18181,7 +18112,7 @@
           <a:p>
             <a:r>
               <a:rPr lang="fr-CH" dirty="0"/>
-              <a:t>6</a:t>
+              <a:t>9</a:t>
             </a:r>
           </a:p>
         </p:txBody>
@@ -18200,8 +18131,8 @@
         </p:nvSpPr>
         <p:spPr>
           <a:xfrm>
-            <a:off x="4472805" y="5577155"/>
-            <a:ext cx="301686" cy="369332"/>
+            <a:off x="4680010" y="5668454"/>
+            <a:ext cx="418704" cy="369332"/>
           </a:xfrm>
           <a:prstGeom prst="rect">
             <a:avLst/>
@@ -18216,7 +18147,7 @@
           <a:p>
             <a:r>
               <a:rPr lang="fr-CH" dirty="0"/>
-              <a:t>7</a:t>
+              <a:t>13</a:t>
             </a:r>
           </a:p>
         </p:txBody>
@@ -18321,8 +18252,8 @@
         </p:nvSpPr>
         <p:spPr>
           <a:xfrm>
-            <a:off x="1437542" y="2810771"/>
-            <a:ext cx="2803429" cy="3262329"/>
+            <a:off x="1534483" y="2810771"/>
+            <a:ext cx="2963722" cy="3428807"/>
           </a:xfrm>
           <a:prstGeom prst="rect">
             <a:avLst/>
@@ -18373,8 +18304,8 @@
         </p:nvSpPr>
         <p:spPr>
           <a:xfrm>
-            <a:off x="4240972" y="2808046"/>
-            <a:ext cx="1107189" cy="3262329"/>
+            <a:off x="4493868" y="2808047"/>
+            <a:ext cx="1152661" cy="3437078"/>
           </a:xfrm>
           <a:prstGeom prst="rect">
             <a:avLst/>
@@ -18425,7 +18356,7 @@
         </p:nvSpPr>
         <p:spPr>
           <a:xfrm>
-            <a:off x="1054485" y="5412766"/>
+            <a:off x="1079885" y="5412766"/>
             <a:ext cx="301686" cy="369332"/>
           </a:xfrm>
           <a:prstGeom prst="rect">
@@ -18441,42 +18372,7 @@
           <a:p>
             <a:r>
               <a:rPr lang="fr-CH" dirty="0"/>
-              <a:t>3</a:t>
-            </a:r>
-          </a:p>
-        </p:txBody>
-      </p:sp>
-      <p:sp>
-        <p:nvSpPr>
-          <p:cNvPr id="42" name="ZoneTexte 5">
-            <a:extLst>
-              <a:ext uri="{FF2B5EF4-FFF2-40B4-BE49-F238E27FC236}">
-                <a16:creationId xmlns:a16="http://schemas.microsoft.com/office/drawing/2014/main" id="{F5252137-DC3C-62D6-5DFC-1B749C3F0FA8}"/>
-              </a:ext>
-            </a:extLst>
-          </p:cNvPr>
-          <p:cNvSpPr txBox="1"/>
-          <p:nvPr/>
-        </p:nvSpPr>
-        <p:spPr>
-          <a:xfrm>
-            <a:off x="5080029" y="3246553"/>
-            <a:ext cx="301686" cy="369332"/>
-          </a:xfrm>
-          <a:prstGeom prst="rect">
-            <a:avLst/>
-          </a:prstGeom>
-          <a:noFill/>
-        </p:spPr>
-        <p:txBody>
-          <a:bodyPr wrap="none" rtlCol="0">
-            <a:spAutoFit/>
-          </a:bodyPr>
-          <a:lstStyle/>
-          <a:p>
-            <a:r>
-              <a:rPr lang="fr-CH" dirty="0"/>
-              <a:t>5</a:t>
+              <a:t>4</a:t>
             </a:r>
           </a:p>
         </p:txBody>
@@ -18511,7 +18407,7 @@
           <a:p>
             <a:r>
               <a:rPr lang="fr-CH" dirty="0"/>
-              <a:t>4b</a:t>
+              <a:t>7b</a:t>
             </a:r>
           </a:p>
         </p:txBody>
@@ -18546,7 +18442,7 @@
           <a:p>
             <a:r>
               <a:rPr lang="fr-CH" dirty="0"/>
-              <a:t>4b</a:t>
+              <a:t>7b</a:t>
             </a:r>
           </a:p>
         </p:txBody>
@@ -18581,7 +18477,7 @@
           <a:p>
             <a:r>
               <a:rPr lang="fr-CH" dirty="0"/>
-              <a:t>4d</a:t>
+              <a:t>7d</a:t>
             </a:r>
           </a:p>
         </p:txBody>
@@ -18660,7 +18556,7 @@
           <a:p>
             <a:r>
               <a:rPr lang="fr-CH" dirty="0"/>
-              <a:t>4c</a:t>
+              <a:t>7c</a:t>
             </a:r>
           </a:p>
         </p:txBody>
@@ -18908,6 +18804,251 @@
           </a:fontRef>
         </p:style>
       </p:cxnSp>
+      <p:sp>
+        <p:nvSpPr>
+          <p:cNvPr id="5" name="ZoneTexte 5">
+            <a:extLst>
+              <a:ext uri="{FF2B5EF4-FFF2-40B4-BE49-F238E27FC236}">
+                <a16:creationId xmlns:a16="http://schemas.microsoft.com/office/drawing/2014/main" id="{B8CA7021-3037-B99D-18C3-19170A791D17}"/>
+              </a:ext>
+            </a:extLst>
+          </p:cNvPr>
+          <p:cNvSpPr txBox="1"/>
+          <p:nvPr/>
+        </p:nvSpPr>
+        <p:spPr>
+          <a:xfrm>
+            <a:off x="992546" y="3869308"/>
+            <a:ext cx="301686" cy="369332"/>
+          </a:xfrm>
+          <a:prstGeom prst="rect">
+            <a:avLst/>
+          </a:prstGeom>
+          <a:noFill/>
+        </p:spPr>
+        <p:txBody>
+          <a:bodyPr wrap="none" rtlCol="0">
+            <a:spAutoFit/>
+          </a:bodyPr>
+          <a:lstStyle/>
+          <a:p>
+            <a:r>
+              <a:rPr lang="fr-CH" dirty="0"/>
+              <a:t>3</a:t>
+            </a:r>
+          </a:p>
+        </p:txBody>
+      </p:sp>
+      <p:sp>
+        <p:nvSpPr>
+          <p:cNvPr id="9" name="ZoneTexte 5">
+            <a:extLst>
+              <a:ext uri="{FF2B5EF4-FFF2-40B4-BE49-F238E27FC236}">
+                <a16:creationId xmlns:a16="http://schemas.microsoft.com/office/drawing/2014/main" id="{51D2E152-10C8-C797-4139-29C61EE647C9}"/>
+              </a:ext>
+            </a:extLst>
+          </p:cNvPr>
+          <p:cNvSpPr txBox="1"/>
+          <p:nvPr/>
+        </p:nvSpPr>
+        <p:spPr>
+          <a:xfrm>
+            <a:off x="3550467" y="5180063"/>
+            <a:ext cx="301686" cy="369332"/>
+          </a:xfrm>
+          <a:prstGeom prst="rect">
+            <a:avLst/>
+          </a:prstGeom>
+          <a:noFill/>
+        </p:spPr>
+        <p:txBody>
+          <a:bodyPr wrap="none" rtlCol="0">
+            <a:spAutoFit/>
+          </a:bodyPr>
+          <a:lstStyle/>
+          <a:p>
+            <a:r>
+              <a:rPr lang="fr-CH" dirty="0"/>
+              <a:t>6</a:t>
+            </a:r>
+          </a:p>
+        </p:txBody>
+      </p:sp>
+      <p:sp>
+        <p:nvSpPr>
+          <p:cNvPr id="10" name="ZoneTexte 5">
+            <a:extLst>
+              <a:ext uri="{FF2B5EF4-FFF2-40B4-BE49-F238E27FC236}">
+                <a16:creationId xmlns:a16="http://schemas.microsoft.com/office/drawing/2014/main" id="{1E60AD5D-7E32-5D57-7047-B5B37F72CE3B}"/>
+              </a:ext>
+            </a:extLst>
+          </p:cNvPr>
+          <p:cNvSpPr txBox="1"/>
+          <p:nvPr/>
+        </p:nvSpPr>
+        <p:spPr>
+          <a:xfrm>
+            <a:off x="4189550" y="4610153"/>
+            <a:ext cx="301686" cy="369332"/>
+          </a:xfrm>
+          <a:prstGeom prst="rect">
+            <a:avLst/>
+          </a:prstGeom>
+          <a:noFill/>
+        </p:spPr>
+        <p:txBody>
+          <a:bodyPr wrap="none" rtlCol="0">
+            <a:spAutoFit/>
+          </a:bodyPr>
+          <a:lstStyle/>
+          <a:p>
+            <a:r>
+              <a:rPr lang="fr-CH" dirty="0"/>
+              <a:t>5</a:t>
+            </a:r>
+          </a:p>
+        </p:txBody>
+      </p:sp>
+      <p:sp>
+        <p:nvSpPr>
+          <p:cNvPr id="13" name="ZoneTexte 5">
+            <a:extLst>
+              <a:ext uri="{FF2B5EF4-FFF2-40B4-BE49-F238E27FC236}">
+                <a16:creationId xmlns:a16="http://schemas.microsoft.com/office/drawing/2014/main" id="{0A2E3089-4643-DF66-CE70-C570626C7EA2}"/>
+              </a:ext>
+            </a:extLst>
+          </p:cNvPr>
+          <p:cNvSpPr txBox="1"/>
+          <p:nvPr/>
+        </p:nvSpPr>
+        <p:spPr>
+          <a:xfrm>
+            <a:off x="3863091" y="5875793"/>
+            <a:ext cx="301686" cy="369332"/>
+          </a:xfrm>
+          <a:prstGeom prst="rect">
+            <a:avLst/>
+          </a:prstGeom>
+          <a:noFill/>
+        </p:spPr>
+        <p:txBody>
+          <a:bodyPr wrap="none" rtlCol="0">
+            <a:spAutoFit/>
+          </a:bodyPr>
+          <a:lstStyle/>
+          <a:p>
+            <a:r>
+              <a:rPr lang="fr-CH" dirty="0"/>
+              <a:t>8</a:t>
+            </a:r>
+          </a:p>
+        </p:txBody>
+      </p:sp>
+      <p:sp>
+        <p:nvSpPr>
+          <p:cNvPr id="27" name="ZoneTexte 5">
+            <a:extLst>
+              <a:ext uri="{FF2B5EF4-FFF2-40B4-BE49-F238E27FC236}">
+                <a16:creationId xmlns:a16="http://schemas.microsoft.com/office/drawing/2014/main" id="{8771D9D8-DE95-63B8-3A5F-6A78B52E321E}"/>
+              </a:ext>
+            </a:extLst>
+          </p:cNvPr>
+          <p:cNvSpPr txBox="1"/>
+          <p:nvPr/>
+        </p:nvSpPr>
+        <p:spPr>
+          <a:xfrm>
+            <a:off x="5537048" y="4961142"/>
+            <a:ext cx="418704" cy="369332"/>
+          </a:xfrm>
+          <a:prstGeom prst="rect">
+            <a:avLst/>
+          </a:prstGeom>
+          <a:noFill/>
+        </p:spPr>
+        <p:txBody>
+          <a:bodyPr wrap="none" rtlCol="0">
+            <a:spAutoFit/>
+          </a:bodyPr>
+          <a:lstStyle/>
+          <a:p>
+            <a:r>
+              <a:rPr lang="fr-CH" dirty="0"/>
+              <a:t>10</a:t>
+            </a:r>
+          </a:p>
+        </p:txBody>
+      </p:sp>
+      <p:sp>
+        <p:nvSpPr>
+          <p:cNvPr id="28" name="ZoneTexte 5">
+            <a:extLst>
+              <a:ext uri="{FF2B5EF4-FFF2-40B4-BE49-F238E27FC236}">
+                <a16:creationId xmlns:a16="http://schemas.microsoft.com/office/drawing/2014/main" id="{8D826D4F-5B74-B21F-B10F-BE814BFBFD81}"/>
+              </a:ext>
+            </a:extLst>
+          </p:cNvPr>
+          <p:cNvSpPr txBox="1"/>
+          <p:nvPr/>
+        </p:nvSpPr>
+        <p:spPr>
+          <a:xfrm>
+            <a:off x="5486660" y="5275081"/>
+            <a:ext cx="418704" cy="369332"/>
+          </a:xfrm>
+          <a:prstGeom prst="rect">
+            <a:avLst/>
+          </a:prstGeom>
+          <a:noFill/>
+        </p:spPr>
+        <p:txBody>
+          <a:bodyPr wrap="none" rtlCol="0">
+            <a:spAutoFit/>
+          </a:bodyPr>
+          <a:lstStyle/>
+          <a:p>
+            <a:r>
+              <a:rPr lang="fr-CH" dirty="0"/>
+              <a:t>11</a:t>
+            </a:r>
+          </a:p>
+        </p:txBody>
+      </p:sp>
+      <p:sp>
+        <p:nvSpPr>
+          <p:cNvPr id="29" name="ZoneTexte 5">
+            <a:extLst>
+              <a:ext uri="{FF2B5EF4-FFF2-40B4-BE49-F238E27FC236}">
+                <a16:creationId xmlns:a16="http://schemas.microsoft.com/office/drawing/2014/main" id="{C033823E-787D-8D1A-2593-39F31CF78AFF}"/>
+              </a:ext>
+            </a:extLst>
+          </p:cNvPr>
+          <p:cNvSpPr txBox="1"/>
+          <p:nvPr/>
+        </p:nvSpPr>
+        <p:spPr>
+          <a:xfrm>
+            <a:off x="5475018" y="5465160"/>
+            <a:ext cx="418704" cy="369332"/>
+          </a:xfrm>
+          <a:prstGeom prst="rect">
+            <a:avLst/>
+          </a:prstGeom>
+          <a:noFill/>
+        </p:spPr>
+        <p:txBody>
+          <a:bodyPr wrap="none" rtlCol="0">
+            <a:spAutoFit/>
+          </a:bodyPr>
+          <a:lstStyle/>
+          <a:p>
+            <a:r>
+              <a:rPr lang="fr-CH" dirty="0"/>
+              <a:t>12</a:t>
+            </a:r>
+          </a:p>
+        </p:txBody>
+      </p:sp>
     </p:spTree>
     <p:extLst>
       <p:ext uri="{BB962C8B-B14F-4D97-AF65-F5344CB8AC3E}">

</xml_diff>